<commit_message>
add 6-7 (1) Font, Dimension and Alignment
</commit_message>
<xml_diff>
--- a/Python-with-Office-Video_Covers.pptx
+++ b/Python-with-Office-Video_Covers.pptx
@@ -5,10 +5,10 @@
     <p:sldMasterId id="2147483660" r:id="rId1"/>
   </p:sldMasterIdLst>
   <p:notesMasterIdLst>
-    <p:notesMasterId r:id="rId37"/>
+    <p:notesMasterId r:id="rId38"/>
   </p:notesMasterIdLst>
   <p:handoutMasterIdLst>
-    <p:handoutMasterId r:id="rId38"/>
+    <p:handoutMasterId r:id="rId39"/>
   </p:handoutMasterIdLst>
   <p:sldIdLst>
     <p:sldId id="257" r:id="rId2"/>
@@ -46,6 +46,7 @@
     <p:sldId id="289" r:id="rId34"/>
     <p:sldId id="290" r:id="rId35"/>
     <p:sldId id="291" r:id="rId36"/>
+    <p:sldId id="292" r:id="rId37"/>
   </p:sldIdLst>
   <p:sldSz cx="12188825" cy="6858000"/>
   <p:notesSz cx="6858000" cy="9144000"/>
@@ -3162,6 +3163,90 @@
     <p:extLst>
       <p:ext uri="{BB962C8B-B14F-4D97-AF65-F5344CB8AC3E}">
         <p14:creationId xmlns:p14="http://schemas.microsoft.com/office/powerpoint/2010/main" val="4133575109"/>
+      </p:ext>
+    </p:extLst>
+  </p:cSld>
+  <p:clrMapOvr>
+    <a:masterClrMapping/>
+  </p:clrMapOvr>
+</p:notes>
+</file>
+
+<file path=ppt/notesSlides/notesSlide36.xml><?xml version="1.0" encoding="utf-8"?>
+<p:notes xmlns:a="http://schemas.openxmlformats.org/drawingml/2006/main" xmlns:r="http://schemas.openxmlformats.org/officeDocument/2006/relationships" xmlns:p="http://schemas.openxmlformats.org/presentationml/2006/main">
+  <p:cSld>
+    <p:spTree>
+      <p:nvGrpSpPr>
+        <p:cNvPr id="1" name=""/>
+        <p:cNvGrpSpPr/>
+        <p:nvPr/>
+      </p:nvGrpSpPr>
+      <p:grpSpPr>
+        <a:xfrm>
+          <a:off x="0" y="0"/>
+          <a:ext cx="0" cy="0"/>
+          <a:chOff x="0" y="0"/>
+          <a:chExt cx="0" cy="0"/>
+        </a:xfrm>
+      </p:grpSpPr>
+      <p:sp>
+        <p:nvSpPr>
+          <p:cNvPr id="2" name="Slide Image Placeholder 1"/>
+          <p:cNvSpPr>
+            <a:spLocks noGrp="1" noRot="1" noChangeAspect="1"/>
+          </p:cNvSpPr>
+          <p:nvPr>
+            <p:ph type="sldImg"/>
+          </p:nvPr>
+        </p:nvSpPr>
+        <p:spPr/>
+      </p:sp>
+      <p:sp>
+        <p:nvSpPr>
+          <p:cNvPr id="3" name="Notes Placeholder 2"/>
+          <p:cNvSpPr>
+            <a:spLocks noGrp="1"/>
+          </p:cNvSpPr>
+          <p:nvPr>
+            <p:ph type="body" idx="1"/>
+          </p:nvPr>
+        </p:nvSpPr>
+        <p:spPr/>
+        <p:txBody>
+          <a:bodyPr/>
+          <a:lstStyle/>
+          <a:p>
+            <a:endParaRPr lang="en-US" dirty="0"/>
+          </a:p>
+        </p:txBody>
+      </p:sp>
+      <p:sp>
+        <p:nvSpPr>
+          <p:cNvPr id="4" name="Slide Number Placeholder 3"/>
+          <p:cNvSpPr>
+            <a:spLocks noGrp="1"/>
+          </p:cNvSpPr>
+          <p:nvPr>
+            <p:ph type="sldNum" sz="quarter" idx="10"/>
+          </p:nvPr>
+        </p:nvSpPr>
+        <p:spPr/>
+        <p:txBody>
+          <a:bodyPr/>
+          <a:lstStyle/>
+          <a:p>
+            <a:fld id="{6BB98AFB-CB0D-4DFE-87B9-B4B0D0DE73CD}" type="slidenum">
+              <a:rPr lang="en-US" smtClean="0"/>
+              <a:t>36</a:t>
+            </a:fld>
+            <a:endParaRPr lang="en-US" dirty="0"/>
+          </a:p>
+        </p:txBody>
+      </p:sp>
+    </p:spTree>
+    <p:extLst>
+      <p:ext uri="{BB962C8B-B14F-4D97-AF65-F5344CB8AC3E}">
+        <p14:creationId xmlns:p14="http://schemas.microsoft.com/office/powerpoint/2010/main" val="3530172327"/>
       </p:ext>
     </p:extLst>
   </p:cSld>
@@ -17884,7 +17969,7 @@
         </p:spPr>
         <p:txBody>
           <a:bodyPr>
-            <a:normAutofit/>
+            <a:normAutofit lnSpcReduction="10000"/>
           </a:bodyPr>
           <a:lstStyle/>
           <a:p>
@@ -17904,7 +17989,7 @@
                 <a:ea typeface="ADLaM Display" panose="020F0502020204030204" pitchFamily="2" charset="0"/>
                 <a:cs typeface="ADLaM Display" panose="020F0502020204030204" pitchFamily="2" charset="0"/>
               </a:rPr>
-              <a:t>6.7 Set Style in Excel</a:t>
+              <a:t>6.7 Set Style in Excel: Font, Dimension &amp; Alignment</a:t>
             </a:r>
           </a:p>
           <a:p>
@@ -17940,7 +18025,7 @@
                 <a:ea typeface="ADLaM Display" panose="020F0502020204030204" pitchFamily="2" charset="0"/>
                 <a:cs typeface="ADLaM Display" panose="020F0502020204030204" pitchFamily="2" charset="0"/>
               </a:rPr>
-              <a:t>设置样式</a:t>
+              <a:t>设置样式：字体，尺寸，对齐</a:t>
             </a:r>
             <a:endParaRPr lang="en-US" altLang="zh-CN" sz="2800" dirty="0">
               <a:latin typeface="ADLaM Display" panose="020F0502020204030204" pitchFamily="2" charset="0"/>
@@ -18099,7 +18184,7 @@
         <p:spPr>
           <a:xfrm>
             <a:off x="7678588" y="3058290"/>
-            <a:ext cx="4248472" cy="2026894"/>
+            <a:ext cx="4248472" cy="1234806"/>
           </a:xfrm>
           <a:prstGeom prst="rect">
             <a:avLst/>
@@ -18138,6 +18223,428 @@
     <p:extLst>
       <p:ext uri="{BB962C8B-B14F-4D97-AF65-F5344CB8AC3E}">
         <p14:creationId xmlns:p14="http://schemas.microsoft.com/office/powerpoint/2010/main" val="2485141835"/>
+      </p:ext>
+    </p:extLst>
+  </p:cSld>
+  <p:clrMapOvr>
+    <a:masterClrMapping/>
+  </p:clrMapOvr>
+  <mc:AlternateContent xmlns:mc="http://schemas.openxmlformats.org/markup-compatibility/2006" xmlns:p14="http://schemas.microsoft.com/office/powerpoint/2010/main">
+    <mc:Choice Requires="p14">
+      <p:transition spd="med" p14:dur="700">
+        <p:fade/>
+      </p:transition>
+    </mc:Choice>
+    <mc:Fallback xmlns="">
+      <p:transition spd="med">
+        <p:fade/>
+      </p:transition>
+    </mc:Fallback>
+  </mc:AlternateContent>
+</p:sld>
+</file>
+
+<file path=ppt/slides/slide36.xml><?xml version="1.0" encoding="utf-8"?>
+<p:sld xmlns:a="http://schemas.openxmlformats.org/drawingml/2006/main" xmlns:r="http://schemas.openxmlformats.org/officeDocument/2006/relationships" xmlns:p="http://schemas.openxmlformats.org/presentationml/2006/main">
+  <p:cSld>
+    <p:spTree>
+      <p:nvGrpSpPr>
+        <p:cNvPr id="1" name=""/>
+        <p:cNvGrpSpPr/>
+        <p:nvPr/>
+      </p:nvGrpSpPr>
+      <p:grpSpPr>
+        <a:xfrm>
+          <a:off x="0" y="0"/>
+          <a:ext cx="0" cy="0"/>
+          <a:chOff x="0" y="0"/>
+          <a:chExt cx="0" cy="0"/>
+        </a:xfrm>
+      </p:grpSpPr>
+      <p:pic>
+        <p:nvPicPr>
+          <p:cNvPr id="8" name="Picture 7">
+            <a:extLst>
+              <a:ext uri="{FF2B5EF4-FFF2-40B4-BE49-F238E27FC236}">
+                <a16:creationId xmlns:a16="http://schemas.microsoft.com/office/drawing/2014/main" id="{7CCE36F8-9A77-0CB4-2ED3-45CC9F178DCF}"/>
+              </a:ext>
+            </a:extLst>
+          </p:cNvPr>
+          <p:cNvPicPr>
+            <a:picLocks noChangeAspect="1"/>
+          </p:cNvPicPr>
+          <p:nvPr/>
+        </p:nvPicPr>
+        <p:blipFill>
+          <a:blip r:embed="rId3"/>
+          <a:stretch>
+            <a:fillRect/>
+          </a:stretch>
+        </p:blipFill>
+        <p:spPr>
+          <a:xfrm>
+            <a:off x="6144607" y="1484784"/>
+            <a:ext cx="5881237" cy="4104456"/>
+          </a:xfrm>
+          <a:prstGeom prst="rect">
+            <a:avLst/>
+          </a:prstGeom>
+          <a:ln>
+            <a:noFill/>
+          </a:ln>
+          <a:effectLst>
+            <a:outerShdw blurRad="292100" dist="139700" dir="2700000" algn="tl" rotWithShape="0">
+              <a:srgbClr val="333333">
+                <a:alpha val="65000"/>
+              </a:srgbClr>
+            </a:outerShdw>
+          </a:effectLst>
+        </p:spPr>
+      </p:pic>
+      <p:sp>
+        <p:nvSpPr>
+          <p:cNvPr id="4" name="Title 3"/>
+          <p:cNvSpPr>
+            <a:spLocks noGrp="1"/>
+          </p:cNvSpPr>
+          <p:nvPr>
+            <p:ph type="ctrTitle"/>
+          </p:nvPr>
+        </p:nvSpPr>
+        <p:spPr/>
+        <p:txBody>
+          <a:bodyPr>
+            <a:normAutofit/>
+          </a:bodyPr>
+          <a:lstStyle/>
+          <a:p>
+            <a:pPr algn="ctr"/>
+            <a:r>
+              <a:rPr lang="zh-CN" altLang="en-US" sz="4800" dirty="0">
+                <a:latin typeface="华文隶书" panose="02010800040101010101" pitchFamily="2" charset="-122"/>
+                <a:ea typeface="华文隶书" panose="02010800040101010101" pitchFamily="2" charset="-122"/>
+              </a:rPr>
+              <a:t>让</a:t>
+            </a:r>
+            <a:r>
+              <a:rPr lang="en-US" altLang="zh-CN" sz="4800" dirty="0">
+                <a:latin typeface="华文隶书" panose="02010800040101010101" pitchFamily="2" charset="-122"/>
+                <a:ea typeface="华文隶书" panose="02010800040101010101" pitchFamily="2" charset="-122"/>
+              </a:rPr>
+              <a:t>Python</a:t>
+            </a:r>
+            <a:r>
+              <a:rPr lang="zh-CN" altLang="en-US" sz="4800" dirty="0">
+                <a:latin typeface="华文隶书" panose="02010800040101010101" pitchFamily="2" charset="-122"/>
+                <a:ea typeface="华文隶书" panose="02010800040101010101" pitchFamily="2" charset="-122"/>
+              </a:rPr>
+              <a:t>遇上</a:t>
+            </a:r>
+            <a:r>
+              <a:rPr lang="en-US" altLang="zh-CN" sz="4800" dirty="0">
+                <a:latin typeface="华文隶书" panose="02010800040101010101" pitchFamily="2" charset="-122"/>
+                <a:ea typeface="华文隶书" panose="02010800040101010101" pitchFamily="2" charset="-122"/>
+              </a:rPr>
+              <a:t>Office</a:t>
+            </a:r>
+            <a:br>
+              <a:rPr lang="en-US" altLang="zh-CN" sz="4800" dirty="0">
+                <a:latin typeface="华文隶书" panose="02010800040101010101" pitchFamily="2" charset="-122"/>
+                <a:ea typeface="华文隶书" panose="02010800040101010101" pitchFamily="2" charset="-122"/>
+              </a:rPr>
+            </a:br>
+            <a:br>
+              <a:rPr lang="en-US" altLang="zh-CN" sz="4800" dirty="0">
+                <a:latin typeface="华文隶书" panose="02010800040101010101" pitchFamily="2" charset="-122"/>
+                <a:ea typeface="华文隶书" panose="02010800040101010101" pitchFamily="2" charset="-122"/>
+              </a:rPr>
+            </a:br>
+            <a:r>
+              <a:rPr lang="en-US" altLang="zh-CN" sz="4800" dirty="0">
+                <a:latin typeface="华文隶书" panose="02010800040101010101" pitchFamily="2" charset="-122"/>
+                <a:ea typeface="华文隶书" panose="02010800040101010101" pitchFamily="2" charset="-122"/>
+              </a:rPr>
+              <a:t>(Python with Office)</a:t>
+            </a:r>
+            <a:endParaRPr lang="en-US" sz="4800" dirty="0">
+              <a:latin typeface="华文隶书" panose="02010800040101010101" pitchFamily="2" charset="-122"/>
+              <a:ea typeface="华文隶书" panose="02010800040101010101" pitchFamily="2" charset="-122"/>
+            </a:endParaRPr>
+          </a:p>
+        </p:txBody>
+      </p:sp>
+      <p:sp>
+        <p:nvSpPr>
+          <p:cNvPr id="3" name="Content Placeholder 2"/>
+          <p:cNvSpPr>
+            <a:spLocks noGrp="1"/>
+          </p:cNvSpPr>
+          <p:nvPr>
+            <p:ph type="subTitle" idx="1"/>
+          </p:nvPr>
+        </p:nvSpPr>
+        <p:spPr>
+          <a:xfrm>
+            <a:off x="549796" y="3403600"/>
+            <a:ext cx="5544617" cy="2185640"/>
+          </a:xfrm>
+        </p:spPr>
+        <p:txBody>
+          <a:bodyPr>
+            <a:normAutofit lnSpcReduction="10000"/>
+          </a:bodyPr>
+          <a:lstStyle/>
+          <a:p>
+            <a:r>
+              <a:rPr lang="en-US" sz="2800" dirty="0">
+                <a:latin typeface="ADLaM Display" panose="020F0502020204030204" pitchFamily="2" charset="0"/>
+                <a:ea typeface="ADLaM Display" panose="020F0502020204030204" pitchFamily="2" charset="0"/>
+                <a:cs typeface="ADLaM Display" panose="020F0502020204030204" pitchFamily="2" charset="0"/>
+              </a:rPr>
+              <a:t>Chapter 6 Work with Excel</a:t>
+            </a:r>
+          </a:p>
+          <a:p>
+            <a:r>
+              <a:rPr lang="en-US" sz="2800" dirty="0">
+                <a:latin typeface="ADLaM Display" panose="020F0502020204030204" pitchFamily="2" charset="0"/>
+                <a:ea typeface="ADLaM Display" panose="020F0502020204030204" pitchFamily="2" charset="0"/>
+                <a:cs typeface="ADLaM Display" panose="020F0502020204030204" pitchFamily="2" charset="0"/>
+              </a:rPr>
+              <a:t>6.7 Set Style in Excel: Border, Fill &amp; Gradient</a:t>
+            </a:r>
+          </a:p>
+          <a:p>
+            <a:r>
+              <a:rPr lang="zh-CN" altLang="en-US" sz="2800" dirty="0">
+                <a:latin typeface="ADLaM Display" panose="020F0502020204030204" pitchFamily="2" charset="0"/>
+                <a:ea typeface="ADLaM Display" panose="020F0502020204030204" pitchFamily="2" charset="0"/>
+                <a:cs typeface="ADLaM Display" panose="020F0502020204030204" pitchFamily="2" charset="0"/>
+              </a:rPr>
+              <a:t>第六章 操作</a:t>
+            </a:r>
+            <a:r>
+              <a:rPr lang="en-US" altLang="zh-CN" sz="2800" dirty="0">
+                <a:latin typeface="ADLaM Display" panose="020F0502020204030204" pitchFamily="2" charset="0"/>
+                <a:ea typeface="ADLaM Display" panose="020F0502020204030204" pitchFamily="2" charset="0"/>
+                <a:cs typeface="ADLaM Display" panose="020F0502020204030204" pitchFamily="2" charset="0"/>
+              </a:rPr>
+              <a:t>Excel</a:t>
+            </a:r>
+          </a:p>
+          <a:p>
+            <a:r>
+              <a:rPr lang="en-US" altLang="zh-CN" sz="2800" dirty="0">
+                <a:latin typeface="ADLaM Display" panose="020F0502020204030204" pitchFamily="2" charset="0"/>
+                <a:ea typeface="ADLaM Display" panose="020F0502020204030204" pitchFamily="2" charset="0"/>
+                <a:cs typeface="ADLaM Display" panose="020F0502020204030204" pitchFamily="2" charset="0"/>
+              </a:rPr>
+              <a:t>6.7 </a:t>
+            </a:r>
+            <a:r>
+              <a:rPr lang="zh-CN" altLang="en-US" sz="2800" dirty="0">
+                <a:latin typeface="ADLaM Display" panose="020F0502020204030204" pitchFamily="2" charset="0"/>
+                <a:ea typeface="ADLaM Display" panose="020F0502020204030204" pitchFamily="2" charset="0"/>
+                <a:cs typeface="ADLaM Display" panose="020F0502020204030204" pitchFamily="2" charset="0"/>
+              </a:rPr>
+              <a:t>设置样式：边框，填充，渐变</a:t>
+            </a:r>
+            <a:endParaRPr lang="en-US" altLang="zh-CN" sz="2800" dirty="0">
+              <a:latin typeface="ADLaM Display" panose="020F0502020204030204" pitchFamily="2" charset="0"/>
+              <a:ea typeface="ADLaM Display" panose="020F0502020204030204" pitchFamily="2" charset="0"/>
+              <a:cs typeface="ADLaM Display" panose="020F0502020204030204" pitchFamily="2" charset="0"/>
+            </a:endParaRPr>
+          </a:p>
+        </p:txBody>
+      </p:sp>
+      <p:pic>
+        <p:nvPicPr>
+          <p:cNvPr id="5" name="Picture 4">
+            <a:extLst>
+              <a:ext uri="{FF2B5EF4-FFF2-40B4-BE49-F238E27FC236}">
+                <a16:creationId xmlns:a16="http://schemas.microsoft.com/office/drawing/2014/main" id="{4AD8B85C-B359-195F-B78C-C879AB7840B1}"/>
+              </a:ext>
+            </a:extLst>
+          </p:cNvPr>
+          <p:cNvPicPr>
+            <a:picLocks noChangeAspect="1"/>
+          </p:cNvPicPr>
+          <p:nvPr/>
+        </p:nvPicPr>
+        <p:blipFill>
+          <a:blip r:embed="rId4"/>
+          <a:stretch>
+            <a:fillRect/>
+          </a:stretch>
+        </p:blipFill>
+        <p:spPr>
+          <a:xfrm>
+            <a:off x="57601" y="1189856"/>
+            <a:ext cx="1068259" cy="1556792"/>
+          </a:xfrm>
+          <a:prstGeom prst="rect">
+            <a:avLst/>
+          </a:prstGeom>
+          <a:ln>
+            <a:noFill/>
+          </a:ln>
+          <a:effectLst>
+            <a:outerShdw blurRad="292100" dist="139700" dir="2700000" algn="tl" rotWithShape="0">
+              <a:srgbClr val="333333">
+                <a:alpha val="65000"/>
+              </a:srgbClr>
+            </a:outerShdw>
+          </a:effectLst>
+        </p:spPr>
+      </p:pic>
+      <p:sp>
+        <p:nvSpPr>
+          <p:cNvPr id="2" name="TextBox 1">
+            <a:extLst>
+              <a:ext uri="{FF2B5EF4-FFF2-40B4-BE49-F238E27FC236}">
+                <a16:creationId xmlns:a16="http://schemas.microsoft.com/office/drawing/2014/main" id="{CAB2C784-DE74-68FC-7A84-3E6C5D164315}"/>
+              </a:ext>
+            </a:extLst>
+          </p:cNvPr>
+          <p:cNvSpPr txBox="1"/>
+          <p:nvPr/>
+        </p:nvSpPr>
+        <p:spPr>
+          <a:xfrm>
+            <a:off x="405780" y="5722972"/>
+            <a:ext cx="7951216" cy="523220"/>
+          </a:xfrm>
+          <a:prstGeom prst="rect">
+            <a:avLst/>
+          </a:prstGeom>
+          <a:solidFill>
+            <a:schemeClr val="bg1">
+              <a:lumMod val="95000"/>
+            </a:schemeClr>
+          </a:solidFill>
+          <a:ln>
+            <a:solidFill>
+              <a:schemeClr val="bg2"/>
+            </a:solidFill>
+          </a:ln>
+        </p:spPr>
+        <p:txBody>
+          <a:bodyPr wrap="none" rtlCol="0" anchor="ctr" anchorCtr="1">
+            <a:spAutoFit/>
+          </a:bodyPr>
+          <a:lstStyle/>
+          <a:p>
+            <a:r>
+              <a:rPr lang="en-US" sz="2800" dirty="0">
+                <a:hlinkClick r:id="rId5"/>
+              </a:rPr>
+              <a:t>https://github.com/yasenstar/python_with_office</a:t>
+            </a:r>
+            <a:endParaRPr lang="en-US" sz="2800" dirty="0"/>
+          </a:p>
+        </p:txBody>
+      </p:sp>
+      <p:sp>
+        <p:nvSpPr>
+          <p:cNvPr id="9" name="TextBox 8">
+            <a:extLst>
+              <a:ext uri="{FF2B5EF4-FFF2-40B4-BE49-F238E27FC236}">
+                <a16:creationId xmlns:a16="http://schemas.microsoft.com/office/drawing/2014/main" id="{C25C84F5-3AA3-A068-7E2F-9123CA5A7D16}"/>
+              </a:ext>
+            </a:extLst>
+          </p:cNvPr>
+          <p:cNvSpPr txBox="1"/>
+          <p:nvPr/>
+        </p:nvSpPr>
+        <p:spPr>
+          <a:xfrm>
+            <a:off x="405780" y="6246192"/>
+            <a:ext cx="7951216" cy="523220"/>
+          </a:xfrm>
+          <a:prstGeom prst="rect">
+            <a:avLst/>
+          </a:prstGeom>
+          <a:solidFill>
+            <a:schemeClr val="bg1">
+              <a:lumMod val="95000"/>
+            </a:schemeClr>
+          </a:solidFill>
+          <a:ln>
+            <a:solidFill>
+              <a:schemeClr val="bg2"/>
+            </a:solidFill>
+          </a:ln>
+        </p:spPr>
+        <p:txBody>
+          <a:bodyPr wrap="square" rtlCol="0" anchor="ctr" anchorCtr="1">
+            <a:spAutoFit/>
+          </a:bodyPr>
+          <a:lstStyle/>
+          <a:p>
+            <a:r>
+              <a:rPr lang="en-US" sz="2800" dirty="0">
+                <a:hlinkClick r:id="rId6"/>
+              </a:rPr>
+              <a:t>https://gitee.com/yasenstar/python_with_office</a:t>
+            </a:r>
+            <a:endParaRPr lang="en-US" sz="2800" dirty="0"/>
+          </a:p>
+        </p:txBody>
+      </p:sp>
+      <p:sp>
+        <p:nvSpPr>
+          <p:cNvPr id="13" name="Rectangle 12">
+            <a:extLst>
+              <a:ext uri="{FF2B5EF4-FFF2-40B4-BE49-F238E27FC236}">
+                <a16:creationId xmlns:a16="http://schemas.microsoft.com/office/drawing/2014/main" id="{6F9C3126-4EC2-77CA-B408-E23CE9AE8E9D}"/>
+              </a:ext>
+            </a:extLst>
+          </p:cNvPr>
+          <p:cNvSpPr/>
+          <p:nvPr/>
+        </p:nvSpPr>
+        <p:spPr>
+          <a:xfrm>
+            <a:off x="7678588" y="4293096"/>
+            <a:ext cx="4248472" cy="792088"/>
+          </a:xfrm>
+          <a:prstGeom prst="rect">
+            <a:avLst/>
+          </a:prstGeom>
+          <a:noFill/>
+          <a:ln w="38100">
+            <a:solidFill>
+              <a:srgbClr val="FF0000"/>
+            </a:solidFill>
+          </a:ln>
+        </p:spPr>
+        <p:style>
+          <a:lnRef idx="2">
+            <a:schemeClr val="accent3"/>
+          </a:lnRef>
+          <a:fillRef idx="1">
+            <a:schemeClr val="lt1"/>
+          </a:fillRef>
+          <a:effectRef idx="0">
+            <a:schemeClr val="accent3"/>
+          </a:effectRef>
+          <a:fontRef idx="minor">
+            <a:schemeClr val="dk1"/>
+          </a:fontRef>
+        </p:style>
+        <p:txBody>
+          <a:bodyPr rtlCol="0" anchor="ctr"/>
+          <a:lstStyle/>
+          <a:p>
+            <a:pPr algn="ctr"/>
+            <a:endParaRPr lang="en-US" dirty="0"/>
+          </a:p>
+        </p:txBody>
+      </p:sp>
+    </p:spTree>
+    <p:extLst>
+      <p:ext uri="{BB962C8B-B14F-4D97-AF65-F5344CB8AC3E}">
+        <p14:creationId xmlns:p14="http://schemas.microsoft.com/office/powerpoint/2010/main" val="4279848535"/>
       </p:ext>
     </p:extLst>
   </p:cSld>

</xml_diff>

<commit_message>
add 608 Filtering and Sorting
</commit_message>
<xml_diff>
--- a/Python-with-Office-Video_Covers.pptx
+++ b/Python-with-Office-Video_Covers.pptx
@@ -5,10 +5,10 @@
     <p:sldMasterId id="2147483660" r:id="rId1"/>
   </p:sldMasterIdLst>
   <p:notesMasterIdLst>
-    <p:notesMasterId r:id="rId38"/>
+    <p:notesMasterId r:id="rId39"/>
   </p:notesMasterIdLst>
   <p:handoutMasterIdLst>
-    <p:handoutMasterId r:id="rId39"/>
+    <p:handoutMasterId r:id="rId40"/>
   </p:handoutMasterIdLst>
   <p:sldIdLst>
     <p:sldId id="257" r:id="rId2"/>
@@ -47,6 +47,7 @@
     <p:sldId id="290" r:id="rId35"/>
     <p:sldId id="291" r:id="rId36"/>
     <p:sldId id="292" r:id="rId37"/>
+    <p:sldId id="293" r:id="rId38"/>
   </p:sldIdLst>
   <p:sldSz cx="12188825" cy="6858000"/>
   <p:notesSz cx="6858000" cy="9144000"/>
@@ -3247,6 +3248,90 @@
     <p:extLst>
       <p:ext uri="{BB962C8B-B14F-4D97-AF65-F5344CB8AC3E}">
         <p14:creationId xmlns:p14="http://schemas.microsoft.com/office/powerpoint/2010/main" val="3530172327"/>
+      </p:ext>
+    </p:extLst>
+  </p:cSld>
+  <p:clrMapOvr>
+    <a:masterClrMapping/>
+  </p:clrMapOvr>
+</p:notes>
+</file>
+
+<file path=ppt/notesSlides/notesSlide37.xml><?xml version="1.0" encoding="utf-8"?>
+<p:notes xmlns:a="http://schemas.openxmlformats.org/drawingml/2006/main" xmlns:r="http://schemas.openxmlformats.org/officeDocument/2006/relationships" xmlns:p="http://schemas.openxmlformats.org/presentationml/2006/main">
+  <p:cSld>
+    <p:spTree>
+      <p:nvGrpSpPr>
+        <p:cNvPr id="1" name=""/>
+        <p:cNvGrpSpPr/>
+        <p:nvPr/>
+      </p:nvGrpSpPr>
+      <p:grpSpPr>
+        <a:xfrm>
+          <a:off x="0" y="0"/>
+          <a:ext cx="0" cy="0"/>
+          <a:chOff x="0" y="0"/>
+          <a:chExt cx="0" cy="0"/>
+        </a:xfrm>
+      </p:grpSpPr>
+      <p:sp>
+        <p:nvSpPr>
+          <p:cNvPr id="2" name="Slide Image Placeholder 1"/>
+          <p:cNvSpPr>
+            <a:spLocks noGrp="1" noRot="1" noChangeAspect="1"/>
+          </p:cNvSpPr>
+          <p:nvPr>
+            <p:ph type="sldImg"/>
+          </p:nvPr>
+        </p:nvSpPr>
+        <p:spPr/>
+      </p:sp>
+      <p:sp>
+        <p:nvSpPr>
+          <p:cNvPr id="3" name="Notes Placeholder 2"/>
+          <p:cNvSpPr>
+            <a:spLocks noGrp="1"/>
+          </p:cNvSpPr>
+          <p:nvPr>
+            <p:ph type="body" idx="1"/>
+          </p:nvPr>
+        </p:nvSpPr>
+        <p:spPr/>
+        <p:txBody>
+          <a:bodyPr/>
+          <a:lstStyle/>
+          <a:p>
+            <a:endParaRPr lang="en-US" dirty="0"/>
+          </a:p>
+        </p:txBody>
+      </p:sp>
+      <p:sp>
+        <p:nvSpPr>
+          <p:cNvPr id="4" name="Slide Number Placeholder 3"/>
+          <p:cNvSpPr>
+            <a:spLocks noGrp="1"/>
+          </p:cNvSpPr>
+          <p:nvPr>
+            <p:ph type="sldNum" sz="quarter" idx="10"/>
+          </p:nvPr>
+        </p:nvSpPr>
+        <p:spPr/>
+        <p:txBody>
+          <a:bodyPr/>
+          <a:lstStyle/>
+          <a:p>
+            <a:fld id="{6BB98AFB-CB0D-4DFE-87B9-B4B0D0DE73CD}" type="slidenum">
+              <a:rPr lang="en-US" smtClean="0"/>
+              <a:t>37</a:t>
+            </a:fld>
+            <a:endParaRPr lang="en-US" dirty="0"/>
+          </a:p>
+        </p:txBody>
+      </p:sp>
+    </p:spTree>
+    <p:extLst>
+      <p:ext uri="{BB962C8B-B14F-4D97-AF65-F5344CB8AC3E}">
+        <p14:creationId xmlns:p14="http://schemas.microsoft.com/office/powerpoint/2010/main" val="1337657347"/>
       </p:ext>
     </p:extLst>
   </p:cSld>
@@ -18658,6 +18743,418 @@
       </p:transition>
     </mc:Choice>
     <mc:Fallback xmlns="">
+      <p:transition spd="med">
+        <p:fade/>
+      </p:transition>
+    </mc:Fallback>
+  </mc:AlternateContent>
+</p:sld>
+</file>
+
+<file path=ppt/slides/slide37.xml><?xml version="1.0" encoding="utf-8"?>
+<p:sld xmlns:a="http://schemas.openxmlformats.org/drawingml/2006/main" xmlns:r="http://schemas.openxmlformats.org/officeDocument/2006/relationships" xmlns:p="http://schemas.openxmlformats.org/presentationml/2006/main">
+  <p:cSld>
+    <p:spTree>
+      <p:nvGrpSpPr>
+        <p:cNvPr id="1" name=""/>
+        <p:cNvGrpSpPr/>
+        <p:nvPr/>
+      </p:nvGrpSpPr>
+      <p:grpSpPr>
+        <a:xfrm>
+          <a:off x="0" y="0"/>
+          <a:ext cx="0" cy="0"/>
+          <a:chOff x="0" y="0"/>
+          <a:chExt cx="0" cy="0"/>
+        </a:xfrm>
+      </p:grpSpPr>
+      <p:pic>
+        <p:nvPicPr>
+          <p:cNvPr id="7" name="Picture 6">
+            <a:extLst>
+              <a:ext uri="{FF2B5EF4-FFF2-40B4-BE49-F238E27FC236}">
+                <a16:creationId xmlns:a16="http://schemas.microsoft.com/office/drawing/2014/main" id="{3CD3FEF6-2312-5724-25FB-A35E9839E174}"/>
+              </a:ext>
+            </a:extLst>
+          </p:cNvPr>
+          <p:cNvPicPr>
+            <a:picLocks noChangeAspect="1"/>
+          </p:cNvPicPr>
+          <p:nvPr/>
+        </p:nvPicPr>
+        <p:blipFill>
+          <a:blip r:embed="rId3"/>
+          <a:stretch>
+            <a:fillRect/>
+          </a:stretch>
+        </p:blipFill>
+        <p:spPr>
+          <a:xfrm>
+            <a:off x="6324943" y="1358454"/>
+            <a:ext cx="5602117" cy="3726730"/>
+          </a:xfrm>
+          <a:prstGeom prst="rect">
+            <a:avLst/>
+          </a:prstGeom>
+        </p:spPr>
+      </p:pic>
+      <p:sp>
+        <p:nvSpPr>
+          <p:cNvPr id="4" name="Title 3"/>
+          <p:cNvSpPr>
+            <a:spLocks noGrp="1"/>
+          </p:cNvSpPr>
+          <p:nvPr>
+            <p:ph type="ctrTitle"/>
+          </p:nvPr>
+        </p:nvSpPr>
+        <p:spPr/>
+        <p:txBody>
+          <a:bodyPr>
+            <a:normAutofit/>
+          </a:bodyPr>
+          <a:lstStyle/>
+          <a:p>
+            <a:pPr algn="ctr"/>
+            <a:r>
+              <a:rPr lang="zh-CN" altLang="en-US" sz="4800" dirty="0">
+                <a:latin typeface="华文隶书" panose="02010800040101010101" pitchFamily="2" charset="-122"/>
+                <a:ea typeface="华文隶书" panose="02010800040101010101" pitchFamily="2" charset="-122"/>
+              </a:rPr>
+              <a:t>让</a:t>
+            </a:r>
+            <a:r>
+              <a:rPr lang="en-US" altLang="zh-CN" sz="4800" dirty="0">
+                <a:latin typeface="华文隶书" panose="02010800040101010101" pitchFamily="2" charset="-122"/>
+                <a:ea typeface="华文隶书" panose="02010800040101010101" pitchFamily="2" charset="-122"/>
+              </a:rPr>
+              <a:t>Python</a:t>
+            </a:r>
+            <a:r>
+              <a:rPr lang="zh-CN" altLang="en-US" sz="4800" dirty="0">
+                <a:latin typeface="华文隶书" panose="02010800040101010101" pitchFamily="2" charset="-122"/>
+                <a:ea typeface="华文隶书" panose="02010800040101010101" pitchFamily="2" charset="-122"/>
+              </a:rPr>
+              <a:t>遇上</a:t>
+            </a:r>
+            <a:r>
+              <a:rPr lang="en-US" altLang="zh-CN" sz="4800" dirty="0">
+                <a:latin typeface="华文隶书" panose="02010800040101010101" pitchFamily="2" charset="-122"/>
+                <a:ea typeface="华文隶书" panose="02010800040101010101" pitchFamily="2" charset="-122"/>
+              </a:rPr>
+              <a:t>Office</a:t>
+            </a:r>
+            <a:br>
+              <a:rPr lang="en-US" altLang="zh-CN" sz="4800" dirty="0">
+                <a:latin typeface="华文隶书" panose="02010800040101010101" pitchFamily="2" charset="-122"/>
+                <a:ea typeface="华文隶书" panose="02010800040101010101" pitchFamily="2" charset="-122"/>
+              </a:rPr>
+            </a:br>
+            <a:br>
+              <a:rPr lang="en-US" altLang="zh-CN" sz="4800" dirty="0">
+                <a:latin typeface="华文隶书" panose="02010800040101010101" pitchFamily="2" charset="-122"/>
+                <a:ea typeface="华文隶书" panose="02010800040101010101" pitchFamily="2" charset="-122"/>
+              </a:rPr>
+            </a:br>
+            <a:r>
+              <a:rPr lang="en-US" altLang="zh-CN" sz="4800" dirty="0">
+                <a:latin typeface="华文隶书" panose="02010800040101010101" pitchFamily="2" charset="-122"/>
+                <a:ea typeface="华文隶书" panose="02010800040101010101" pitchFamily="2" charset="-122"/>
+              </a:rPr>
+              <a:t>(Python with Office)</a:t>
+            </a:r>
+            <a:endParaRPr lang="en-US" sz="4800" dirty="0">
+              <a:latin typeface="华文隶书" panose="02010800040101010101" pitchFamily="2" charset="-122"/>
+              <a:ea typeface="华文隶书" panose="02010800040101010101" pitchFamily="2" charset="-122"/>
+            </a:endParaRPr>
+          </a:p>
+        </p:txBody>
+      </p:sp>
+      <p:sp>
+        <p:nvSpPr>
+          <p:cNvPr id="3" name="Content Placeholder 2"/>
+          <p:cNvSpPr>
+            <a:spLocks noGrp="1"/>
+          </p:cNvSpPr>
+          <p:nvPr>
+            <p:ph type="subTitle" idx="1"/>
+          </p:nvPr>
+        </p:nvSpPr>
+        <p:spPr>
+          <a:xfrm>
+            <a:off x="549796" y="3403600"/>
+            <a:ext cx="5544617" cy="2185640"/>
+          </a:xfrm>
+        </p:spPr>
+        <p:txBody>
+          <a:bodyPr>
+            <a:normAutofit/>
+          </a:bodyPr>
+          <a:lstStyle/>
+          <a:p>
+            <a:r>
+              <a:rPr lang="en-US" sz="2800" dirty="0">
+                <a:latin typeface="ADLaM Display" panose="020F0502020204030204" pitchFamily="2" charset="0"/>
+                <a:ea typeface="ADLaM Display" panose="020F0502020204030204" pitchFamily="2" charset="0"/>
+                <a:cs typeface="ADLaM Display" panose="020F0502020204030204" pitchFamily="2" charset="0"/>
+              </a:rPr>
+              <a:t>Chapter 6 Work with Excel</a:t>
+            </a:r>
+          </a:p>
+          <a:p>
+            <a:r>
+              <a:rPr lang="en-US" sz="2800" dirty="0">
+                <a:latin typeface="ADLaM Display" panose="020F0502020204030204" pitchFamily="2" charset="0"/>
+                <a:ea typeface="ADLaM Display" panose="020F0502020204030204" pitchFamily="2" charset="0"/>
+                <a:cs typeface="ADLaM Display" panose="020F0502020204030204" pitchFamily="2" charset="0"/>
+              </a:rPr>
+              <a:t>6.8 Filtering and Sorting</a:t>
+            </a:r>
+          </a:p>
+          <a:p>
+            <a:r>
+              <a:rPr lang="zh-CN" altLang="en-US" sz="2800" dirty="0">
+                <a:latin typeface="ADLaM Display" panose="020F0502020204030204" pitchFamily="2" charset="0"/>
+                <a:ea typeface="ADLaM Display" panose="020F0502020204030204" pitchFamily="2" charset="0"/>
+                <a:cs typeface="ADLaM Display" panose="020F0502020204030204" pitchFamily="2" charset="0"/>
+              </a:rPr>
+              <a:t>第六章 操作</a:t>
+            </a:r>
+            <a:r>
+              <a:rPr lang="en-US" altLang="zh-CN" sz="2800" dirty="0">
+                <a:latin typeface="ADLaM Display" panose="020F0502020204030204" pitchFamily="2" charset="0"/>
+                <a:ea typeface="ADLaM Display" panose="020F0502020204030204" pitchFamily="2" charset="0"/>
+                <a:cs typeface="ADLaM Display" panose="020F0502020204030204" pitchFamily="2" charset="0"/>
+              </a:rPr>
+              <a:t>Excel</a:t>
+            </a:r>
+          </a:p>
+          <a:p>
+            <a:r>
+              <a:rPr lang="en-US" altLang="zh-CN" sz="2800" dirty="0">
+                <a:latin typeface="ADLaM Display" panose="020F0502020204030204" pitchFamily="2" charset="0"/>
+                <a:ea typeface="ADLaM Display" panose="020F0502020204030204" pitchFamily="2" charset="0"/>
+                <a:cs typeface="ADLaM Display" panose="020F0502020204030204" pitchFamily="2" charset="0"/>
+              </a:rPr>
+              <a:t>6.8 </a:t>
+            </a:r>
+            <a:r>
+              <a:rPr lang="zh-CN" altLang="en-US" sz="2800" dirty="0">
+                <a:latin typeface="ADLaM Display" panose="020F0502020204030204" pitchFamily="2" charset="0"/>
+                <a:ea typeface="ADLaM Display" panose="020F0502020204030204" pitchFamily="2" charset="0"/>
+                <a:cs typeface="ADLaM Display" panose="020F0502020204030204" pitchFamily="2" charset="0"/>
+              </a:rPr>
+              <a:t>过滤和排序</a:t>
+            </a:r>
+            <a:endParaRPr lang="en-US" altLang="zh-CN" sz="2800" dirty="0">
+              <a:latin typeface="ADLaM Display" panose="020F0502020204030204" pitchFamily="2" charset="0"/>
+              <a:ea typeface="ADLaM Display" panose="020F0502020204030204" pitchFamily="2" charset="0"/>
+              <a:cs typeface="ADLaM Display" panose="020F0502020204030204" pitchFamily="2" charset="0"/>
+            </a:endParaRPr>
+          </a:p>
+        </p:txBody>
+      </p:sp>
+      <p:pic>
+        <p:nvPicPr>
+          <p:cNvPr id="5" name="Picture 4">
+            <a:extLst>
+              <a:ext uri="{FF2B5EF4-FFF2-40B4-BE49-F238E27FC236}">
+                <a16:creationId xmlns:a16="http://schemas.microsoft.com/office/drawing/2014/main" id="{4AD8B85C-B359-195F-B78C-C879AB7840B1}"/>
+              </a:ext>
+            </a:extLst>
+          </p:cNvPr>
+          <p:cNvPicPr>
+            <a:picLocks noChangeAspect="1"/>
+          </p:cNvPicPr>
+          <p:nvPr/>
+        </p:nvPicPr>
+        <p:blipFill>
+          <a:blip r:embed="rId4"/>
+          <a:stretch>
+            <a:fillRect/>
+          </a:stretch>
+        </p:blipFill>
+        <p:spPr>
+          <a:xfrm>
+            <a:off x="57601" y="1189856"/>
+            <a:ext cx="1068259" cy="1556792"/>
+          </a:xfrm>
+          <a:prstGeom prst="rect">
+            <a:avLst/>
+          </a:prstGeom>
+          <a:ln>
+            <a:noFill/>
+          </a:ln>
+          <a:effectLst>
+            <a:outerShdw blurRad="292100" dist="139700" dir="2700000" algn="tl" rotWithShape="0">
+              <a:srgbClr val="333333">
+                <a:alpha val="65000"/>
+              </a:srgbClr>
+            </a:outerShdw>
+          </a:effectLst>
+        </p:spPr>
+      </p:pic>
+      <p:sp>
+        <p:nvSpPr>
+          <p:cNvPr id="2" name="TextBox 1">
+            <a:extLst>
+              <a:ext uri="{FF2B5EF4-FFF2-40B4-BE49-F238E27FC236}">
+                <a16:creationId xmlns:a16="http://schemas.microsoft.com/office/drawing/2014/main" id="{CAB2C784-DE74-68FC-7A84-3E6C5D164315}"/>
+              </a:ext>
+            </a:extLst>
+          </p:cNvPr>
+          <p:cNvSpPr txBox="1"/>
+          <p:nvPr/>
+        </p:nvSpPr>
+        <p:spPr>
+          <a:xfrm>
+            <a:off x="405780" y="5722972"/>
+            <a:ext cx="7951216" cy="523220"/>
+          </a:xfrm>
+          <a:prstGeom prst="rect">
+            <a:avLst/>
+          </a:prstGeom>
+          <a:solidFill>
+            <a:schemeClr val="bg1">
+              <a:lumMod val="95000"/>
+            </a:schemeClr>
+          </a:solidFill>
+          <a:ln>
+            <a:solidFill>
+              <a:schemeClr val="bg2"/>
+            </a:solidFill>
+          </a:ln>
+        </p:spPr>
+        <p:txBody>
+          <a:bodyPr wrap="none" rtlCol="0" anchor="ctr" anchorCtr="1">
+            <a:spAutoFit/>
+          </a:bodyPr>
+          <a:lstStyle/>
+          <a:p>
+            <a:r>
+              <a:rPr lang="en-US" sz="2800" dirty="0">
+                <a:hlinkClick r:id="rId5"/>
+              </a:rPr>
+              <a:t>https://github.com/yasenstar/python_with_office</a:t>
+            </a:r>
+            <a:endParaRPr lang="en-US" sz="2800" dirty="0"/>
+          </a:p>
+        </p:txBody>
+      </p:sp>
+      <p:sp>
+        <p:nvSpPr>
+          <p:cNvPr id="9" name="TextBox 8">
+            <a:extLst>
+              <a:ext uri="{FF2B5EF4-FFF2-40B4-BE49-F238E27FC236}">
+                <a16:creationId xmlns:a16="http://schemas.microsoft.com/office/drawing/2014/main" id="{C25C84F5-3AA3-A068-7E2F-9123CA5A7D16}"/>
+              </a:ext>
+            </a:extLst>
+          </p:cNvPr>
+          <p:cNvSpPr txBox="1"/>
+          <p:nvPr/>
+        </p:nvSpPr>
+        <p:spPr>
+          <a:xfrm>
+            <a:off x="405780" y="6246192"/>
+            <a:ext cx="7951216" cy="523220"/>
+          </a:xfrm>
+          <a:prstGeom prst="rect">
+            <a:avLst/>
+          </a:prstGeom>
+          <a:solidFill>
+            <a:schemeClr val="bg1">
+              <a:lumMod val="95000"/>
+            </a:schemeClr>
+          </a:solidFill>
+          <a:ln>
+            <a:solidFill>
+              <a:schemeClr val="bg2"/>
+            </a:solidFill>
+          </a:ln>
+        </p:spPr>
+        <p:txBody>
+          <a:bodyPr wrap="square" rtlCol="0" anchor="ctr" anchorCtr="1">
+            <a:spAutoFit/>
+          </a:bodyPr>
+          <a:lstStyle/>
+          <a:p>
+            <a:r>
+              <a:rPr lang="en-US" sz="2800" dirty="0">
+                <a:hlinkClick r:id="rId6"/>
+              </a:rPr>
+              <a:t>https://gitee.com/yasenstar/python_with_office</a:t>
+            </a:r>
+            <a:endParaRPr lang="en-US" sz="2800" dirty="0"/>
+          </a:p>
+        </p:txBody>
+      </p:sp>
+      <p:sp>
+        <p:nvSpPr>
+          <p:cNvPr id="13" name="Rectangle 12">
+            <a:extLst>
+              <a:ext uri="{FF2B5EF4-FFF2-40B4-BE49-F238E27FC236}">
+                <a16:creationId xmlns:a16="http://schemas.microsoft.com/office/drawing/2014/main" id="{6F9C3126-4EC2-77CA-B408-E23CE9AE8E9D}"/>
+              </a:ext>
+            </a:extLst>
+          </p:cNvPr>
+          <p:cNvSpPr/>
+          <p:nvPr/>
+        </p:nvSpPr>
+        <p:spPr>
+          <a:xfrm>
+            <a:off x="8182644" y="3704332"/>
+            <a:ext cx="3456385" cy="792088"/>
+          </a:xfrm>
+          <a:prstGeom prst="rect">
+            <a:avLst/>
+          </a:prstGeom>
+          <a:noFill/>
+          <a:ln w="38100">
+            <a:solidFill>
+              <a:srgbClr val="FF0000"/>
+            </a:solidFill>
+          </a:ln>
+        </p:spPr>
+        <p:style>
+          <a:lnRef idx="2">
+            <a:schemeClr val="accent3"/>
+          </a:lnRef>
+          <a:fillRef idx="1">
+            <a:schemeClr val="lt1"/>
+          </a:fillRef>
+          <a:effectRef idx="0">
+            <a:schemeClr val="accent3"/>
+          </a:effectRef>
+          <a:fontRef idx="minor">
+            <a:schemeClr val="dk1"/>
+          </a:fontRef>
+        </p:style>
+        <p:txBody>
+          <a:bodyPr rtlCol="0" anchor="ctr"/>
+          <a:lstStyle/>
+          <a:p>
+            <a:pPr algn="ctr"/>
+            <a:endParaRPr lang="en-US" dirty="0"/>
+          </a:p>
+        </p:txBody>
+      </p:sp>
+    </p:spTree>
+    <p:extLst>
+      <p:ext uri="{BB962C8B-B14F-4D97-AF65-F5344CB8AC3E}">
+        <p14:creationId xmlns:p14="http://schemas.microsoft.com/office/powerpoint/2010/main" val="2694095750"/>
+      </p:ext>
+    </p:extLst>
+  </p:cSld>
+  <p:clrMapOvr>
+    <a:masterClrMapping/>
+  </p:clrMapOvr>
+  <mc:AlternateContent xmlns:mc="http://schemas.openxmlformats.org/markup-compatibility/2006">
+    <mc:Choice xmlns:p14="http://schemas.microsoft.com/office/powerpoint/2010/main" Requires="p14">
+      <p:transition spd="med" p14:dur="700">
+        <p:fade/>
+      </p:transition>
+    </mc:Choice>
+    <mc:Fallback>
       <p:transition spd="med">
         <p:fade/>
       </p:transition>

</xml_diff>

<commit_message>
add 6-9 insert chart
</commit_message>
<xml_diff>
--- a/Python-with-Office-Video_Covers.pptx
+++ b/Python-with-Office-Video_Covers.pptx
@@ -5,10 +5,10 @@
     <p:sldMasterId id="2147483660" r:id="rId1"/>
   </p:sldMasterIdLst>
   <p:notesMasterIdLst>
-    <p:notesMasterId r:id="rId39"/>
+    <p:notesMasterId r:id="rId40"/>
   </p:notesMasterIdLst>
   <p:handoutMasterIdLst>
-    <p:handoutMasterId r:id="rId40"/>
+    <p:handoutMasterId r:id="rId41"/>
   </p:handoutMasterIdLst>
   <p:sldIdLst>
     <p:sldId id="257" r:id="rId2"/>
@@ -48,6 +48,7 @@
     <p:sldId id="291" r:id="rId36"/>
     <p:sldId id="292" r:id="rId37"/>
     <p:sldId id="293" r:id="rId38"/>
+    <p:sldId id="294" r:id="rId39"/>
   </p:sldIdLst>
   <p:sldSz cx="12188825" cy="6858000"/>
   <p:notesSz cx="6858000" cy="9144000"/>
@@ -3332,6 +3333,90 @@
     <p:extLst>
       <p:ext uri="{BB962C8B-B14F-4D97-AF65-F5344CB8AC3E}">
         <p14:creationId xmlns:p14="http://schemas.microsoft.com/office/powerpoint/2010/main" val="1337657347"/>
+      </p:ext>
+    </p:extLst>
+  </p:cSld>
+  <p:clrMapOvr>
+    <a:masterClrMapping/>
+  </p:clrMapOvr>
+</p:notes>
+</file>
+
+<file path=ppt/notesSlides/notesSlide38.xml><?xml version="1.0" encoding="utf-8"?>
+<p:notes xmlns:a="http://schemas.openxmlformats.org/drawingml/2006/main" xmlns:r="http://schemas.openxmlformats.org/officeDocument/2006/relationships" xmlns:p="http://schemas.openxmlformats.org/presentationml/2006/main">
+  <p:cSld>
+    <p:spTree>
+      <p:nvGrpSpPr>
+        <p:cNvPr id="1" name=""/>
+        <p:cNvGrpSpPr/>
+        <p:nvPr/>
+      </p:nvGrpSpPr>
+      <p:grpSpPr>
+        <a:xfrm>
+          <a:off x="0" y="0"/>
+          <a:ext cx="0" cy="0"/>
+          <a:chOff x="0" y="0"/>
+          <a:chExt cx="0" cy="0"/>
+        </a:xfrm>
+      </p:grpSpPr>
+      <p:sp>
+        <p:nvSpPr>
+          <p:cNvPr id="2" name="Slide Image Placeholder 1"/>
+          <p:cNvSpPr>
+            <a:spLocks noGrp="1" noRot="1" noChangeAspect="1"/>
+          </p:cNvSpPr>
+          <p:nvPr>
+            <p:ph type="sldImg"/>
+          </p:nvPr>
+        </p:nvSpPr>
+        <p:spPr/>
+      </p:sp>
+      <p:sp>
+        <p:nvSpPr>
+          <p:cNvPr id="3" name="Notes Placeholder 2"/>
+          <p:cNvSpPr>
+            <a:spLocks noGrp="1"/>
+          </p:cNvSpPr>
+          <p:nvPr>
+            <p:ph type="body" idx="1"/>
+          </p:nvPr>
+        </p:nvSpPr>
+        <p:spPr/>
+        <p:txBody>
+          <a:bodyPr/>
+          <a:lstStyle/>
+          <a:p>
+            <a:endParaRPr lang="en-US" dirty="0"/>
+          </a:p>
+        </p:txBody>
+      </p:sp>
+      <p:sp>
+        <p:nvSpPr>
+          <p:cNvPr id="4" name="Slide Number Placeholder 3"/>
+          <p:cNvSpPr>
+            <a:spLocks noGrp="1"/>
+          </p:cNvSpPr>
+          <p:nvPr>
+            <p:ph type="sldNum" sz="quarter" idx="10"/>
+          </p:nvPr>
+        </p:nvSpPr>
+        <p:spPr/>
+        <p:txBody>
+          <a:bodyPr/>
+          <a:lstStyle/>
+          <a:p>
+            <a:fld id="{6BB98AFB-CB0D-4DFE-87B9-B4B0D0DE73CD}" type="slidenum">
+              <a:rPr lang="en-US" smtClean="0"/>
+              <a:t>38</a:t>
+            </a:fld>
+            <a:endParaRPr lang="en-US" dirty="0"/>
+          </a:p>
+        </p:txBody>
+      </p:sp>
+    </p:spTree>
+    <p:extLst>
+      <p:ext uri="{BB962C8B-B14F-4D97-AF65-F5344CB8AC3E}">
+        <p14:creationId xmlns:p14="http://schemas.microsoft.com/office/powerpoint/2010/main" val="2220439923"/>
       </p:ext>
     </p:extLst>
   </p:cSld>
@@ -19142,6 +19227,428 @@
     <p:extLst>
       <p:ext uri="{BB962C8B-B14F-4D97-AF65-F5344CB8AC3E}">
         <p14:creationId xmlns:p14="http://schemas.microsoft.com/office/powerpoint/2010/main" val="2694095750"/>
+      </p:ext>
+    </p:extLst>
+  </p:cSld>
+  <p:clrMapOvr>
+    <a:masterClrMapping/>
+  </p:clrMapOvr>
+  <mc:AlternateContent xmlns:mc="http://schemas.openxmlformats.org/markup-compatibility/2006">
+    <mc:Choice xmlns:p14="http://schemas.microsoft.com/office/powerpoint/2010/main" Requires="p14">
+      <p:transition spd="med" p14:dur="700">
+        <p:fade/>
+      </p:transition>
+    </mc:Choice>
+    <mc:Fallback>
+      <p:transition spd="med">
+        <p:fade/>
+      </p:transition>
+    </mc:Fallback>
+  </mc:AlternateContent>
+</p:sld>
+</file>
+
+<file path=ppt/slides/slide38.xml><?xml version="1.0" encoding="utf-8"?>
+<p:sld xmlns:a="http://schemas.openxmlformats.org/drawingml/2006/main" xmlns:r="http://schemas.openxmlformats.org/officeDocument/2006/relationships" xmlns:p="http://schemas.openxmlformats.org/presentationml/2006/main">
+  <p:cSld>
+    <p:spTree>
+      <p:nvGrpSpPr>
+        <p:cNvPr id="1" name=""/>
+        <p:cNvGrpSpPr/>
+        <p:nvPr/>
+      </p:nvGrpSpPr>
+      <p:grpSpPr>
+        <a:xfrm>
+          <a:off x="0" y="0"/>
+          <a:ext cx="0" cy="0"/>
+          <a:chOff x="0" y="0"/>
+          <a:chExt cx="0" cy="0"/>
+        </a:xfrm>
+      </p:grpSpPr>
+      <p:pic>
+        <p:nvPicPr>
+          <p:cNvPr id="8" name="Picture 7">
+            <a:extLst>
+              <a:ext uri="{FF2B5EF4-FFF2-40B4-BE49-F238E27FC236}">
+                <a16:creationId xmlns:a16="http://schemas.microsoft.com/office/drawing/2014/main" id="{1175FD6C-EF1A-9789-CC77-A4C17199CA29}"/>
+              </a:ext>
+            </a:extLst>
+          </p:cNvPr>
+          <p:cNvPicPr>
+            <a:picLocks noChangeAspect="1"/>
+          </p:cNvPicPr>
+          <p:nvPr/>
+        </p:nvPicPr>
+        <p:blipFill>
+          <a:blip r:embed="rId3"/>
+          <a:stretch>
+            <a:fillRect/>
+          </a:stretch>
+        </p:blipFill>
+        <p:spPr>
+          <a:xfrm>
+            <a:off x="6166420" y="1183511"/>
+            <a:ext cx="5902827" cy="4333721"/>
+          </a:xfrm>
+          <a:prstGeom prst="rect">
+            <a:avLst/>
+          </a:prstGeom>
+          <a:ln>
+            <a:noFill/>
+          </a:ln>
+          <a:effectLst>
+            <a:outerShdw blurRad="292100" dist="139700" dir="2700000" algn="tl" rotWithShape="0">
+              <a:srgbClr val="333333">
+                <a:alpha val="65000"/>
+              </a:srgbClr>
+            </a:outerShdw>
+          </a:effectLst>
+        </p:spPr>
+      </p:pic>
+      <p:sp>
+        <p:nvSpPr>
+          <p:cNvPr id="4" name="Title 3"/>
+          <p:cNvSpPr>
+            <a:spLocks noGrp="1"/>
+          </p:cNvSpPr>
+          <p:nvPr>
+            <p:ph type="ctrTitle"/>
+          </p:nvPr>
+        </p:nvSpPr>
+        <p:spPr/>
+        <p:txBody>
+          <a:bodyPr>
+            <a:normAutofit/>
+          </a:bodyPr>
+          <a:lstStyle/>
+          <a:p>
+            <a:pPr algn="ctr"/>
+            <a:r>
+              <a:rPr lang="zh-CN" altLang="en-US" sz="4800" dirty="0">
+                <a:latin typeface="华文隶书" panose="02010800040101010101" pitchFamily="2" charset="-122"/>
+                <a:ea typeface="华文隶书" panose="02010800040101010101" pitchFamily="2" charset="-122"/>
+              </a:rPr>
+              <a:t>让</a:t>
+            </a:r>
+            <a:r>
+              <a:rPr lang="en-US" altLang="zh-CN" sz="4800" dirty="0">
+                <a:latin typeface="华文隶书" panose="02010800040101010101" pitchFamily="2" charset="-122"/>
+                <a:ea typeface="华文隶书" panose="02010800040101010101" pitchFamily="2" charset="-122"/>
+              </a:rPr>
+              <a:t>Python</a:t>
+            </a:r>
+            <a:r>
+              <a:rPr lang="zh-CN" altLang="en-US" sz="4800" dirty="0">
+                <a:latin typeface="华文隶书" panose="02010800040101010101" pitchFamily="2" charset="-122"/>
+                <a:ea typeface="华文隶书" panose="02010800040101010101" pitchFamily="2" charset="-122"/>
+              </a:rPr>
+              <a:t>遇上</a:t>
+            </a:r>
+            <a:r>
+              <a:rPr lang="en-US" altLang="zh-CN" sz="4800" dirty="0">
+                <a:latin typeface="华文隶书" panose="02010800040101010101" pitchFamily="2" charset="-122"/>
+                <a:ea typeface="华文隶书" panose="02010800040101010101" pitchFamily="2" charset="-122"/>
+              </a:rPr>
+              <a:t>Office</a:t>
+            </a:r>
+            <a:br>
+              <a:rPr lang="en-US" altLang="zh-CN" sz="4800" dirty="0">
+                <a:latin typeface="华文隶书" panose="02010800040101010101" pitchFamily="2" charset="-122"/>
+                <a:ea typeface="华文隶书" panose="02010800040101010101" pitchFamily="2" charset="-122"/>
+              </a:rPr>
+            </a:br>
+            <a:br>
+              <a:rPr lang="en-US" altLang="zh-CN" sz="4800" dirty="0">
+                <a:latin typeface="华文隶书" panose="02010800040101010101" pitchFamily="2" charset="-122"/>
+                <a:ea typeface="华文隶书" panose="02010800040101010101" pitchFamily="2" charset="-122"/>
+              </a:rPr>
+            </a:br>
+            <a:r>
+              <a:rPr lang="en-US" altLang="zh-CN" sz="4800" dirty="0">
+                <a:latin typeface="华文隶书" panose="02010800040101010101" pitchFamily="2" charset="-122"/>
+                <a:ea typeface="华文隶书" panose="02010800040101010101" pitchFamily="2" charset="-122"/>
+              </a:rPr>
+              <a:t>(Python with Office)</a:t>
+            </a:r>
+            <a:endParaRPr lang="en-US" sz="4800" dirty="0">
+              <a:latin typeface="华文隶书" panose="02010800040101010101" pitchFamily="2" charset="-122"/>
+              <a:ea typeface="华文隶书" panose="02010800040101010101" pitchFamily="2" charset="-122"/>
+            </a:endParaRPr>
+          </a:p>
+        </p:txBody>
+      </p:sp>
+      <p:sp>
+        <p:nvSpPr>
+          <p:cNvPr id="3" name="Content Placeholder 2"/>
+          <p:cNvSpPr>
+            <a:spLocks noGrp="1"/>
+          </p:cNvSpPr>
+          <p:nvPr>
+            <p:ph type="subTitle" idx="1"/>
+          </p:nvPr>
+        </p:nvSpPr>
+        <p:spPr>
+          <a:xfrm>
+            <a:off x="549796" y="3403600"/>
+            <a:ext cx="5544617" cy="2185640"/>
+          </a:xfrm>
+        </p:spPr>
+        <p:txBody>
+          <a:bodyPr>
+            <a:normAutofit/>
+          </a:bodyPr>
+          <a:lstStyle/>
+          <a:p>
+            <a:r>
+              <a:rPr lang="en-US" sz="2800" dirty="0">
+                <a:latin typeface="ADLaM Display" panose="020F0502020204030204" pitchFamily="2" charset="0"/>
+                <a:ea typeface="ADLaM Display" panose="020F0502020204030204" pitchFamily="2" charset="0"/>
+                <a:cs typeface="ADLaM Display" panose="020F0502020204030204" pitchFamily="2" charset="0"/>
+              </a:rPr>
+              <a:t>Chapter 6 Work with Excel</a:t>
+            </a:r>
+          </a:p>
+          <a:p>
+            <a:r>
+              <a:rPr lang="en-US" sz="2800" dirty="0">
+                <a:latin typeface="ADLaM Display" panose="020F0502020204030204" pitchFamily="2" charset="0"/>
+                <a:ea typeface="ADLaM Display" panose="020F0502020204030204" pitchFamily="2" charset="0"/>
+                <a:cs typeface="ADLaM Display" panose="020F0502020204030204" pitchFamily="2" charset="0"/>
+              </a:rPr>
+              <a:t>6.9 Insert Chart</a:t>
+            </a:r>
+          </a:p>
+          <a:p>
+            <a:r>
+              <a:rPr lang="zh-CN" altLang="en-US" sz="2800" dirty="0">
+                <a:latin typeface="ADLaM Display" panose="020F0502020204030204" pitchFamily="2" charset="0"/>
+                <a:ea typeface="ADLaM Display" panose="020F0502020204030204" pitchFamily="2" charset="0"/>
+                <a:cs typeface="ADLaM Display" panose="020F0502020204030204" pitchFamily="2" charset="0"/>
+              </a:rPr>
+              <a:t>第六章 操作</a:t>
+            </a:r>
+            <a:r>
+              <a:rPr lang="en-US" altLang="zh-CN" sz="2800" dirty="0">
+                <a:latin typeface="ADLaM Display" panose="020F0502020204030204" pitchFamily="2" charset="0"/>
+                <a:ea typeface="ADLaM Display" panose="020F0502020204030204" pitchFamily="2" charset="0"/>
+                <a:cs typeface="ADLaM Display" panose="020F0502020204030204" pitchFamily="2" charset="0"/>
+              </a:rPr>
+              <a:t>Excel</a:t>
+            </a:r>
+          </a:p>
+          <a:p>
+            <a:r>
+              <a:rPr lang="en-US" altLang="zh-CN" sz="2800" dirty="0">
+                <a:latin typeface="ADLaM Display" panose="020F0502020204030204" pitchFamily="2" charset="0"/>
+                <a:ea typeface="ADLaM Display" panose="020F0502020204030204" pitchFamily="2" charset="0"/>
+                <a:cs typeface="ADLaM Display" panose="020F0502020204030204" pitchFamily="2" charset="0"/>
+              </a:rPr>
+              <a:t>6.9 </a:t>
+            </a:r>
+            <a:r>
+              <a:rPr lang="zh-CN" altLang="en-US" sz="2800" dirty="0">
+                <a:latin typeface="ADLaM Display" panose="020F0502020204030204" pitchFamily="2" charset="0"/>
+                <a:ea typeface="ADLaM Display" panose="020F0502020204030204" pitchFamily="2" charset="0"/>
+                <a:cs typeface="ADLaM Display" panose="020F0502020204030204" pitchFamily="2" charset="0"/>
+              </a:rPr>
+              <a:t>插入图表</a:t>
+            </a:r>
+            <a:endParaRPr lang="en-US" altLang="zh-CN" sz="2800" dirty="0">
+              <a:latin typeface="ADLaM Display" panose="020F0502020204030204" pitchFamily="2" charset="0"/>
+              <a:ea typeface="ADLaM Display" panose="020F0502020204030204" pitchFamily="2" charset="0"/>
+              <a:cs typeface="ADLaM Display" panose="020F0502020204030204" pitchFamily="2" charset="0"/>
+            </a:endParaRPr>
+          </a:p>
+        </p:txBody>
+      </p:sp>
+      <p:pic>
+        <p:nvPicPr>
+          <p:cNvPr id="5" name="Picture 4">
+            <a:extLst>
+              <a:ext uri="{FF2B5EF4-FFF2-40B4-BE49-F238E27FC236}">
+                <a16:creationId xmlns:a16="http://schemas.microsoft.com/office/drawing/2014/main" id="{4AD8B85C-B359-195F-B78C-C879AB7840B1}"/>
+              </a:ext>
+            </a:extLst>
+          </p:cNvPr>
+          <p:cNvPicPr>
+            <a:picLocks noChangeAspect="1"/>
+          </p:cNvPicPr>
+          <p:nvPr/>
+        </p:nvPicPr>
+        <p:blipFill>
+          <a:blip r:embed="rId4"/>
+          <a:stretch>
+            <a:fillRect/>
+          </a:stretch>
+        </p:blipFill>
+        <p:spPr>
+          <a:xfrm>
+            <a:off x="57601" y="1189856"/>
+            <a:ext cx="1068259" cy="1556792"/>
+          </a:xfrm>
+          <a:prstGeom prst="rect">
+            <a:avLst/>
+          </a:prstGeom>
+          <a:ln>
+            <a:noFill/>
+          </a:ln>
+          <a:effectLst>
+            <a:outerShdw blurRad="292100" dist="139700" dir="2700000" algn="tl" rotWithShape="0">
+              <a:srgbClr val="333333">
+                <a:alpha val="65000"/>
+              </a:srgbClr>
+            </a:outerShdw>
+          </a:effectLst>
+        </p:spPr>
+      </p:pic>
+      <p:sp>
+        <p:nvSpPr>
+          <p:cNvPr id="2" name="TextBox 1">
+            <a:extLst>
+              <a:ext uri="{FF2B5EF4-FFF2-40B4-BE49-F238E27FC236}">
+                <a16:creationId xmlns:a16="http://schemas.microsoft.com/office/drawing/2014/main" id="{CAB2C784-DE74-68FC-7A84-3E6C5D164315}"/>
+              </a:ext>
+            </a:extLst>
+          </p:cNvPr>
+          <p:cNvSpPr txBox="1"/>
+          <p:nvPr/>
+        </p:nvSpPr>
+        <p:spPr>
+          <a:xfrm>
+            <a:off x="405780" y="5722972"/>
+            <a:ext cx="7951216" cy="523220"/>
+          </a:xfrm>
+          <a:prstGeom prst="rect">
+            <a:avLst/>
+          </a:prstGeom>
+          <a:solidFill>
+            <a:schemeClr val="bg1">
+              <a:lumMod val="95000"/>
+            </a:schemeClr>
+          </a:solidFill>
+          <a:ln>
+            <a:solidFill>
+              <a:schemeClr val="bg2"/>
+            </a:solidFill>
+          </a:ln>
+        </p:spPr>
+        <p:txBody>
+          <a:bodyPr wrap="none" rtlCol="0" anchor="ctr" anchorCtr="1">
+            <a:spAutoFit/>
+          </a:bodyPr>
+          <a:lstStyle/>
+          <a:p>
+            <a:r>
+              <a:rPr lang="en-US" sz="2800" dirty="0">
+                <a:hlinkClick r:id="rId5"/>
+              </a:rPr>
+              <a:t>https://github.com/yasenstar/python_with_office</a:t>
+            </a:r>
+            <a:endParaRPr lang="en-US" sz="2800" dirty="0"/>
+          </a:p>
+        </p:txBody>
+      </p:sp>
+      <p:sp>
+        <p:nvSpPr>
+          <p:cNvPr id="9" name="TextBox 8">
+            <a:extLst>
+              <a:ext uri="{FF2B5EF4-FFF2-40B4-BE49-F238E27FC236}">
+                <a16:creationId xmlns:a16="http://schemas.microsoft.com/office/drawing/2014/main" id="{C25C84F5-3AA3-A068-7E2F-9123CA5A7D16}"/>
+              </a:ext>
+            </a:extLst>
+          </p:cNvPr>
+          <p:cNvSpPr txBox="1"/>
+          <p:nvPr/>
+        </p:nvSpPr>
+        <p:spPr>
+          <a:xfrm>
+            <a:off x="405780" y="6246192"/>
+            <a:ext cx="7951216" cy="523220"/>
+          </a:xfrm>
+          <a:prstGeom prst="rect">
+            <a:avLst/>
+          </a:prstGeom>
+          <a:solidFill>
+            <a:schemeClr val="bg1">
+              <a:lumMod val="95000"/>
+            </a:schemeClr>
+          </a:solidFill>
+          <a:ln>
+            <a:solidFill>
+              <a:schemeClr val="bg2"/>
+            </a:solidFill>
+          </a:ln>
+        </p:spPr>
+        <p:txBody>
+          <a:bodyPr wrap="square" rtlCol="0" anchor="ctr" anchorCtr="1">
+            <a:spAutoFit/>
+          </a:bodyPr>
+          <a:lstStyle/>
+          <a:p>
+            <a:r>
+              <a:rPr lang="en-US" sz="2800" dirty="0">
+                <a:hlinkClick r:id="rId6"/>
+              </a:rPr>
+              <a:t>https://gitee.com/yasenstar/python_with_office</a:t>
+            </a:r>
+            <a:endParaRPr lang="en-US" sz="2800" dirty="0"/>
+          </a:p>
+        </p:txBody>
+      </p:sp>
+      <p:sp>
+        <p:nvSpPr>
+          <p:cNvPr id="13" name="Rectangle 12">
+            <a:extLst>
+              <a:ext uri="{FF2B5EF4-FFF2-40B4-BE49-F238E27FC236}">
+                <a16:creationId xmlns:a16="http://schemas.microsoft.com/office/drawing/2014/main" id="{6F9C3126-4EC2-77CA-B408-E23CE9AE8E9D}"/>
+              </a:ext>
+            </a:extLst>
+          </p:cNvPr>
+          <p:cNvSpPr/>
+          <p:nvPr/>
+        </p:nvSpPr>
+        <p:spPr>
+          <a:xfrm>
+            <a:off x="8182644" y="4005064"/>
+            <a:ext cx="3528392" cy="491356"/>
+          </a:xfrm>
+          <a:prstGeom prst="rect">
+            <a:avLst/>
+          </a:prstGeom>
+          <a:noFill/>
+          <a:ln w="38100">
+            <a:solidFill>
+              <a:srgbClr val="FF0000"/>
+            </a:solidFill>
+          </a:ln>
+        </p:spPr>
+        <p:style>
+          <a:lnRef idx="2">
+            <a:schemeClr val="accent3"/>
+          </a:lnRef>
+          <a:fillRef idx="1">
+            <a:schemeClr val="lt1"/>
+          </a:fillRef>
+          <a:effectRef idx="0">
+            <a:schemeClr val="accent3"/>
+          </a:effectRef>
+          <a:fontRef idx="minor">
+            <a:schemeClr val="dk1"/>
+          </a:fontRef>
+        </p:style>
+        <p:txBody>
+          <a:bodyPr rtlCol="0" anchor="ctr"/>
+          <a:lstStyle/>
+          <a:p>
+            <a:pPr algn="ctr"/>
+            <a:endParaRPr lang="en-US" dirty="0"/>
+          </a:p>
+        </p:txBody>
+      </p:sp>
+    </p:spTree>
+    <p:extLst>
+      <p:ext uri="{BB962C8B-B14F-4D97-AF65-F5344CB8AC3E}">
+        <p14:creationId xmlns:p14="http://schemas.microsoft.com/office/powerpoint/2010/main" val="2218385094"/>
       </p:ext>
     </p:extLst>
   </p:cSld>

</xml_diff>

<commit_message>
add 3-10 write only and read only
</commit_message>
<xml_diff>
--- a/Python-with-Office-Video_Covers.pptx
+++ b/Python-with-Office-Video_Covers.pptx
@@ -19922,31 +19922,15 @@
                 <a:ea typeface="ADLaM Display" panose="020F0502020204030204" pitchFamily="2" charset="0"/>
                 <a:cs typeface="ADLaM Display" panose="020F0502020204030204" pitchFamily="2" charset="0"/>
               </a:rPr>
-              <a:t>6.10 </a:t>
-            </a:r>
-            <a:r>
-              <a:rPr lang="en-US" sz="2800" dirty="0" err="1">
-                <a:latin typeface="ADLaM Display" panose="020F0502020204030204" pitchFamily="2" charset="0"/>
-                <a:ea typeface="ADLaM Display" panose="020F0502020204030204" pitchFamily="2" charset="0"/>
-                <a:cs typeface="ADLaM Display" panose="020F0502020204030204" pitchFamily="2" charset="0"/>
-              </a:rPr>
-              <a:t>ReadOnly</a:t>
-            </a:r>
-            <a:r>
-              <a:rPr lang="en-US" sz="2800" dirty="0">
-                <a:latin typeface="ADLaM Display" panose="020F0502020204030204" pitchFamily="2" charset="0"/>
-                <a:ea typeface="ADLaM Display" panose="020F0502020204030204" pitchFamily="2" charset="0"/>
-                <a:cs typeface="ADLaM Display" panose="020F0502020204030204" pitchFamily="2" charset="0"/>
-              </a:rPr>
-              <a:t>, </a:t>
-            </a:r>
-            <a:r>
-              <a:rPr lang="en-US" sz="2800" dirty="0" err="1">
-                <a:latin typeface="ADLaM Display" panose="020F0502020204030204" pitchFamily="2" charset="0"/>
-                <a:ea typeface="ADLaM Display" panose="020F0502020204030204" pitchFamily="2" charset="0"/>
-                <a:cs typeface="ADLaM Display" panose="020F0502020204030204" pitchFamily="2" charset="0"/>
-              </a:rPr>
-              <a:t>WriteOnly</a:t>
+              <a:t>6.10 Read-Only</a:t>
+            </a:r>
+            <a:r>
+              <a:rPr lang="en-US" sz="2800">
+                <a:latin typeface="ADLaM Display" panose="020F0502020204030204" pitchFamily="2" charset="0"/>
+                <a:ea typeface="ADLaM Display" panose="020F0502020204030204" pitchFamily="2" charset="0"/>
+                <a:cs typeface="ADLaM Display" panose="020F0502020204030204" pitchFamily="2" charset="0"/>
+              </a:rPr>
+              <a:t>, Write-Only</a:t>
             </a:r>
             <a:endParaRPr lang="en-US" sz="2800" dirty="0">
               <a:latin typeface="ADLaM Display" panose="020F0502020204030204" pitchFamily="2" charset="0"/>

</xml_diff>

<commit_message>
add 6-11 protect Excel
</commit_message>
<xml_diff>
--- a/Python-with-Office-Video_Covers.pptx
+++ b/Python-with-Office-Video_Covers.pptx
@@ -5,10 +5,10 @@
     <p:sldMasterId id="2147483660" r:id="rId1"/>
   </p:sldMasterIdLst>
   <p:notesMasterIdLst>
-    <p:notesMasterId r:id="rId41"/>
+    <p:notesMasterId r:id="rId42"/>
   </p:notesMasterIdLst>
   <p:handoutMasterIdLst>
-    <p:handoutMasterId r:id="rId42"/>
+    <p:handoutMasterId r:id="rId43"/>
   </p:handoutMasterIdLst>
   <p:sldIdLst>
     <p:sldId id="257" r:id="rId2"/>
@@ -50,6 +50,7 @@
     <p:sldId id="293" r:id="rId38"/>
     <p:sldId id="294" r:id="rId39"/>
     <p:sldId id="295" r:id="rId40"/>
+    <p:sldId id="296" r:id="rId41"/>
   </p:sldIdLst>
   <p:sldSz cx="12188825" cy="6858000"/>
   <p:notesSz cx="6858000" cy="9144000"/>
@@ -3586,6 +3587,90 @@
     <p:extLst>
       <p:ext uri="{BB962C8B-B14F-4D97-AF65-F5344CB8AC3E}">
         <p14:creationId xmlns:p14="http://schemas.microsoft.com/office/powerpoint/2010/main" val="150836077"/>
+      </p:ext>
+    </p:extLst>
+  </p:cSld>
+  <p:clrMapOvr>
+    <a:masterClrMapping/>
+  </p:clrMapOvr>
+</p:notes>
+</file>
+
+<file path=ppt/notesSlides/notesSlide40.xml><?xml version="1.0" encoding="utf-8"?>
+<p:notes xmlns:a="http://schemas.openxmlformats.org/drawingml/2006/main" xmlns:r="http://schemas.openxmlformats.org/officeDocument/2006/relationships" xmlns:p="http://schemas.openxmlformats.org/presentationml/2006/main">
+  <p:cSld>
+    <p:spTree>
+      <p:nvGrpSpPr>
+        <p:cNvPr id="1" name=""/>
+        <p:cNvGrpSpPr/>
+        <p:nvPr/>
+      </p:nvGrpSpPr>
+      <p:grpSpPr>
+        <a:xfrm>
+          <a:off x="0" y="0"/>
+          <a:ext cx="0" cy="0"/>
+          <a:chOff x="0" y="0"/>
+          <a:chExt cx="0" cy="0"/>
+        </a:xfrm>
+      </p:grpSpPr>
+      <p:sp>
+        <p:nvSpPr>
+          <p:cNvPr id="2" name="Slide Image Placeholder 1"/>
+          <p:cNvSpPr>
+            <a:spLocks noGrp="1" noRot="1" noChangeAspect="1"/>
+          </p:cNvSpPr>
+          <p:nvPr>
+            <p:ph type="sldImg"/>
+          </p:nvPr>
+        </p:nvSpPr>
+        <p:spPr/>
+      </p:sp>
+      <p:sp>
+        <p:nvSpPr>
+          <p:cNvPr id="3" name="Notes Placeholder 2"/>
+          <p:cNvSpPr>
+            <a:spLocks noGrp="1"/>
+          </p:cNvSpPr>
+          <p:nvPr>
+            <p:ph type="body" idx="1"/>
+          </p:nvPr>
+        </p:nvSpPr>
+        <p:spPr/>
+        <p:txBody>
+          <a:bodyPr/>
+          <a:lstStyle/>
+          <a:p>
+            <a:endParaRPr lang="en-US" dirty="0"/>
+          </a:p>
+        </p:txBody>
+      </p:sp>
+      <p:sp>
+        <p:nvSpPr>
+          <p:cNvPr id="4" name="Slide Number Placeholder 3"/>
+          <p:cNvSpPr>
+            <a:spLocks noGrp="1"/>
+          </p:cNvSpPr>
+          <p:nvPr>
+            <p:ph type="sldNum" sz="quarter" idx="10"/>
+          </p:nvPr>
+        </p:nvSpPr>
+        <p:spPr/>
+        <p:txBody>
+          <a:bodyPr/>
+          <a:lstStyle/>
+          <a:p>
+            <a:fld id="{6BB98AFB-CB0D-4DFE-87B9-B4B0D0DE73CD}" type="slidenum">
+              <a:rPr lang="en-US" smtClean="0"/>
+              <a:t>40</a:t>
+            </a:fld>
+            <a:endParaRPr lang="en-US" dirty="0"/>
+          </a:p>
+        </p:txBody>
+      </p:sp>
+    </p:spTree>
+    <p:extLst>
+      <p:ext uri="{BB962C8B-B14F-4D97-AF65-F5344CB8AC3E}">
+        <p14:creationId xmlns:p14="http://schemas.microsoft.com/office/powerpoint/2010/main" val="2375663032"/>
       </p:ext>
     </p:extLst>
   </p:cSld>
@@ -19922,21 +20007,8 @@
                 <a:ea typeface="ADLaM Display" panose="020F0502020204030204" pitchFamily="2" charset="0"/>
                 <a:cs typeface="ADLaM Display" panose="020F0502020204030204" pitchFamily="2" charset="0"/>
               </a:rPr>
-              <a:t>6.10 Read-Only</a:t>
-            </a:r>
-            <a:r>
-              <a:rPr lang="en-US" sz="2800">
-                <a:latin typeface="ADLaM Display" panose="020F0502020204030204" pitchFamily="2" charset="0"/>
-                <a:ea typeface="ADLaM Display" panose="020F0502020204030204" pitchFamily="2" charset="0"/>
-                <a:cs typeface="ADLaM Display" panose="020F0502020204030204" pitchFamily="2" charset="0"/>
-              </a:rPr>
-              <a:t>, Write-Only</a:t>
-            </a:r>
-            <a:endParaRPr lang="en-US" sz="2800" dirty="0">
-              <a:latin typeface="ADLaM Display" panose="020F0502020204030204" pitchFamily="2" charset="0"/>
-              <a:ea typeface="ADLaM Display" panose="020F0502020204030204" pitchFamily="2" charset="0"/>
-              <a:cs typeface="ADLaM Display" panose="020F0502020204030204" pitchFamily="2" charset="0"/>
-            </a:endParaRPr>
+              <a:t>6.10 Read-Only, Write-Only</a:t>
+            </a:r>
           </a:p>
           <a:p>
             <a:r>
@@ -20526,6 +20598,428 @@
       </p:transition>
     </mc:Choice>
     <mc:Fallback xmlns="">
+      <p:transition spd="med">
+        <p:fade/>
+      </p:transition>
+    </mc:Fallback>
+  </mc:AlternateContent>
+</p:sld>
+</file>
+
+<file path=ppt/slides/slide40.xml><?xml version="1.0" encoding="utf-8"?>
+<p:sld xmlns:a="http://schemas.openxmlformats.org/drawingml/2006/main" xmlns:r="http://schemas.openxmlformats.org/officeDocument/2006/relationships" xmlns:p="http://schemas.openxmlformats.org/presentationml/2006/main">
+  <p:cSld>
+    <p:spTree>
+      <p:nvGrpSpPr>
+        <p:cNvPr id="1" name=""/>
+        <p:cNvGrpSpPr/>
+        <p:nvPr/>
+      </p:nvGrpSpPr>
+      <p:grpSpPr>
+        <a:xfrm>
+          <a:off x="0" y="0"/>
+          <a:ext cx="0" cy="0"/>
+          <a:chOff x="0" y="0"/>
+          <a:chExt cx="0" cy="0"/>
+        </a:xfrm>
+      </p:grpSpPr>
+      <p:pic>
+        <p:nvPicPr>
+          <p:cNvPr id="8" name="Picture 7">
+            <a:extLst>
+              <a:ext uri="{FF2B5EF4-FFF2-40B4-BE49-F238E27FC236}">
+                <a16:creationId xmlns:a16="http://schemas.microsoft.com/office/drawing/2014/main" id="{7C363DD2-C60E-BA76-0AB4-A21E400A254E}"/>
+              </a:ext>
+            </a:extLst>
+          </p:cNvPr>
+          <p:cNvPicPr>
+            <a:picLocks noChangeAspect="1"/>
+          </p:cNvPicPr>
+          <p:nvPr/>
+        </p:nvPicPr>
+        <p:blipFill>
+          <a:blip r:embed="rId3"/>
+          <a:stretch>
+            <a:fillRect/>
+          </a:stretch>
+        </p:blipFill>
+        <p:spPr>
+          <a:xfrm>
+            <a:off x="6094412" y="1184339"/>
+            <a:ext cx="5991002" cy="4396559"/>
+          </a:xfrm>
+          <a:prstGeom prst="rect">
+            <a:avLst/>
+          </a:prstGeom>
+          <a:ln>
+            <a:noFill/>
+          </a:ln>
+          <a:effectLst>
+            <a:outerShdw blurRad="292100" dist="139700" dir="2700000" algn="tl" rotWithShape="0">
+              <a:srgbClr val="333333">
+                <a:alpha val="65000"/>
+              </a:srgbClr>
+            </a:outerShdw>
+          </a:effectLst>
+        </p:spPr>
+      </p:pic>
+      <p:sp>
+        <p:nvSpPr>
+          <p:cNvPr id="4" name="Title 3"/>
+          <p:cNvSpPr>
+            <a:spLocks noGrp="1"/>
+          </p:cNvSpPr>
+          <p:nvPr>
+            <p:ph type="ctrTitle"/>
+          </p:nvPr>
+        </p:nvSpPr>
+        <p:spPr/>
+        <p:txBody>
+          <a:bodyPr>
+            <a:normAutofit/>
+          </a:bodyPr>
+          <a:lstStyle/>
+          <a:p>
+            <a:pPr algn="ctr"/>
+            <a:r>
+              <a:rPr lang="zh-CN" altLang="en-US" sz="4800" dirty="0">
+                <a:latin typeface="华文隶书" panose="02010800040101010101" pitchFamily="2" charset="-122"/>
+                <a:ea typeface="华文隶书" panose="02010800040101010101" pitchFamily="2" charset="-122"/>
+              </a:rPr>
+              <a:t>让</a:t>
+            </a:r>
+            <a:r>
+              <a:rPr lang="en-US" altLang="zh-CN" sz="4800" dirty="0">
+                <a:latin typeface="华文隶书" panose="02010800040101010101" pitchFamily="2" charset="-122"/>
+                <a:ea typeface="华文隶书" panose="02010800040101010101" pitchFamily="2" charset="-122"/>
+              </a:rPr>
+              <a:t>Python</a:t>
+            </a:r>
+            <a:r>
+              <a:rPr lang="zh-CN" altLang="en-US" sz="4800" dirty="0">
+                <a:latin typeface="华文隶书" panose="02010800040101010101" pitchFamily="2" charset="-122"/>
+                <a:ea typeface="华文隶书" panose="02010800040101010101" pitchFamily="2" charset="-122"/>
+              </a:rPr>
+              <a:t>遇上</a:t>
+            </a:r>
+            <a:r>
+              <a:rPr lang="en-US" altLang="zh-CN" sz="4800" dirty="0">
+                <a:latin typeface="华文隶书" panose="02010800040101010101" pitchFamily="2" charset="-122"/>
+                <a:ea typeface="华文隶书" panose="02010800040101010101" pitchFamily="2" charset="-122"/>
+              </a:rPr>
+              <a:t>Office</a:t>
+            </a:r>
+            <a:br>
+              <a:rPr lang="en-US" altLang="zh-CN" sz="4800" dirty="0">
+                <a:latin typeface="华文隶书" panose="02010800040101010101" pitchFamily="2" charset="-122"/>
+                <a:ea typeface="华文隶书" panose="02010800040101010101" pitchFamily="2" charset="-122"/>
+              </a:rPr>
+            </a:br>
+            <a:br>
+              <a:rPr lang="en-US" altLang="zh-CN" sz="4800" dirty="0">
+                <a:latin typeface="华文隶书" panose="02010800040101010101" pitchFamily="2" charset="-122"/>
+                <a:ea typeface="华文隶书" panose="02010800040101010101" pitchFamily="2" charset="-122"/>
+              </a:rPr>
+            </a:br>
+            <a:r>
+              <a:rPr lang="en-US" altLang="zh-CN" sz="4800" dirty="0">
+                <a:latin typeface="华文隶书" panose="02010800040101010101" pitchFamily="2" charset="-122"/>
+                <a:ea typeface="华文隶书" panose="02010800040101010101" pitchFamily="2" charset="-122"/>
+              </a:rPr>
+              <a:t>(Python with Office)</a:t>
+            </a:r>
+            <a:endParaRPr lang="en-US" sz="4800" dirty="0">
+              <a:latin typeface="华文隶书" panose="02010800040101010101" pitchFamily="2" charset="-122"/>
+              <a:ea typeface="华文隶书" panose="02010800040101010101" pitchFamily="2" charset="-122"/>
+            </a:endParaRPr>
+          </a:p>
+        </p:txBody>
+      </p:sp>
+      <p:sp>
+        <p:nvSpPr>
+          <p:cNvPr id="3" name="Content Placeholder 2"/>
+          <p:cNvSpPr>
+            <a:spLocks noGrp="1"/>
+          </p:cNvSpPr>
+          <p:nvPr>
+            <p:ph type="subTitle" idx="1"/>
+          </p:nvPr>
+        </p:nvSpPr>
+        <p:spPr>
+          <a:xfrm>
+            <a:off x="549796" y="3403600"/>
+            <a:ext cx="5544617" cy="2185640"/>
+          </a:xfrm>
+        </p:spPr>
+        <p:txBody>
+          <a:bodyPr>
+            <a:normAutofit/>
+          </a:bodyPr>
+          <a:lstStyle/>
+          <a:p>
+            <a:r>
+              <a:rPr lang="en-US" sz="2800" dirty="0">
+                <a:latin typeface="ADLaM Display" panose="020F0502020204030204" pitchFamily="2" charset="0"/>
+                <a:ea typeface="ADLaM Display" panose="020F0502020204030204" pitchFamily="2" charset="0"/>
+                <a:cs typeface="ADLaM Display" panose="020F0502020204030204" pitchFamily="2" charset="0"/>
+              </a:rPr>
+              <a:t>Chapter 6 Work with Excel</a:t>
+            </a:r>
+          </a:p>
+          <a:p>
+            <a:r>
+              <a:rPr lang="en-US" sz="2800" dirty="0">
+                <a:latin typeface="ADLaM Display" panose="020F0502020204030204" pitchFamily="2" charset="0"/>
+                <a:ea typeface="ADLaM Display" panose="020F0502020204030204" pitchFamily="2" charset="0"/>
+                <a:cs typeface="ADLaM Display" panose="020F0502020204030204" pitchFamily="2" charset="0"/>
+              </a:rPr>
+              <a:t>6.11 Security Protection</a:t>
+            </a:r>
+          </a:p>
+          <a:p>
+            <a:r>
+              <a:rPr lang="zh-CN" altLang="en-US" sz="2800" dirty="0">
+                <a:latin typeface="ADLaM Display" panose="020F0502020204030204" pitchFamily="2" charset="0"/>
+                <a:ea typeface="ADLaM Display" panose="020F0502020204030204" pitchFamily="2" charset="0"/>
+                <a:cs typeface="ADLaM Display" panose="020F0502020204030204" pitchFamily="2" charset="0"/>
+              </a:rPr>
+              <a:t>第六章 操作</a:t>
+            </a:r>
+            <a:r>
+              <a:rPr lang="en-US" altLang="zh-CN" sz="2800" dirty="0">
+                <a:latin typeface="ADLaM Display" panose="020F0502020204030204" pitchFamily="2" charset="0"/>
+                <a:ea typeface="ADLaM Display" panose="020F0502020204030204" pitchFamily="2" charset="0"/>
+                <a:cs typeface="ADLaM Display" panose="020F0502020204030204" pitchFamily="2" charset="0"/>
+              </a:rPr>
+              <a:t>Excel</a:t>
+            </a:r>
+          </a:p>
+          <a:p>
+            <a:r>
+              <a:rPr lang="en-US" altLang="zh-CN" sz="2800" dirty="0">
+                <a:latin typeface="ADLaM Display" panose="020F0502020204030204" pitchFamily="2" charset="0"/>
+                <a:ea typeface="ADLaM Display" panose="020F0502020204030204" pitchFamily="2" charset="0"/>
+                <a:cs typeface="ADLaM Display" panose="020F0502020204030204" pitchFamily="2" charset="0"/>
+              </a:rPr>
+              <a:t>6.11 </a:t>
+            </a:r>
+            <a:r>
+              <a:rPr lang="zh-CN" altLang="en-US" sz="2800">
+                <a:latin typeface="ADLaM Display" panose="020F0502020204030204" pitchFamily="2" charset="0"/>
+                <a:ea typeface="ADLaM Display" panose="020F0502020204030204" pitchFamily="2" charset="0"/>
+                <a:cs typeface="ADLaM Display" panose="020F0502020204030204" pitchFamily="2" charset="0"/>
+              </a:rPr>
+              <a:t>加密保护</a:t>
+            </a:r>
+            <a:endParaRPr lang="en-US" altLang="zh-CN" sz="2800" dirty="0">
+              <a:latin typeface="ADLaM Display" panose="020F0502020204030204" pitchFamily="2" charset="0"/>
+              <a:ea typeface="ADLaM Display" panose="020F0502020204030204" pitchFamily="2" charset="0"/>
+              <a:cs typeface="ADLaM Display" panose="020F0502020204030204" pitchFamily="2" charset="0"/>
+            </a:endParaRPr>
+          </a:p>
+        </p:txBody>
+      </p:sp>
+      <p:pic>
+        <p:nvPicPr>
+          <p:cNvPr id="5" name="Picture 4">
+            <a:extLst>
+              <a:ext uri="{FF2B5EF4-FFF2-40B4-BE49-F238E27FC236}">
+                <a16:creationId xmlns:a16="http://schemas.microsoft.com/office/drawing/2014/main" id="{4AD8B85C-B359-195F-B78C-C879AB7840B1}"/>
+              </a:ext>
+            </a:extLst>
+          </p:cNvPr>
+          <p:cNvPicPr>
+            <a:picLocks noChangeAspect="1"/>
+          </p:cNvPicPr>
+          <p:nvPr/>
+        </p:nvPicPr>
+        <p:blipFill>
+          <a:blip r:embed="rId4"/>
+          <a:stretch>
+            <a:fillRect/>
+          </a:stretch>
+        </p:blipFill>
+        <p:spPr>
+          <a:xfrm>
+            <a:off x="57601" y="1189856"/>
+            <a:ext cx="1068259" cy="1556792"/>
+          </a:xfrm>
+          <a:prstGeom prst="rect">
+            <a:avLst/>
+          </a:prstGeom>
+          <a:ln>
+            <a:noFill/>
+          </a:ln>
+          <a:effectLst>
+            <a:outerShdw blurRad="292100" dist="139700" dir="2700000" algn="tl" rotWithShape="0">
+              <a:srgbClr val="333333">
+                <a:alpha val="65000"/>
+              </a:srgbClr>
+            </a:outerShdw>
+          </a:effectLst>
+        </p:spPr>
+      </p:pic>
+      <p:sp>
+        <p:nvSpPr>
+          <p:cNvPr id="2" name="TextBox 1">
+            <a:extLst>
+              <a:ext uri="{FF2B5EF4-FFF2-40B4-BE49-F238E27FC236}">
+                <a16:creationId xmlns:a16="http://schemas.microsoft.com/office/drawing/2014/main" id="{CAB2C784-DE74-68FC-7A84-3E6C5D164315}"/>
+              </a:ext>
+            </a:extLst>
+          </p:cNvPr>
+          <p:cNvSpPr txBox="1"/>
+          <p:nvPr/>
+        </p:nvSpPr>
+        <p:spPr>
+          <a:xfrm>
+            <a:off x="405780" y="5722972"/>
+            <a:ext cx="7951216" cy="523220"/>
+          </a:xfrm>
+          <a:prstGeom prst="rect">
+            <a:avLst/>
+          </a:prstGeom>
+          <a:solidFill>
+            <a:schemeClr val="bg1">
+              <a:lumMod val="95000"/>
+            </a:schemeClr>
+          </a:solidFill>
+          <a:ln>
+            <a:solidFill>
+              <a:schemeClr val="bg2"/>
+            </a:solidFill>
+          </a:ln>
+        </p:spPr>
+        <p:txBody>
+          <a:bodyPr wrap="none" rtlCol="0" anchor="ctr" anchorCtr="1">
+            <a:spAutoFit/>
+          </a:bodyPr>
+          <a:lstStyle/>
+          <a:p>
+            <a:r>
+              <a:rPr lang="en-US" sz="2800" dirty="0">
+                <a:hlinkClick r:id="rId5"/>
+              </a:rPr>
+              <a:t>https://github.com/yasenstar/python_with_office</a:t>
+            </a:r>
+            <a:endParaRPr lang="en-US" sz="2800" dirty="0"/>
+          </a:p>
+        </p:txBody>
+      </p:sp>
+      <p:sp>
+        <p:nvSpPr>
+          <p:cNvPr id="9" name="TextBox 8">
+            <a:extLst>
+              <a:ext uri="{FF2B5EF4-FFF2-40B4-BE49-F238E27FC236}">
+                <a16:creationId xmlns:a16="http://schemas.microsoft.com/office/drawing/2014/main" id="{C25C84F5-3AA3-A068-7E2F-9123CA5A7D16}"/>
+              </a:ext>
+            </a:extLst>
+          </p:cNvPr>
+          <p:cNvSpPr txBox="1"/>
+          <p:nvPr/>
+        </p:nvSpPr>
+        <p:spPr>
+          <a:xfrm>
+            <a:off x="405780" y="6246192"/>
+            <a:ext cx="7951216" cy="523220"/>
+          </a:xfrm>
+          <a:prstGeom prst="rect">
+            <a:avLst/>
+          </a:prstGeom>
+          <a:solidFill>
+            <a:schemeClr val="bg1">
+              <a:lumMod val="95000"/>
+            </a:schemeClr>
+          </a:solidFill>
+          <a:ln>
+            <a:solidFill>
+              <a:schemeClr val="bg2"/>
+            </a:solidFill>
+          </a:ln>
+        </p:spPr>
+        <p:txBody>
+          <a:bodyPr wrap="square" rtlCol="0" anchor="ctr" anchorCtr="1">
+            <a:spAutoFit/>
+          </a:bodyPr>
+          <a:lstStyle/>
+          <a:p>
+            <a:r>
+              <a:rPr lang="en-US" sz="2800" dirty="0">
+                <a:hlinkClick r:id="rId6"/>
+              </a:rPr>
+              <a:t>https://gitee.com/yasenstar/python_with_office</a:t>
+            </a:r>
+            <a:endParaRPr lang="en-US" sz="2800" dirty="0"/>
+          </a:p>
+        </p:txBody>
+      </p:sp>
+      <p:sp>
+        <p:nvSpPr>
+          <p:cNvPr id="13" name="Rectangle 12">
+            <a:extLst>
+              <a:ext uri="{FF2B5EF4-FFF2-40B4-BE49-F238E27FC236}">
+                <a16:creationId xmlns:a16="http://schemas.microsoft.com/office/drawing/2014/main" id="{6F9C3126-4EC2-77CA-B408-E23CE9AE8E9D}"/>
+              </a:ext>
+            </a:extLst>
+          </p:cNvPr>
+          <p:cNvSpPr/>
+          <p:nvPr/>
+        </p:nvSpPr>
+        <p:spPr>
+          <a:xfrm>
+            <a:off x="7462564" y="3861048"/>
+            <a:ext cx="4522486" cy="1338704"/>
+          </a:xfrm>
+          <a:prstGeom prst="rect">
+            <a:avLst/>
+          </a:prstGeom>
+          <a:noFill/>
+          <a:ln w="38100">
+            <a:solidFill>
+              <a:srgbClr val="FF0000"/>
+            </a:solidFill>
+          </a:ln>
+        </p:spPr>
+        <p:style>
+          <a:lnRef idx="2">
+            <a:schemeClr val="accent3"/>
+          </a:lnRef>
+          <a:fillRef idx="1">
+            <a:schemeClr val="lt1"/>
+          </a:fillRef>
+          <a:effectRef idx="0">
+            <a:schemeClr val="accent3"/>
+          </a:effectRef>
+          <a:fontRef idx="minor">
+            <a:schemeClr val="dk1"/>
+          </a:fontRef>
+        </p:style>
+        <p:txBody>
+          <a:bodyPr rtlCol="0" anchor="ctr"/>
+          <a:lstStyle/>
+          <a:p>
+            <a:pPr algn="ctr"/>
+            <a:endParaRPr lang="en-US" dirty="0"/>
+          </a:p>
+        </p:txBody>
+      </p:sp>
+    </p:spTree>
+    <p:extLst>
+      <p:ext uri="{BB962C8B-B14F-4D97-AF65-F5344CB8AC3E}">
+        <p14:creationId xmlns:p14="http://schemas.microsoft.com/office/powerpoint/2010/main" val="3870491128"/>
+      </p:ext>
+    </p:extLst>
+  </p:cSld>
+  <p:clrMapOvr>
+    <a:masterClrMapping/>
+  </p:clrMapOvr>
+  <mc:AlternateContent xmlns:mc="http://schemas.openxmlformats.org/markup-compatibility/2006">
+    <mc:Choice xmlns:p14="http://schemas.microsoft.com/office/powerpoint/2010/main" Requires="p14">
+      <p:transition spd="med" p14:dur="700">
+        <p:fade/>
+      </p:transition>
+    </mc:Choice>
+    <mc:Fallback>
       <p:transition spd="med">
         <p:fade/>
       </p:transition>

</xml_diff>

<commit_message>
add 4-12 finished "working with Excel"
</commit_message>
<xml_diff>
--- a/Python-with-Office-Video_Covers.pptx
+++ b/Python-with-Office-Video_Covers.pptx
@@ -5,10 +5,10 @@
     <p:sldMasterId id="2147483660" r:id="rId1"/>
   </p:sldMasterIdLst>
   <p:notesMasterIdLst>
-    <p:notesMasterId r:id="rId42"/>
+    <p:notesMasterId r:id="rId43"/>
   </p:notesMasterIdLst>
   <p:handoutMasterIdLst>
-    <p:handoutMasterId r:id="rId43"/>
+    <p:handoutMasterId r:id="rId44"/>
   </p:handoutMasterIdLst>
   <p:sldIdLst>
     <p:sldId id="257" r:id="rId2"/>
@@ -51,6 +51,7 @@
     <p:sldId id="294" r:id="rId39"/>
     <p:sldId id="295" r:id="rId40"/>
     <p:sldId id="296" r:id="rId41"/>
+    <p:sldId id="297" r:id="rId42"/>
   </p:sldIdLst>
   <p:sldSz cx="12188825" cy="6858000"/>
   <p:notesSz cx="6858000" cy="9144000"/>
@@ -3671,6 +3672,90 @@
     <p:extLst>
       <p:ext uri="{BB962C8B-B14F-4D97-AF65-F5344CB8AC3E}">
         <p14:creationId xmlns:p14="http://schemas.microsoft.com/office/powerpoint/2010/main" val="2375663032"/>
+      </p:ext>
+    </p:extLst>
+  </p:cSld>
+  <p:clrMapOvr>
+    <a:masterClrMapping/>
+  </p:clrMapOvr>
+</p:notes>
+</file>
+
+<file path=ppt/notesSlides/notesSlide41.xml><?xml version="1.0" encoding="utf-8"?>
+<p:notes xmlns:a="http://schemas.openxmlformats.org/drawingml/2006/main" xmlns:r="http://schemas.openxmlformats.org/officeDocument/2006/relationships" xmlns:p="http://schemas.openxmlformats.org/presentationml/2006/main">
+  <p:cSld>
+    <p:spTree>
+      <p:nvGrpSpPr>
+        <p:cNvPr id="1" name=""/>
+        <p:cNvGrpSpPr/>
+        <p:nvPr/>
+      </p:nvGrpSpPr>
+      <p:grpSpPr>
+        <a:xfrm>
+          <a:off x="0" y="0"/>
+          <a:ext cx="0" cy="0"/>
+          <a:chOff x="0" y="0"/>
+          <a:chExt cx="0" cy="0"/>
+        </a:xfrm>
+      </p:grpSpPr>
+      <p:sp>
+        <p:nvSpPr>
+          <p:cNvPr id="2" name="Slide Image Placeholder 1"/>
+          <p:cNvSpPr>
+            <a:spLocks noGrp="1" noRot="1" noChangeAspect="1"/>
+          </p:cNvSpPr>
+          <p:nvPr>
+            <p:ph type="sldImg"/>
+          </p:nvPr>
+        </p:nvSpPr>
+        <p:spPr/>
+      </p:sp>
+      <p:sp>
+        <p:nvSpPr>
+          <p:cNvPr id="3" name="Notes Placeholder 2"/>
+          <p:cNvSpPr>
+            <a:spLocks noGrp="1"/>
+          </p:cNvSpPr>
+          <p:nvPr>
+            <p:ph type="body" idx="1"/>
+          </p:nvPr>
+        </p:nvSpPr>
+        <p:spPr/>
+        <p:txBody>
+          <a:bodyPr/>
+          <a:lstStyle/>
+          <a:p>
+            <a:endParaRPr lang="en-US" dirty="0"/>
+          </a:p>
+        </p:txBody>
+      </p:sp>
+      <p:sp>
+        <p:nvSpPr>
+          <p:cNvPr id="4" name="Slide Number Placeholder 3"/>
+          <p:cNvSpPr>
+            <a:spLocks noGrp="1"/>
+          </p:cNvSpPr>
+          <p:nvPr>
+            <p:ph type="sldNum" sz="quarter" idx="10"/>
+          </p:nvPr>
+        </p:nvSpPr>
+        <p:spPr/>
+        <p:txBody>
+          <a:bodyPr/>
+          <a:lstStyle/>
+          <a:p>
+            <a:fld id="{6BB98AFB-CB0D-4DFE-87B9-B4B0D0DE73CD}" type="slidenum">
+              <a:rPr lang="en-US" smtClean="0"/>
+              <a:t>41</a:t>
+            </a:fld>
+            <a:endParaRPr lang="en-US" dirty="0"/>
+          </a:p>
+        </p:txBody>
+      </p:sp>
+    </p:spTree>
+    <p:extLst>
+      <p:ext uri="{BB962C8B-B14F-4D97-AF65-F5344CB8AC3E}">
+        <p14:creationId xmlns:p14="http://schemas.microsoft.com/office/powerpoint/2010/main" val="3332420838"/>
       </p:ext>
     </p:extLst>
   </p:cSld>
@@ -20804,7 +20889,7 @@
               <a:t>6.11 </a:t>
             </a:r>
             <a:r>
-              <a:rPr lang="zh-CN" altLang="en-US" sz="2800">
+              <a:rPr lang="zh-CN" altLang="en-US" sz="2800" dirty="0">
                 <a:latin typeface="ADLaM Display" panose="020F0502020204030204" pitchFamily="2" charset="0"/>
                 <a:ea typeface="ADLaM Display" panose="020F0502020204030204" pitchFamily="2" charset="0"/>
                 <a:cs typeface="ADLaM Display" panose="020F0502020204030204" pitchFamily="2" charset="0"/>
@@ -21007,6 +21092,442 @@
     <p:extLst>
       <p:ext uri="{BB962C8B-B14F-4D97-AF65-F5344CB8AC3E}">
         <p14:creationId xmlns:p14="http://schemas.microsoft.com/office/powerpoint/2010/main" val="3870491128"/>
+      </p:ext>
+    </p:extLst>
+  </p:cSld>
+  <p:clrMapOvr>
+    <a:masterClrMapping/>
+  </p:clrMapOvr>
+  <mc:AlternateContent xmlns:mc="http://schemas.openxmlformats.org/markup-compatibility/2006">
+    <mc:Choice xmlns:p14="http://schemas.microsoft.com/office/powerpoint/2010/main" Requires="p14">
+      <p:transition spd="med" p14:dur="700">
+        <p:fade/>
+      </p:transition>
+    </mc:Choice>
+    <mc:Fallback>
+      <p:transition spd="med">
+        <p:fade/>
+      </p:transition>
+    </mc:Fallback>
+  </mc:AlternateContent>
+</p:sld>
+</file>
+
+<file path=ppt/slides/slide41.xml><?xml version="1.0" encoding="utf-8"?>
+<p:sld xmlns:a="http://schemas.openxmlformats.org/drawingml/2006/main" xmlns:r="http://schemas.openxmlformats.org/officeDocument/2006/relationships" xmlns:p="http://schemas.openxmlformats.org/presentationml/2006/main">
+  <p:cSld>
+    <p:spTree>
+      <p:nvGrpSpPr>
+        <p:cNvPr id="1" name=""/>
+        <p:cNvGrpSpPr/>
+        <p:nvPr/>
+      </p:nvGrpSpPr>
+      <p:grpSpPr>
+        <a:xfrm>
+          <a:off x="0" y="0"/>
+          <a:ext cx="0" cy="0"/>
+          <a:chOff x="0" y="0"/>
+          <a:chExt cx="0" cy="0"/>
+        </a:xfrm>
+      </p:grpSpPr>
+      <p:sp>
+        <p:nvSpPr>
+          <p:cNvPr id="4" name="Title 3"/>
+          <p:cNvSpPr>
+            <a:spLocks noGrp="1"/>
+          </p:cNvSpPr>
+          <p:nvPr>
+            <p:ph type="ctrTitle"/>
+          </p:nvPr>
+        </p:nvSpPr>
+        <p:spPr/>
+        <p:txBody>
+          <a:bodyPr>
+            <a:normAutofit/>
+          </a:bodyPr>
+          <a:lstStyle/>
+          <a:p>
+            <a:pPr algn="ctr"/>
+            <a:r>
+              <a:rPr lang="zh-CN" altLang="en-US" sz="4800" dirty="0">
+                <a:latin typeface="华文隶书" panose="02010800040101010101" pitchFamily="2" charset="-122"/>
+                <a:ea typeface="华文隶书" panose="02010800040101010101" pitchFamily="2" charset="-122"/>
+              </a:rPr>
+              <a:t>让</a:t>
+            </a:r>
+            <a:r>
+              <a:rPr lang="en-US" altLang="zh-CN" sz="4800" dirty="0">
+                <a:latin typeface="华文隶书" panose="02010800040101010101" pitchFamily="2" charset="-122"/>
+                <a:ea typeface="华文隶书" panose="02010800040101010101" pitchFamily="2" charset="-122"/>
+              </a:rPr>
+              <a:t>Python</a:t>
+            </a:r>
+            <a:r>
+              <a:rPr lang="zh-CN" altLang="en-US" sz="4800" dirty="0">
+                <a:latin typeface="华文隶书" panose="02010800040101010101" pitchFamily="2" charset="-122"/>
+                <a:ea typeface="华文隶书" panose="02010800040101010101" pitchFamily="2" charset="-122"/>
+              </a:rPr>
+              <a:t>遇上</a:t>
+            </a:r>
+            <a:r>
+              <a:rPr lang="en-US" altLang="zh-CN" sz="4800" dirty="0">
+                <a:latin typeface="华文隶书" panose="02010800040101010101" pitchFamily="2" charset="-122"/>
+                <a:ea typeface="华文隶书" panose="02010800040101010101" pitchFamily="2" charset="-122"/>
+              </a:rPr>
+              <a:t>Office</a:t>
+            </a:r>
+            <a:br>
+              <a:rPr lang="en-US" altLang="zh-CN" sz="4800" dirty="0">
+                <a:latin typeface="华文隶书" panose="02010800040101010101" pitchFamily="2" charset="-122"/>
+                <a:ea typeface="华文隶书" panose="02010800040101010101" pitchFamily="2" charset="-122"/>
+              </a:rPr>
+            </a:br>
+            <a:br>
+              <a:rPr lang="en-US" altLang="zh-CN" sz="4800" dirty="0">
+                <a:latin typeface="华文隶书" panose="02010800040101010101" pitchFamily="2" charset="-122"/>
+                <a:ea typeface="华文隶书" panose="02010800040101010101" pitchFamily="2" charset="-122"/>
+              </a:rPr>
+            </a:br>
+            <a:r>
+              <a:rPr lang="en-US" altLang="zh-CN" sz="4800" dirty="0">
+                <a:latin typeface="华文隶书" panose="02010800040101010101" pitchFamily="2" charset="-122"/>
+                <a:ea typeface="华文隶书" panose="02010800040101010101" pitchFamily="2" charset="-122"/>
+              </a:rPr>
+              <a:t>(Python with Office)</a:t>
+            </a:r>
+            <a:endParaRPr lang="en-US" sz="4800" dirty="0">
+              <a:latin typeface="华文隶书" panose="02010800040101010101" pitchFamily="2" charset="-122"/>
+              <a:ea typeface="华文隶书" panose="02010800040101010101" pitchFamily="2" charset="-122"/>
+            </a:endParaRPr>
+          </a:p>
+        </p:txBody>
+      </p:sp>
+      <p:sp>
+        <p:nvSpPr>
+          <p:cNvPr id="3" name="Content Placeholder 2"/>
+          <p:cNvSpPr>
+            <a:spLocks noGrp="1"/>
+          </p:cNvSpPr>
+          <p:nvPr>
+            <p:ph type="subTitle" idx="1"/>
+          </p:nvPr>
+        </p:nvSpPr>
+        <p:spPr>
+          <a:xfrm>
+            <a:off x="549796" y="3403600"/>
+            <a:ext cx="5544617" cy="2185640"/>
+          </a:xfrm>
+        </p:spPr>
+        <p:txBody>
+          <a:bodyPr>
+            <a:normAutofit/>
+          </a:bodyPr>
+          <a:lstStyle/>
+          <a:p>
+            <a:r>
+              <a:rPr lang="en-US" sz="2800" dirty="0">
+                <a:latin typeface="ADLaM Display" panose="020F0502020204030204" pitchFamily="2" charset="0"/>
+                <a:ea typeface="ADLaM Display" panose="020F0502020204030204" pitchFamily="2" charset="0"/>
+                <a:cs typeface="ADLaM Display" panose="020F0502020204030204" pitchFamily="2" charset="0"/>
+              </a:rPr>
+              <a:t>Chapter 6 Work with Excel</a:t>
+            </a:r>
+          </a:p>
+          <a:p>
+            <a:r>
+              <a:rPr lang="en-US" sz="2800" dirty="0">
+                <a:latin typeface="ADLaM Display" panose="020F0502020204030204" pitchFamily="2" charset="0"/>
+                <a:ea typeface="ADLaM Display" panose="020F0502020204030204" pitchFamily="2" charset="0"/>
+                <a:cs typeface="ADLaM Display" panose="020F0502020204030204" pitchFamily="2" charset="0"/>
+              </a:rPr>
+              <a:t>6.12 xls to xlsx</a:t>
+            </a:r>
+          </a:p>
+          <a:p>
+            <a:r>
+              <a:rPr lang="zh-CN" altLang="en-US" sz="2800" dirty="0">
+                <a:latin typeface="ADLaM Display" panose="020F0502020204030204" pitchFamily="2" charset="0"/>
+                <a:ea typeface="ADLaM Display" panose="020F0502020204030204" pitchFamily="2" charset="0"/>
+                <a:cs typeface="ADLaM Display" panose="020F0502020204030204" pitchFamily="2" charset="0"/>
+              </a:rPr>
+              <a:t>第六章 操作</a:t>
+            </a:r>
+            <a:r>
+              <a:rPr lang="en-US" altLang="zh-CN" sz="2800" dirty="0">
+                <a:latin typeface="ADLaM Display" panose="020F0502020204030204" pitchFamily="2" charset="0"/>
+                <a:ea typeface="ADLaM Display" panose="020F0502020204030204" pitchFamily="2" charset="0"/>
+                <a:cs typeface="ADLaM Display" panose="020F0502020204030204" pitchFamily="2" charset="0"/>
+              </a:rPr>
+              <a:t>Excel</a:t>
+            </a:r>
+          </a:p>
+          <a:p>
+            <a:r>
+              <a:rPr lang="en-US" altLang="zh-CN" sz="2800" dirty="0">
+                <a:latin typeface="ADLaM Display" panose="020F0502020204030204" pitchFamily="2" charset="0"/>
+                <a:ea typeface="ADLaM Display" panose="020F0502020204030204" pitchFamily="2" charset="0"/>
+                <a:cs typeface="ADLaM Display" panose="020F0502020204030204" pitchFamily="2" charset="0"/>
+              </a:rPr>
+              <a:t>6.12 </a:t>
+            </a:r>
+            <a:r>
+              <a:rPr lang="en-US" sz="2800" dirty="0">
+                <a:latin typeface="ADLaM Display" panose="020F0502020204030204" pitchFamily="2" charset="0"/>
+                <a:ea typeface="ADLaM Display" panose="020F0502020204030204" pitchFamily="2" charset="0"/>
+                <a:cs typeface="ADLaM Display" panose="020F0502020204030204" pitchFamily="2" charset="0"/>
+              </a:rPr>
+              <a:t>xls </a:t>
+            </a:r>
+            <a:r>
+              <a:rPr lang="zh-CN" altLang="en-US" sz="2800">
+                <a:latin typeface="ADLaM Display" panose="020F0502020204030204" pitchFamily="2" charset="0"/>
+                <a:ea typeface="ADLaM Display" panose="020F0502020204030204" pitchFamily="2" charset="0"/>
+                <a:cs typeface="ADLaM Display" panose="020F0502020204030204" pitchFamily="2" charset="0"/>
+              </a:rPr>
+              <a:t>转</a:t>
+            </a:r>
+            <a:r>
+              <a:rPr lang="en-US" sz="2800">
+                <a:latin typeface="ADLaM Display" panose="020F0502020204030204" pitchFamily="2" charset="0"/>
+                <a:ea typeface="ADLaM Display" panose="020F0502020204030204" pitchFamily="2" charset="0"/>
+                <a:cs typeface="ADLaM Display" panose="020F0502020204030204" pitchFamily="2" charset="0"/>
+              </a:rPr>
+              <a:t> </a:t>
+            </a:r>
+            <a:r>
+              <a:rPr lang="en-US" sz="2800" dirty="0">
+                <a:latin typeface="ADLaM Display" panose="020F0502020204030204" pitchFamily="2" charset="0"/>
+                <a:ea typeface="ADLaM Display" panose="020F0502020204030204" pitchFamily="2" charset="0"/>
+                <a:cs typeface="ADLaM Display" panose="020F0502020204030204" pitchFamily="2" charset="0"/>
+              </a:rPr>
+              <a:t>xlsx</a:t>
+            </a:r>
+            <a:endParaRPr lang="en-US" altLang="zh-CN" sz="2800" dirty="0">
+              <a:latin typeface="ADLaM Display" panose="020F0502020204030204" pitchFamily="2" charset="0"/>
+              <a:ea typeface="ADLaM Display" panose="020F0502020204030204" pitchFamily="2" charset="0"/>
+              <a:cs typeface="ADLaM Display" panose="020F0502020204030204" pitchFamily="2" charset="0"/>
+            </a:endParaRPr>
+          </a:p>
+        </p:txBody>
+      </p:sp>
+      <p:pic>
+        <p:nvPicPr>
+          <p:cNvPr id="5" name="Picture 4">
+            <a:extLst>
+              <a:ext uri="{FF2B5EF4-FFF2-40B4-BE49-F238E27FC236}">
+                <a16:creationId xmlns:a16="http://schemas.microsoft.com/office/drawing/2014/main" id="{4AD8B85C-B359-195F-B78C-C879AB7840B1}"/>
+              </a:ext>
+            </a:extLst>
+          </p:cNvPr>
+          <p:cNvPicPr>
+            <a:picLocks noChangeAspect="1"/>
+          </p:cNvPicPr>
+          <p:nvPr/>
+        </p:nvPicPr>
+        <p:blipFill>
+          <a:blip r:embed="rId3"/>
+          <a:stretch>
+            <a:fillRect/>
+          </a:stretch>
+        </p:blipFill>
+        <p:spPr>
+          <a:xfrm>
+            <a:off x="57601" y="1189856"/>
+            <a:ext cx="1068259" cy="1556792"/>
+          </a:xfrm>
+          <a:prstGeom prst="rect">
+            <a:avLst/>
+          </a:prstGeom>
+          <a:ln>
+            <a:noFill/>
+          </a:ln>
+          <a:effectLst>
+            <a:outerShdw blurRad="292100" dist="139700" dir="2700000" algn="tl" rotWithShape="0">
+              <a:srgbClr val="333333">
+                <a:alpha val="65000"/>
+              </a:srgbClr>
+            </a:outerShdw>
+          </a:effectLst>
+        </p:spPr>
+      </p:pic>
+      <p:sp>
+        <p:nvSpPr>
+          <p:cNvPr id="2" name="TextBox 1">
+            <a:extLst>
+              <a:ext uri="{FF2B5EF4-FFF2-40B4-BE49-F238E27FC236}">
+                <a16:creationId xmlns:a16="http://schemas.microsoft.com/office/drawing/2014/main" id="{CAB2C784-DE74-68FC-7A84-3E6C5D164315}"/>
+              </a:ext>
+            </a:extLst>
+          </p:cNvPr>
+          <p:cNvSpPr txBox="1"/>
+          <p:nvPr/>
+        </p:nvSpPr>
+        <p:spPr>
+          <a:xfrm>
+            <a:off x="405780" y="5722972"/>
+            <a:ext cx="7951216" cy="523220"/>
+          </a:xfrm>
+          <a:prstGeom prst="rect">
+            <a:avLst/>
+          </a:prstGeom>
+          <a:solidFill>
+            <a:schemeClr val="bg1">
+              <a:lumMod val="95000"/>
+            </a:schemeClr>
+          </a:solidFill>
+          <a:ln>
+            <a:solidFill>
+              <a:schemeClr val="bg2"/>
+            </a:solidFill>
+          </a:ln>
+        </p:spPr>
+        <p:txBody>
+          <a:bodyPr wrap="none" rtlCol="0" anchor="ctr" anchorCtr="1">
+            <a:spAutoFit/>
+          </a:bodyPr>
+          <a:lstStyle/>
+          <a:p>
+            <a:r>
+              <a:rPr lang="en-US" sz="2800" dirty="0">
+                <a:hlinkClick r:id="rId4"/>
+              </a:rPr>
+              <a:t>https://github.com/yasenstar/python_with_office</a:t>
+            </a:r>
+            <a:endParaRPr lang="en-US" sz="2800" dirty="0"/>
+          </a:p>
+        </p:txBody>
+      </p:sp>
+      <p:sp>
+        <p:nvSpPr>
+          <p:cNvPr id="9" name="TextBox 8">
+            <a:extLst>
+              <a:ext uri="{FF2B5EF4-FFF2-40B4-BE49-F238E27FC236}">
+                <a16:creationId xmlns:a16="http://schemas.microsoft.com/office/drawing/2014/main" id="{C25C84F5-3AA3-A068-7E2F-9123CA5A7D16}"/>
+              </a:ext>
+            </a:extLst>
+          </p:cNvPr>
+          <p:cNvSpPr txBox="1"/>
+          <p:nvPr/>
+        </p:nvSpPr>
+        <p:spPr>
+          <a:xfrm>
+            <a:off x="405780" y="6246192"/>
+            <a:ext cx="7951216" cy="523220"/>
+          </a:xfrm>
+          <a:prstGeom prst="rect">
+            <a:avLst/>
+          </a:prstGeom>
+          <a:solidFill>
+            <a:schemeClr val="bg1">
+              <a:lumMod val="95000"/>
+            </a:schemeClr>
+          </a:solidFill>
+          <a:ln>
+            <a:solidFill>
+              <a:schemeClr val="bg2"/>
+            </a:solidFill>
+          </a:ln>
+        </p:spPr>
+        <p:txBody>
+          <a:bodyPr wrap="square" rtlCol="0" anchor="ctr" anchorCtr="1">
+            <a:spAutoFit/>
+          </a:bodyPr>
+          <a:lstStyle/>
+          <a:p>
+            <a:r>
+              <a:rPr lang="en-US" sz="2800" dirty="0">
+                <a:hlinkClick r:id="rId5"/>
+              </a:rPr>
+              <a:t>https://gitee.com/yasenstar/python_with_office</a:t>
+            </a:r>
+            <a:endParaRPr lang="en-US" sz="2800" dirty="0"/>
+          </a:p>
+        </p:txBody>
+      </p:sp>
+      <p:pic>
+        <p:nvPicPr>
+          <p:cNvPr id="7" name="Picture 6">
+            <a:extLst>
+              <a:ext uri="{FF2B5EF4-FFF2-40B4-BE49-F238E27FC236}">
+                <a16:creationId xmlns:a16="http://schemas.microsoft.com/office/drawing/2014/main" id="{1A56BF8A-4050-E044-3916-2A8D56304413}"/>
+              </a:ext>
+            </a:extLst>
+          </p:cNvPr>
+          <p:cNvPicPr>
+            <a:picLocks noChangeAspect="1"/>
+          </p:cNvPicPr>
+          <p:nvPr/>
+        </p:nvPicPr>
+        <p:blipFill>
+          <a:blip r:embed="rId6"/>
+          <a:stretch>
+            <a:fillRect/>
+          </a:stretch>
+        </p:blipFill>
+        <p:spPr>
+          <a:xfrm>
+            <a:off x="6112786" y="938406"/>
+            <a:ext cx="5670401" cy="4639419"/>
+          </a:xfrm>
+          <a:prstGeom prst="rect">
+            <a:avLst/>
+          </a:prstGeom>
+        </p:spPr>
+      </p:pic>
+      <p:sp>
+        <p:nvSpPr>
+          <p:cNvPr id="13" name="Rectangle 12">
+            <a:extLst>
+              <a:ext uri="{FF2B5EF4-FFF2-40B4-BE49-F238E27FC236}">
+                <a16:creationId xmlns:a16="http://schemas.microsoft.com/office/drawing/2014/main" id="{6F9C3126-4EC2-77CA-B408-E23CE9AE8E9D}"/>
+              </a:ext>
+            </a:extLst>
+          </p:cNvPr>
+          <p:cNvSpPr/>
+          <p:nvPr/>
+        </p:nvSpPr>
+        <p:spPr>
+          <a:xfrm>
+            <a:off x="9478788" y="4293096"/>
+            <a:ext cx="2506262" cy="360040"/>
+          </a:xfrm>
+          <a:prstGeom prst="rect">
+            <a:avLst/>
+          </a:prstGeom>
+          <a:noFill/>
+          <a:ln w="38100">
+            <a:solidFill>
+              <a:srgbClr val="FF0000"/>
+            </a:solidFill>
+          </a:ln>
+        </p:spPr>
+        <p:style>
+          <a:lnRef idx="2">
+            <a:schemeClr val="accent3"/>
+          </a:lnRef>
+          <a:fillRef idx="1">
+            <a:schemeClr val="lt1"/>
+          </a:fillRef>
+          <a:effectRef idx="0">
+            <a:schemeClr val="accent3"/>
+          </a:effectRef>
+          <a:fontRef idx="minor">
+            <a:schemeClr val="dk1"/>
+          </a:fontRef>
+        </p:style>
+        <p:txBody>
+          <a:bodyPr rtlCol="0" anchor="ctr"/>
+          <a:lstStyle/>
+          <a:p>
+            <a:pPr algn="ctr"/>
+            <a:endParaRPr lang="en-US" dirty="0"/>
+          </a:p>
+        </p:txBody>
+      </p:sp>
+    </p:spTree>
+    <p:extLst>
+      <p:ext uri="{BB962C8B-B14F-4D97-AF65-F5344CB8AC3E}">
+        <p14:creationId xmlns:p14="http://schemas.microsoft.com/office/powerpoint/2010/main" val="1499312136"/>
       </p:ext>
     </p:extLst>
   </p:cSld>

</xml_diff>

<commit_message>
prepare chapter 7 work with Word
</commit_message>
<xml_diff>
--- a/Python-with-Office-Video_Covers.pptx
+++ b/Python-with-Office-Video_Covers.pptx
@@ -5,10 +5,10 @@
     <p:sldMasterId id="2147483660" r:id="rId1"/>
   </p:sldMasterIdLst>
   <p:notesMasterIdLst>
-    <p:notesMasterId r:id="rId43"/>
+    <p:notesMasterId r:id="rId44"/>
   </p:notesMasterIdLst>
   <p:handoutMasterIdLst>
-    <p:handoutMasterId r:id="rId44"/>
+    <p:handoutMasterId r:id="rId45"/>
   </p:handoutMasterIdLst>
   <p:sldIdLst>
     <p:sldId id="257" r:id="rId2"/>
@@ -52,6 +52,7 @@
     <p:sldId id="295" r:id="rId40"/>
     <p:sldId id="296" r:id="rId41"/>
     <p:sldId id="297" r:id="rId42"/>
+    <p:sldId id="298" r:id="rId43"/>
   </p:sldIdLst>
   <p:sldSz cx="12188825" cy="6858000"/>
   <p:notesSz cx="6858000" cy="9144000"/>
@@ -314,7 +315,7 @@
           <a:p>
             <a:fld id="{24CE221E-83ED-4F6C-BA5F-3F9E6FDB6953}" type="datetimeFigureOut">
               <a:rPr lang="en-US"/>
-              <a:t>11/30/2023</a:t>
+              <a:t>12/2/2023</a:t>
             </a:fld>
             <a:endParaRPr dirty="0"/>
           </a:p>
@@ -479,7 +480,7 @@
           <a:p>
             <a:fld id="{97853E5F-CE67-483C-A264-F17AC70E9CA2}" type="datetimeFigureOut">
               <a:rPr lang="en-US"/>
-              <a:t>11/30/2023</a:t>
+              <a:t>12/2/2023</a:t>
             </a:fld>
             <a:endParaRPr dirty="0"/>
           </a:p>
@@ -3765,6 +3766,90 @@
 </p:notes>
 </file>
 
+<file path=ppt/notesSlides/notesSlide42.xml><?xml version="1.0" encoding="utf-8"?>
+<p:notes xmlns:a="http://schemas.openxmlformats.org/drawingml/2006/main" xmlns:r="http://schemas.openxmlformats.org/officeDocument/2006/relationships" xmlns:p="http://schemas.openxmlformats.org/presentationml/2006/main">
+  <p:cSld>
+    <p:spTree>
+      <p:nvGrpSpPr>
+        <p:cNvPr id="1" name=""/>
+        <p:cNvGrpSpPr/>
+        <p:nvPr/>
+      </p:nvGrpSpPr>
+      <p:grpSpPr>
+        <a:xfrm>
+          <a:off x="0" y="0"/>
+          <a:ext cx="0" cy="0"/>
+          <a:chOff x="0" y="0"/>
+          <a:chExt cx="0" cy="0"/>
+        </a:xfrm>
+      </p:grpSpPr>
+      <p:sp>
+        <p:nvSpPr>
+          <p:cNvPr id="2" name="Slide Image Placeholder 1"/>
+          <p:cNvSpPr>
+            <a:spLocks noGrp="1" noRot="1" noChangeAspect="1"/>
+          </p:cNvSpPr>
+          <p:nvPr>
+            <p:ph type="sldImg"/>
+          </p:nvPr>
+        </p:nvSpPr>
+        <p:spPr/>
+      </p:sp>
+      <p:sp>
+        <p:nvSpPr>
+          <p:cNvPr id="3" name="Notes Placeholder 2"/>
+          <p:cNvSpPr>
+            <a:spLocks noGrp="1"/>
+          </p:cNvSpPr>
+          <p:nvPr>
+            <p:ph type="body" idx="1"/>
+          </p:nvPr>
+        </p:nvSpPr>
+        <p:spPr/>
+        <p:txBody>
+          <a:bodyPr/>
+          <a:lstStyle/>
+          <a:p>
+            <a:endParaRPr lang="en-US" dirty="0"/>
+          </a:p>
+        </p:txBody>
+      </p:sp>
+      <p:sp>
+        <p:nvSpPr>
+          <p:cNvPr id="4" name="Slide Number Placeholder 3"/>
+          <p:cNvSpPr>
+            <a:spLocks noGrp="1"/>
+          </p:cNvSpPr>
+          <p:nvPr>
+            <p:ph type="sldNum" sz="quarter" idx="10"/>
+          </p:nvPr>
+        </p:nvSpPr>
+        <p:spPr/>
+        <p:txBody>
+          <a:bodyPr/>
+          <a:lstStyle/>
+          <a:p>
+            <a:fld id="{6BB98AFB-CB0D-4DFE-87B9-B4B0D0DE73CD}" type="slidenum">
+              <a:rPr lang="en-US" smtClean="0"/>
+              <a:t>42</a:t>
+            </a:fld>
+            <a:endParaRPr lang="en-US" dirty="0"/>
+          </a:p>
+        </p:txBody>
+      </p:sp>
+    </p:spTree>
+    <p:extLst>
+      <p:ext uri="{BB962C8B-B14F-4D97-AF65-F5344CB8AC3E}">
+        <p14:creationId xmlns:p14="http://schemas.microsoft.com/office/powerpoint/2010/main" val="2989968773"/>
+      </p:ext>
+    </p:extLst>
+  </p:cSld>
+  <p:clrMapOvr>
+    <a:masterClrMapping/>
+  </p:clrMapOvr>
+</p:notes>
+</file>
+
 <file path=ppt/notesSlides/notesSlide5.xml><?xml version="1.0" encoding="utf-8"?>
 <p:notes xmlns:a="http://schemas.openxmlformats.org/drawingml/2006/main" xmlns:r="http://schemas.openxmlformats.org/officeDocument/2006/relationships" xmlns:p="http://schemas.openxmlformats.org/presentationml/2006/main">
   <p:cSld>
@@ -4431,7 +4516,7 @@
           <a:p>
             <a:fld id="{3E0FA9E5-6744-4841-888F-9E7CC0C2B7EC}" type="datetimeFigureOut">
               <a:rPr lang="en-US" smtClean="0"/>
-              <a:t>11/30/2023</a:t>
+              <a:t>12/2/2023</a:t>
             </a:fld>
             <a:endParaRPr lang="en-US" dirty="0"/>
           </a:p>
@@ -4621,7 +4706,7 @@
           <a:p>
             <a:fld id="{3E0FA9E5-6744-4841-888F-9E7CC0C2B7EC}" type="datetimeFigureOut">
               <a:rPr lang="en-US" smtClean="0"/>
-              <a:t>11/30/2023</a:t>
+              <a:t>12/2/2023</a:t>
             </a:fld>
             <a:endParaRPr lang="en-US" dirty="0"/>
           </a:p>
@@ -4816,7 +4901,7 @@
           <a:p>
             <a:fld id="{3E0FA9E5-6744-4841-888F-9E7CC0C2B7EC}" type="datetimeFigureOut">
               <a:rPr lang="en-US" smtClean="0"/>
-              <a:t>11/30/2023</a:t>
+              <a:t>12/2/2023</a:t>
             </a:fld>
             <a:endParaRPr lang="en-US" dirty="0"/>
           </a:p>
@@ -5001,7 +5086,7 @@
           <a:p>
             <a:fld id="{3E0FA9E5-6744-4841-888F-9E7CC0C2B7EC}" type="datetimeFigureOut">
               <a:rPr lang="en-US" smtClean="0"/>
-              <a:t>11/30/2023</a:t>
+              <a:t>12/2/2023</a:t>
             </a:fld>
             <a:endParaRPr lang="en-US" dirty="0"/>
           </a:p>
@@ -5270,7 +5355,7 @@
           <a:p>
             <a:fld id="{3E0FA9E5-6744-4841-888F-9E7CC0C2B7EC}" type="datetimeFigureOut">
               <a:rPr lang="en-US" smtClean="0"/>
-              <a:t>11/30/2023</a:t>
+              <a:t>12/2/2023</a:t>
             </a:fld>
             <a:endParaRPr lang="en-US" dirty="0"/>
           </a:p>
@@ -5577,7 +5662,7 @@
           <a:p>
             <a:fld id="{3E0FA9E5-6744-4841-888F-9E7CC0C2B7EC}" type="datetimeFigureOut">
               <a:rPr lang="en-US" smtClean="0"/>
-              <a:t>11/30/2023</a:t>
+              <a:t>12/2/2023</a:t>
             </a:fld>
             <a:endParaRPr lang="en-US" dirty="0"/>
           </a:p>
@@ -6033,7 +6118,7 @@
           <a:p>
             <a:fld id="{3E0FA9E5-6744-4841-888F-9E7CC0C2B7EC}" type="datetimeFigureOut">
               <a:rPr lang="en-US" smtClean="0"/>
-              <a:t>11/30/2023</a:t>
+              <a:t>12/2/2023</a:t>
             </a:fld>
             <a:endParaRPr lang="en-US" dirty="0"/>
           </a:p>
@@ -6166,7 +6251,7 @@
           <a:p>
             <a:fld id="{3E0FA9E5-6744-4841-888F-9E7CC0C2B7EC}" type="datetimeFigureOut">
               <a:rPr lang="en-US" smtClean="0"/>
-              <a:t>11/30/2023</a:t>
+              <a:t>12/2/2023</a:t>
             </a:fld>
             <a:endParaRPr lang="en-US" dirty="0"/>
           </a:p>
@@ -6276,7 +6361,7 @@
           <a:p>
             <a:fld id="{3E0FA9E5-6744-4841-888F-9E7CC0C2B7EC}" type="datetimeFigureOut">
               <a:rPr lang="en-US" smtClean="0"/>
-              <a:t>11/30/2023</a:t>
+              <a:t>12/2/2023</a:t>
             </a:fld>
             <a:endParaRPr lang="en-US" dirty="0"/>
           </a:p>
@@ -6587,7 +6672,7 @@
           <a:p>
             <a:fld id="{3E0FA9E5-6744-4841-888F-9E7CC0C2B7EC}" type="datetimeFigureOut">
               <a:rPr lang="en-US" smtClean="0"/>
-              <a:t>11/30/2023</a:t>
+              <a:t>12/2/2023</a:t>
             </a:fld>
             <a:endParaRPr lang="en-US" dirty="0"/>
           </a:p>
@@ -7064,7 +7149,7 @@
             <a:fld id="{3E0FA9E5-6744-4841-888F-9E7CC0C2B7EC}" type="datetimeFigureOut">
               <a:rPr lang="en-US" smtClean="0"/>
               <a:pPr/>
-              <a:t>11/30/2023</a:t>
+              <a:t>12/2/2023</a:t>
             </a:fld>
             <a:endParaRPr lang="en-US" dirty="0"/>
           </a:p>
@@ -19488,13 +19573,13 @@
   <p:clrMapOvr>
     <a:masterClrMapping/>
   </p:clrMapOvr>
-  <mc:AlternateContent xmlns:mc="http://schemas.openxmlformats.org/markup-compatibility/2006">
-    <mc:Choice xmlns:p14="http://schemas.microsoft.com/office/powerpoint/2010/main" Requires="p14">
+  <mc:AlternateContent xmlns:mc="http://schemas.openxmlformats.org/markup-compatibility/2006" xmlns:p14="http://schemas.microsoft.com/office/powerpoint/2010/main">
+    <mc:Choice Requires="p14">
       <p:transition spd="med" p14:dur="700">
         <p:fade/>
       </p:transition>
     </mc:Choice>
-    <mc:Fallback>
+    <mc:Fallback xmlns="">
       <p:transition spd="med">
         <p:fade/>
       </p:transition>
@@ -19910,13 +19995,13 @@
   <p:clrMapOvr>
     <a:masterClrMapping/>
   </p:clrMapOvr>
-  <mc:AlternateContent xmlns:mc="http://schemas.openxmlformats.org/markup-compatibility/2006">
-    <mc:Choice xmlns:p14="http://schemas.microsoft.com/office/powerpoint/2010/main" Requires="p14">
+  <mc:AlternateContent xmlns:mc="http://schemas.openxmlformats.org/markup-compatibility/2006" xmlns:p14="http://schemas.microsoft.com/office/powerpoint/2010/main">
+    <mc:Choice Requires="p14">
       <p:transition spd="med" p14:dur="700">
         <p:fade/>
       </p:transition>
     </mc:Choice>
-    <mc:Fallback>
+    <mc:Fallback xmlns="">
       <p:transition spd="med">
         <p:fade/>
       </p:transition>
@@ -20332,13 +20417,13 @@
   <p:clrMapOvr>
     <a:masterClrMapping/>
   </p:clrMapOvr>
-  <mc:AlternateContent xmlns:mc="http://schemas.openxmlformats.org/markup-compatibility/2006">
-    <mc:Choice xmlns:p14="http://schemas.microsoft.com/office/powerpoint/2010/main" Requires="p14">
+  <mc:AlternateContent xmlns:mc="http://schemas.openxmlformats.org/markup-compatibility/2006" xmlns:p14="http://schemas.microsoft.com/office/powerpoint/2010/main">
+    <mc:Choice Requires="p14">
       <p:transition spd="med" p14:dur="700">
         <p:fade/>
       </p:transition>
     </mc:Choice>
-    <mc:Fallback>
+    <mc:Fallback xmlns="">
       <p:transition spd="med">
         <p:fade/>
       </p:transition>
@@ -21098,13 +21183,13 @@
   <p:clrMapOvr>
     <a:masterClrMapping/>
   </p:clrMapOvr>
-  <mc:AlternateContent xmlns:mc="http://schemas.openxmlformats.org/markup-compatibility/2006">
-    <mc:Choice xmlns:p14="http://schemas.microsoft.com/office/powerpoint/2010/main" Requires="p14">
+  <mc:AlternateContent xmlns:mc="http://schemas.openxmlformats.org/markup-compatibility/2006" xmlns:p14="http://schemas.microsoft.com/office/powerpoint/2010/main">
+    <mc:Choice Requires="p14">
       <p:transition spd="med" p14:dur="700">
         <p:fade/>
       </p:transition>
     </mc:Choice>
-    <mc:Fallback>
+    <mc:Fallback xmlns="">
       <p:transition spd="med">
         <p:fade/>
       </p:transition>
@@ -21528,6 +21613,444 @@
     <p:extLst>
       <p:ext uri="{BB962C8B-B14F-4D97-AF65-F5344CB8AC3E}">
         <p14:creationId xmlns:p14="http://schemas.microsoft.com/office/powerpoint/2010/main" val="1499312136"/>
+      </p:ext>
+    </p:extLst>
+  </p:cSld>
+  <p:clrMapOvr>
+    <a:masterClrMapping/>
+  </p:clrMapOvr>
+  <mc:AlternateContent xmlns:mc="http://schemas.openxmlformats.org/markup-compatibility/2006" xmlns:p14="http://schemas.microsoft.com/office/powerpoint/2010/main">
+    <mc:Choice Requires="p14">
+      <p:transition spd="med" p14:dur="700">
+        <p:fade/>
+      </p:transition>
+    </mc:Choice>
+    <mc:Fallback xmlns="">
+      <p:transition spd="med">
+        <p:fade/>
+      </p:transition>
+    </mc:Fallback>
+  </mc:AlternateContent>
+</p:sld>
+</file>
+
+<file path=ppt/slides/slide42.xml><?xml version="1.0" encoding="utf-8"?>
+<p:sld xmlns:a="http://schemas.openxmlformats.org/drawingml/2006/main" xmlns:r="http://schemas.openxmlformats.org/officeDocument/2006/relationships" xmlns:p="http://schemas.openxmlformats.org/presentationml/2006/main">
+  <p:cSld>
+    <p:spTree>
+      <p:nvGrpSpPr>
+        <p:cNvPr id="1" name=""/>
+        <p:cNvGrpSpPr/>
+        <p:nvPr/>
+      </p:nvGrpSpPr>
+      <p:grpSpPr>
+        <a:xfrm>
+          <a:off x="0" y="0"/>
+          <a:ext cx="0" cy="0"/>
+          <a:chOff x="0" y="0"/>
+          <a:chExt cx="0" cy="0"/>
+        </a:xfrm>
+      </p:grpSpPr>
+      <p:pic>
+        <p:nvPicPr>
+          <p:cNvPr id="8" name="Picture 7">
+            <a:extLst>
+              <a:ext uri="{FF2B5EF4-FFF2-40B4-BE49-F238E27FC236}">
+                <a16:creationId xmlns:a16="http://schemas.microsoft.com/office/drawing/2014/main" id="{166DA5E8-D28F-BB8F-5386-3899AF27134D}"/>
+              </a:ext>
+            </a:extLst>
+          </p:cNvPr>
+          <p:cNvPicPr>
+            <a:picLocks noChangeAspect="1"/>
+          </p:cNvPicPr>
+          <p:nvPr/>
+        </p:nvPicPr>
+        <p:blipFill>
+          <a:blip r:embed="rId3"/>
+          <a:stretch>
+            <a:fillRect/>
+          </a:stretch>
+        </p:blipFill>
+        <p:spPr>
+          <a:xfrm>
+            <a:off x="6058417" y="1134988"/>
+            <a:ext cx="6000867" cy="4454252"/>
+          </a:xfrm>
+          <a:prstGeom prst="rect">
+            <a:avLst/>
+          </a:prstGeom>
+          <a:ln>
+            <a:noFill/>
+          </a:ln>
+          <a:effectLst>
+            <a:outerShdw blurRad="292100" dist="139700" dir="2700000" algn="tl" rotWithShape="0">
+              <a:srgbClr val="333333">
+                <a:alpha val="65000"/>
+              </a:srgbClr>
+            </a:outerShdw>
+          </a:effectLst>
+        </p:spPr>
+      </p:pic>
+      <p:sp>
+        <p:nvSpPr>
+          <p:cNvPr id="4" name="Title 3"/>
+          <p:cNvSpPr>
+            <a:spLocks noGrp="1"/>
+          </p:cNvSpPr>
+          <p:nvPr>
+            <p:ph type="ctrTitle"/>
+          </p:nvPr>
+        </p:nvSpPr>
+        <p:spPr/>
+        <p:txBody>
+          <a:bodyPr>
+            <a:normAutofit/>
+          </a:bodyPr>
+          <a:lstStyle/>
+          <a:p>
+            <a:pPr algn="ctr"/>
+            <a:r>
+              <a:rPr lang="zh-CN" altLang="en-US" sz="4800" dirty="0">
+                <a:latin typeface="华文隶书" panose="02010800040101010101" pitchFamily="2" charset="-122"/>
+                <a:ea typeface="华文隶书" panose="02010800040101010101" pitchFamily="2" charset="-122"/>
+              </a:rPr>
+              <a:t>让</a:t>
+            </a:r>
+            <a:r>
+              <a:rPr lang="en-US" altLang="zh-CN" sz="4800" dirty="0">
+                <a:latin typeface="华文隶书" panose="02010800040101010101" pitchFamily="2" charset="-122"/>
+                <a:ea typeface="华文隶书" panose="02010800040101010101" pitchFamily="2" charset="-122"/>
+              </a:rPr>
+              <a:t>Python</a:t>
+            </a:r>
+            <a:r>
+              <a:rPr lang="zh-CN" altLang="en-US" sz="4800" dirty="0">
+                <a:latin typeface="华文隶书" panose="02010800040101010101" pitchFamily="2" charset="-122"/>
+                <a:ea typeface="华文隶书" panose="02010800040101010101" pitchFamily="2" charset="-122"/>
+              </a:rPr>
+              <a:t>遇上</a:t>
+            </a:r>
+            <a:r>
+              <a:rPr lang="en-US" altLang="zh-CN" sz="4800" dirty="0">
+                <a:latin typeface="华文隶书" panose="02010800040101010101" pitchFamily="2" charset="-122"/>
+                <a:ea typeface="华文隶书" panose="02010800040101010101" pitchFamily="2" charset="-122"/>
+              </a:rPr>
+              <a:t>Office</a:t>
+            </a:r>
+            <a:br>
+              <a:rPr lang="en-US" altLang="zh-CN" sz="4800" dirty="0">
+                <a:latin typeface="华文隶书" panose="02010800040101010101" pitchFamily="2" charset="-122"/>
+                <a:ea typeface="华文隶书" panose="02010800040101010101" pitchFamily="2" charset="-122"/>
+              </a:rPr>
+            </a:br>
+            <a:br>
+              <a:rPr lang="en-US" altLang="zh-CN" sz="4800" dirty="0">
+                <a:latin typeface="华文隶书" panose="02010800040101010101" pitchFamily="2" charset="-122"/>
+                <a:ea typeface="华文隶书" panose="02010800040101010101" pitchFamily="2" charset="-122"/>
+              </a:rPr>
+            </a:br>
+            <a:r>
+              <a:rPr lang="en-US" altLang="zh-CN" sz="4800" dirty="0">
+                <a:latin typeface="华文隶书" panose="02010800040101010101" pitchFamily="2" charset="-122"/>
+                <a:ea typeface="华文隶书" panose="02010800040101010101" pitchFamily="2" charset="-122"/>
+              </a:rPr>
+              <a:t>(Python with Office)</a:t>
+            </a:r>
+            <a:endParaRPr lang="en-US" sz="4800" dirty="0">
+              <a:latin typeface="华文隶书" panose="02010800040101010101" pitchFamily="2" charset="-122"/>
+              <a:ea typeface="华文隶书" panose="02010800040101010101" pitchFamily="2" charset="-122"/>
+            </a:endParaRPr>
+          </a:p>
+        </p:txBody>
+      </p:sp>
+      <p:sp>
+        <p:nvSpPr>
+          <p:cNvPr id="3" name="Content Placeholder 2"/>
+          <p:cNvSpPr>
+            <a:spLocks noGrp="1"/>
+          </p:cNvSpPr>
+          <p:nvPr>
+            <p:ph type="subTitle" idx="1"/>
+          </p:nvPr>
+        </p:nvSpPr>
+        <p:spPr>
+          <a:xfrm>
+            <a:off x="549796" y="3403600"/>
+            <a:ext cx="5544617" cy="2185640"/>
+          </a:xfrm>
+        </p:spPr>
+        <p:txBody>
+          <a:bodyPr>
+            <a:normAutofit/>
+          </a:bodyPr>
+          <a:lstStyle/>
+          <a:p>
+            <a:r>
+              <a:rPr lang="en-US" sz="2800" dirty="0">
+                <a:latin typeface="ADLaM Display" panose="020F0502020204030204" pitchFamily="2" charset="0"/>
+                <a:ea typeface="ADLaM Display" panose="020F0502020204030204" pitchFamily="2" charset="0"/>
+                <a:cs typeface="ADLaM Display" panose="020F0502020204030204" pitchFamily="2" charset="0"/>
+              </a:rPr>
+              <a:t>Chapter 7 Work with Word</a:t>
+            </a:r>
+          </a:p>
+          <a:p>
+            <a:r>
+              <a:rPr lang="en-US" sz="2800" dirty="0">
+                <a:latin typeface="ADLaM Display" panose="020F0502020204030204" pitchFamily="2" charset="0"/>
+                <a:ea typeface="ADLaM Display" panose="020F0502020204030204" pitchFamily="2" charset="0"/>
+                <a:cs typeface="ADLaM Display" panose="020F0502020204030204" pitchFamily="2" charset="0"/>
+              </a:rPr>
+              <a:t>7.1&amp;7.2 Open and Save docx</a:t>
+            </a:r>
+          </a:p>
+          <a:p>
+            <a:r>
+              <a:rPr lang="zh-CN" altLang="en-US" sz="2800" dirty="0">
+                <a:latin typeface="ADLaM Display" panose="020F0502020204030204" pitchFamily="2" charset="0"/>
+                <a:ea typeface="ADLaM Display" panose="020F0502020204030204" pitchFamily="2" charset="0"/>
+                <a:cs typeface="ADLaM Display" panose="020F0502020204030204" pitchFamily="2" charset="0"/>
+              </a:rPr>
+              <a:t>第七章 操作</a:t>
+            </a:r>
+            <a:r>
+              <a:rPr lang="en-US" altLang="zh-CN" sz="2800" dirty="0">
+                <a:latin typeface="ADLaM Display" panose="020F0502020204030204" pitchFamily="2" charset="0"/>
+                <a:ea typeface="ADLaM Display" panose="020F0502020204030204" pitchFamily="2" charset="0"/>
+                <a:cs typeface="ADLaM Display" panose="020F0502020204030204" pitchFamily="2" charset="0"/>
+              </a:rPr>
+              <a:t>Word</a:t>
+            </a:r>
+          </a:p>
+          <a:p>
+            <a:r>
+              <a:rPr lang="en-US" altLang="zh-CN" sz="2800" dirty="0">
+                <a:latin typeface="ADLaM Display" panose="020F0502020204030204" pitchFamily="2" charset="0"/>
+                <a:ea typeface="ADLaM Display" panose="020F0502020204030204" pitchFamily="2" charset="0"/>
+                <a:cs typeface="ADLaM Display" panose="020F0502020204030204" pitchFamily="2" charset="0"/>
+              </a:rPr>
+              <a:t>7.1&amp;7.2 </a:t>
+            </a:r>
+            <a:r>
+              <a:rPr lang="zh-CN" altLang="en-US" sz="2800" dirty="0">
+                <a:latin typeface="ADLaM Display" panose="020F0502020204030204" pitchFamily="2" charset="0"/>
+                <a:ea typeface="ADLaM Display" panose="020F0502020204030204" pitchFamily="2" charset="0"/>
+                <a:cs typeface="ADLaM Display" panose="020F0502020204030204" pitchFamily="2" charset="0"/>
+              </a:rPr>
+              <a:t>打开和保存</a:t>
+            </a:r>
+            <a:r>
+              <a:rPr lang="en-US" altLang="zh-CN" sz="2800" dirty="0">
+                <a:latin typeface="ADLaM Display" panose="020F0502020204030204" pitchFamily="2" charset="0"/>
+                <a:ea typeface="ADLaM Display" panose="020F0502020204030204" pitchFamily="2" charset="0"/>
+                <a:cs typeface="ADLaM Display" panose="020F0502020204030204" pitchFamily="2" charset="0"/>
+              </a:rPr>
+              <a:t>docx</a:t>
+            </a:r>
+            <a:r>
+              <a:rPr lang="zh-CN" altLang="en-US" sz="2800">
+                <a:latin typeface="ADLaM Display" panose="020F0502020204030204" pitchFamily="2" charset="0"/>
+                <a:ea typeface="ADLaM Display" panose="020F0502020204030204" pitchFamily="2" charset="0"/>
+                <a:cs typeface="ADLaM Display" panose="020F0502020204030204" pitchFamily="2" charset="0"/>
+              </a:rPr>
+              <a:t>文件</a:t>
+            </a:r>
+            <a:endParaRPr lang="en-US" altLang="zh-CN" sz="2800" dirty="0">
+              <a:latin typeface="ADLaM Display" panose="020F0502020204030204" pitchFamily="2" charset="0"/>
+              <a:ea typeface="ADLaM Display" panose="020F0502020204030204" pitchFamily="2" charset="0"/>
+              <a:cs typeface="ADLaM Display" panose="020F0502020204030204" pitchFamily="2" charset="0"/>
+            </a:endParaRPr>
+          </a:p>
+        </p:txBody>
+      </p:sp>
+      <p:pic>
+        <p:nvPicPr>
+          <p:cNvPr id="5" name="Picture 4">
+            <a:extLst>
+              <a:ext uri="{FF2B5EF4-FFF2-40B4-BE49-F238E27FC236}">
+                <a16:creationId xmlns:a16="http://schemas.microsoft.com/office/drawing/2014/main" id="{4AD8B85C-B359-195F-B78C-C879AB7840B1}"/>
+              </a:ext>
+            </a:extLst>
+          </p:cNvPr>
+          <p:cNvPicPr>
+            <a:picLocks noChangeAspect="1"/>
+          </p:cNvPicPr>
+          <p:nvPr/>
+        </p:nvPicPr>
+        <p:blipFill>
+          <a:blip r:embed="rId4"/>
+          <a:stretch>
+            <a:fillRect/>
+          </a:stretch>
+        </p:blipFill>
+        <p:spPr>
+          <a:xfrm>
+            <a:off x="57601" y="1189856"/>
+            <a:ext cx="1068259" cy="1556792"/>
+          </a:xfrm>
+          <a:prstGeom prst="rect">
+            <a:avLst/>
+          </a:prstGeom>
+          <a:ln>
+            <a:noFill/>
+          </a:ln>
+          <a:effectLst>
+            <a:outerShdw blurRad="292100" dist="139700" dir="2700000" algn="tl" rotWithShape="0">
+              <a:srgbClr val="333333">
+                <a:alpha val="65000"/>
+              </a:srgbClr>
+            </a:outerShdw>
+          </a:effectLst>
+        </p:spPr>
+      </p:pic>
+      <p:sp>
+        <p:nvSpPr>
+          <p:cNvPr id="2" name="TextBox 1">
+            <a:extLst>
+              <a:ext uri="{FF2B5EF4-FFF2-40B4-BE49-F238E27FC236}">
+                <a16:creationId xmlns:a16="http://schemas.microsoft.com/office/drawing/2014/main" id="{CAB2C784-DE74-68FC-7A84-3E6C5D164315}"/>
+              </a:ext>
+            </a:extLst>
+          </p:cNvPr>
+          <p:cNvSpPr txBox="1"/>
+          <p:nvPr/>
+        </p:nvSpPr>
+        <p:spPr>
+          <a:xfrm>
+            <a:off x="405780" y="5722972"/>
+            <a:ext cx="7951216" cy="523220"/>
+          </a:xfrm>
+          <a:prstGeom prst="rect">
+            <a:avLst/>
+          </a:prstGeom>
+          <a:solidFill>
+            <a:schemeClr val="bg1">
+              <a:lumMod val="95000"/>
+            </a:schemeClr>
+          </a:solidFill>
+          <a:ln>
+            <a:solidFill>
+              <a:schemeClr val="bg2"/>
+            </a:solidFill>
+          </a:ln>
+        </p:spPr>
+        <p:txBody>
+          <a:bodyPr wrap="none" rtlCol="0" anchor="ctr" anchorCtr="1">
+            <a:spAutoFit/>
+          </a:bodyPr>
+          <a:lstStyle/>
+          <a:p>
+            <a:r>
+              <a:rPr lang="en-US" sz="2800" dirty="0">
+                <a:hlinkClick r:id="rId5"/>
+              </a:rPr>
+              <a:t>https://github.com/yasenstar/python_with_office</a:t>
+            </a:r>
+            <a:endParaRPr lang="en-US" sz="2800" dirty="0"/>
+          </a:p>
+        </p:txBody>
+      </p:sp>
+      <p:sp>
+        <p:nvSpPr>
+          <p:cNvPr id="9" name="TextBox 8">
+            <a:extLst>
+              <a:ext uri="{FF2B5EF4-FFF2-40B4-BE49-F238E27FC236}">
+                <a16:creationId xmlns:a16="http://schemas.microsoft.com/office/drawing/2014/main" id="{C25C84F5-3AA3-A068-7E2F-9123CA5A7D16}"/>
+              </a:ext>
+            </a:extLst>
+          </p:cNvPr>
+          <p:cNvSpPr txBox="1"/>
+          <p:nvPr/>
+        </p:nvSpPr>
+        <p:spPr>
+          <a:xfrm>
+            <a:off x="405780" y="6246192"/>
+            <a:ext cx="7951216" cy="523220"/>
+          </a:xfrm>
+          <a:prstGeom prst="rect">
+            <a:avLst/>
+          </a:prstGeom>
+          <a:solidFill>
+            <a:schemeClr val="bg1">
+              <a:lumMod val="95000"/>
+            </a:schemeClr>
+          </a:solidFill>
+          <a:ln>
+            <a:solidFill>
+              <a:schemeClr val="bg2"/>
+            </a:solidFill>
+          </a:ln>
+        </p:spPr>
+        <p:txBody>
+          <a:bodyPr wrap="square" rtlCol="0" anchor="ctr" anchorCtr="1">
+            <a:spAutoFit/>
+          </a:bodyPr>
+          <a:lstStyle/>
+          <a:p>
+            <a:r>
+              <a:rPr lang="en-US" sz="2800" dirty="0">
+                <a:hlinkClick r:id="rId6"/>
+              </a:rPr>
+              <a:t>https://gitee.com/yasenstar/python_with_office</a:t>
+            </a:r>
+            <a:endParaRPr lang="en-US" sz="2800" dirty="0"/>
+          </a:p>
+        </p:txBody>
+      </p:sp>
+      <p:sp>
+        <p:nvSpPr>
+          <p:cNvPr id="13" name="Rectangle 12">
+            <a:extLst>
+              <a:ext uri="{FF2B5EF4-FFF2-40B4-BE49-F238E27FC236}">
+                <a16:creationId xmlns:a16="http://schemas.microsoft.com/office/drawing/2014/main" id="{6F9C3126-4EC2-77CA-B408-E23CE9AE8E9D}"/>
+              </a:ext>
+            </a:extLst>
+          </p:cNvPr>
+          <p:cNvSpPr/>
+          <p:nvPr/>
+        </p:nvSpPr>
+        <p:spPr>
+          <a:xfrm>
+            <a:off x="7534572" y="1430660"/>
+            <a:ext cx="4464496" cy="1494284"/>
+          </a:xfrm>
+          <a:prstGeom prst="rect">
+            <a:avLst/>
+          </a:prstGeom>
+          <a:noFill/>
+          <a:ln w="38100">
+            <a:solidFill>
+              <a:srgbClr val="FF0000"/>
+            </a:solidFill>
+          </a:ln>
+        </p:spPr>
+        <p:style>
+          <a:lnRef idx="2">
+            <a:schemeClr val="accent3"/>
+          </a:lnRef>
+          <a:fillRef idx="1">
+            <a:schemeClr val="lt1"/>
+          </a:fillRef>
+          <a:effectRef idx="0">
+            <a:schemeClr val="accent3"/>
+          </a:effectRef>
+          <a:fontRef idx="minor">
+            <a:schemeClr val="dk1"/>
+          </a:fontRef>
+        </p:style>
+        <p:txBody>
+          <a:bodyPr rtlCol="0" anchor="ctr"/>
+          <a:lstStyle/>
+          <a:p>
+            <a:pPr algn="ctr"/>
+            <a:endParaRPr lang="en-US" dirty="0"/>
+          </a:p>
+        </p:txBody>
+      </p:sp>
+    </p:spTree>
+    <p:extLst>
+      <p:ext uri="{BB962C8B-B14F-4D97-AF65-F5344CB8AC3E}">
+        <p14:creationId xmlns:p14="http://schemas.microsoft.com/office/powerpoint/2010/main" val="2245452456"/>
       </p:ext>
     </p:extLst>
   </p:cSld>

</xml_diff>

<commit_message>
add 7-3 doc to docx converter
</commit_message>
<xml_diff>
--- a/Python-with-Office-Video_Covers.pptx
+++ b/Python-with-Office-Video_Covers.pptx
@@ -22142,13 +22142,13 @@
   <p:clrMapOvr>
     <a:masterClrMapping/>
   </p:clrMapOvr>
-  <mc:AlternateContent xmlns:mc="http://schemas.openxmlformats.org/markup-compatibility/2006">
-    <mc:Choice xmlns:p14="http://schemas.microsoft.com/office/powerpoint/2010/main" Requires="p14">
+  <mc:AlternateContent xmlns:mc="http://schemas.openxmlformats.org/markup-compatibility/2006" xmlns:p14="http://schemas.microsoft.com/office/powerpoint/2010/main">
+    <mc:Choice Requires="p14">
       <p:transition spd="med" p14:dur="700">
         <p:fade/>
       </p:transition>
     </mc:Choice>
-    <mc:Fallback>
+    <mc:Fallback xmlns="">
       <p:transition spd="med">
         <p:fade/>
       </p:transition>
@@ -22174,6 +22174,46 @@
           <a:chExt cx="0" cy="0"/>
         </a:xfrm>
       </p:grpSpPr>
+      <p:pic>
+        <p:nvPicPr>
+          <p:cNvPr id="7" name="Picture 6">
+            <a:extLst>
+              <a:ext uri="{FF2B5EF4-FFF2-40B4-BE49-F238E27FC236}">
+                <a16:creationId xmlns:a16="http://schemas.microsoft.com/office/drawing/2014/main" id="{65B1EF13-8A7F-B522-3A73-C1140116FD0C}"/>
+              </a:ext>
+            </a:extLst>
+          </p:cNvPr>
+          <p:cNvPicPr>
+            <a:picLocks noChangeAspect="1"/>
+          </p:cNvPicPr>
+          <p:nvPr/>
+        </p:nvPicPr>
+        <p:blipFill>
+          <a:blip r:embed="rId3"/>
+          <a:stretch>
+            <a:fillRect/>
+          </a:stretch>
+        </p:blipFill>
+        <p:spPr>
+          <a:xfrm>
+            <a:off x="6433380" y="888749"/>
+            <a:ext cx="4917616" cy="4807445"/>
+          </a:xfrm>
+          <a:prstGeom prst="rect">
+            <a:avLst/>
+          </a:prstGeom>
+          <a:ln>
+            <a:noFill/>
+          </a:ln>
+          <a:effectLst>
+            <a:outerShdw blurRad="292100" dist="139700" dir="2700000" algn="tl" rotWithShape="0">
+              <a:srgbClr val="333333">
+                <a:alpha val="65000"/>
+              </a:srgbClr>
+            </a:outerShdw>
+          </a:effectLst>
+        </p:spPr>
+      </p:pic>
       <p:sp>
         <p:nvSpPr>
           <p:cNvPr id="4" name="Title 3"/>
@@ -22284,21 +22324,24 @@
                 <a:ea typeface="ADLaM Display" panose="020F0502020204030204" pitchFamily="2" charset="0"/>
                 <a:cs typeface="ADLaM Display" panose="020F0502020204030204" pitchFamily="2" charset="0"/>
               </a:rPr>
-              <a:t>7.3 doc to docx </a:t>
-            </a:r>
-            <a:r>
-              <a:rPr lang="en-US" sz="2800" dirty="0" err="1">
-                <a:latin typeface="ADLaM Display" panose="020F0502020204030204" pitchFamily="2" charset="0"/>
-                <a:ea typeface="ADLaM Display" panose="020F0502020204030204" pitchFamily="2" charset="0"/>
-                <a:cs typeface="ADLaM Display" panose="020F0502020204030204" pitchFamily="2" charset="0"/>
-              </a:rPr>
-              <a:t>coverting</a:t>
-            </a:r>
-            <a:endParaRPr lang="en-US" sz="2800" dirty="0">
-              <a:latin typeface="ADLaM Display" panose="020F0502020204030204" pitchFamily="2" charset="0"/>
-              <a:ea typeface="ADLaM Display" panose="020F0502020204030204" pitchFamily="2" charset="0"/>
-              <a:cs typeface="ADLaM Display" panose="020F0502020204030204" pitchFamily="2" charset="0"/>
-            </a:endParaRPr>
+              <a:t>7.3 doc to docx co</a:t>
+            </a:r>
+            <a:r>
+              <a:rPr lang="en-US" altLang="zh-CN" sz="2800" dirty="0">
+                <a:latin typeface="ADLaM Display" panose="020F0502020204030204" pitchFamily="2" charset="0"/>
+                <a:ea typeface="ADLaM Display" panose="020F0502020204030204" pitchFamily="2" charset="0"/>
+                <a:cs typeface="ADLaM Display" panose="020F0502020204030204" pitchFamily="2" charset="0"/>
+              </a:rPr>
+              <a:t>n</a:t>
+            </a:r>
+            <a:r>
+              <a:rPr lang="en-US" sz="2800" dirty="0">
+                <a:latin typeface="ADLaM Display" panose="020F0502020204030204" pitchFamily="2" charset="0"/>
+                <a:ea typeface="ADLaM Display" panose="020F0502020204030204" pitchFamily="2" charset="0"/>
+                <a:cs typeface="ADLaM Display" panose="020F0502020204030204" pitchFamily="2" charset="0"/>
+              </a:rPr>
+              <a:t>verting</a:t>
+            </a:r>
           </a:p>
           <a:p>
             <a:r>
@@ -22361,7 +22404,7 @@
           <p:nvPr/>
         </p:nvPicPr>
         <p:blipFill>
-          <a:blip r:embed="rId3"/>
+          <a:blip r:embed="rId4"/>
           <a:stretch>
             <a:fillRect/>
           </a:stretch>
@@ -22425,7 +22468,7 @@
           <a:p>
             <a:r>
               <a:rPr lang="en-US" sz="2800" dirty="0">
-                <a:hlinkClick r:id="rId4"/>
+                <a:hlinkClick r:id="rId5"/>
               </a:rPr>
               <a:t>https://github.com/yasenstar/python_with_office</a:t>
             </a:r>
@@ -22472,7 +22515,7 @@
           <a:p>
             <a:r>
               <a:rPr lang="en-US" sz="2800" dirty="0">
-                <a:hlinkClick r:id="rId5"/>
+                <a:hlinkClick r:id="rId6"/>
               </a:rPr>
               <a:t>https://gitee.com/yasenstar/python_with_office</a:t>
             </a:r>
@@ -22494,8 +22537,8 @@
         </p:nvSpPr>
         <p:spPr>
           <a:xfrm>
-            <a:off x="7534572" y="1430660"/>
-            <a:ext cx="4464496" cy="1494284"/>
+            <a:off x="8542684" y="1772816"/>
+            <a:ext cx="2736304" cy="576064"/>
           </a:xfrm>
           <a:prstGeom prst="rect">
             <a:avLst/>
@@ -22540,13 +22583,13 @@
   <p:clrMapOvr>
     <a:masterClrMapping/>
   </p:clrMapOvr>
-  <mc:AlternateContent xmlns:mc="http://schemas.openxmlformats.org/markup-compatibility/2006">
-    <mc:Choice xmlns:p14="http://schemas.microsoft.com/office/powerpoint/2010/main" Requires="p14">
+  <mc:AlternateContent xmlns:mc="http://schemas.openxmlformats.org/markup-compatibility/2006" xmlns:p14="http://schemas.microsoft.com/office/powerpoint/2010/main">
+    <mc:Choice Requires="p14">
       <p:transition spd="med" p14:dur="700">
         <p:fade/>
       </p:transition>
     </mc:Choice>
-    <mc:Fallback>
+    <mc:Fallback xmlns="">
       <p:transition spd="med">
         <p:fade/>
       </p:transition>

</xml_diff>

<commit_message>
add 7-4 work with paragraph
</commit_message>
<xml_diff>
--- a/Python-with-Office-Video_Covers.pptx
+++ b/Python-with-Office-Video_Covers.pptx
@@ -5,10 +5,10 @@
     <p:sldMasterId id="2147483660" r:id="rId1"/>
   </p:sldMasterIdLst>
   <p:notesMasterIdLst>
-    <p:notesMasterId r:id="rId45"/>
+    <p:notesMasterId r:id="rId46"/>
   </p:notesMasterIdLst>
   <p:handoutMasterIdLst>
-    <p:handoutMasterId r:id="rId46"/>
+    <p:handoutMasterId r:id="rId47"/>
   </p:handoutMasterIdLst>
   <p:sldIdLst>
     <p:sldId id="257" r:id="rId2"/>
@@ -54,6 +54,7 @@
     <p:sldId id="297" r:id="rId42"/>
     <p:sldId id="298" r:id="rId43"/>
     <p:sldId id="299" r:id="rId44"/>
+    <p:sldId id="300" r:id="rId45"/>
   </p:sldIdLst>
   <p:sldSz cx="12188825" cy="6858000"/>
   <p:notesSz cx="6858000" cy="9144000"/>
@@ -3926,6 +3927,90 @@
     <p:extLst>
       <p:ext uri="{BB962C8B-B14F-4D97-AF65-F5344CB8AC3E}">
         <p14:creationId xmlns:p14="http://schemas.microsoft.com/office/powerpoint/2010/main" val="2492733409"/>
+      </p:ext>
+    </p:extLst>
+  </p:cSld>
+  <p:clrMapOvr>
+    <a:masterClrMapping/>
+  </p:clrMapOvr>
+</p:notes>
+</file>
+
+<file path=ppt/notesSlides/notesSlide44.xml><?xml version="1.0" encoding="utf-8"?>
+<p:notes xmlns:a="http://schemas.openxmlformats.org/drawingml/2006/main" xmlns:r="http://schemas.openxmlformats.org/officeDocument/2006/relationships" xmlns:p="http://schemas.openxmlformats.org/presentationml/2006/main">
+  <p:cSld>
+    <p:spTree>
+      <p:nvGrpSpPr>
+        <p:cNvPr id="1" name=""/>
+        <p:cNvGrpSpPr/>
+        <p:nvPr/>
+      </p:nvGrpSpPr>
+      <p:grpSpPr>
+        <a:xfrm>
+          <a:off x="0" y="0"/>
+          <a:ext cx="0" cy="0"/>
+          <a:chOff x="0" y="0"/>
+          <a:chExt cx="0" cy="0"/>
+        </a:xfrm>
+      </p:grpSpPr>
+      <p:sp>
+        <p:nvSpPr>
+          <p:cNvPr id="2" name="Slide Image Placeholder 1"/>
+          <p:cNvSpPr>
+            <a:spLocks noGrp="1" noRot="1" noChangeAspect="1"/>
+          </p:cNvSpPr>
+          <p:nvPr>
+            <p:ph type="sldImg"/>
+          </p:nvPr>
+        </p:nvSpPr>
+        <p:spPr/>
+      </p:sp>
+      <p:sp>
+        <p:nvSpPr>
+          <p:cNvPr id="3" name="Notes Placeholder 2"/>
+          <p:cNvSpPr>
+            <a:spLocks noGrp="1"/>
+          </p:cNvSpPr>
+          <p:nvPr>
+            <p:ph type="body" idx="1"/>
+          </p:nvPr>
+        </p:nvSpPr>
+        <p:spPr/>
+        <p:txBody>
+          <a:bodyPr/>
+          <a:lstStyle/>
+          <a:p>
+            <a:endParaRPr lang="en-US" dirty="0"/>
+          </a:p>
+        </p:txBody>
+      </p:sp>
+      <p:sp>
+        <p:nvSpPr>
+          <p:cNvPr id="4" name="Slide Number Placeholder 3"/>
+          <p:cNvSpPr>
+            <a:spLocks noGrp="1"/>
+          </p:cNvSpPr>
+          <p:nvPr>
+            <p:ph type="sldNum" sz="quarter" idx="10"/>
+          </p:nvPr>
+        </p:nvSpPr>
+        <p:spPr/>
+        <p:txBody>
+          <a:bodyPr/>
+          <a:lstStyle/>
+          <a:p>
+            <a:fld id="{6BB98AFB-CB0D-4DFE-87B9-B4B0D0DE73CD}" type="slidenum">
+              <a:rPr lang="en-US" smtClean="0"/>
+              <a:t>44</a:t>
+            </a:fld>
+            <a:endParaRPr lang="en-US" dirty="0"/>
+          </a:p>
+        </p:txBody>
+      </p:sp>
+    </p:spTree>
+    <p:extLst>
+      <p:ext uri="{BB962C8B-B14F-4D97-AF65-F5344CB8AC3E}">
+        <p14:creationId xmlns:p14="http://schemas.microsoft.com/office/powerpoint/2010/main" val="1899180386"/>
       </p:ext>
     </p:extLst>
   </p:cSld>
@@ -22577,6 +22662,428 @@
     <p:extLst>
       <p:ext uri="{BB962C8B-B14F-4D97-AF65-F5344CB8AC3E}">
         <p14:creationId xmlns:p14="http://schemas.microsoft.com/office/powerpoint/2010/main" val="2315332430"/>
+      </p:ext>
+    </p:extLst>
+  </p:cSld>
+  <p:clrMapOvr>
+    <a:masterClrMapping/>
+  </p:clrMapOvr>
+  <mc:AlternateContent xmlns:mc="http://schemas.openxmlformats.org/markup-compatibility/2006" xmlns:p14="http://schemas.microsoft.com/office/powerpoint/2010/main">
+    <mc:Choice Requires="p14">
+      <p:transition spd="med" p14:dur="700">
+        <p:fade/>
+      </p:transition>
+    </mc:Choice>
+    <mc:Fallback xmlns="">
+      <p:transition spd="med">
+        <p:fade/>
+      </p:transition>
+    </mc:Fallback>
+  </mc:AlternateContent>
+</p:sld>
+</file>
+
+<file path=ppt/slides/slide44.xml><?xml version="1.0" encoding="utf-8"?>
+<p:sld xmlns:a="http://schemas.openxmlformats.org/drawingml/2006/main" xmlns:r="http://schemas.openxmlformats.org/officeDocument/2006/relationships" xmlns:p="http://schemas.openxmlformats.org/presentationml/2006/main">
+  <p:cSld>
+    <p:spTree>
+      <p:nvGrpSpPr>
+        <p:cNvPr id="1" name=""/>
+        <p:cNvGrpSpPr/>
+        <p:nvPr/>
+      </p:nvGrpSpPr>
+      <p:grpSpPr>
+        <a:xfrm>
+          <a:off x="0" y="0"/>
+          <a:ext cx="0" cy="0"/>
+          <a:chOff x="0" y="0"/>
+          <a:chExt cx="0" cy="0"/>
+        </a:xfrm>
+      </p:grpSpPr>
+      <p:sp>
+        <p:nvSpPr>
+          <p:cNvPr id="4" name="Title 3"/>
+          <p:cNvSpPr>
+            <a:spLocks noGrp="1"/>
+          </p:cNvSpPr>
+          <p:nvPr>
+            <p:ph type="ctrTitle"/>
+          </p:nvPr>
+        </p:nvSpPr>
+        <p:spPr/>
+        <p:txBody>
+          <a:bodyPr>
+            <a:normAutofit/>
+          </a:bodyPr>
+          <a:lstStyle/>
+          <a:p>
+            <a:pPr algn="ctr"/>
+            <a:r>
+              <a:rPr lang="zh-CN" altLang="en-US" sz="4800" dirty="0">
+                <a:latin typeface="华文隶书" panose="02010800040101010101" pitchFamily="2" charset="-122"/>
+                <a:ea typeface="华文隶书" panose="02010800040101010101" pitchFamily="2" charset="-122"/>
+              </a:rPr>
+              <a:t>让</a:t>
+            </a:r>
+            <a:r>
+              <a:rPr lang="en-US" altLang="zh-CN" sz="4800" dirty="0">
+                <a:latin typeface="华文隶书" panose="02010800040101010101" pitchFamily="2" charset="-122"/>
+                <a:ea typeface="华文隶书" panose="02010800040101010101" pitchFamily="2" charset="-122"/>
+              </a:rPr>
+              <a:t>Python</a:t>
+            </a:r>
+            <a:r>
+              <a:rPr lang="zh-CN" altLang="en-US" sz="4800" dirty="0">
+                <a:latin typeface="华文隶书" panose="02010800040101010101" pitchFamily="2" charset="-122"/>
+                <a:ea typeface="华文隶书" panose="02010800040101010101" pitchFamily="2" charset="-122"/>
+              </a:rPr>
+              <a:t>遇上</a:t>
+            </a:r>
+            <a:r>
+              <a:rPr lang="en-US" altLang="zh-CN" sz="4800" dirty="0">
+                <a:latin typeface="华文隶书" panose="02010800040101010101" pitchFamily="2" charset="-122"/>
+                <a:ea typeface="华文隶书" panose="02010800040101010101" pitchFamily="2" charset="-122"/>
+              </a:rPr>
+              <a:t>Office</a:t>
+            </a:r>
+            <a:br>
+              <a:rPr lang="en-US" altLang="zh-CN" sz="4800" dirty="0">
+                <a:latin typeface="华文隶书" panose="02010800040101010101" pitchFamily="2" charset="-122"/>
+                <a:ea typeface="华文隶书" panose="02010800040101010101" pitchFamily="2" charset="-122"/>
+              </a:rPr>
+            </a:br>
+            <a:br>
+              <a:rPr lang="en-US" altLang="zh-CN" sz="4800" dirty="0">
+                <a:latin typeface="华文隶书" panose="02010800040101010101" pitchFamily="2" charset="-122"/>
+                <a:ea typeface="华文隶书" panose="02010800040101010101" pitchFamily="2" charset="-122"/>
+              </a:rPr>
+            </a:br>
+            <a:r>
+              <a:rPr lang="en-US" altLang="zh-CN" sz="4800" dirty="0">
+                <a:latin typeface="华文隶书" panose="02010800040101010101" pitchFamily="2" charset="-122"/>
+                <a:ea typeface="华文隶书" panose="02010800040101010101" pitchFamily="2" charset="-122"/>
+              </a:rPr>
+              <a:t>(Python with Office)</a:t>
+            </a:r>
+            <a:endParaRPr lang="en-US" sz="4800" dirty="0">
+              <a:latin typeface="华文隶书" panose="02010800040101010101" pitchFamily="2" charset="-122"/>
+              <a:ea typeface="华文隶书" panose="02010800040101010101" pitchFamily="2" charset="-122"/>
+            </a:endParaRPr>
+          </a:p>
+        </p:txBody>
+      </p:sp>
+      <p:sp>
+        <p:nvSpPr>
+          <p:cNvPr id="3" name="Content Placeholder 2"/>
+          <p:cNvSpPr>
+            <a:spLocks noGrp="1"/>
+          </p:cNvSpPr>
+          <p:nvPr>
+            <p:ph type="subTitle" idx="1"/>
+          </p:nvPr>
+        </p:nvSpPr>
+        <p:spPr>
+          <a:xfrm>
+            <a:off x="549796" y="3403600"/>
+            <a:ext cx="5544617" cy="2185640"/>
+          </a:xfrm>
+        </p:spPr>
+        <p:txBody>
+          <a:bodyPr>
+            <a:normAutofit/>
+          </a:bodyPr>
+          <a:lstStyle/>
+          <a:p>
+            <a:r>
+              <a:rPr lang="en-US" sz="2800" dirty="0">
+                <a:latin typeface="ADLaM Display" panose="020F0502020204030204" pitchFamily="2" charset="0"/>
+                <a:ea typeface="ADLaM Display" panose="020F0502020204030204" pitchFamily="2" charset="0"/>
+                <a:cs typeface="ADLaM Display" panose="020F0502020204030204" pitchFamily="2" charset="0"/>
+              </a:rPr>
+              <a:t>Chapter 7 Work with Word</a:t>
+            </a:r>
+          </a:p>
+          <a:p>
+            <a:r>
+              <a:rPr lang="en-US" sz="2800" dirty="0">
+                <a:latin typeface="ADLaM Display" panose="020F0502020204030204" pitchFamily="2" charset="0"/>
+                <a:ea typeface="ADLaM Display" panose="020F0502020204030204" pitchFamily="2" charset="0"/>
+                <a:cs typeface="ADLaM Display" panose="020F0502020204030204" pitchFamily="2" charset="0"/>
+              </a:rPr>
+              <a:t>7.4 work with paragraph</a:t>
+            </a:r>
+          </a:p>
+          <a:p>
+            <a:r>
+              <a:rPr lang="zh-CN" altLang="en-US" sz="2800" dirty="0">
+                <a:latin typeface="ADLaM Display" panose="020F0502020204030204" pitchFamily="2" charset="0"/>
+                <a:ea typeface="ADLaM Display" panose="020F0502020204030204" pitchFamily="2" charset="0"/>
+                <a:cs typeface="ADLaM Display" panose="020F0502020204030204" pitchFamily="2" charset="0"/>
+              </a:rPr>
+              <a:t>第七章 操作</a:t>
+            </a:r>
+            <a:r>
+              <a:rPr lang="en-US" altLang="zh-CN" sz="2800" dirty="0">
+                <a:latin typeface="ADLaM Display" panose="020F0502020204030204" pitchFamily="2" charset="0"/>
+                <a:ea typeface="ADLaM Display" panose="020F0502020204030204" pitchFamily="2" charset="0"/>
+                <a:cs typeface="ADLaM Display" panose="020F0502020204030204" pitchFamily="2" charset="0"/>
+              </a:rPr>
+              <a:t>Word</a:t>
+            </a:r>
+          </a:p>
+          <a:p>
+            <a:r>
+              <a:rPr lang="en-US" altLang="zh-CN" sz="2800" dirty="0">
+                <a:latin typeface="ADLaM Display" panose="020F0502020204030204" pitchFamily="2" charset="0"/>
+                <a:ea typeface="ADLaM Display" panose="020F0502020204030204" pitchFamily="2" charset="0"/>
+                <a:cs typeface="ADLaM Display" panose="020F0502020204030204" pitchFamily="2" charset="0"/>
+              </a:rPr>
+              <a:t>7.4 </a:t>
+            </a:r>
+            <a:r>
+              <a:rPr lang="zh-CN" altLang="en-US" sz="2800" dirty="0">
+                <a:latin typeface="ADLaM Display" panose="020F0502020204030204" pitchFamily="2" charset="0"/>
+                <a:ea typeface="ADLaM Display" panose="020F0502020204030204" pitchFamily="2" charset="0"/>
+                <a:cs typeface="ADLaM Display" panose="020F0502020204030204" pitchFamily="2" charset="0"/>
+              </a:rPr>
+              <a:t>段落操作</a:t>
+            </a:r>
+            <a:endParaRPr lang="en-US" altLang="zh-CN" sz="2800" dirty="0">
+              <a:latin typeface="ADLaM Display" panose="020F0502020204030204" pitchFamily="2" charset="0"/>
+              <a:ea typeface="ADLaM Display" panose="020F0502020204030204" pitchFamily="2" charset="0"/>
+              <a:cs typeface="ADLaM Display" panose="020F0502020204030204" pitchFamily="2" charset="0"/>
+            </a:endParaRPr>
+          </a:p>
+        </p:txBody>
+      </p:sp>
+      <p:pic>
+        <p:nvPicPr>
+          <p:cNvPr id="5" name="Picture 4">
+            <a:extLst>
+              <a:ext uri="{FF2B5EF4-FFF2-40B4-BE49-F238E27FC236}">
+                <a16:creationId xmlns:a16="http://schemas.microsoft.com/office/drawing/2014/main" id="{4AD8B85C-B359-195F-B78C-C879AB7840B1}"/>
+              </a:ext>
+            </a:extLst>
+          </p:cNvPr>
+          <p:cNvPicPr>
+            <a:picLocks noChangeAspect="1"/>
+          </p:cNvPicPr>
+          <p:nvPr/>
+        </p:nvPicPr>
+        <p:blipFill>
+          <a:blip r:embed="rId3"/>
+          <a:stretch>
+            <a:fillRect/>
+          </a:stretch>
+        </p:blipFill>
+        <p:spPr>
+          <a:xfrm>
+            <a:off x="57601" y="1189856"/>
+            <a:ext cx="1068259" cy="1556792"/>
+          </a:xfrm>
+          <a:prstGeom prst="rect">
+            <a:avLst/>
+          </a:prstGeom>
+          <a:ln>
+            <a:noFill/>
+          </a:ln>
+          <a:effectLst>
+            <a:outerShdw blurRad="292100" dist="139700" dir="2700000" algn="tl" rotWithShape="0">
+              <a:srgbClr val="333333">
+                <a:alpha val="65000"/>
+              </a:srgbClr>
+            </a:outerShdw>
+          </a:effectLst>
+        </p:spPr>
+      </p:pic>
+      <p:sp>
+        <p:nvSpPr>
+          <p:cNvPr id="2" name="TextBox 1">
+            <a:extLst>
+              <a:ext uri="{FF2B5EF4-FFF2-40B4-BE49-F238E27FC236}">
+                <a16:creationId xmlns:a16="http://schemas.microsoft.com/office/drawing/2014/main" id="{CAB2C784-DE74-68FC-7A84-3E6C5D164315}"/>
+              </a:ext>
+            </a:extLst>
+          </p:cNvPr>
+          <p:cNvSpPr txBox="1"/>
+          <p:nvPr/>
+        </p:nvSpPr>
+        <p:spPr>
+          <a:xfrm>
+            <a:off x="405780" y="5722972"/>
+            <a:ext cx="7951216" cy="523220"/>
+          </a:xfrm>
+          <a:prstGeom prst="rect">
+            <a:avLst/>
+          </a:prstGeom>
+          <a:solidFill>
+            <a:schemeClr val="bg1">
+              <a:lumMod val="95000"/>
+            </a:schemeClr>
+          </a:solidFill>
+          <a:ln>
+            <a:solidFill>
+              <a:schemeClr val="bg2"/>
+            </a:solidFill>
+          </a:ln>
+        </p:spPr>
+        <p:txBody>
+          <a:bodyPr wrap="none" rtlCol="0" anchor="ctr" anchorCtr="1">
+            <a:spAutoFit/>
+          </a:bodyPr>
+          <a:lstStyle/>
+          <a:p>
+            <a:r>
+              <a:rPr lang="en-US" sz="2800" dirty="0">
+                <a:hlinkClick r:id="rId4"/>
+              </a:rPr>
+              <a:t>https://github.com/yasenstar/python_with_office</a:t>
+            </a:r>
+            <a:endParaRPr lang="en-US" sz="2800" dirty="0"/>
+          </a:p>
+        </p:txBody>
+      </p:sp>
+      <p:sp>
+        <p:nvSpPr>
+          <p:cNvPr id="9" name="TextBox 8">
+            <a:extLst>
+              <a:ext uri="{FF2B5EF4-FFF2-40B4-BE49-F238E27FC236}">
+                <a16:creationId xmlns:a16="http://schemas.microsoft.com/office/drawing/2014/main" id="{C25C84F5-3AA3-A068-7E2F-9123CA5A7D16}"/>
+              </a:ext>
+            </a:extLst>
+          </p:cNvPr>
+          <p:cNvSpPr txBox="1"/>
+          <p:nvPr/>
+        </p:nvSpPr>
+        <p:spPr>
+          <a:xfrm>
+            <a:off x="405780" y="6246192"/>
+            <a:ext cx="7951216" cy="523220"/>
+          </a:xfrm>
+          <a:prstGeom prst="rect">
+            <a:avLst/>
+          </a:prstGeom>
+          <a:solidFill>
+            <a:schemeClr val="bg1">
+              <a:lumMod val="95000"/>
+            </a:schemeClr>
+          </a:solidFill>
+          <a:ln>
+            <a:solidFill>
+              <a:schemeClr val="bg2"/>
+            </a:solidFill>
+          </a:ln>
+        </p:spPr>
+        <p:txBody>
+          <a:bodyPr wrap="square" rtlCol="0" anchor="ctr" anchorCtr="1">
+            <a:spAutoFit/>
+          </a:bodyPr>
+          <a:lstStyle/>
+          <a:p>
+            <a:r>
+              <a:rPr lang="en-US" sz="2800" dirty="0">
+                <a:hlinkClick r:id="rId5"/>
+              </a:rPr>
+              <a:t>https://gitee.com/yasenstar/python_with_office</a:t>
+            </a:r>
+            <a:endParaRPr lang="en-US" sz="2800" dirty="0"/>
+          </a:p>
+        </p:txBody>
+      </p:sp>
+      <p:pic>
+        <p:nvPicPr>
+          <p:cNvPr id="8" name="Picture 7">
+            <a:extLst>
+              <a:ext uri="{FF2B5EF4-FFF2-40B4-BE49-F238E27FC236}">
+                <a16:creationId xmlns:a16="http://schemas.microsoft.com/office/drawing/2014/main" id="{078A61EF-AA26-4FA8-F762-F5A40ABB5838}"/>
+              </a:ext>
+            </a:extLst>
+          </p:cNvPr>
+          <p:cNvPicPr>
+            <a:picLocks noChangeAspect="1"/>
+          </p:cNvPicPr>
+          <p:nvPr/>
+        </p:nvPicPr>
+        <p:blipFill>
+          <a:blip r:embed="rId6"/>
+          <a:stretch>
+            <a:fillRect/>
+          </a:stretch>
+        </p:blipFill>
+        <p:spPr>
+          <a:xfrm>
+            <a:off x="6022404" y="1953125"/>
+            <a:ext cx="5784596" cy="3371081"/>
+          </a:xfrm>
+          <a:prstGeom prst="rect">
+            <a:avLst/>
+          </a:prstGeom>
+          <a:ln>
+            <a:noFill/>
+          </a:ln>
+          <a:effectLst>
+            <a:outerShdw blurRad="292100" dist="139700" dir="2700000" algn="tl" rotWithShape="0">
+              <a:srgbClr val="333333">
+                <a:alpha val="65000"/>
+              </a:srgbClr>
+            </a:outerShdw>
+          </a:effectLst>
+        </p:spPr>
+      </p:pic>
+      <p:sp>
+        <p:nvSpPr>
+          <p:cNvPr id="13" name="Rectangle 12">
+            <a:extLst>
+              <a:ext uri="{FF2B5EF4-FFF2-40B4-BE49-F238E27FC236}">
+                <a16:creationId xmlns:a16="http://schemas.microsoft.com/office/drawing/2014/main" id="{6F9C3126-4EC2-77CA-B408-E23CE9AE8E9D}"/>
+              </a:ext>
+            </a:extLst>
+          </p:cNvPr>
+          <p:cNvSpPr/>
+          <p:nvPr/>
+        </p:nvSpPr>
+        <p:spPr>
+          <a:xfrm>
+            <a:off x="7390555" y="2746648"/>
+            <a:ext cx="4248473" cy="898376"/>
+          </a:xfrm>
+          <a:prstGeom prst="rect">
+            <a:avLst/>
+          </a:prstGeom>
+          <a:noFill/>
+          <a:ln w="38100">
+            <a:solidFill>
+              <a:srgbClr val="FF0000"/>
+            </a:solidFill>
+          </a:ln>
+        </p:spPr>
+        <p:style>
+          <a:lnRef idx="2">
+            <a:schemeClr val="accent3"/>
+          </a:lnRef>
+          <a:fillRef idx="1">
+            <a:schemeClr val="lt1"/>
+          </a:fillRef>
+          <a:effectRef idx="0">
+            <a:schemeClr val="accent3"/>
+          </a:effectRef>
+          <a:fontRef idx="minor">
+            <a:schemeClr val="dk1"/>
+          </a:fontRef>
+        </p:style>
+        <p:txBody>
+          <a:bodyPr rtlCol="0" anchor="ctr"/>
+          <a:lstStyle/>
+          <a:p>
+            <a:pPr algn="ctr"/>
+            <a:endParaRPr lang="en-US" dirty="0"/>
+          </a:p>
+        </p:txBody>
+      </p:sp>
+    </p:spTree>
+    <p:extLst>
+      <p:ext uri="{BB962C8B-B14F-4D97-AF65-F5344CB8AC3E}">
+        <p14:creationId xmlns:p14="http://schemas.microsoft.com/office/powerpoint/2010/main" val="1674380767"/>
       </p:ext>
     </p:extLst>
   </p:cSld>

</xml_diff>

<commit_message>
add 7-1 and part of 7-5-2
</commit_message>
<xml_diff>
--- a/Python-with-Office-Video_Covers.pptx
+++ b/Python-with-Office-Video_Covers.pptx
@@ -5,10 +5,10 @@
     <p:sldMasterId id="2147483660" r:id="rId1"/>
   </p:sldMasterIdLst>
   <p:notesMasterIdLst>
-    <p:notesMasterId r:id="rId46"/>
+    <p:notesMasterId r:id="rId48"/>
   </p:notesMasterIdLst>
   <p:handoutMasterIdLst>
-    <p:handoutMasterId r:id="rId47"/>
+    <p:handoutMasterId r:id="rId49"/>
   </p:handoutMasterIdLst>
   <p:sldIdLst>
     <p:sldId id="257" r:id="rId2"/>
@@ -55,6 +55,8 @@
     <p:sldId id="298" r:id="rId43"/>
     <p:sldId id="299" r:id="rId44"/>
     <p:sldId id="300" r:id="rId45"/>
+    <p:sldId id="301" r:id="rId46"/>
+    <p:sldId id="302" r:id="rId47"/>
   </p:sldIdLst>
   <p:sldSz cx="12188825" cy="6858000"/>
   <p:notesSz cx="6858000" cy="9144000"/>
@@ -4011,6 +4013,174 @@
     <p:extLst>
       <p:ext uri="{BB962C8B-B14F-4D97-AF65-F5344CB8AC3E}">
         <p14:creationId xmlns:p14="http://schemas.microsoft.com/office/powerpoint/2010/main" val="1899180386"/>
+      </p:ext>
+    </p:extLst>
+  </p:cSld>
+  <p:clrMapOvr>
+    <a:masterClrMapping/>
+  </p:clrMapOvr>
+</p:notes>
+</file>
+
+<file path=ppt/notesSlides/notesSlide45.xml><?xml version="1.0" encoding="utf-8"?>
+<p:notes xmlns:a="http://schemas.openxmlformats.org/drawingml/2006/main" xmlns:r="http://schemas.openxmlformats.org/officeDocument/2006/relationships" xmlns:p="http://schemas.openxmlformats.org/presentationml/2006/main">
+  <p:cSld>
+    <p:spTree>
+      <p:nvGrpSpPr>
+        <p:cNvPr id="1" name=""/>
+        <p:cNvGrpSpPr/>
+        <p:nvPr/>
+      </p:nvGrpSpPr>
+      <p:grpSpPr>
+        <a:xfrm>
+          <a:off x="0" y="0"/>
+          <a:ext cx="0" cy="0"/>
+          <a:chOff x="0" y="0"/>
+          <a:chExt cx="0" cy="0"/>
+        </a:xfrm>
+      </p:grpSpPr>
+      <p:sp>
+        <p:nvSpPr>
+          <p:cNvPr id="2" name="Slide Image Placeholder 1"/>
+          <p:cNvSpPr>
+            <a:spLocks noGrp="1" noRot="1" noChangeAspect="1"/>
+          </p:cNvSpPr>
+          <p:nvPr>
+            <p:ph type="sldImg"/>
+          </p:nvPr>
+        </p:nvSpPr>
+        <p:spPr/>
+      </p:sp>
+      <p:sp>
+        <p:nvSpPr>
+          <p:cNvPr id="3" name="Notes Placeholder 2"/>
+          <p:cNvSpPr>
+            <a:spLocks noGrp="1"/>
+          </p:cNvSpPr>
+          <p:nvPr>
+            <p:ph type="body" idx="1"/>
+          </p:nvPr>
+        </p:nvSpPr>
+        <p:spPr/>
+        <p:txBody>
+          <a:bodyPr/>
+          <a:lstStyle/>
+          <a:p>
+            <a:endParaRPr lang="en-US" dirty="0"/>
+          </a:p>
+        </p:txBody>
+      </p:sp>
+      <p:sp>
+        <p:nvSpPr>
+          <p:cNvPr id="4" name="Slide Number Placeholder 3"/>
+          <p:cNvSpPr>
+            <a:spLocks noGrp="1"/>
+          </p:cNvSpPr>
+          <p:nvPr>
+            <p:ph type="sldNum" sz="quarter" idx="10"/>
+          </p:nvPr>
+        </p:nvSpPr>
+        <p:spPr/>
+        <p:txBody>
+          <a:bodyPr/>
+          <a:lstStyle/>
+          <a:p>
+            <a:fld id="{6BB98AFB-CB0D-4DFE-87B9-B4B0D0DE73CD}" type="slidenum">
+              <a:rPr lang="en-US" smtClean="0"/>
+              <a:t>45</a:t>
+            </a:fld>
+            <a:endParaRPr lang="en-US" dirty="0"/>
+          </a:p>
+        </p:txBody>
+      </p:sp>
+    </p:spTree>
+    <p:extLst>
+      <p:ext uri="{BB962C8B-B14F-4D97-AF65-F5344CB8AC3E}">
+        <p14:creationId xmlns:p14="http://schemas.microsoft.com/office/powerpoint/2010/main" val="570822050"/>
+      </p:ext>
+    </p:extLst>
+  </p:cSld>
+  <p:clrMapOvr>
+    <a:masterClrMapping/>
+  </p:clrMapOvr>
+</p:notes>
+</file>
+
+<file path=ppt/notesSlides/notesSlide46.xml><?xml version="1.0" encoding="utf-8"?>
+<p:notes xmlns:a="http://schemas.openxmlformats.org/drawingml/2006/main" xmlns:r="http://schemas.openxmlformats.org/officeDocument/2006/relationships" xmlns:p="http://schemas.openxmlformats.org/presentationml/2006/main">
+  <p:cSld>
+    <p:spTree>
+      <p:nvGrpSpPr>
+        <p:cNvPr id="1" name=""/>
+        <p:cNvGrpSpPr/>
+        <p:nvPr/>
+      </p:nvGrpSpPr>
+      <p:grpSpPr>
+        <a:xfrm>
+          <a:off x="0" y="0"/>
+          <a:ext cx="0" cy="0"/>
+          <a:chOff x="0" y="0"/>
+          <a:chExt cx="0" cy="0"/>
+        </a:xfrm>
+      </p:grpSpPr>
+      <p:sp>
+        <p:nvSpPr>
+          <p:cNvPr id="2" name="Slide Image Placeholder 1"/>
+          <p:cNvSpPr>
+            <a:spLocks noGrp="1" noRot="1" noChangeAspect="1"/>
+          </p:cNvSpPr>
+          <p:nvPr>
+            <p:ph type="sldImg"/>
+          </p:nvPr>
+        </p:nvSpPr>
+        <p:spPr/>
+      </p:sp>
+      <p:sp>
+        <p:nvSpPr>
+          <p:cNvPr id="3" name="Notes Placeholder 2"/>
+          <p:cNvSpPr>
+            <a:spLocks noGrp="1"/>
+          </p:cNvSpPr>
+          <p:nvPr>
+            <p:ph type="body" idx="1"/>
+          </p:nvPr>
+        </p:nvSpPr>
+        <p:spPr/>
+        <p:txBody>
+          <a:bodyPr/>
+          <a:lstStyle/>
+          <a:p>
+            <a:endParaRPr lang="en-US" dirty="0"/>
+          </a:p>
+        </p:txBody>
+      </p:sp>
+      <p:sp>
+        <p:nvSpPr>
+          <p:cNvPr id="4" name="Slide Number Placeholder 3"/>
+          <p:cNvSpPr>
+            <a:spLocks noGrp="1"/>
+          </p:cNvSpPr>
+          <p:nvPr>
+            <p:ph type="sldNum" sz="quarter" idx="10"/>
+          </p:nvPr>
+        </p:nvSpPr>
+        <p:spPr/>
+        <p:txBody>
+          <a:bodyPr/>
+          <a:lstStyle/>
+          <a:p>
+            <a:fld id="{6BB98AFB-CB0D-4DFE-87B9-B4B0D0DE73CD}" type="slidenum">
+              <a:rPr lang="en-US" smtClean="0"/>
+              <a:t>46</a:t>
+            </a:fld>
+            <a:endParaRPr lang="en-US" dirty="0"/>
+          </a:p>
+        </p:txBody>
+      </p:sp>
+    </p:spTree>
+    <p:extLst>
+      <p:ext uri="{BB962C8B-B14F-4D97-AF65-F5344CB8AC3E}">
+        <p14:creationId xmlns:p14="http://schemas.microsoft.com/office/powerpoint/2010/main" val="2312110685"/>
       </p:ext>
     </p:extLst>
   </p:cSld>
@@ -23084,6 +23254,840 @@
     <p:extLst>
       <p:ext uri="{BB962C8B-B14F-4D97-AF65-F5344CB8AC3E}">
         <p14:creationId xmlns:p14="http://schemas.microsoft.com/office/powerpoint/2010/main" val="1674380767"/>
+      </p:ext>
+    </p:extLst>
+  </p:cSld>
+  <p:clrMapOvr>
+    <a:masterClrMapping/>
+  </p:clrMapOvr>
+  <mc:AlternateContent xmlns:mc="http://schemas.openxmlformats.org/markup-compatibility/2006" xmlns:p14="http://schemas.microsoft.com/office/powerpoint/2010/main">
+    <mc:Choice Requires="p14">
+      <p:transition spd="med" p14:dur="700">
+        <p:fade/>
+      </p:transition>
+    </mc:Choice>
+    <mc:Fallback xmlns="">
+      <p:transition spd="med">
+        <p:fade/>
+      </p:transition>
+    </mc:Fallback>
+  </mc:AlternateContent>
+</p:sld>
+</file>
+
+<file path=ppt/slides/slide45.xml><?xml version="1.0" encoding="utf-8"?>
+<p:sld xmlns:a="http://schemas.openxmlformats.org/drawingml/2006/main" xmlns:r="http://schemas.openxmlformats.org/officeDocument/2006/relationships" xmlns:p="http://schemas.openxmlformats.org/presentationml/2006/main">
+  <p:cSld>
+    <p:spTree>
+      <p:nvGrpSpPr>
+        <p:cNvPr id="1" name=""/>
+        <p:cNvGrpSpPr/>
+        <p:nvPr/>
+      </p:nvGrpSpPr>
+      <p:grpSpPr>
+        <a:xfrm>
+          <a:off x="0" y="0"/>
+          <a:ext cx="0" cy="0"/>
+          <a:chOff x="0" y="0"/>
+          <a:chExt cx="0" cy="0"/>
+        </a:xfrm>
+      </p:grpSpPr>
+      <p:pic>
+        <p:nvPicPr>
+          <p:cNvPr id="7" name="Picture 6">
+            <a:extLst>
+              <a:ext uri="{FF2B5EF4-FFF2-40B4-BE49-F238E27FC236}">
+                <a16:creationId xmlns:a16="http://schemas.microsoft.com/office/drawing/2014/main" id="{6433B15D-61DB-475F-6147-8254831BF630}"/>
+              </a:ext>
+            </a:extLst>
+          </p:cNvPr>
+          <p:cNvPicPr>
+            <a:picLocks noChangeAspect="1"/>
+          </p:cNvPicPr>
+          <p:nvPr/>
+        </p:nvPicPr>
+        <p:blipFill>
+          <a:blip r:embed="rId3"/>
+          <a:stretch>
+            <a:fillRect/>
+          </a:stretch>
+        </p:blipFill>
+        <p:spPr>
+          <a:xfrm>
+            <a:off x="6094412" y="1229598"/>
+            <a:ext cx="5780896" cy="4359642"/>
+          </a:xfrm>
+          <a:prstGeom prst="rect">
+            <a:avLst/>
+          </a:prstGeom>
+          <a:ln>
+            <a:noFill/>
+          </a:ln>
+          <a:effectLst>
+            <a:outerShdw blurRad="292100" dist="139700" dir="2700000" algn="tl" rotWithShape="0">
+              <a:srgbClr val="333333">
+                <a:alpha val="65000"/>
+              </a:srgbClr>
+            </a:outerShdw>
+          </a:effectLst>
+        </p:spPr>
+      </p:pic>
+      <p:sp>
+        <p:nvSpPr>
+          <p:cNvPr id="4" name="Title 3"/>
+          <p:cNvSpPr>
+            <a:spLocks noGrp="1"/>
+          </p:cNvSpPr>
+          <p:nvPr>
+            <p:ph type="ctrTitle"/>
+          </p:nvPr>
+        </p:nvSpPr>
+        <p:spPr/>
+        <p:txBody>
+          <a:bodyPr>
+            <a:normAutofit/>
+          </a:bodyPr>
+          <a:lstStyle/>
+          <a:p>
+            <a:pPr algn="ctr"/>
+            <a:r>
+              <a:rPr lang="zh-CN" altLang="en-US" sz="4800" dirty="0">
+                <a:latin typeface="华文隶书" panose="02010800040101010101" pitchFamily="2" charset="-122"/>
+                <a:ea typeface="华文隶书" panose="02010800040101010101" pitchFamily="2" charset="-122"/>
+              </a:rPr>
+              <a:t>让</a:t>
+            </a:r>
+            <a:r>
+              <a:rPr lang="en-US" altLang="zh-CN" sz="4800" dirty="0">
+                <a:latin typeface="华文隶书" panose="02010800040101010101" pitchFamily="2" charset="-122"/>
+                <a:ea typeface="华文隶书" panose="02010800040101010101" pitchFamily="2" charset="-122"/>
+              </a:rPr>
+              <a:t>Python</a:t>
+            </a:r>
+            <a:r>
+              <a:rPr lang="zh-CN" altLang="en-US" sz="4800" dirty="0">
+                <a:latin typeface="华文隶书" panose="02010800040101010101" pitchFamily="2" charset="-122"/>
+                <a:ea typeface="华文隶书" panose="02010800040101010101" pitchFamily="2" charset="-122"/>
+              </a:rPr>
+              <a:t>遇上</a:t>
+            </a:r>
+            <a:r>
+              <a:rPr lang="en-US" altLang="zh-CN" sz="4800" dirty="0">
+                <a:latin typeface="华文隶书" panose="02010800040101010101" pitchFamily="2" charset="-122"/>
+                <a:ea typeface="华文隶书" panose="02010800040101010101" pitchFamily="2" charset="-122"/>
+              </a:rPr>
+              <a:t>Office</a:t>
+            </a:r>
+            <a:br>
+              <a:rPr lang="en-US" altLang="zh-CN" sz="4800" dirty="0">
+                <a:latin typeface="华文隶书" panose="02010800040101010101" pitchFamily="2" charset="-122"/>
+                <a:ea typeface="华文隶书" panose="02010800040101010101" pitchFamily="2" charset="-122"/>
+              </a:rPr>
+            </a:br>
+            <a:br>
+              <a:rPr lang="en-US" altLang="zh-CN" sz="4800" dirty="0">
+                <a:latin typeface="华文隶书" panose="02010800040101010101" pitchFamily="2" charset="-122"/>
+                <a:ea typeface="华文隶书" panose="02010800040101010101" pitchFamily="2" charset="-122"/>
+              </a:rPr>
+            </a:br>
+            <a:r>
+              <a:rPr lang="en-US" altLang="zh-CN" sz="4800" dirty="0">
+                <a:latin typeface="华文隶书" panose="02010800040101010101" pitchFamily="2" charset="-122"/>
+                <a:ea typeface="华文隶书" panose="02010800040101010101" pitchFamily="2" charset="-122"/>
+              </a:rPr>
+              <a:t>(Python with Office)</a:t>
+            </a:r>
+            <a:endParaRPr lang="en-US" sz="4800" dirty="0">
+              <a:latin typeface="华文隶书" panose="02010800040101010101" pitchFamily="2" charset="-122"/>
+              <a:ea typeface="华文隶书" panose="02010800040101010101" pitchFamily="2" charset="-122"/>
+            </a:endParaRPr>
+          </a:p>
+        </p:txBody>
+      </p:sp>
+      <p:sp>
+        <p:nvSpPr>
+          <p:cNvPr id="3" name="Content Placeholder 2"/>
+          <p:cNvSpPr>
+            <a:spLocks noGrp="1"/>
+          </p:cNvSpPr>
+          <p:nvPr>
+            <p:ph type="subTitle" idx="1"/>
+          </p:nvPr>
+        </p:nvSpPr>
+        <p:spPr>
+          <a:xfrm>
+            <a:off x="549796" y="3403600"/>
+            <a:ext cx="5544617" cy="2185640"/>
+          </a:xfrm>
+        </p:spPr>
+        <p:txBody>
+          <a:bodyPr>
+            <a:normAutofit/>
+          </a:bodyPr>
+          <a:lstStyle/>
+          <a:p>
+            <a:r>
+              <a:rPr lang="en-US" sz="2800" dirty="0">
+                <a:latin typeface="ADLaM Display" panose="020F0502020204030204" pitchFamily="2" charset="0"/>
+                <a:ea typeface="ADLaM Display" panose="020F0502020204030204" pitchFamily="2" charset="0"/>
+                <a:cs typeface="ADLaM Display" panose="020F0502020204030204" pitchFamily="2" charset="0"/>
+              </a:rPr>
+              <a:t>Chapter 7 Work with Word</a:t>
+            </a:r>
+          </a:p>
+          <a:p>
+            <a:r>
+              <a:rPr lang="en-US" sz="2800" dirty="0">
+                <a:latin typeface="ADLaM Display" panose="020F0502020204030204" pitchFamily="2" charset="0"/>
+                <a:ea typeface="ADLaM Display" panose="020F0502020204030204" pitchFamily="2" charset="0"/>
+                <a:cs typeface="ADLaM Display" panose="020F0502020204030204" pitchFamily="2" charset="0"/>
+              </a:rPr>
+              <a:t>7.5 paragraph styles</a:t>
+            </a:r>
+          </a:p>
+          <a:p>
+            <a:r>
+              <a:rPr lang="zh-CN" altLang="en-US" sz="2800" dirty="0">
+                <a:latin typeface="ADLaM Display" panose="020F0502020204030204" pitchFamily="2" charset="0"/>
+                <a:ea typeface="ADLaM Display" panose="020F0502020204030204" pitchFamily="2" charset="0"/>
+                <a:cs typeface="ADLaM Display" panose="020F0502020204030204" pitchFamily="2" charset="0"/>
+              </a:rPr>
+              <a:t>第七章 操作</a:t>
+            </a:r>
+            <a:r>
+              <a:rPr lang="en-US" altLang="zh-CN" sz="2800" dirty="0">
+                <a:latin typeface="ADLaM Display" panose="020F0502020204030204" pitchFamily="2" charset="0"/>
+                <a:ea typeface="ADLaM Display" panose="020F0502020204030204" pitchFamily="2" charset="0"/>
+                <a:cs typeface="ADLaM Display" panose="020F0502020204030204" pitchFamily="2" charset="0"/>
+              </a:rPr>
+              <a:t>Word</a:t>
+            </a:r>
+          </a:p>
+          <a:p>
+            <a:r>
+              <a:rPr lang="en-US" altLang="zh-CN" sz="2800" dirty="0">
+                <a:latin typeface="ADLaM Display" panose="020F0502020204030204" pitchFamily="2" charset="0"/>
+                <a:ea typeface="ADLaM Display" panose="020F0502020204030204" pitchFamily="2" charset="0"/>
+                <a:cs typeface="ADLaM Display" panose="020F0502020204030204" pitchFamily="2" charset="0"/>
+              </a:rPr>
+              <a:t>7.5 </a:t>
+            </a:r>
+            <a:r>
+              <a:rPr lang="zh-CN" altLang="en-US" sz="2800" dirty="0">
+                <a:latin typeface="ADLaM Display" panose="020F0502020204030204" pitchFamily="2" charset="0"/>
+                <a:ea typeface="ADLaM Display" panose="020F0502020204030204" pitchFamily="2" charset="0"/>
+                <a:cs typeface="ADLaM Display" panose="020F0502020204030204" pitchFamily="2" charset="0"/>
+              </a:rPr>
+              <a:t>段落样式</a:t>
+            </a:r>
+            <a:endParaRPr lang="en-US" altLang="zh-CN" sz="2800" dirty="0">
+              <a:latin typeface="ADLaM Display" panose="020F0502020204030204" pitchFamily="2" charset="0"/>
+              <a:ea typeface="ADLaM Display" panose="020F0502020204030204" pitchFamily="2" charset="0"/>
+              <a:cs typeface="ADLaM Display" panose="020F0502020204030204" pitchFamily="2" charset="0"/>
+            </a:endParaRPr>
+          </a:p>
+        </p:txBody>
+      </p:sp>
+      <p:pic>
+        <p:nvPicPr>
+          <p:cNvPr id="5" name="Picture 4">
+            <a:extLst>
+              <a:ext uri="{FF2B5EF4-FFF2-40B4-BE49-F238E27FC236}">
+                <a16:creationId xmlns:a16="http://schemas.microsoft.com/office/drawing/2014/main" id="{4AD8B85C-B359-195F-B78C-C879AB7840B1}"/>
+              </a:ext>
+            </a:extLst>
+          </p:cNvPr>
+          <p:cNvPicPr>
+            <a:picLocks noChangeAspect="1"/>
+          </p:cNvPicPr>
+          <p:nvPr/>
+        </p:nvPicPr>
+        <p:blipFill>
+          <a:blip r:embed="rId4"/>
+          <a:stretch>
+            <a:fillRect/>
+          </a:stretch>
+        </p:blipFill>
+        <p:spPr>
+          <a:xfrm>
+            <a:off x="57601" y="1189856"/>
+            <a:ext cx="1068259" cy="1556792"/>
+          </a:xfrm>
+          <a:prstGeom prst="rect">
+            <a:avLst/>
+          </a:prstGeom>
+          <a:ln>
+            <a:noFill/>
+          </a:ln>
+          <a:effectLst>
+            <a:outerShdw blurRad="292100" dist="139700" dir="2700000" algn="tl" rotWithShape="0">
+              <a:srgbClr val="333333">
+                <a:alpha val="65000"/>
+              </a:srgbClr>
+            </a:outerShdw>
+          </a:effectLst>
+        </p:spPr>
+      </p:pic>
+      <p:sp>
+        <p:nvSpPr>
+          <p:cNvPr id="2" name="TextBox 1">
+            <a:extLst>
+              <a:ext uri="{FF2B5EF4-FFF2-40B4-BE49-F238E27FC236}">
+                <a16:creationId xmlns:a16="http://schemas.microsoft.com/office/drawing/2014/main" id="{CAB2C784-DE74-68FC-7A84-3E6C5D164315}"/>
+              </a:ext>
+            </a:extLst>
+          </p:cNvPr>
+          <p:cNvSpPr txBox="1"/>
+          <p:nvPr/>
+        </p:nvSpPr>
+        <p:spPr>
+          <a:xfrm>
+            <a:off x="405780" y="5722972"/>
+            <a:ext cx="7951216" cy="523220"/>
+          </a:xfrm>
+          <a:prstGeom prst="rect">
+            <a:avLst/>
+          </a:prstGeom>
+          <a:solidFill>
+            <a:schemeClr val="bg1">
+              <a:lumMod val="95000"/>
+            </a:schemeClr>
+          </a:solidFill>
+          <a:ln>
+            <a:solidFill>
+              <a:schemeClr val="bg2"/>
+            </a:solidFill>
+          </a:ln>
+        </p:spPr>
+        <p:txBody>
+          <a:bodyPr wrap="none" rtlCol="0" anchor="ctr" anchorCtr="1">
+            <a:spAutoFit/>
+          </a:bodyPr>
+          <a:lstStyle/>
+          <a:p>
+            <a:r>
+              <a:rPr lang="en-US" sz="2800" dirty="0">
+                <a:hlinkClick r:id="rId5"/>
+              </a:rPr>
+              <a:t>https://github.com/yasenstar/python_with_office</a:t>
+            </a:r>
+            <a:endParaRPr lang="en-US" sz="2800" dirty="0"/>
+          </a:p>
+        </p:txBody>
+      </p:sp>
+      <p:sp>
+        <p:nvSpPr>
+          <p:cNvPr id="9" name="TextBox 8">
+            <a:extLst>
+              <a:ext uri="{FF2B5EF4-FFF2-40B4-BE49-F238E27FC236}">
+                <a16:creationId xmlns:a16="http://schemas.microsoft.com/office/drawing/2014/main" id="{C25C84F5-3AA3-A068-7E2F-9123CA5A7D16}"/>
+              </a:ext>
+            </a:extLst>
+          </p:cNvPr>
+          <p:cNvSpPr txBox="1"/>
+          <p:nvPr/>
+        </p:nvSpPr>
+        <p:spPr>
+          <a:xfrm>
+            <a:off x="405780" y="6246192"/>
+            <a:ext cx="7951216" cy="523220"/>
+          </a:xfrm>
+          <a:prstGeom prst="rect">
+            <a:avLst/>
+          </a:prstGeom>
+          <a:solidFill>
+            <a:schemeClr val="bg1">
+              <a:lumMod val="95000"/>
+            </a:schemeClr>
+          </a:solidFill>
+          <a:ln>
+            <a:solidFill>
+              <a:schemeClr val="bg2"/>
+            </a:solidFill>
+          </a:ln>
+        </p:spPr>
+        <p:txBody>
+          <a:bodyPr wrap="square" rtlCol="0" anchor="ctr" anchorCtr="1">
+            <a:spAutoFit/>
+          </a:bodyPr>
+          <a:lstStyle/>
+          <a:p>
+            <a:r>
+              <a:rPr lang="en-US" sz="2800" dirty="0">
+                <a:hlinkClick r:id="rId6"/>
+              </a:rPr>
+              <a:t>https://gitee.com/yasenstar/python_with_office</a:t>
+            </a:r>
+            <a:endParaRPr lang="en-US" sz="2800" dirty="0"/>
+          </a:p>
+        </p:txBody>
+      </p:sp>
+      <p:sp>
+        <p:nvSpPr>
+          <p:cNvPr id="13" name="Rectangle 12">
+            <a:extLst>
+              <a:ext uri="{FF2B5EF4-FFF2-40B4-BE49-F238E27FC236}">
+                <a16:creationId xmlns:a16="http://schemas.microsoft.com/office/drawing/2014/main" id="{6F9C3126-4EC2-77CA-B408-E23CE9AE8E9D}"/>
+              </a:ext>
+            </a:extLst>
+          </p:cNvPr>
+          <p:cNvSpPr/>
+          <p:nvPr/>
+        </p:nvSpPr>
+        <p:spPr>
+          <a:xfrm>
+            <a:off x="7318548" y="2348880"/>
+            <a:ext cx="4464495" cy="2016224"/>
+          </a:xfrm>
+          <a:prstGeom prst="rect">
+            <a:avLst/>
+          </a:prstGeom>
+          <a:noFill/>
+          <a:ln w="38100">
+            <a:solidFill>
+              <a:srgbClr val="FF0000"/>
+            </a:solidFill>
+          </a:ln>
+        </p:spPr>
+        <p:style>
+          <a:lnRef idx="2">
+            <a:schemeClr val="accent3"/>
+          </a:lnRef>
+          <a:fillRef idx="1">
+            <a:schemeClr val="lt1"/>
+          </a:fillRef>
+          <a:effectRef idx="0">
+            <a:schemeClr val="accent3"/>
+          </a:effectRef>
+          <a:fontRef idx="minor">
+            <a:schemeClr val="dk1"/>
+          </a:fontRef>
+        </p:style>
+        <p:txBody>
+          <a:bodyPr rtlCol="0" anchor="ctr"/>
+          <a:lstStyle/>
+          <a:p>
+            <a:pPr algn="ctr"/>
+            <a:endParaRPr lang="en-US" dirty="0"/>
+          </a:p>
+        </p:txBody>
+      </p:sp>
+    </p:spTree>
+    <p:extLst>
+      <p:ext uri="{BB962C8B-B14F-4D97-AF65-F5344CB8AC3E}">
+        <p14:creationId xmlns:p14="http://schemas.microsoft.com/office/powerpoint/2010/main" val="3205902135"/>
+      </p:ext>
+    </p:extLst>
+  </p:cSld>
+  <p:clrMapOvr>
+    <a:masterClrMapping/>
+  </p:clrMapOvr>
+  <mc:AlternateContent xmlns:mc="http://schemas.openxmlformats.org/markup-compatibility/2006" xmlns:p14="http://schemas.microsoft.com/office/powerpoint/2010/main">
+    <mc:Choice Requires="p14">
+      <p:transition spd="med" p14:dur="700">
+        <p:fade/>
+      </p:transition>
+    </mc:Choice>
+    <mc:Fallback xmlns="">
+      <p:transition spd="med">
+        <p:fade/>
+      </p:transition>
+    </mc:Fallback>
+  </mc:AlternateContent>
+</p:sld>
+</file>
+
+<file path=ppt/slides/slide46.xml><?xml version="1.0" encoding="utf-8"?>
+<p:sld xmlns:a="http://schemas.openxmlformats.org/drawingml/2006/main" xmlns:r="http://schemas.openxmlformats.org/officeDocument/2006/relationships" xmlns:p="http://schemas.openxmlformats.org/presentationml/2006/main">
+  <p:cSld>
+    <p:spTree>
+      <p:nvGrpSpPr>
+        <p:cNvPr id="1" name=""/>
+        <p:cNvGrpSpPr/>
+        <p:nvPr/>
+      </p:nvGrpSpPr>
+      <p:grpSpPr>
+        <a:xfrm>
+          <a:off x="0" y="0"/>
+          <a:ext cx="0" cy="0"/>
+          <a:chOff x="0" y="0"/>
+          <a:chExt cx="0" cy="0"/>
+        </a:xfrm>
+      </p:grpSpPr>
+      <p:pic>
+        <p:nvPicPr>
+          <p:cNvPr id="8" name="Picture 7">
+            <a:extLst>
+              <a:ext uri="{FF2B5EF4-FFF2-40B4-BE49-F238E27FC236}">
+                <a16:creationId xmlns:a16="http://schemas.microsoft.com/office/drawing/2014/main" id="{89AD7374-A986-79CD-3ACB-D8F86FF9EBEF}"/>
+              </a:ext>
+            </a:extLst>
+          </p:cNvPr>
+          <p:cNvPicPr>
+            <a:picLocks noChangeAspect="1"/>
+          </p:cNvPicPr>
+          <p:nvPr/>
+        </p:nvPicPr>
+        <p:blipFill>
+          <a:blip r:embed="rId3"/>
+          <a:stretch>
+            <a:fillRect/>
+          </a:stretch>
+        </p:blipFill>
+        <p:spPr>
+          <a:xfrm>
+            <a:off x="6059083" y="1163063"/>
+            <a:ext cx="5782988" cy="4293096"/>
+          </a:xfrm>
+          <a:prstGeom prst="rect">
+            <a:avLst/>
+          </a:prstGeom>
+        </p:spPr>
+      </p:pic>
+      <p:sp>
+        <p:nvSpPr>
+          <p:cNvPr id="4" name="Title 3"/>
+          <p:cNvSpPr>
+            <a:spLocks noGrp="1"/>
+          </p:cNvSpPr>
+          <p:nvPr>
+            <p:ph type="ctrTitle"/>
+          </p:nvPr>
+        </p:nvSpPr>
+        <p:spPr/>
+        <p:txBody>
+          <a:bodyPr>
+            <a:normAutofit/>
+          </a:bodyPr>
+          <a:lstStyle/>
+          <a:p>
+            <a:pPr algn="ctr"/>
+            <a:r>
+              <a:rPr lang="zh-CN" altLang="en-US" sz="4800" dirty="0">
+                <a:latin typeface="华文隶书" panose="02010800040101010101" pitchFamily="2" charset="-122"/>
+                <a:ea typeface="华文隶书" panose="02010800040101010101" pitchFamily="2" charset="-122"/>
+              </a:rPr>
+              <a:t>让</a:t>
+            </a:r>
+            <a:r>
+              <a:rPr lang="en-US" altLang="zh-CN" sz="4800" dirty="0">
+                <a:latin typeface="华文隶书" panose="02010800040101010101" pitchFamily="2" charset="-122"/>
+                <a:ea typeface="华文隶书" panose="02010800040101010101" pitchFamily="2" charset="-122"/>
+              </a:rPr>
+              <a:t>Python</a:t>
+            </a:r>
+            <a:r>
+              <a:rPr lang="zh-CN" altLang="en-US" sz="4800" dirty="0">
+                <a:latin typeface="华文隶书" panose="02010800040101010101" pitchFamily="2" charset="-122"/>
+                <a:ea typeface="华文隶书" panose="02010800040101010101" pitchFamily="2" charset="-122"/>
+              </a:rPr>
+              <a:t>遇上</a:t>
+            </a:r>
+            <a:r>
+              <a:rPr lang="en-US" altLang="zh-CN" sz="4800" dirty="0">
+                <a:latin typeface="华文隶书" panose="02010800040101010101" pitchFamily="2" charset="-122"/>
+                <a:ea typeface="华文隶书" panose="02010800040101010101" pitchFamily="2" charset="-122"/>
+              </a:rPr>
+              <a:t>Office</a:t>
+            </a:r>
+            <a:br>
+              <a:rPr lang="en-US" altLang="zh-CN" sz="4800" dirty="0">
+                <a:latin typeface="华文隶书" panose="02010800040101010101" pitchFamily="2" charset="-122"/>
+                <a:ea typeface="华文隶书" panose="02010800040101010101" pitchFamily="2" charset="-122"/>
+              </a:rPr>
+            </a:br>
+            <a:br>
+              <a:rPr lang="en-US" altLang="zh-CN" sz="4800" dirty="0">
+                <a:latin typeface="华文隶书" panose="02010800040101010101" pitchFamily="2" charset="-122"/>
+                <a:ea typeface="华文隶书" panose="02010800040101010101" pitchFamily="2" charset="-122"/>
+              </a:rPr>
+            </a:br>
+            <a:r>
+              <a:rPr lang="en-US" altLang="zh-CN" sz="4800" dirty="0">
+                <a:latin typeface="华文隶书" panose="02010800040101010101" pitchFamily="2" charset="-122"/>
+                <a:ea typeface="华文隶书" panose="02010800040101010101" pitchFamily="2" charset="-122"/>
+              </a:rPr>
+              <a:t>(Python with Office)</a:t>
+            </a:r>
+            <a:endParaRPr lang="en-US" sz="4800" dirty="0">
+              <a:latin typeface="华文隶书" panose="02010800040101010101" pitchFamily="2" charset="-122"/>
+              <a:ea typeface="华文隶书" panose="02010800040101010101" pitchFamily="2" charset="-122"/>
+            </a:endParaRPr>
+          </a:p>
+        </p:txBody>
+      </p:sp>
+      <p:sp>
+        <p:nvSpPr>
+          <p:cNvPr id="3" name="Content Placeholder 2"/>
+          <p:cNvSpPr>
+            <a:spLocks noGrp="1"/>
+          </p:cNvSpPr>
+          <p:nvPr>
+            <p:ph type="subTitle" idx="1"/>
+          </p:nvPr>
+        </p:nvSpPr>
+        <p:spPr>
+          <a:xfrm>
+            <a:off x="549796" y="3403600"/>
+            <a:ext cx="5544617" cy="2185640"/>
+          </a:xfrm>
+        </p:spPr>
+        <p:txBody>
+          <a:bodyPr>
+            <a:normAutofit/>
+          </a:bodyPr>
+          <a:lstStyle/>
+          <a:p>
+            <a:r>
+              <a:rPr lang="en-US" sz="2800" dirty="0">
+                <a:latin typeface="ADLaM Display" panose="020F0502020204030204" pitchFamily="2" charset="0"/>
+                <a:ea typeface="ADLaM Display" panose="020F0502020204030204" pitchFamily="2" charset="0"/>
+                <a:cs typeface="ADLaM Display" panose="020F0502020204030204" pitchFamily="2" charset="0"/>
+              </a:rPr>
+              <a:t>Chapter 7 Work with Word</a:t>
+            </a:r>
+          </a:p>
+          <a:p>
+            <a:r>
+              <a:rPr lang="en-US" sz="2800" dirty="0">
+                <a:latin typeface="ADLaM Display" panose="020F0502020204030204" pitchFamily="2" charset="0"/>
+                <a:ea typeface="ADLaM Display" panose="020F0502020204030204" pitchFamily="2" charset="0"/>
+                <a:cs typeface="ADLaM Display" panose="020F0502020204030204" pitchFamily="2" charset="0"/>
+              </a:rPr>
+              <a:t>7.5 paragraph styles</a:t>
+            </a:r>
+          </a:p>
+          <a:p>
+            <a:r>
+              <a:rPr lang="zh-CN" altLang="en-US" sz="2800" dirty="0">
+                <a:latin typeface="ADLaM Display" panose="020F0502020204030204" pitchFamily="2" charset="0"/>
+                <a:ea typeface="ADLaM Display" panose="020F0502020204030204" pitchFamily="2" charset="0"/>
+                <a:cs typeface="ADLaM Display" panose="020F0502020204030204" pitchFamily="2" charset="0"/>
+              </a:rPr>
+              <a:t>第七章 操作</a:t>
+            </a:r>
+            <a:r>
+              <a:rPr lang="en-US" altLang="zh-CN" sz="2800" dirty="0">
+                <a:latin typeface="ADLaM Display" panose="020F0502020204030204" pitchFamily="2" charset="0"/>
+                <a:ea typeface="ADLaM Display" panose="020F0502020204030204" pitchFamily="2" charset="0"/>
+                <a:cs typeface="ADLaM Display" panose="020F0502020204030204" pitchFamily="2" charset="0"/>
+              </a:rPr>
+              <a:t>Word</a:t>
+            </a:r>
+          </a:p>
+          <a:p>
+            <a:r>
+              <a:rPr lang="en-US" altLang="zh-CN" sz="2800" dirty="0">
+                <a:latin typeface="ADLaM Display" panose="020F0502020204030204" pitchFamily="2" charset="0"/>
+                <a:ea typeface="ADLaM Display" panose="020F0502020204030204" pitchFamily="2" charset="0"/>
+                <a:cs typeface="ADLaM Display" panose="020F0502020204030204" pitchFamily="2" charset="0"/>
+              </a:rPr>
+              <a:t>7.5 </a:t>
+            </a:r>
+            <a:r>
+              <a:rPr lang="zh-CN" altLang="en-US" sz="2800" dirty="0">
+                <a:latin typeface="ADLaM Display" panose="020F0502020204030204" pitchFamily="2" charset="0"/>
+                <a:ea typeface="ADLaM Display" panose="020F0502020204030204" pitchFamily="2" charset="0"/>
+                <a:cs typeface="ADLaM Display" panose="020F0502020204030204" pitchFamily="2" charset="0"/>
+              </a:rPr>
+              <a:t>段落样式</a:t>
+            </a:r>
+            <a:endParaRPr lang="en-US" altLang="zh-CN" sz="2800" dirty="0">
+              <a:latin typeface="ADLaM Display" panose="020F0502020204030204" pitchFamily="2" charset="0"/>
+              <a:ea typeface="ADLaM Display" panose="020F0502020204030204" pitchFamily="2" charset="0"/>
+              <a:cs typeface="ADLaM Display" panose="020F0502020204030204" pitchFamily="2" charset="0"/>
+            </a:endParaRPr>
+          </a:p>
+        </p:txBody>
+      </p:sp>
+      <p:pic>
+        <p:nvPicPr>
+          <p:cNvPr id="5" name="Picture 4">
+            <a:extLst>
+              <a:ext uri="{FF2B5EF4-FFF2-40B4-BE49-F238E27FC236}">
+                <a16:creationId xmlns:a16="http://schemas.microsoft.com/office/drawing/2014/main" id="{4AD8B85C-B359-195F-B78C-C879AB7840B1}"/>
+              </a:ext>
+            </a:extLst>
+          </p:cNvPr>
+          <p:cNvPicPr>
+            <a:picLocks noChangeAspect="1"/>
+          </p:cNvPicPr>
+          <p:nvPr/>
+        </p:nvPicPr>
+        <p:blipFill>
+          <a:blip r:embed="rId4"/>
+          <a:stretch>
+            <a:fillRect/>
+          </a:stretch>
+        </p:blipFill>
+        <p:spPr>
+          <a:xfrm>
+            <a:off x="57601" y="1189856"/>
+            <a:ext cx="1068259" cy="1556792"/>
+          </a:xfrm>
+          <a:prstGeom prst="rect">
+            <a:avLst/>
+          </a:prstGeom>
+          <a:ln>
+            <a:noFill/>
+          </a:ln>
+          <a:effectLst>
+            <a:outerShdw blurRad="292100" dist="139700" dir="2700000" algn="tl" rotWithShape="0">
+              <a:srgbClr val="333333">
+                <a:alpha val="65000"/>
+              </a:srgbClr>
+            </a:outerShdw>
+          </a:effectLst>
+        </p:spPr>
+      </p:pic>
+      <p:sp>
+        <p:nvSpPr>
+          <p:cNvPr id="2" name="TextBox 1">
+            <a:extLst>
+              <a:ext uri="{FF2B5EF4-FFF2-40B4-BE49-F238E27FC236}">
+                <a16:creationId xmlns:a16="http://schemas.microsoft.com/office/drawing/2014/main" id="{CAB2C784-DE74-68FC-7A84-3E6C5D164315}"/>
+              </a:ext>
+            </a:extLst>
+          </p:cNvPr>
+          <p:cNvSpPr txBox="1"/>
+          <p:nvPr/>
+        </p:nvSpPr>
+        <p:spPr>
+          <a:xfrm>
+            <a:off x="405780" y="5722972"/>
+            <a:ext cx="7951216" cy="523220"/>
+          </a:xfrm>
+          <a:prstGeom prst="rect">
+            <a:avLst/>
+          </a:prstGeom>
+          <a:solidFill>
+            <a:schemeClr val="bg1">
+              <a:lumMod val="95000"/>
+            </a:schemeClr>
+          </a:solidFill>
+          <a:ln>
+            <a:solidFill>
+              <a:schemeClr val="bg2"/>
+            </a:solidFill>
+          </a:ln>
+        </p:spPr>
+        <p:txBody>
+          <a:bodyPr wrap="none" rtlCol="0" anchor="ctr" anchorCtr="1">
+            <a:spAutoFit/>
+          </a:bodyPr>
+          <a:lstStyle/>
+          <a:p>
+            <a:r>
+              <a:rPr lang="en-US" sz="2800" dirty="0">
+                <a:hlinkClick r:id="rId5"/>
+              </a:rPr>
+              <a:t>https://github.com/yasenstar/python_with_office</a:t>
+            </a:r>
+            <a:endParaRPr lang="en-US" sz="2800" dirty="0"/>
+          </a:p>
+        </p:txBody>
+      </p:sp>
+      <p:sp>
+        <p:nvSpPr>
+          <p:cNvPr id="9" name="TextBox 8">
+            <a:extLst>
+              <a:ext uri="{FF2B5EF4-FFF2-40B4-BE49-F238E27FC236}">
+                <a16:creationId xmlns:a16="http://schemas.microsoft.com/office/drawing/2014/main" id="{C25C84F5-3AA3-A068-7E2F-9123CA5A7D16}"/>
+              </a:ext>
+            </a:extLst>
+          </p:cNvPr>
+          <p:cNvSpPr txBox="1"/>
+          <p:nvPr/>
+        </p:nvSpPr>
+        <p:spPr>
+          <a:xfrm>
+            <a:off x="405780" y="6246192"/>
+            <a:ext cx="7951216" cy="523220"/>
+          </a:xfrm>
+          <a:prstGeom prst="rect">
+            <a:avLst/>
+          </a:prstGeom>
+          <a:solidFill>
+            <a:schemeClr val="bg1">
+              <a:lumMod val="95000"/>
+            </a:schemeClr>
+          </a:solidFill>
+          <a:ln>
+            <a:solidFill>
+              <a:schemeClr val="bg2"/>
+            </a:solidFill>
+          </a:ln>
+        </p:spPr>
+        <p:txBody>
+          <a:bodyPr wrap="square" rtlCol="0" anchor="ctr" anchorCtr="1">
+            <a:spAutoFit/>
+          </a:bodyPr>
+          <a:lstStyle/>
+          <a:p>
+            <a:r>
+              <a:rPr lang="en-US" sz="2800" dirty="0">
+                <a:hlinkClick r:id="rId6"/>
+              </a:rPr>
+              <a:t>https://gitee.com/yasenstar/python_with_office</a:t>
+            </a:r>
+            <a:endParaRPr lang="en-US" sz="2800" dirty="0"/>
+          </a:p>
+        </p:txBody>
+      </p:sp>
+      <p:sp>
+        <p:nvSpPr>
+          <p:cNvPr id="13" name="Rectangle 12">
+            <a:extLst>
+              <a:ext uri="{FF2B5EF4-FFF2-40B4-BE49-F238E27FC236}">
+                <a16:creationId xmlns:a16="http://schemas.microsoft.com/office/drawing/2014/main" id="{6F9C3126-4EC2-77CA-B408-E23CE9AE8E9D}"/>
+              </a:ext>
+            </a:extLst>
+          </p:cNvPr>
+          <p:cNvSpPr/>
+          <p:nvPr/>
+        </p:nvSpPr>
+        <p:spPr>
+          <a:xfrm>
+            <a:off x="7318548" y="4005064"/>
+            <a:ext cx="4464495" cy="1194688"/>
+          </a:xfrm>
+          <a:prstGeom prst="rect">
+            <a:avLst/>
+          </a:prstGeom>
+          <a:noFill/>
+          <a:ln w="38100">
+            <a:solidFill>
+              <a:srgbClr val="FF0000"/>
+            </a:solidFill>
+          </a:ln>
+        </p:spPr>
+        <p:style>
+          <a:lnRef idx="2">
+            <a:schemeClr val="accent3"/>
+          </a:lnRef>
+          <a:fillRef idx="1">
+            <a:schemeClr val="lt1"/>
+          </a:fillRef>
+          <a:effectRef idx="0">
+            <a:schemeClr val="accent3"/>
+          </a:effectRef>
+          <a:fontRef idx="minor">
+            <a:schemeClr val="dk1"/>
+          </a:fontRef>
+        </p:style>
+        <p:txBody>
+          <a:bodyPr rtlCol="0" anchor="ctr"/>
+          <a:lstStyle/>
+          <a:p>
+            <a:pPr algn="ctr"/>
+            <a:endParaRPr lang="en-US" dirty="0"/>
+          </a:p>
+        </p:txBody>
+      </p:sp>
+    </p:spTree>
+    <p:extLst>
+      <p:ext uri="{BB962C8B-B14F-4D97-AF65-F5344CB8AC3E}">
+        <p14:creationId xmlns:p14="http://schemas.microsoft.com/office/powerpoint/2010/main" val="939556126"/>
       </p:ext>
     </p:extLst>
   </p:cSld>

</xml_diff>

<commit_message>
add case study of using run
</commit_message>
<xml_diff>
--- a/Python-with-Office-Video_Covers.pptx
+++ b/Python-with-Office-Video_Covers.pptx
@@ -5,10 +5,10 @@
     <p:sldMasterId id="2147483660" r:id="rId1"/>
   </p:sldMasterIdLst>
   <p:notesMasterIdLst>
-    <p:notesMasterId r:id="rId50"/>
+    <p:notesMasterId r:id="rId52"/>
   </p:notesMasterIdLst>
   <p:handoutMasterIdLst>
-    <p:handoutMasterId r:id="rId51"/>
+    <p:handoutMasterId r:id="rId53"/>
   </p:handoutMasterIdLst>
   <p:sldIdLst>
     <p:sldId id="257" r:id="rId2"/>
@@ -59,6 +59,8 @@
     <p:sldId id="302" r:id="rId47"/>
     <p:sldId id="303" r:id="rId48"/>
     <p:sldId id="304" r:id="rId49"/>
+    <p:sldId id="306" r:id="rId50"/>
+    <p:sldId id="305" r:id="rId51"/>
   </p:sldIdLst>
   <p:sldSz cx="12188825" cy="6858000"/>
   <p:notesSz cx="6858000" cy="9144000"/>
@@ -4351,6 +4353,90 @@
     <p:extLst>
       <p:ext uri="{BB962C8B-B14F-4D97-AF65-F5344CB8AC3E}">
         <p14:creationId xmlns:p14="http://schemas.microsoft.com/office/powerpoint/2010/main" val="1018979850"/>
+      </p:ext>
+    </p:extLst>
+  </p:cSld>
+  <p:clrMapOvr>
+    <a:masterClrMapping/>
+  </p:clrMapOvr>
+</p:notes>
+</file>
+
+<file path=ppt/notesSlides/notesSlide49.xml><?xml version="1.0" encoding="utf-8"?>
+<p:notes xmlns:a="http://schemas.openxmlformats.org/drawingml/2006/main" xmlns:r="http://schemas.openxmlformats.org/officeDocument/2006/relationships" xmlns:p="http://schemas.openxmlformats.org/presentationml/2006/main">
+  <p:cSld>
+    <p:spTree>
+      <p:nvGrpSpPr>
+        <p:cNvPr id="1" name=""/>
+        <p:cNvGrpSpPr/>
+        <p:nvPr/>
+      </p:nvGrpSpPr>
+      <p:grpSpPr>
+        <a:xfrm>
+          <a:off x="0" y="0"/>
+          <a:ext cx="0" cy="0"/>
+          <a:chOff x="0" y="0"/>
+          <a:chExt cx="0" cy="0"/>
+        </a:xfrm>
+      </p:grpSpPr>
+      <p:sp>
+        <p:nvSpPr>
+          <p:cNvPr id="2" name="Slide Image Placeholder 1"/>
+          <p:cNvSpPr>
+            <a:spLocks noGrp="1" noRot="1" noChangeAspect="1"/>
+          </p:cNvSpPr>
+          <p:nvPr>
+            <p:ph type="sldImg"/>
+          </p:nvPr>
+        </p:nvSpPr>
+        <p:spPr/>
+      </p:sp>
+      <p:sp>
+        <p:nvSpPr>
+          <p:cNvPr id="3" name="Notes Placeholder 2"/>
+          <p:cNvSpPr>
+            <a:spLocks noGrp="1"/>
+          </p:cNvSpPr>
+          <p:nvPr>
+            <p:ph type="body" idx="1"/>
+          </p:nvPr>
+        </p:nvSpPr>
+        <p:spPr/>
+        <p:txBody>
+          <a:bodyPr/>
+          <a:lstStyle/>
+          <a:p>
+            <a:endParaRPr lang="en-US" dirty="0"/>
+          </a:p>
+        </p:txBody>
+      </p:sp>
+      <p:sp>
+        <p:nvSpPr>
+          <p:cNvPr id="4" name="Slide Number Placeholder 3"/>
+          <p:cNvSpPr>
+            <a:spLocks noGrp="1"/>
+          </p:cNvSpPr>
+          <p:nvPr>
+            <p:ph type="sldNum" sz="quarter" idx="10"/>
+          </p:nvPr>
+        </p:nvSpPr>
+        <p:spPr/>
+        <p:txBody>
+          <a:bodyPr/>
+          <a:lstStyle/>
+          <a:p>
+            <a:fld id="{6BB98AFB-CB0D-4DFE-87B9-B4B0D0DE73CD}" type="slidenum">
+              <a:rPr lang="en-US" smtClean="0"/>
+              <a:t>49</a:t>
+            </a:fld>
+            <a:endParaRPr lang="en-US" dirty="0"/>
+          </a:p>
+        </p:txBody>
+      </p:sp>
+    </p:spTree>
+    <p:extLst>
+      <p:ext uri="{BB962C8B-B14F-4D97-AF65-F5344CB8AC3E}">
+        <p14:creationId xmlns:p14="http://schemas.microsoft.com/office/powerpoint/2010/main" val="466641551"/>
       </p:ext>
     </p:extLst>
   </p:cSld>
@@ -24882,7 +24968,7 @@
                 <a:ea typeface="ADLaM Display" panose="020F0502020204030204" pitchFamily="2" charset="0"/>
                 <a:cs typeface="ADLaM Display" panose="020F0502020204030204" pitchFamily="2" charset="0"/>
               </a:rPr>
-              <a:t>7.6 Run Object (2)</a:t>
+              <a:t>7.6 Run Object (2) - 1</a:t>
             </a:r>
           </a:p>
           <a:p>
@@ -24926,7 +25012,7 @@
                 <a:ea typeface="ADLaM Display" panose="020F0502020204030204" pitchFamily="2" charset="0"/>
                 <a:cs typeface="ADLaM Display" panose="020F0502020204030204" pitchFamily="2" charset="0"/>
               </a:rPr>
-              <a:t> (2)</a:t>
+              <a:t> (2) - 1</a:t>
             </a:r>
           </a:p>
         </p:txBody>
@@ -25119,6 +25205,444 @@
     <p:extLst>
       <p:ext uri="{BB962C8B-B14F-4D97-AF65-F5344CB8AC3E}">
         <p14:creationId xmlns:p14="http://schemas.microsoft.com/office/powerpoint/2010/main" val="1462061475"/>
+      </p:ext>
+    </p:extLst>
+  </p:cSld>
+  <p:clrMapOvr>
+    <a:masterClrMapping/>
+  </p:clrMapOvr>
+  <mc:AlternateContent xmlns:mc="http://schemas.openxmlformats.org/markup-compatibility/2006">
+    <mc:Choice xmlns:p14="http://schemas.microsoft.com/office/powerpoint/2010/main" Requires="p14">
+      <p:transition spd="med" p14:dur="700">
+        <p:fade/>
+      </p:transition>
+    </mc:Choice>
+    <mc:Fallback>
+      <p:transition spd="med">
+        <p:fade/>
+      </p:transition>
+    </mc:Fallback>
+  </mc:AlternateContent>
+</p:sld>
+</file>
+
+<file path=ppt/slides/slide49.xml><?xml version="1.0" encoding="utf-8"?>
+<p:sld xmlns:a="http://schemas.openxmlformats.org/drawingml/2006/main" xmlns:r="http://schemas.openxmlformats.org/officeDocument/2006/relationships" xmlns:p="http://schemas.openxmlformats.org/presentationml/2006/main">
+  <p:cSld>
+    <p:spTree>
+      <p:nvGrpSpPr>
+        <p:cNvPr id="1" name=""/>
+        <p:cNvGrpSpPr/>
+        <p:nvPr/>
+      </p:nvGrpSpPr>
+      <p:grpSpPr>
+        <a:xfrm>
+          <a:off x="0" y="0"/>
+          <a:ext cx="0" cy="0"/>
+          <a:chOff x="0" y="0"/>
+          <a:chExt cx="0" cy="0"/>
+        </a:xfrm>
+      </p:grpSpPr>
+      <p:pic>
+        <p:nvPicPr>
+          <p:cNvPr id="8" name="Picture 7">
+            <a:extLst>
+              <a:ext uri="{FF2B5EF4-FFF2-40B4-BE49-F238E27FC236}">
+                <a16:creationId xmlns:a16="http://schemas.microsoft.com/office/drawing/2014/main" id="{7EEBF9BE-1647-944E-DF0D-ACD1A00E383B}"/>
+              </a:ext>
+            </a:extLst>
+          </p:cNvPr>
+          <p:cNvPicPr>
+            <a:picLocks noChangeAspect="1"/>
+          </p:cNvPicPr>
+          <p:nvPr/>
+        </p:nvPicPr>
+        <p:blipFill>
+          <a:blip r:embed="rId3"/>
+          <a:stretch>
+            <a:fillRect/>
+          </a:stretch>
+        </p:blipFill>
+        <p:spPr>
+          <a:xfrm>
+            <a:off x="6094412" y="608486"/>
+            <a:ext cx="5989966" cy="4908745"/>
+          </a:xfrm>
+          <a:prstGeom prst="rect">
+            <a:avLst/>
+          </a:prstGeom>
+          <a:ln>
+            <a:noFill/>
+          </a:ln>
+          <a:effectLst>
+            <a:outerShdw blurRad="292100" dist="139700" dir="2700000" algn="tl" rotWithShape="0">
+              <a:srgbClr val="333333">
+                <a:alpha val="65000"/>
+              </a:srgbClr>
+            </a:outerShdw>
+          </a:effectLst>
+        </p:spPr>
+      </p:pic>
+      <p:sp>
+        <p:nvSpPr>
+          <p:cNvPr id="4" name="Title 3"/>
+          <p:cNvSpPr>
+            <a:spLocks noGrp="1"/>
+          </p:cNvSpPr>
+          <p:nvPr>
+            <p:ph type="ctrTitle"/>
+          </p:nvPr>
+        </p:nvSpPr>
+        <p:spPr/>
+        <p:txBody>
+          <a:bodyPr>
+            <a:normAutofit/>
+          </a:bodyPr>
+          <a:lstStyle/>
+          <a:p>
+            <a:pPr algn="ctr"/>
+            <a:r>
+              <a:rPr lang="zh-CN" altLang="en-US" sz="4800" dirty="0">
+                <a:latin typeface="华文隶书" panose="02010800040101010101" pitchFamily="2" charset="-122"/>
+                <a:ea typeface="华文隶书" panose="02010800040101010101" pitchFamily="2" charset="-122"/>
+              </a:rPr>
+              <a:t>让</a:t>
+            </a:r>
+            <a:r>
+              <a:rPr lang="en-US" altLang="zh-CN" sz="4800" dirty="0">
+                <a:latin typeface="华文隶书" panose="02010800040101010101" pitchFamily="2" charset="-122"/>
+                <a:ea typeface="华文隶书" panose="02010800040101010101" pitchFamily="2" charset="-122"/>
+              </a:rPr>
+              <a:t>Python</a:t>
+            </a:r>
+            <a:r>
+              <a:rPr lang="zh-CN" altLang="en-US" sz="4800" dirty="0">
+                <a:latin typeface="华文隶书" panose="02010800040101010101" pitchFamily="2" charset="-122"/>
+                <a:ea typeface="华文隶书" panose="02010800040101010101" pitchFamily="2" charset="-122"/>
+              </a:rPr>
+              <a:t>遇上</a:t>
+            </a:r>
+            <a:r>
+              <a:rPr lang="en-US" altLang="zh-CN" sz="4800" dirty="0">
+                <a:latin typeface="华文隶书" panose="02010800040101010101" pitchFamily="2" charset="-122"/>
+                <a:ea typeface="华文隶书" panose="02010800040101010101" pitchFamily="2" charset="-122"/>
+              </a:rPr>
+              <a:t>Office</a:t>
+            </a:r>
+            <a:br>
+              <a:rPr lang="en-US" altLang="zh-CN" sz="4800" dirty="0">
+                <a:latin typeface="华文隶书" panose="02010800040101010101" pitchFamily="2" charset="-122"/>
+                <a:ea typeface="华文隶书" panose="02010800040101010101" pitchFamily="2" charset="-122"/>
+              </a:rPr>
+            </a:br>
+            <a:br>
+              <a:rPr lang="en-US" altLang="zh-CN" sz="4800" dirty="0">
+                <a:latin typeface="华文隶书" panose="02010800040101010101" pitchFamily="2" charset="-122"/>
+                <a:ea typeface="华文隶书" panose="02010800040101010101" pitchFamily="2" charset="-122"/>
+              </a:rPr>
+            </a:br>
+            <a:r>
+              <a:rPr lang="en-US" altLang="zh-CN" sz="4800" dirty="0">
+                <a:latin typeface="华文隶书" panose="02010800040101010101" pitchFamily="2" charset="-122"/>
+                <a:ea typeface="华文隶书" panose="02010800040101010101" pitchFamily="2" charset="-122"/>
+              </a:rPr>
+              <a:t>(Python with Office)</a:t>
+            </a:r>
+            <a:endParaRPr lang="en-US" sz="4800" dirty="0">
+              <a:latin typeface="华文隶书" panose="02010800040101010101" pitchFamily="2" charset="-122"/>
+              <a:ea typeface="华文隶书" panose="02010800040101010101" pitchFamily="2" charset="-122"/>
+            </a:endParaRPr>
+          </a:p>
+        </p:txBody>
+      </p:sp>
+      <p:sp>
+        <p:nvSpPr>
+          <p:cNvPr id="3" name="Content Placeholder 2"/>
+          <p:cNvSpPr>
+            <a:spLocks noGrp="1"/>
+          </p:cNvSpPr>
+          <p:nvPr>
+            <p:ph type="subTitle" idx="1"/>
+          </p:nvPr>
+        </p:nvSpPr>
+        <p:spPr>
+          <a:xfrm>
+            <a:off x="549796" y="3403600"/>
+            <a:ext cx="5544617" cy="2185640"/>
+          </a:xfrm>
+        </p:spPr>
+        <p:txBody>
+          <a:bodyPr>
+            <a:normAutofit/>
+          </a:bodyPr>
+          <a:lstStyle/>
+          <a:p>
+            <a:r>
+              <a:rPr lang="en-US" sz="2800" dirty="0">
+                <a:latin typeface="ADLaM Display" panose="020F0502020204030204" pitchFamily="2" charset="0"/>
+                <a:ea typeface="ADLaM Display" panose="020F0502020204030204" pitchFamily="2" charset="0"/>
+                <a:cs typeface="ADLaM Display" panose="020F0502020204030204" pitchFamily="2" charset="0"/>
+              </a:rPr>
+              <a:t>Chapter 7 Work with Word</a:t>
+            </a:r>
+          </a:p>
+          <a:p>
+            <a:r>
+              <a:rPr lang="en-US" sz="2800" dirty="0">
+                <a:latin typeface="ADLaM Display" panose="020F0502020204030204" pitchFamily="2" charset="0"/>
+                <a:ea typeface="ADLaM Display" panose="020F0502020204030204" pitchFamily="2" charset="0"/>
+                <a:cs typeface="ADLaM Display" panose="020F0502020204030204" pitchFamily="2" charset="0"/>
+              </a:rPr>
+              <a:t>7.6 Run Object (2) - 2</a:t>
+            </a:r>
+          </a:p>
+          <a:p>
+            <a:r>
+              <a:rPr lang="zh-CN" altLang="en-US" sz="2800" dirty="0">
+                <a:latin typeface="ADLaM Display" panose="020F0502020204030204" pitchFamily="2" charset="0"/>
+                <a:ea typeface="ADLaM Display" panose="020F0502020204030204" pitchFamily="2" charset="0"/>
+                <a:cs typeface="ADLaM Display" panose="020F0502020204030204" pitchFamily="2" charset="0"/>
+              </a:rPr>
+              <a:t>第七章 操作</a:t>
+            </a:r>
+            <a:r>
+              <a:rPr lang="en-US" altLang="zh-CN" sz="2800" dirty="0">
+                <a:latin typeface="ADLaM Display" panose="020F0502020204030204" pitchFamily="2" charset="0"/>
+                <a:ea typeface="ADLaM Display" panose="020F0502020204030204" pitchFamily="2" charset="0"/>
+                <a:cs typeface="ADLaM Display" panose="020F0502020204030204" pitchFamily="2" charset="0"/>
+              </a:rPr>
+              <a:t>Word</a:t>
+            </a:r>
+          </a:p>
+          <a:p>
+            <a:r>
+              <a:rPr lang="en-US" altLang="zh-CN" sz="2800" dirty="0">
+                <a:latin typeface="ADLaM Display" panose="020F0502020204030204" pitchFamily="2" charset="0"/>
+                <a:ea typeface="ADLaM Display" panose="020F0502020204030204" pitchFamily="2" charset="0"/>
+                <a:cs typeface="ADLaM Display" panose="020F0502020204030204" pitchFamily="2" charset="0"/>
+              </a:rPr>
+              <a:t>7.6 Run</a:t>
+            </a:r>
+            <a:r>
+              <a:rPr lang="zh-CN" altLang="en-US" sz="2800" dirty="0">
+                <a:latin typeface="ADLaM Display" panose="020F0502020204030204" pitchFamily="2" charset="0"/>
+                <a:ea typeface="ADLaM Display" panose="020F0502020204030204" pitchFamily="2" charset="0"/>
+                <a:cs typeface="ADLaM Display" panose="020F0502020204030204" pitchFamily="2" charset="0"/>
+              </a:rPr>
+              <a:t>对象</a:t>
+            </a:r>
+            <a:r>
+              <a:rPr lang="en-US" altLang="zh-CN" sz="2800" dirty="0">
+                <a:latin typeface="ADLaM Display" panose="020F0502020204030204" pitchFamily="2" charset="0"/>
+                <a:ea typeface="ADLaM Display" panose="020F0502020204030204" pitchFamily="2" charset="0"/>
+                <a:cs typeface="ADLaM Display" panose="020F0502020204030204" pitchFamily="2" charset="0"/>
+              </a:rPr>
+              <a:t> (2) </a:t>
+            </a:r>
+            <a:r>
+              <a:rPr lang="en-US" altLang="zh-CN" sz="2800">
+                <a:latin typeface="ADLaM Display" panose="020F0502020204030204" pitchFamily="2" charset="0"/>
+                <a:ea typeface="ADLaM Display" panose="020F0502020204030204" pitchFamily="2" charset="0"/>
+                <a:cs typeface="ADLaM Display" panose="020F0502020204030204" pitchFamily="2" charset="0"/>
+              </a:rPr>
+              <a:t>- 2</a:t>
+            </a:r>
+            <a:endParaRPr lang="en-US" altLang="zh-CN" sz="2800" dirty="0">
+              <a:latin typeface="ADLaM Display" panose="020F0502020204030204" pitchFamily="2" charset="0"/>
+              <a:ea typeface="ADLaM Display" panose="020F0502020204030204" pitchFamily="2" charset="0"/>
+              <a:cs typeface="ADLaM Display" panose="020F0502020204030204" pitchFamily="2" charset="0"/>
+            </a:endParaRPr>
+          </a:p>
+        </p:txBody>
+      </p:sp>
+      <p:pic>
+        <p:nvPicPr>
+          <p:cNvPr id="5" name="Picture 4">
+            <a:extLst>
+              <a:ext uri="{FF2B5EF4-FFF2-40B4-BE49-F238E27FC236}">
+                <a16:creationId xmlns:a16="http://schemas.microsoft.com/office/drawing/2014/main" id="{4AD8B85C-B359-195F-B78C-C879AB7840B1}"/>
+              </a:ext>
+            </a:extLst>
+          </p:cNvPr>
+          <p:cNvPicPr>
+            <a:picLocks noChangeAspect="1"/>
+          </p:cNvPicPr>
+          <p:nvPr/>
+        </p:nvPicPr>
+        <p:blipFill>
+          <a:blip r:embed="rId4"/>
+          <a:stretch>
+            <a:fillRect/>
+          </a:stretch>
+        </p:blipFill>
+        <p:spPr>
+          <a:xfrm>
+            <a:off x="57601" y="1189856"/>
+            <a:ext cx="1068259" cy="1556792"/>
+          </a:xfrm>
+          <a:prstGeom prst="rect">
+            <a:avLst/>
+          </a:prstGeom>
+          <a:ln>
+            <a:noFill/>
+          </a:ln>
+          <a:effectLst>
+            <a:outerShdw blurRad="292100" dist="139700" dir="2700000" algn="tl" rotWithShape="0">
+              <a:srgbClr val="333333">
+                <a:alpha val="65000"/>
+              </a:srgbClr>
+            </a:outerShdw>
+          </a:effectLst>
+        </p:spPr>
+      </p:pic>
+      <p:sp>
+        <p:nvSpPr>
+          <p:cNvPr id="2" name="TextBox 1">
+            <a:extLst>
+              <a:ext uri="{FF2B5EF4-FFF2-40B4-BE49-F238E27FC236}">
+                <a16:creationId xmlns:a16="http://schemas.microsoft.com/office/drawing/2014/main" id="{CAB2C784-DE74-68FC-7A84-3E6C5D164315}"/>
+              </a:ext>
+            </a:extLst>
+          </p:cNvPr>
+          <p:cNvSpPr txBox="1"/>
+          <p:nvPr/>
+        </p:nvSpPr>
+        <p:spPr>
+          <a:xfrm>
+            <a:off x="405780" y="5722972"/>
+            <a:ext cx="7951216" cy="523220"/>
+          </a:xfrm>
+          <a:prstGeom prst="rect">
+            <a:avLst/>
+          </a:prstGeom>
+          <a:solidFill>
+            <a:schemeClr val="bg1">
+              <a:lumMod val="95000"/>
+            </a:schemeClr>
+          </a:solidFill>
+          <a:ln>
+            <a:solidFill>
+              <a:schemeClr val="bg2"/>
+            </a:solidFill>
+          </a:ln>
+        </p:spPr>
+        <p:txBody>
+          <a:bodyPr wrap="none" rtlCol="0" anchor="ctr" anchorCtr="1">
+            <a:spAutoFit/>
+          </a:bodyPr>
+          <a:lstStyle/>
+          <a:p>
+            <a:r>
+              <a:rPr lang="en-US" sz="2800" dirty="0">
+                <a:hlinkClick r:id="rId5"/>
+              </a:rPr>
+              <a:t>https://github.com/yasenstar/python_with_office</a:t>
+            </a:r>
+            <a:endParaRPr lang="en-US" sz="2800" dirty="0"/>
+          </a:p>
+        </p:txBody>
+      </p:sp>
+      <p:sp>
+        <p:nvSpPr>
+          <p:cNvPr id="9" name="TextBox 8">
+            <a:extLst>
+              <a:ext uri="{FF2B5EF4-FFF2-40B4-BE49-F238E27FC236}">
+                <a16:creationId xmlns:a16="http://schemas.microsoft.com/office/drawing/2014/main" id="{C25C84F5-3AA3-A068-7E2F-9123CA5A7D16}"/>
+              </a:ext>
+            </a:extLst>
+          </p:cNvPr>
+          <p:cNvSpPr txBox="1"/>
+          <p:nvPr/>
+        </p:nvSpPr>
+        <p:spPr>
+          <a:xfrm>
+            <a:off x="405780" y="6246192"/>
+            <a:ext cx="7951216" cy="523220"/>
+          </a:xfrm>
+          <a:prstGeom prst="rect">
+            <a:avLst/>
+          </a:prstGeom>
+          <a:solidFill>
+            <a:schemeClr val="bg1">
+              <a:lumMod val="95000"/>
+            </a:schemeClr>
+          </a:solidFill>
+          <a:ln>
+            <a:solidFill>
+              <a:schemeClr val="bg2"/>
+            </a:solidFill>
+          </a:ln>
+        </p:spPr>
+        <p:txBody>
+          <a:bodyPr wrap="square" rtlCol="0" anchor="ctr" anchorCtr="1">
+            <a:spAutoFit/>
+          </a:bodyPr>
+          <a:lstStyle/>
+          <a:p>
+            <a:r>
+              <a:rPr lang="en-US" sz="2800" dirty="0">
+                <a:hlinkClick r:id="rId6"/>
+              </a:rPr>
+              <a:t>https://gitee.com/yasenstar/python_with_office</a:t>
+            </a:r>
+            <a:endParaRPr lang="en-US" sz="2800" dirty="0"/>
+          </a:p>
+        </p:txBody>
+      </p:sp>
+      <p:sp>
+        <p:nvSpPr>
+          <p:cNvPr id="13" name="Rectangle 12">
+            <a:extLst>
+              <a:ext uri="{FF2B5EF4-FFF2-40B4-BE49-F238E27FC236}">
+                <a16:creationId xmlns:a16="http://schemas.microsoft.com/office/drawing/2014/main" id="{6F9C3126-4EC2-77CA-B408-E23CE9AE8E9D}"/>
+              </a:ext>
+            </a:extLst>
+          </p:cNvPr>
+          <p:cNvSpPr/>
+          <p:nvPr/>
+        </p:nvSpPr>
+        <p:spPr>
+          <a:xfrm>
+            <a:off x="7534572" y="3573016"/>
+            <a:ext cx="4464495" cy="360040"/>
+          </a:xfrm>
+          <a:prstGeom prst="rect">
+            <a:avLst/>
+          </a:prstGeom>
+          <a:noFill/>
+          <a:ln w="38100">
+            <a:solidFill>
+              <a:srgbClr val="FF0000"/>
+            </a:solidFill>
+          </a:ln>
+        </p:spPr>
+        <p:style>
+          <a:lnRef idx="2">
+            <a:schemeClr val="accent3"/>
+          </a:lnRef>
+          <a:fillRef idx="1">
+            <a:schemeClr val="lt1"/>
+          </a:fillRef>
+          <a:effectRef idx="0">
+            <a:schemeClr val="accent3"/>
+          </a:effectRef>
+          <a:fontRef idx="minor">
+            <a:schemeClr val="dk1"/>
+          </a:fontRef>
+        </p:style>
+        <p:txBody>
+          <a:bodyPr rtlCol="0" anchor="ctr"/>
+          <a:lstStyle/>
+          <a:p>
+            <a:pPr algn="ctr"/>
+            <a:endParaRPr lang="en-US" dirty="0"/>
+          </a:p>
+        </p:txBody>
+      </p:sp>
+    </p:spTree>
+    <p:extLst>
+      <p:ext uri="{BB962C8B-B14F-4D97-AF65-F5344CB8AC3E}">
+        <p14:creationId xmlns:p14="http://schemas.microsoft.com/office/powerpoint/2010/main" val="466511930"/>
       </p:ext>
     </p:extLst>
   </p:cSld>
@@ -25463,6 +25987,128 @@
     <p:extLst>
       <p:ext uri="{BB962C8B-B14F-4D97-AF65-F5344CB8AC3E}">
         <p14:creationId xmlns:p14="http://schemas.microsoft.com/office/powerpoint/2010/main" val="967501008"/>
+      </p:ext>
+    </p:extLst>
+  </p:cSld>
+  <p:clrMapOvr>
+    <a:masterClrMapping/>
+  </p:clrMapOvr>
+  <mc:AlternateContent xmlns:mc="http://schemas.openxmlformats.org/markup-compatibility/2006" xmlns:p14="http://schemas.microsoft.com/office/powerpoint/2010/main">
+    <mc:Choice Requires="p14">
+      <p:transition spd="med" p14:dur="700">
+        <p:fade/>
+      </p:transition>
+    </mc:Choice>
+    <mc:Fallback xmlns="">
+      <p:transition spd="med">
+        <p:fade/>
+      </p:transition>
+    </mc:Fallback>
+  </mc:AlternateContent>
+</p:sld>
+</file>
+
+<file path=ppt/slides/slide50.xml><?xml version="1.0" encoding="utf-8"?>
+<p:sld xmlns:a="http://schemas.openxmlformats.org/drawingml/2006/main" xmlns:r="http://schemas.openxmlformats.org/officeDocument/2006/relationships" xmlns:p="http://schemas.openxmlformats.org/presentationml/2006/main">
+  <p:cSld>
+    <p:spTree>
+      <p:nvGrpSpPr>
+        <p:cNvPr id="1" name=""/>
+        <p:cNvGrpSpPr/>
+        <p:nvPr/>
+      </p:nvGrpSpPr>
+      <p:grpSpPr>
+        <a:xfrm>
+          <a:off x="0" y="0"/>
+          <a:ext cx="0" cy="0"/>
+          <a:chOff x="0" y="0"/>
+          <a:chExt cx="0" cy="0"/>
+        </a:xfrm>
+      </p:grpSpPr>
+      <p:sp>
+        <p:nvSpPr>
+          <p:cNvPr id="2" name="Title 1">
+            <a:extLst>
+              <a:ext uri="{FF2B5EF4-FFF2-40B4-BE49-F238E27FC236}">
+                <a16:creationId xmlns:a16="http://schemas.microsoft.com/office/drawing/2014/main" id="{A933AC59-3AD6-84EB-1158-DF3DADC2A6B8}"/>
+              </a:ext>
+            </a:extLst>
+          </p:cNvPr>
+          <p:cNvSpPr>
+            <a:spLocks noGrp="1"/>
+          </p:cNvSpPr>
+          <p:nvPr>
+            <p:ph type="title"/>
+          </p:nvPr>
+        </p:nvSpPr>
+        <p:spPr/>
+        <p:txBody>
+          <a:bodyPr/>
+          <a:lstStyle/>
+          <a:p>
+            <a:endParaRPr lang="en-US"/>
+          </a:p>
+        </p:txBody>
+      </p:sp>
+      <p:sp>
+        <p:nvSpPr>
+          <p:cNvPr id="3" name="Content Placeholder 2">
+            <a:extLst>
+              <a:ext uri="{FF2B5EF4-FFF2-40B4-BE49-F238E27FC236}">
+                <a16:creationId xmlns:a16="http://schemas.microsoft.com/office/drawing/2014/main" id="{CB1388A8-3B74-AAA5-A307-02DB16B2DC3F}"/>
+              </a:ext>
+            </a:extLst>
+          </p:cNvPr>
+          <p:cNvSpPr>
+            <a:spLocks noGrp="1"/>
+          </p:cNvSpPr>
+          <p:nvPr>
+            <p:ph idx="1"/>
+          </p:nvPr>
+        </p:nvSpPr>
+        <p:spPr/>
+        <p:txBody>
+          <a:bodyPr/>
+          <a:lstStyle/>
+          <a:p>
+            <a:endParaRPr lang="en-US"/>
+          </a:p>
+        </p:txBody>
+      </p:sp>
+      <p:pic>
+        <p:nvPicPr>
+          <p:cNvPr id="5" name="Picture 4">
+            <a:extLst>
+              <a:ext uri="{FF2B5EF4-FFF2-40B4-BE49-F238E27FC236}">
+                <a16:creationId xmlns:a16="http://schemas.microsoft.com/office/drawing/2014/main" id="{6A6FB6DA-1988-8CCA-499B-6C961ED81637}"/>
+              </a:ext>
+            </a:extLst>
+          </p:cNvPr>
+          <p:cNvPicPr>
+            <a:picLocks noChangeAspect="1"/>
+          </p:cNvPicPr>
+          <p:nvPr/>
+        </p:nvPicPr>
+        <p:blipFill>
+          <a:blip r:embed="rId2"/>
+          <a:stretch>
+            <a:fillRect/>
+          </a:stretch>
+        </p:blipFill>
+        <p:spPr>
+          <a:xfrm>
+            <a:off x="2093912" y="1633537"/>
+            <a:ext cx="8001000" cy="3590925"/>
+          </a:xfrm>
+          <a:prstGeom prst="rect">
+            <a:avLst/>
+          </a:prstGeom>
+        </p:spPr>
+      </p:pic>
+    </p:spTree>
+    <p:extLst>
+      <p:ext uri="{BB962C8B-B14F-4D97-AF65-F5344CB8AC3E}">
+        <p14:creationId xmlns:p14="http://schemas.microsoft.com/office/powerpoint/2010/main" val="3571115217"/>
       </p:ext>
     </p:extLst>
   </p:cSld>

</xml_diff>

<commit_message>
add 7-7 unit of length
</commit_message>
<xml_diff>
--- a/Python-with-Office-Video_Covers.pptx
+++ b/Python-with-Office-Video_Covers.pptx
@@ -5,10 +5,10 @@
     <p:sldMasterId id="2147483660" r:id="rId1"/>
   </p:sldMasterIdLst>
   <p:notesMasterIdLst>
-    <p:notesMasterId r:id="rId51"/>
+    <p:notesMasterId r:id="rId52"/>
   </p:notesMasterIdLst>
   <p:handoutMasterIdLst>
-    <p:handoutMasterId r:id="rId52"/>
+    <p:handoutMasterId r:id="rId53"/>
   </p:handoutMasterIdLst>
   <p:sldIdLst>
     <p:sldId id="257" r:id="rId2"/>
@@ -60,6 +60,7 @@
     <p:sldId id="303" r:id="rId48"/>
     <p:sldId id="304" r:id="rId49"/>
     <p:sldId id="306" r:id="rId50"/>
+    <p:sldId id="307" r:id="rId51"/>
   </p:sldIdLst>
   <p:sldSz cx="12188825" cy="6858000"/>
   <p:notesSz cx="6858000" cy="9144000"/>
@@ -4520,6 +4521,90 @@
     <p:extLst>
       <p:ext uri="{BB962C8B-B14F-4D97-AF65-F5344CB8AC3E}">
         <p14:creationId xmlns:p14="http://schemas.microsoft.com/office/powerpoint/2010/main" val="2930636943"/>
+      </p:ext>
+    </p:extLst>
+  </p:cSld>
+  <p:clrMapOvr>
+    <a:masterClrMapping/>
+  </p:clrMapOvr>
+</p:notes>
+</file>
+
+<file path=ppt/notesSlides/notesSlide50.xml><?xml version="1.0" encoding="utf-8"?>
+<p:notes xmlns:a="http://schemas.openxmlformats.org/drawingml/2006/main" xmlns:r="http://schemas.openxmlformats.org/officeDocument/2006/relationships" xmlns:p="http://schemas.openxmlformats.org/presentationml/2006/main">
+  <p:cSld>
+    <p:spTree>
+      <p:nvGrpSpPr>
+        <p:cNvPr id="1" name=""/>
+        <p:cNvGrpSpPr/>
+        <p:nvPr/>
+      </p:nvGrpSpPr>
+      <p:grpSpPr>
+        <a:xfrm>
+          <a:off x="0" y="0"/>
+          <a:ext cx="0" cy="0"/>
+          <a:chOff x="0" y="0"/>
+          <a:chExt cx="0" cy="0"/>
+        </a:xfrm>
+      </p:grpSpPr>
+      <p:sp>
+        <p:nvSpPr>
+          <p:cNvPr id="2" name="Slide Image Placeholder 1"/>
+          <p:cNvSpPr>
+            <a:spLocks noGrp="1" noRot="1" noChangeAspect="1"/>
+          </p:cNvSpPr>
+          <p:nvPr>
+            <p:ph type="sldImg"/>
+          </p:nvPr>
+        </p:nvSpPr>
+        <p:spPr/>
+      </p:sp>
+      <p:sp>
+        <p:nvSpPr>
+          <p:cNvPr id="3" name="Notes Placeholder 2"/>
+          <p:cNvSpPr>
+            <a:spLocks noGrp="1"/>
+          </p:cNvSpPr>
+          <p:nvPr>
+            <p:ph type="body" idx="1"/>
+          </p:nvPr>
+        </p:nvSpPr>
+        <p:spPr/>
+        <p:txBody>
+          <a:bodyPr/>
+          <a:lstStyle/>
+          <a:p>
+            <a:endParaRPr lang="en-US" dirty="0"/>
+          </a:p>
+        </p:txBody>
+      </p:sp>
+      <p:sp>
+        <p:nvSpPr>
+          <p:cNvPr id="4" name="Slide Number Placeholder 3"/>
+          <p:cNvSpPr>
+            <a:spLocks noGrp="1"/>
+          </p:cNvSpPr>
+          <p:nvPr>
+            <p:ph type="sldNum" sz="quarter" idx="10"/>
+          </p:nvPr>
+        </p:nvSpPr>
+        <p:spPr/>
+        <p:txBody>
+          <a:bodyPr/>
+          <a:lstStyle/>
+          <a:p>
+            <a:fld id="{6BB98AFB-CB0D-4DFE-87B9-B4B0D0DE73CD}" type="slidenum">
+              <a:rPr lang="en-US" smtClean="0"/>
+              <a:t>50</a:t>
+            </a:fld>
+            <a:endParaRPr lang="en-US" dirty="0"/>
+          </a:p>
+        </p:txBody>
+      </p:sp>
+    </p:spTree>
+    <p:extLst>
+      <p:ext uri="{BB962C8B-B14F-4D97-AF65-F5344CB8AC3E}">
+        <p14:creationId xmlns:p14="http://schemas.microsoft.com/office/powerpoint/2010/main" val="539788767"/>
       </p:ext>
     </p:extLst>
   </p:cSld>
@@ -25986,6 +26071,428 @@
       </p:transition>
     </mc:Choice>
     <mc:Fallback xmlns="">
+      <p:transition spd="med">
+        <p:fade/>
+      </p:transition>
+    </mc:Fallback>
+  </mc:AlternateContent>
+</p:sld>
+</file>
+
+<file path=ppt/slides/slide50.xml><?xml version="1.0" encoding="utf-8"?>
+<p:sld xmlns:a="http://schemas.openxmlformats.org/drawingml/2006/main" xmlns:r="http://schemas.openxmlformats.org/officeDocument/2006/relationships" xmlns:p="http://schemas.openxmlformats.org/presentationml/2006/main">
+  <p:cSld>
+    <p:spTree>
+      <p:nvGrpSpPr>
+        <p:cNvPr id="1" name=""/>
+        <p:cNvGrpSpPr/>
+        <p:nvPr/>
+      </p:nvGrpSpPr>
+      <p:grpSpPr>
+        <a:xfrm>
+          <a:off x="0" y="0"/>
+          <a:ext cx="0" cy="0"/>
+          <a:chOff x="0" y="0"/>
+          <a:chExt cx="0" cy="0"/>
+        </a:xfrm>
+      </p:grpSpPr>
+      <p:sp>
+        <p:nvSpPr>
+          <p:cNvPr id="4" name="Title 3"/>
+          <p:cNvSpPr>
+            <a:spLocks noGrp="1"/>
+          </p:cNvSpPr>
+          <p:nvPr>
+            <p:ph type="ctrTitle"/>
+          </p:nvPr>
+        </p:nvSpPr>
+        <p:spPr/>
+        <p:txBody>
+          <a:bodyPr>
+            <a:normAutofit/>
+          </a:bodyPr>
+          <a:lstStyle/>
+          <a:p>
+            <a:pPr algn="ctr"/>
+            <a:r>
+              <a:rPr lang="zh-CN" altLang="en-US" sz="4800" dirty="0">
+                <a:latin typeface="华文隶书" panose="02010800040101010101" pitchFamily="2" charset="-122"/>
+                <a:ea typeface="华文隶书" panose="02010800040101010101" pitchFamily="2" charset="-122"/>
+              </a:rPr>
+              <a:t>让</a:t>
+            </a:r>
+            <a:r>
+              <a:rPr lang="en-US" altLang="zh-CN" sz="4800" dirty="0">
+                <a:latin typeface="华文隶书" panose="02010800040101010101" pitchFamily="2" charset="-122"/>
+                <a:ea typeface="华文隶书" panose="02010800040101010101" pitchFamily="2" charset="-122"/>
+              </a:rPr>
+              <a:t>Python</a:t>
+            </a:r>
+            <a:r>
+              <a:rPr lang="zh-CN" altLang="en-US" sz="4800" dirty="0">
+                <a:latin typeface="华文隶书" panose="02010800040101010101" pitchFamily="2" charset="-122"/>
+                <a:ea typeface="华文隶书" panose="02010800040101010101" pitchFamily="2" charset="-122"/>
+              </a:rPr>
+              <a:t>遇上</a:t>
+            </a:r>
+            <a:r>
+              <a:rPr lang="en-US" altLang="zh-CN" sz="4800" dirty="0">
+                <a:latin typeface="华文隶书" panose="02010800040101010101" pitchFamily="2" charset="-122"/>
+                <a:ea typeface="华文隶书" panose="02010800040101010101" pitchFamily="2" charset="-122"/>
+              </a:rPr>
+              <a:t>Office</a:t>
+            </a:r>
+            <a:br>
+              <a:rPr lang="en-US" altLang="zh-CN" sz="4800" dirty="0">
+                <a:latin typeface="华文隶书" panose="02010800040101010101" pitchFamily="2" charset="-122"/>
+                <a:ea typeface="华文隶书" panose="02010800040101010101" pitchFamily="2" charset="-122"/>
+              </a:rPr>
+            </a:br>
+            <a:br>
+              <a:rPr lang="en-US" altLang="zh-CN" sz="4800" dirty="0">
+                <a:latin typeface="华文隶书" panose="02010800040101010101" pitchFamily="2" charset="-122"/>
+                <a:ea typeface="华文隶书" panose="02010800040101010101" pitchFamily="2" charset="-122"/>
+              </a:rPr>
+            </a:br>
+            <a:r>
+              <a:rPr lang="en-US" altLang="zh-CN" sz="4800" dirty="0">
+                <a:latin typeface="华文隶书" panose="02010800040101010101" pitchFamily="2" charset="-122"/>
+                <a:ea typeface="华文隶书" panose="02010800040101010101" pitchFamily="2" charset="-122"/>
+              </a:rPr>
+              <a:t>(Python with Office)</a:t>
+            </a:r>
+            <a:endParaRPr lang="en-US" sz="4800" dirty="0">
+              <a:latin typeface="华文隶书" panose="02010800040101010101" pitchFamily="2" charset="-122"/>
+              <a:ea typeface="华文隶书" panose="02010800040101010101" pitchFamily="2" charset="-122"/>
+            </a:endParaRPr>
+          </a:p>
+        </p:txBody>
+      </p:sp>
+      <p:sp>
+        <p:nvSpPr>
+          <p:cNvPr id="3" name="Content Placeholder 2"/>
+          <p:cNvSpPr>
+            <a:spLocks noGrp="1"/>
+          </p:cNvSpPr>
+          <p:nvPr>
+            <p:ph type="subTitle" idx="1"/>
+          </p:nvPr>
+        </p:nvSpPr>
+        <p:spPr>
+          <a:xfrm>
+            <a:off x="549796" y="3403600"/>
+            <a:ext cx="5544617" cy="2185640"/>
+          </a:xfrm>
+        </p:spPr>
+        <p:txBody>
+          <a:bodyPr>
+            <a:normAutofit/>
+          </a:bodyPr>
+          <a:lstStyle/>
+          <a:p>
+            <a:r>
+              <a:rPr lang="en-US" sz="2800" dirty="0">
+                <a:latin typeface="ADLaM Display" panose="020F0502020204030204" pitchFamily="2" charset="0"/>
+                <a:ea typeface="ADLaM Display" panose="020F0502020204030204" pitchFamily="2" charset="0"/>
+                <a:cs typeface="ADLaM Display" panose="020F0502020204030204" pitchFamily="2" charset="0"/>
+              </a:rPr>
+              <a:t>Chapter 7 Work with Word</a:t>
+            </a:r>
+          </a:p>
+          <a:p>
+            <a:r>
+              <a:rPr lang="en-US" sz="2800" dirty="0">
+                <a:latin typeface="ADLaM Display" panose="020F0502020204030204" pitchFamily="2" charset="0"/>
+                <a:ea typeface="ADLaM Display" panose="020F0502020204030204" pitchFamily="2" charset="0"/>
+                <a:cs typeface="ADLaM Display" panose="020F0502020204030204" pitchFamily="2" charset="0"/>
+              </a:rPr>
+              <a:t>7.7 Unit of Length</a:t>
+            </a:r>
+          </a:p>
+          <a:p>
+            <a:r>
+              <a:rPr lang="zh-CN" altLang="en-US" sz="2800" dirty="0">
+                <a:latin typeface="ADLaM Display" panose="020F0502020204030204" pitchFamily="2" charset="0"/>
+                <a:ea typeface="ADLaM Display" panose="020F0502020204030204" pitchFamily="2" charset="0"/>
+                <a:cs typeface="ADLaM Display" panose="020F0502020204030204" pitchFamily="2" charset="0"/>
+              </a:rPr>
+              <a:t>第七章 操作</a:t>
+            </a:r>
+            <a:r>
+              <a:rPr lang="en-US" altLang="zh-CN" sz="2800" dirty="0">
+                <a:latin typeface="ADLaM Display" panose="020F0502020204030204" pitchFamily="2" charset="0"/>
+                <a:ea typeface="ADLaM Display" panose="020F0502020204030204" pitchFamily="2" charset="0"/>
+                <a:cs typeface="ADLaM Display" panose="020F0502020204030204" pitchFamily="2" charset="0"/>
+              </a:rPr>
+              <a:t>Word</a:t>
+            </a:r>
+          </a:p>
+          <a:p>
+            <a:r>
+              <a:rPr lang="en-US" altLang="zh-CN" sz="2800" dirty="0">
+                <a:latin typeface="ADLaM Display" panose="020F0502020204030204" pitchFamily="2" charset="0"/>
+                <a:ea typeface="ADLaM Display" panose="020F0502020204030204" pitchFamily="2" charset="0"/>
+                <a:cs typeface="ADLaM Display" panose="020F0502020204030204" pitchFamily="2" charset="0"/>
+              </a:rPr>
+              <a:t>7.7 </a:t>
+            </a:r>
+            <a:r>
+              <a:rPr lang="zh-CN" altLang="en-US" sz="2800">
+                <a:latin typeface="ADLaM Display" panose="020F0502020204030204" pitchFamily="2" charset="0"/>
+                <a:ea typeface="ADLaM Display" panose="020F0502020204030204" pitchFamily="2" charset="0"/>
+                <a:cs typeface="ADLaM Display" panose="020F0502020204030204" pitchFamily="2" charset="0"/>
+              </a:rPr>
+              <a:t>长度单位</a:t>
+            </a:r>
+            <a:endParaRPr lang="en-US" altLang="zh-CN" sz="2800" dirty="0">
+              <a:latin typeface="ADLaM Display" panose="020F0502020204030204" pitchFamily="2" charset="0"/>
+              <a:ea typeface="ADLaM Display" panose="020F0502020204030204" pitchFamily="2" charset="0"/>
+              <a:cs typeface="ADLaM Display" panose="020F0502020204030204" pitchFamily="2" charset="0"/>
+            </a:endParaRPr>
+          </a:p>
+        </p:txBody>
+      </p:sp>
+      <p:pic>
+        <p:nvPicPr>
+          <p:cNvPr id="5" name="Picture 4">
+            <a:extLst>
+              <a:ext uri="{FF2B5EF4-FFF2-40B4-BE49-F238E27FC236}">
+                <a16:creationId xmlns:a16="http://schemas.microsoft.com/office/drawing/2014/main" id="{4AD8B85C-B359-195F-B78C-C879AB7840B1}"/>
+              </a:ext>
+            </a:extLst>
+          </p:cNvPr>
+          <p:cNvPicPr>
+            <a:picLocks noChangeAspect="1"/>
+          </p:cNvPicPr>
+          <p:nvPr/>
+        </p:nvPicPr>
+        <p:blipFill>
+          <a:blip r:embed="rId3"/>
+          <a:stretch>
+            <a:fillRect/>
+          </a:stretch>
+        </p:blipFill>
+        <p:spPr>
+          <a:xfrm>
+            <a:off x="57601" y="1189856"/>
+            <a:ext cx="1068259" cy="1556792"/>
+          </a:xfrm>
+          <a:prstGeom prst="rect">
+            <a:avLst/>
+          </a:prstGeom>
+          <a:ln>
+            <a:noFill/>
+          </a:ln>
+          <a:effectLst>
+            <a:outerShdw blurRad="292100" dist="139700" dir="2700000" algn="tl" rotWithShape="0">
+              <a:srgbClr val="333333">
+                <a:alpha val="65000"/>
+              </a:srgbClr>
+            </a:outerShdw>
+          </a:effectLst>
+        </p:spPr>
+      </p:pic>
+      <p:sp>
+        <p:nvSpPr>
+          <p:cNvPr id="2" name="TextBox 1">
+            <a:extLst>
+              <a:ext uri="{FF2B5EF4-FFF2-40B4-BE49-F238E27FC236}">
+                <a16:creationId xmlns:a16="http://schemas.microsoft.com/office/drawing/2014/main" id="{CAB2C784-DE74-68FC-7A84-3E6C5D164315}"/>
+              </a:ext>
+            </a:extLst>
+          </p:cNvPr>
+          <p:cNvSpPr txBox="1"/>
+          <p:nvPr/>
+        </p:nvSpPr>
+        <p:spPr>
+          <a:xfrm>
+            <a:off x="405780" y="5722972"/>
+            <a:ext cx="7951216" cy="523220"/>
+          </a:xfrm>
+          <a:prstGeom prst="rect">
+            <a:avLst/>
+          </a:prstGeom>
+          <a:solidFill>
+            <a:schemeClr val="bg1">
+              <a:lumMod val="95000"/>
+            </a:schemeClr>
+          </a:solidFill>
+          <a:ln>
+            <a:solidFill>
+              <a:schemeClr val="bg2"/>
+            </a:solidFill>
+          </a:ln>
+        </p:spPr>
+        <p:txBody>
+          <a:bodyPr wrap="none" rtlCol="0" anchor="ctr" anchorCtr="1">
+            <a:spAutoFit/>
+          </a:bodyPr>
+          <a:lstStyle/>
+          <a:p>
+            <a:r>
+              <a:rPr lang="en-US" sz="2800" dirty="0">
+                <a:hlinkClick r:id="rId4"/>
+              </a:rPr>
+              <a:t>https://github.com/yasenstar/python_with_office</a:t>
+            </a:r>
+            <a:endParaRPr lang="en-US" sz="2800" dirty="0"/>
+          </a:p>
+        </p:txBody>
+      </p:sp>
+      <p:sp>
+        <p:nvSpPr>
+          <p:cNvPr id="9" name="TextBox 8">
+            <a:extLst>
+              <a:ext uri="{FF2B5EF4-FFF2-40B4-BE49-F238E27FC236}">
+                <a16:creationId xmlns:a16="http://schemas.microsoft.com/office/drawing/2014/main" id="{C25C84F5-3AA3-A068-7E2F-9123CA5A7D16}"/>
+              </a:ext>
+            </a:extLst>
+          </p:cNvPr>
+          <p:cNvSpPr txBox="1"/>
+          <p:nvPr/>
+        </p:nvSpPr>
+        <p:spPr>
+          <a:xfrm>
+            <a:off x="405780" y="6246192"/>
+            <a:ext cx="7951216" cy="523220"/>
+          </a:xfrm>
+          <a:prstGeom prst="rect">
+            <a:avLst/>
+          </a:prstGeom>
+          <a:solidFill>
+            <a:schemeClr val="bg1">
+              <a:lumMod val="95000"/>
+            </a:schemeClr>
+          </a:solidFill>
+          <a:ln>
+            <a:solidFill>
+              <a:schemeClr val="bg2"/>
+            </a:solidFill>
+          </a:ln>
+        </p:spPr>
+        <p:txBody>
+          <a:bodyPr wrap="square" rtlCol="0" anchor="ctr" anchorCtr="1">
+            <a:spAutoFit/>
+          </a:bodyPr>
+          <a:lstStyle/>
+          <a:p>
+            <a:r>
+              <a:rPr lang="en-US" sz="2800" dirty="0">
+                <a:hlinkClick r:id="rId5"/>
+              </a:rPr>
+              <a:t>https://gitee.com/yasenstar/python_with_office</a:t>
+            </a:r>
+            <a:endParaRPr lang="en-US" sz="2800" dirty="0"/>
+          </a:p>
+        </p:txBody>
+      </p:sp>
+      <p:pic>
+        <p:nvPicPr>
+          <p:cNvPr id="7" name="Picture 6">
+            <a:extLst>
+              <a:ext uri="{FF2B5EF4-FFF2-40B4-BE49-F238E27FC236}">
+                <a16:creationId xmlns:a16="http://schemas.microsoft.com/office/drawing/2014/main" id="{4C2BC6C5-565B-030D-9A3B-A9B83DCEC919}"/>
+              </a:ext>
+            </a:extLst>
+          </p:cNvPr>
+          <p:cNvPicPr>
+            <a:picLocks noChangeAspect="1"/>
+          </p:cNvPicPr>
+          <p:nvPr/>
+        </p:nvPicPr>
+        <p:blipFill>
+          <a:blip r:embed="rId6"/>
+          <a:stretch>
+            <a:fillRect/>
+          </a:stretch>
+        </p:blipFill>
+        <p:spPr>
+          <a:xfrm>
+            <a:off x="6310436" y="533400"/>
+            <a:ext cx="5004967" cy="5075659"/>
+          </a:xfrm>
+          <a:prstGeom prst="rect">
+            <a:avLst/>
+          </a:prstGeom>
+          <a:ln>
+            <a:noFill/>
+          </a:ln>
+          <a:effectLst>
+            <a:outerShdw blurRad="292100" dist="139700" dir="2700000" algn="tl" rotWithShape="0">
+              <a:srgbClr val="333333">
+                <a:alpha val="65000"/>
+              </a:srgbClr>
+            </a:outerShdw>
+          </a:effectLst>
+        </p:spPr>
+      </p:pic>
+      <p:sp>
+        <p:nvSpPr>
+          <p:cNvPr id="13" name="Rectangle 12">
+            <a:extLst>
+              <a:ext uri="{FF2B5EF4-FFF2-40B4-BE49-F238E27FC236}">
+                <a16:creationId xmlns:a16="http://schemas.microsoft.com/office/drawing/2014/main" id="{6F9C3126-4EC2-77CA-B408-E23CE9AE8E9D}"/>
+              </a:ext>
+            </a:extLst>
+          </p:cNvPr>
+          <p:cNvSpPr/>
+          <p:nvPr/>
+        </p:nvSpPr>
+        <p:spPr>
+          <a:xfrm>
+            <a:off x="7822605" y="2348880"/>
+            <a:ext cx="3384376" cy="1944216"/>
+          </a:xfrm>
+          <a:prstGeom prst="rect">
+            <a:avLst/>
+          </a:prstGeom>
+          <a:noFill/>
+          <a:ln w="38100">
+            <a:solidFill>
+              <a:srgbClr val="FF0000"/>
+            </a:solidFill>
+          </a:ln>
+        </p:spPr>
+        <p:style>
+          <a:lnRef idx="2">
+            <a:schemeClr val="accent3"/>
+          </a:lnRef>
+          <a:fillRef idx="1">
+            <a:schemeClr val="lt1"/>
+          </a:fillRef>
+          <a:effectRef idx="0">
+            <a:schemeClr val="accent3"/>
+          </a:effectRef>
+          <a:fontRef idx="minor">
+            <a:schemeClr val="dk1"/>
+          </a:fontRef>
+        </p:style>
+        <p:txBody>
+          <a:bodyPr rtlCol="0" anchor="ctr"/>
+          <a:lstStyle/>
+          <a:p>
+            <a:pPr algn="ctr"/>
+            <a:endParaRPr lang="en-US" dirty="0"/>
+          </a:p>
+        </p:txBody>
+      </p:sp>
+    </p:spTree>
+    <p:extLst>
+      <p:ext uri="{BB962C8B-B14F-4D97-AF65-F5344CB8AC3E}">
+        <p14:creationId xmlns:p14="http://schemas.microsoft.com/office/powerpoint/2010/main" val="3777438237"/>
+      </p:ext>
+    </p:extLst>
+  </p:cSld>
+  <p:clrMapOvr>
+    <a:masterClrMapping/>
+  </p:clrMapOvr>
+  <mc:AlternateContent xmlns:mc="http://schemas.openxmlformats.org/markup-compatibility/2006">
+    <mc:Choice xmlns:p14="http://schemas.microsoft.com/office/powerpoint/2010/main" Requires="p14">
+      <p:transition spd="med" p14:dur="700">
+        <p:fade/>
+      </p:transition>
+    </mc:Choice>
+    <mc:Fallback>
       <p:transition spd="med">
         <p:fade/>
       </p:transition>

</xml_diff>

<commit_message>
add 7-9 part 1
</commit_message>
<xml_diff>
--- a/Python-with-Office-Video_Covers.pptx
+++ b/Python-with-Office-Video_Covers.pptx
@@ -5,10 +5,10 @@
     <p:sldMasterId id="2147483660" r:id="rId1"/>
   </p:sldMasterIdLst>
   <p:notesMasterIdLst>
-    <p:notesMasterId r:id="rId54"/>
+    <p:notesMasterId r:id="rId56"/>
   </p:notesMasterIdLst>
   <p:handoutMasterIdLst>
-    <p:handoutMasterId r:id="rId55"/>
+    <p:handoutMasterId r:id="rId57"/>
   </p:handoutMasterIdLst>
   <p:sldIdLst>
     <p:sldId id="257" r:id="rId2"/>
@@ -63,6 +63,8 @@
     <p:sldId id="307" r:id="rId51"/>
     <p:sldId id="308" r:id="rId52"/>
     <p:sldId id="309" r:id="rId53"/>
+    <p:sldId id="310" r:id="rId54"/>
+    <p:sldId id="311" r:id="rId55"/>
   </p:sldIdLst>
   <p:sldSz cx="12188825" cy="6858000"/>
   <p:notesSz cx="6858000" cy="9144000"/>
@@ -325,7 +327,7 @@
           <a:p>
             <a:fld id="{24CE221E-83ED-4F6C-BA5F-3F9E6FDB6953}" type="datetimeFigureOut">
               <a:rPr lang="en-US"/>
-              <a:t>12/6/2023</a:t>
+              <a:t>12/9/2023</a:t>
             </a:fld>
             <a:endParaRPr dirty="0"/>
           </a:p>
@@ -490,7 +492,7 @@
           <a:p>
             <a:fld id="{97853E5F-CE67-483C-A264-F17AC70E9CA2}" type="datetimeFigureOut">
               <a:rPr lang="en-US"/>
-              <a:t>12/6/2023</a:t>
+              <a:t>12/9/2023</a:t>
             </a:fld>
             <a:endParaRPr dirty="0"/>
           </a:p>
@@ -4784,6 +4786,174 @@
 </p:notes>
 </file>
 
+<file path=ppt/notesSlides/notesSlide53.xml><?xml version="1.0" encoding="utf-8"?>
+<p:notes xmlns:a="http://schemas.openxmlformats.org/drawingml/2006/main" xmlns:r="http://schemas.openxmlformats.org/officeDocument/2006/relationships" xmlns:p="http://schemas.openxmlformats.org/presentationml/2006/main">
+  <p:cSld>
+    <p:spTree>
+      <p:nvGrpSpPr>
+        <p:cNvPr id="1" name=""/>
+        <p:cNvGrpSpPr/>
+        <p:nvPr/>
+      </p:nvGrpSpPr>
+      <p:grpSpPr>
+        <a:xfrm>
+          <a:off x="0" y="0"/>
+          <a:ext cx="0" cy="0"/>
+          <a:chOff x="0" y="0"/>
+          <a:chExt cx="0" cy="0"/>
+        </a:xfrm>
+      </p:grpSpPr>
+      <p:sp>
+        <p:nvSpPr>
+          <p:cNvPr id="2" name="Slide Image Placeholder 1"/>
+          <p:cNvSpPr>
+            <a:spLocks noGrp="1" noRot="1" noChangeAspect="1"/>
+          </p:cNvSpPr>
+          <p:nvPr>
+            <p:ph type="sldImg"/>
+          </p:nvPr>
+        </p:nvSpPr>
+        <p:spPr/>
+      </p:sp>
+      <p:sp>
+        <p:nvSpPr>
+          <p:cNvPr id="3" name="Notes Placeholder 2"/>
+          <p:cNvSpPr>
+            <a:spLocks noGrp="1"/>
+          </p:cNvSpPr>
+          <p:nvPr>
+            <p:ph type="body" idx="1"/>
+          </p:nvPr>
+        </p:nvSpPr>
+        <p:spPr/>
+        <p:txBody>
+          <a:bodyPr/>
+          <a:lstStyle/>
+          <a:p>
+            <a:endParaRPr lang="en-US" dirty="0"/>
+          </a:p>
+        </p:txBody>
+      </p:sp>
+      <p:sp>
+        <p:nvSpPr>
+          <p:cNvPr id="4" name="Slide Number Placeholder 3"/>
+          <p:cNvSpPr>
+            <a:spLocks noGrp="1"/>
+          </p:cNvSpPr>
+          <p:nvPr>
+            <p:ph type="sldNum" sz="quarter" idx="10"/>
+          </p:nvPr>
+        </p:nvSpPr>
+        <p:spPr/>
+        <p:txBody>
+          <a:bodyPr/>
+          <a:lstStyle/>
+          <a:p>
+            <a:fld id="{6BB98AFB-CB0D-4DFE-87B9-B4B0D0DE73CD}" type="slidenum">
+              <a:rPr lang="en-US" smtClean="0"/>
+              <a:t>53</a:t>
+            </a:fld>
+            <a:endParaRPr lang="en-US" dirty="0"/>
+          </a:p>
+        </p:txBody>
+      </p:sp>
+    </p:spTree>
+    <p:extLst>
+      <p:ext uri="{BB962C8B-B14F-4D97-AF65-F5344CB8AC3E}">
+        <p14:creationId xmlns:p14="http://schemas.microsoft.com/office/powerpoint/2010/main" val="267938931"/>
+      </p:ext>
+    </p:extLst>
+  </p:cSld>
+  <p:clrMapOvr>
+    <a:masterClrMapping/>
+  </p:clrMapOvr>
+</p:notes>
+</file>
+
+<file path=ppt/notesSlides/notesSlide54.xml><?xml version="1.0" encoding="utf-8"?>
+<p:notes xmlns:a="http://schemas.openxmlformats.org/drawingml/2006/main" xmlns:r="http://schemas.openxmlformats.org/officeDocument/2006/relationships" xmlns:p="http://schemas.openxmlformats.org/presentationml/2006/main">
+  <p:cSld>
+    <p:spTree>
+      <p:nvGrpSpPr>
+        <p:cNvPr id="1" name=""/>
+        <p:cNvGrpSpPr/>
+        <p:nvPr/>
+      </p:nvGrpSpPr>
+      <p:grpSpPr>
+        <a:xfrm>
+          <a:off x="0" y="0"/>
+          <a:ext cx="0" cy="0"/>
+          <a:chOff x="0" y="0"/>
+          <a:chExt cx="0" cy="0"/>
+        </a:xfrm>
+      </p:grpSpPr>
+      <p:sp>
+        <p:nvSpPr>
+          <p:cNvPr id="2" name="Slide Image Placeholder 1"/>
+          <p:cNvSpPr>
+            <a:spLocks noGrp="1" noRot="1" noChangeAspect="1"/>
+          </p:cNvSpPr>
+          <p:nvPr>
+            <p:ph type="sldImg"/>
+          </p:nvPr>
+        </p:nvSpPr>
+        <p:spPr/>
+      </p:sp>
+      <p:sp>
+        <p:nvSpPr>
+          <p:cNvPr id="3" name="Notes Placeholder 2"/>
+          <p:cNvSpPr>
+            <a:spLocks noGrp="1"/>
+          </p:cNvSpPr>
+          <p:nvPr>
+            <p:ph type="body" idx="1"/>
+          </p:nvPr>
+        </p:nvSpPr>
+        <p:spPr/>
+        <p:txBody>
+          <a:bodyPr/>
+          <a:lstStyle/>
+          <a:p>
+            <a:endParaRPr lang="en-US" dirty="0"/>
+          </a:p>
+        </p:txBody>
+      </p:sp>
+      <p:sp>
+        <p:nvSpPr>
+          <p:cNvPr id="4" name="Slide Number Placeholder 3"/>
+          <p:cNvSpPr>
+            <a:spLocks noGrp="1"/>
+          </p:cNvSpPr>
+          <p:nvPr>
+            <p:ph type="sldNum" sz="quarter" idx="10"/>
+          </p:nvPr>
+        </p:nvSpPr>
+        <p:spPr/>
+        <p:txBody>
+          <a:bodyPr/>
+          <a:lstStyle/>
+          <a:p>
+            <a:fld id="{6BB98AFB-CB0D-4DFE-87B9-B4B0D0DE73CD}" type="slidenum">
+              <a:rPr lang="en-US" smtClean="0"/>
+              <a:t>54</a:t>
+            </a:fld>
+            <a:endParaRPr lang="en-US" dirty="0"/>
+          </a:p>
+        </p:txBody>
+      </p:sp>
+    </p:spTree>
+    <p:extLst>
+      <p:ext uri="{BB962C8B-B14F-4D97-AF65-F5344CB8AC3E}">
+        <p14:creationId xmlns:p14="http://schemas.microsoft.com/office/powerpoint/2010/main" val="1636547325"/>
+      </p:ext>
+    </p:extLst>
+  </p:cSld>
+  <p:clrMapOvr>
+    <a:masterClrMapping/>
+  </p:clrMapOvr>
+</p:notes>
+</file>
+
 <file path=ppt/notesSlides/notesSlide6.xml><?xml version="1.0" encoding="utf-8"?>
 <p:notes xmlns:a="http://schemas.openxmlformats.org/drawingml/2006/main" xmlns:r="http://schemas.openxmlformats.org/officeDocument/2006/relationships" xmlns:p="http://schemas.openxmlformats.org/presentationml/2006/main">
   <p:cSld>
@@ -5366,7 +5536,7 @@
           <a:p>
             <a:fld id="{3E0FA9E5-6744-4841-888F-9E7CC0C2B7EC}" type="datetimeFigureOut">
               <a:rPr lang="en-US" smtClean="0"/>
-              <a:t>12/6/2023</a:t>
+              <a:t>12/9/2023</a:t>
             </a:fld>
             <a:endParaRPr lang="en-US" dirty="0"/>
           </a:p>
@@ -5556,7 +5726,7 @@
           <a:p>
             <a:fld id="{3E0FA9E5-6744-4841-888F-9E7CC0C2B7EC}" type="datetimeFigureOut">
               <a:rPr lang="en-US" smtClean="0"/>
-              <a:t>12/6/2023</a:t>
+              <a:t>12/9/2023</a:t>
             </a:fld>
             <a:endParaRPr lang="en-US" dirty="0"/>
           </a:p>
@@ -5751,7 +5921,7 @@
           <a:p>
             <a:fld id="{3E0FA9E5-6744-4841-888F-9E7CC0C2B7EC}" type="datetimeFigureOut">
               <a:rPr lang="en-US" smtClean="0"/>
-              <a:t>12/6/2023</a:t>
+              <a:t>12/9/2023</a:t>
             </a:fld>
             <a:endParaRPr lang="en-US" dirty="0"/>
           </a:p>
@@ -5936,7 +6106,7 @@
           <a:p>
             <a:fld id="{3E0FA9E5-6744-4841-888F-9E7CC0C2B7EC}" type="datetimeFigureOut">
               <a:rPr lang="en-US" smtClean="0"/>
-              <a:t>12/6/2023</a:t>
+              <a:t>12/9/2023</a:t>
             </a:fld>
             <a:endParaRPr lang="en-US" dirty="0"/>
           </a:p>
@@ -6205,7 +6375,7 @@
           <a:p>
             <a:fld id="{3E0FA9E5-6744-4841-888F-9E7CC0C2B7EC}" type="datetimeFigureOut">
               <a:rPr lang="en-US" smtClean="0"/>
-              <a:t>12/6/2023</a:t>
+              <a:t>12/9/2023</a:t>
             </a:fld>
             <a:endParaRPr lang="en-US" dirty="0"/>
           </a:p>
@@ -6512,7 +6682,7 @@
           <a:p>
             <a:fld id="{3E0FA9E5-6744-4841-888F-9E7CC0C2B7EC}" type="datetimeFigureOut">
               <a:rPr lang="en-US" smtClean="0"/>
-              <a:t>12/6/2023</a:t>
+              <a:t>12/9/2023</a:t>
             </a:fld>
             <a:endParaRPr lang="en-US" dirty="0"/>
           </a:p>
@@ -6968,7 +7138,7 @@
           <a:p>
             <a:fld id="{3E0FA9E5-6744-4841-888F-9E7CC0C2B7EC}" type="datetimeFigureOut">
               <a:rPr lang="en-US" smtClean="0"/>
-              <a:t>12/6/2023</a:t>
+              <a:t>12/9/2023</a:t>
             </a:fld>
             <a:endParaRPr lang="en-US" dirty="0"/>
           </a:p>
@@ -7101,7 +7271,7 @@
           <a:p>
             <a:fld id="{3E0FA9E5-6744-4841-888F-9E7CC0C2B7EC}" type="datetimeFigureOut">
               <a:rPr lang="en-US" smtClean="0"/>
-              <a:t>12/6/2023</a:t>
+              <a:t>12/9/2023</a:t>
             </a:fld>
             <a:endParaRPr lang="en-US" dirty="0"/>
           </a:p>
@@ -7211,7 +7381,7 @@
           <a:p>
             <a:fld id="{3E0FA9E5-6744-4841-888F-9E7CC0C2B7EC}" type="datetimeFigureOut">
               <a:rPr lang="en-US" smtClean="0"/>
-              <a:t>12/6/2023</a:t>
+              <a:t>12/9/2023</a:t>
             </a:fld>
             <a:endParaRPr lang="en-US" dirty="0"/>
           </a:p>
@@ -7522,7 +7692,7 @@
           <a:p>
             <a:fld id="{3E0FA9E5-6744-4841-888F-9E7CC0C2B7EC}" type="datetimeFigureOut">
               <a:rPr lang="en-US" smtClean="0"/>
-              <a:t>12/6/2023</a:t>
+              <a:t>12/9/2023</a:t>
             </a:fld>
             <a:endParaRPr lang="en-US" dirty="0"/>
           </a:p>
@@ -7999,7 +8169,7 @@
             <a:fld id="{3E0FA9E5-6744-4841-888F-9E7CC0C2B7EC}" type="datetimeFigureOut">
               <a:rPr lang="en-US" smtClean="0"/>
               <a:pPr/>
-              <a:t>12/6/2023</a:t>
+              <a:t>12/9/2023</a:t>
             </a:fld>
             <a:endParaRPr lang="en-US" dirty="0"/>
           </a:p>
@@ -27112,10 +27282,10 @@
       </p:grpSpPr>
       <p:pic>
         <p:nvPicPr>
-          <p:cNvPr id="7" name="Picture 6">
+          <p:cNvPr id="8" name="Picture 7">
             <a:extLst>
               <a:ext uri="{FF2B5EF4-FFF2-40B4-BE49-F238E27FC236}">
-                <a16:creationId xmlns:a16="http://schemas.microsoft.com/office/drawing/2014/main" id="{0B04749E-D6D9-D65F-8966-C065420263BB}"/>
+                <a16:creationId xmlns:a16="http://schemas.microsoft.com/office/drawing/2014/main" id="{6D8702CA-8A3A-14B1-64FA-90B5B7190072}"/>
               </a:ext>
             </a:extLst>
           </p:cNvPr>
@@ -27132,8 +27302,8 @@
         </p:blipFill>
         <p:spPr>
           <a:xfrm>
-            <a:off x="6153341" y="454832"/>
-            <a:ext cx="5499997" cy="5186337"/>
+            <a:off x="6166773" y="418356"/>
+            <a:ext cx="4608159" cy="5273782"/>
           </a:xfrm>
           <a:prstGeom prst="rect">
             <a:avLst/>
@@ -27260,7 +27430,7 @@
                 <a:ea typeface="ADLaM Display" panose="020F0502020204030204" pitchFamily="2" charset="0"/>
                 <a:cs typeface="ADLaM Display" panose="020F0502020204030204" pitchFamily="2" charset="0"/>
               </a:rPr>
-              <a:t>7.9 Work with Images</a:t>
+              <a:t>7.9 Work with Pictures (1)</a:t>
             </a:r>
           </a:p>
           <a:p>
@@ -27296,13 +27466,16 @@
                 <a:ea typeface="ADLaM Display" panose="020F0502020204030204" pitchFamily="2" charset="0"/>
                 <a:cs typeface="ADLaM Display" panose="020F0502020204030204" pitchFamily="2" charset="0"/>
               </a:rPr>
-              <a:t>插入图像</a:t>
-            </a:r>
-            <a:endParaRPr lang="en-US" altLang="zh-CN" sz="2800" dirty="0">
-              <a:latin typeface="ADLaM Display" panose="020F0502020204030204" pitchFamily="2" charset="0"/>
-              <a:ea typeface="ADLaM Display" panose="020F0502020204030204" pitchFamily="2" charset="0"/>
-              <a:cs typeface="ADLaM Display" panose="020F0502020204030204" pitchFamily="2" charset="0"/>
-            </a:endParaRPr>
+              <a:t>插入图像 </a:t>
+            </a:r>
+            <a:r>
+              <a:rPr lang="en-US" altLang="zh-CN" sz="2800" dirty="0">
+                <a:latin typeface="ADLaM Display" panose="020F0502020204030204" pitchFamily="2" charset="0"/>
+                <a:ea typeface="ADLaM Display" panose="020F0502020204030204" pitchFamily="2" charset="0"/>
+                <a:cs typeface="ADLaM Display" panose="020F0502020204030204" pitchFamily="2" charset="0"/>
+              </a:rPr>
+              <a:t>(1)</a:t>
+            </a:r>
           </a:p>
         </p:txBody>
       </p:sp>
@@ -27454,8 +27627,8 @@
         </p:nvSpPr>
         <p:spPr>
           <a:xfrm>
-            <a:off x="7822604" y="2924944"/>
-            <a:ext cx="3888431" cy="2088232"/>
+            <a:off x="7822605" y="2924944"/>
+            <a:ext cx="2808312" cy="288032"/>
           </a:xfrm>
           <a:prstGeom prst="rect">
             <a:avLst/>
@@ -27500,13 +27673,895 @@
   <p:clrMapOvr>
     <a:masterClrMapping/>
   </p:clrMapOvr>
-  <mc:AlternateContent xmlns:mc="http://schemas.openxmlformats.org/markup-compatibility/2006">
-    <mc:Choice xmlns:p14="http://schemas.microsoft.com/office/powerpoint/2010/main" Requires="p14">
+  <mc:AlternateContent xmlns:mc="http://schemas.openxmlformats.org/markup-compatibility/2006" xmlns:p14="http://schemas.microsoft.com/office/powerpoint/2010/main">
+    <mc:Choice Requires="p14">
       <p:transition spd="med" p14:dur="700">
         <p:fade/>
       </p:transition>
     </mc:Choice>
-    <mc:Fallback>
+    <mc:Fallback xmlns="">
+      <p:transition spd="med">
+        <p:fade/>
+      </p:transition>
+    </mc:Fallback>
+  </mc:AlternateContent>
+</p:sld>
+</file>
+
+<file path=ppt/slides/slide53.xml><?xml version="1.0" encoding="utf-8"?>
+<p:sld xmlns:a="http://schemas.openxmlformats.org/drawingml/2006/main" xmlns:r="http://schemas.openxmlformats.org/officeDocument/2006/relationships" xmlns:p="http://schemas.openxmlformats.org/presentationml/2006/main">
+  <p:cSld>
+    <p:spTree>
+      <p:nvGrpSpPr>
+        <p:cNvPr id="1" name=""/>
+        <p:cNvGrpSpPr/>
+        <p:nvPr/>
+      </p:nvGrpSpPr>
+      <p:grpSpPr>
+        <a:xfrm>
+          <a:off x="0" y="0"/>
+          <a:ext cx="0" cy="0"/>
+          <a:chOff x="0" y="0"/>
+          <a:chExt cx="0" cy="0"/>
+        </a:xfrm>
+      </p:grpSpPr>
+      <p:sp>
+        <p:nvSpPr>
+          <p:cNvPr id="4" name="Title 3"/>
+          <p:cNvSpPr>
+            <a:spLocks noGrp="1"/>
+          </p:cNvSpPr>
+          <p:nvPr>
+            <p:ph type="ctrTitle"/>
+          </p:nvPr>
+        </p:nvSpPr>
+        <p:spPr/>
+        <p:txBody>
+          <a:bodyPr>
+            <a:normAutofit/>
+          </a:bodyPr>
+          <a:lstStyle/>
+          <a:p>
+            <a:pPr algn="ctr"/>
+            <a:r>
+              <a:rPr lang="zh-CN" altLang="en-US" sz="4800" dirty="0">
+                <a:latin typeface="华文隶书" panose="02010800040101010101" pitchFamily="2" charset="-122"/>
+                <a:ea typeface="华文隶书" panose="02010800040101010101" pitchFamily="2" charset="-122"/>
+              </a:rPr>
+              <a:t>让</a:t>
+            </a:r>
+            <a:r>
+              <a:rPr lang="en-US" altLang="zh-CN" sz="4800" dirty="0">
+                <a:latin typeface="华文隶书" panose="02010800040101010101" pitchFamily="2" charset="-122"/>
+                <a:ea typeface="华文隶书" panose="02010800040101010101" pitchFamily="2" charset="-122"/>
+              </a:rPr>
+              <a:t>Python</a:t>
+            </a:r>
+            <a:r>
+              <a:rPr lang="zh-CN" altLang="en-US" sz="4800" dirty="0">
+                <a:latin typeface="华文隶书" panose="02010800040101010101" pitchFamily="2" charset="-122"/>
+                <a:ea typeface="华文隶书" panose="02010800040101010101" pitchFamily="2" charset="-122"/>
+              </a:rPr>
+              <a:t>遇上</a:t>
+            </a:r>
+            <a:r>
+              <a:rPr lang="en-US" altLang="zh-CN" sz="4800" dirty="0">
+                <a:latin typeface="华文隶书" panose="02010800040101010101" pitchFamily="2" charset="-122"/>
+                <a:ea typeface="华文隶书" panose="02010800040101010101" pitchFamily="2" charset="-122"/>
+              </a:rPr>
+              <a:t>Office</a:t>
+            </a:r>
+            <a:br>
+              <a:rPr lang="en-US" altLang="zh-CN" sz="4800" dirty="0">
+                <a:latin typeface="华文隶书" panose="02010800040101010101" pitchFamily="2" charset="-122"/>
+                <a:ea typeface="华文隶书" panose="02010800040101010101" pitchFamily="2" charset="-122"/>
+              </a:rPr>
+            </a:br>
+            <a:br>
+              <a:rPr lang="en-US" altLang="zh-CN" sz="4800" dirty="0">
+                <a:latin typeface="华文隶书" panose="02010800040101010101" pitchFamily="2" charset="-122"/>
+                <a:ea typeface="华文隶书" panose="02010800040101010101" pitchFamily="2" charset="-122"/>
+              </a:rPr>
+            </a:br>
+            <a:r>
+              <a:rPr lang="en-US" altLang="zh-CN" sz="4800" dirty="0">
+                <a:latin typeface="华文隶书" panose="02010800040101010101" pitchFamily="2" charset="-122"/>
+                <a:ea typeface="华文隶书" panose="02010800040101010101" pitchFamily="2" charset="-122"/>
+              </a:rPr>
+              <a:t>(Python with Office)</a:t>
+            </a:r>
+            <a:endParaRPr lang="en-US" sz="4800" dirty="0">
+              <a:latin typeface="华文隶书" panose="02010800040101010101" pitchFamily="2" charset="-122"/>
+              <a:ea typeface="华文隶书" panose="02010800040101010101" pitchFamily="2" charset="-122"/>
+            </a:endParaRPr>
+          </a:p>
+        </p:txBody>
+      </p:sp>
+      <p:sp>
+        <p:nvSpPr>
+          <p:cNvPr id="3" name="Content Placeholder 2"/>
+          <p:cNvSpPr>
+            <a:spLocks noGrp="1"/>
+          </p:cNvSpPr>
+          <p:nvPr>
+            <p:ph type="subTitle" idx="1"/>
+          </p:nvPr>
+        </p:nvSpPr>
+        <p:spPr>
+          <a:xfrm>
+            <a:off x="549796" y="3403600"/>
+            <a:ext cx="5544617" cy="2185640"/>
+          </a:xfrm>
+        </p:spPr>
+        <p:txBody>
+          <a:bodyPr>
+            <a:normAutofit/>
+          </a:bodyPr>
+          <a:lstStyle/>
+          <a:p>
+            <a:r>
+              <a:rPr lang="en-US" sz="2800" dirty="0">
+                <a:latin typeface="ADLaM Display" panose="020F0502020204030204" pitchFamily="2" charset="0"/>
+                <a:ea typeface="ADLaM Display" panose="020F0502020204030204" pitchFamily="2" charset="0"/>
+                <a:cs typeface="ADLaM Display" panose="020F0502020204030204" pitchFamily="2" charset="0"/>
+              </a:rPr>
+              <a:t>Chapter 7 Work with Word</a:t>
+            </a:r>
+          </a:p>
+          <a:p>
+            <a:r>
+              <a:rPr lang="en-US" sz="2800" dirty="0">
+                <a:latin typeface="ADLaM Display" panose="020F0502020204030204" pitchFamily="2" charset="0"/>
+                <a:ea typeface="ADLaM Display" panose="020F0502020204030204" pitchFamily="2" charset="0"/>
+                <a:cs typeface="ADLaM Display" panose="020F0502020204030204" pitchFamily="2" charset="0"/>
+              </a:rPr>
+              <a:t>7.9 Work with </a:t>
+            </a:r>
+            <a:r>
+              <a:rPr lang="en-US" altLang="zh-CN" sz="2800" dirty="0">
+                <a:latin typeface="ADLaM Display" panose="020F0502020204030204" pitchFamily="2" charset="0"/>
+                <a:ea typeface="ADLaM Display" panose="020F0502020204030204" pitchFamily="2" charset="0"/>
+                <a:cs typeface="ADLaM Display" panose="020F0502020204030204" pitchFamily="2" charset="0"/>
+              </a:rPr>
+              <a:t>Pictures</a:t>
+            </a:r>
+            <a:r>
+              <a:rPr lang="en-US" sz="2800" dirty="0">
+                <a:latin typeface="ADLaM Display" panose="020F0502020204030204" pitchFamily="2" charset="0"/>
+                <a:ea typeface="ADLaM Display" panose="020F0502020204030204" pitchFamily="2" charset="0"/>
+                <a:cs typeface="ADLaM Display" panose="020F0502020204030204" pitchFamily="2" charset="0"/>
+              </a:rPr>
+              <a:t> (2)</a:t>
+            </a:r>
+          </a:p>
+          <a:p>
+            <a:r>
+              <a:rPr lang="zh-CN" altLang="en-US" sz="2800" dirty="0">
+                <a:latin typeface="ADLaM Display" panose="020F0502020204030204" pitchFamily="2" charset="0"/>
+                <a:ea typeface="ADLaM Display" panose="020F0502020204030204" pitchFamily="2" charset="0"/>
+                <a:cs typeface="ADLaM Display" panose="020F0502020204030204" pitchFamily="2" charset="0"/>
+              </a:rPr>
+              <a:t>第七章 操作</a:t>
+            </a:r>
+            <a:r>
+              <a:rPr lang="en-US" altLang="zh-CN" sz="2800" dirty="0">
+                <a:latin typeface="ADLaM Display" panose="020F0502020204030204" pitchFamily="2" charset="0"/>
+                <a:ea typeface="ADLaM Display" panose="020F0502020204030204" pitchFamily="2" charset="0"/>
+                <a:cs typeface="ADLaM Display" panose="020F0502020204030204" pitchFamily="2" charset="0"/>
+              </a:rPr>
+              <a:t>Word</a:t>
+            </a:r>
+          </a:p>
+          <a:p>
+            <a:r>
+              <a:rPr lang="en-US" altLang="zh-CN" sz="2800" dirty="0">
+                <a:latin typeface="ADLaM Display" panose="020F0502020204030204" pitchFamily="2" charset="0"/>
+                <a:ea typeface="ADLaM Display" panose="020F0502020204030204" pitchFamily="2" charset="0"/>
+                <a:cs typeface="ADLaM Display" panose="020F0502020204030204" pitchFamily="2" charset="0"/>
+              </a:rPr>
+              <a:t>7.9 </a:t>
+            </a:r>
+            <a:r>
+              <a:rPr lang="zh-CN" altLang="en-US" sz="2800" dirty="0">
+                <a:latin typeface="ADLaM Display" panose="020F0502020204030204" pitchFamily="2" charset="0"/>
+                <a:ea typeface="ADLaM Display" panose="020F0502020204030204" pitchFamily="2" charset="0"/>
+                <a:cs typeface="ADLaM Display" panose="020F0502020204030204" pitchFamily="2" charset="0"/>
+              </a:rPr>
+              <a:t>插入图像 </a:t>
+            </a:r>
+            <a:r>
+              <a:rPr lang="en-US" altLang="zh-CN" sz="2800" dirty="0">
+                <a:latin typeface="ADLaM Display" panose="020F0502020204030204" pitchFamily="2" charset="0"/>
+                <a:ea typeface="ADLaM Display" panose="020F0502020204030204" pitchFamily="2" charset="0"/>
+                <a:cs typeface="ADLaM Display" panose="020F0502020204030204" pitchFamily="2" charset="0"/>
+              </a:rPr>
+              <a:t>(2)</a:t>
+            </a:r>
+          </a:p>
+        </p:txBody>
+      </p:sp>
+      <p:pic>
+        <p:nvPicPr>
+          <p:cNvPr id="5" name="Picture 4">
+            <a:extLst>
+              <a:ext uri="{FF2B5EF4-FFF2-40B4-BE49-F238E27FC236}">
+                <a16:creationId xmlns:a16="http://schemas.microsoft.com/office/drawing/2014/main" id="{4AD8B85C-B359-195F-B78C-C879AB7840B1}"/>
+              </a:ext>
+            </a:extLst>
+          </p:cNvPr>
+          <p:cNvPicPr>
+            <a:picLocks noChangeAspect="1"/>
+          </p:cNvPicPr>
+          <p:nvPr/>
+        </p:nvPicPr>
+        <p:blipFill>
+          <a:blip r:embed="rId3"/>
+          <a:stretch>
+            <a:fillRect/>
+          </a:stretch>
+        </p:blipFill>
+        <p:spPr>
+          <a:xfrm>
+            <a:off x="57601" y="1189856"/>
+            <a:ext cx="1068259" cy="1556792"/>
+          </a:xfrm>
+          <a:prstGeom prst="rect">
+            <a:avLst/>
+          </a:prstGeom>
+          <a:ln>
+            <a:noFill/>
+          </a:ln>
+          <a:effectLst>
+            <a:outerShdw blurRad="292100" dist="139700" dir="2700000" algn="tl" rotWithShape="0">
+              <a:srgbClr val="333333">
+                <a:alpha val="65000"/>
+              </a:srgbClr>
+            </a:outerShdw>
+          </a:effectLst>
+        </p:spPr>
+      </p:pic>
+      <p:sp>
+        <p:nvSpPr>
+          <p:cNvPr id="2" name="TextBox 1">
+            <a:extLst>
+              <a:ext uri="{FF2B5EF4-FFF2-40B4-BE49-F238E27FC236}">
+                <a16:creationId xmlns:a16="http://schemas.microsoft.com/office/drawing/2014/main" id="{CAB2C784-DE74-68FC-7A84-3E6C5D164315}"/>
+              </a:ext>
+            </a:extLst>
+          </p:cNvPr>
+          <p:cNvSpPr txBox="1"/>
+          <p:nvPr/>
+        </p:nvSpPr>
+        <p:spPr>
+          <a:xfrm>
+            <a:off x="405780" y="5722972"/>
+            <a:ext cx="7951216" cy="523220"/>
+          </a:xfrm>
+          <a:prstGeom prst="rect">
+            <a:avLst/>
+          </a:prstGeom>
+          <a:solidFill>
+            <a:schemeClr val="bg1">
+              <a:lumMod val="95000"/>
+            </a:schemeClr>
+          </a:solidFill>
+          <a:ln>
+            <a:solidFill>
+              <a:schemeClr val="bg2"/>
+            </a:solidFill>
+          </a:ln>
+        </p:spPr>
+        <p:txBody>
+          <a:bodyPr wrap="none" rtlCol="0" anchor="ctr" anchorCtr="1">
+            <a:spAutoFit/>
+          </a:bodyPr>
+          <a:lstStyle/>
+          <a:p>
+            <a:r>
+              <a:rPr lang="en-US" sz="2800" dirty="0">
+                <a:hlinkClick r:id="rId4"/>
+              </a:rPr>
+              <a:t>https://github.com/yasenstar/python_with_office</a:t>
+            </a:r>
+            <a:endParaRPr lang="en-US" sz="2800" dirty="0"/>
+          </a:p>
+        </p:txBody>
+      </p:sp>
+      <p:sp>
+        <p:nvSpPr>
+          <p:cNvPr id="9" name="TextBox 8">
+            <a:extLst>
+              <a:ext uri="{FF2B5EF4-FFF2-40B4-BE49-F238E27FC236}">
+                <a16:creationId xmlns:a16="http://schemas.microsoft.com/office/drawing/2014/main" id="{C25C84F5-3AA3-A068-7E2F-9123CA5A7D16}"/>
+              </a:ext>
+            </a:extLst>
+          </p:cNvPr>
+          <p:cNvSpPr txBox="1"/>
+          <p:nvPr/>
+        </p:nvSpPr>
+        <p:spPr>
+          <a:xfrm>
+            <a:off x="405780" y="6246192"/>
+            <a:ext cx="7951216" cy="523220"/>
+          </a:xfrm>
+          <a:prstGeom prst="rect">
+            <a:avLst/>
+          </a:prstGeom>
+          <a:solidFill>
+            <a:schemeClr val="bg1">
+              <a:lumMod val="95000"/>
+            </a:schemeClr>
+          </a:solidFill>
+          <a:ln>
+            <a:solidFill>
+              <a:schemeClr val="bg2"/>
+            </a:solidFill>
+          </a:ln>
+        </p:spPr>
+        <p:txBody>
+          <a:bodyPr wrap="square" rtlCol="0" anchor="ctr" anchorCtr="1">
+            <a:spAutoFit/>
+          </a:bodyPr>
+          <a:lstStyle/>
+          <a:p>
+            <a:r>
+              <a:rPr lang="en-US" sz="2800" dirty="0">
+                <a:hlinkClick r:id="rId5"/>
+              </a:rPr>
+              <a:t>https://gitee.com/yasenstar/python_with_office</a:t>
+            </a:r>
+            <a:endParaRPr lang="en-US" sz="2800" dirty="0"/>
+          </a:p>
+        </p:txBody>
+      </p:sp>
+      <p:pic>
+        <p:nvPicPr>
+          <p:cNvPr id="6" name="Picture 5">
+            <a:extLst>
+              <a:ext uri="{FF2B5EF4-FFF2-40B4-BE49-F238E27FC236}">
+                <a16:creationId xmlns:a16="http://schemas.microsoft.com/office/drawing/2014/main" id="{AC70259A-A958-5D0A-DE40-69F3B50DCF17}"/>
+              </a:ext>
+            </a:extLst>
+          </p:cNvPr>
+          <p:cNvPicPr>
+            <a:picLocks noChangeAspect="1"/>
+          </p:cNvPicPr>
+          <p:nvPr/>
+        </p:nvPicPr>
+        <p:blipFill>
+          <a:blip r:embed="rId6"/>
+          <a:stretch>
+            <a:fillRect/>
+          </a:stretch>
+        </p:blipFill>
+        <p:spPr>
+          <a:xfrm>
+            <a:off x="6166773" y="418356"/>
+            <a:ext cx="4608159" cy="5273782"/>
+          </a:xfrm>
+          <a:prstGeom prst="rect">
+            <a:avLst/>
+          </a:prstGeom>
+          <a:ln>
+            <a:noFill/>
+          </a:ln>
+          <a:effectLst>
+            <a:outerShdw blurRad="292100" dist="139700" dir="2700000" algn="tl" rotWithShape="0">
+              <a:srgbClr val="333333">
+                <a:alpha val="65000"/>
+              </a:srgbClr>
+            </a:outerShdw>
+          </a:effectLst>
+        </p:spPr>
+      </p:pic>
+      <p:sp>
+        <p:nvSpPr>
+          <p:cNvPr id="8" name="Rectangle 7">
+            <a:extLst>
+              <a:ext uri="{FF2B5EF4-FFF2-40B4-BE49-F238E27FC236}">
+                <a16:creationId xmlns:a16="http://schemas.microsoft.com/office/drawing/2014/main" id="{BF240C6B-5810-C38F-A5D9-138DB3FF9663}"/>
+              </a:ext>
+            </a:extLst>
+          </p:cNvPr>
+          <p:cNvSpPr/>
+          <p:nvPr/>
+        </p:nvSpPr>
+        <p:spPr>
+          <a:xfrm>
+            <a:off x="7822605" y="3212976"/>
+            <a:ext cx="2808312" cy="936104"/>
+          </a:xfrm>
+          <a:prstGeom prst="rect">
+            <a:avLst/>
+          </a:prstGeom>
+          <a:noFill/>
+          <a:ln w="38100">
+            <a:solidFill>
+              <a:srgbClr val="FF0000"/>
+            </a:solidFill>
+          </a:ln>
+        </p:spPr>
+        <p:style>
+          <a:lnRef idx="2">
+            <a:schemeClr val="accent3"/>
+          </a:lnRef>
+          <a:fillRef idx="1">
+            <a:schemeClr val="lt1"/>
+          </a:fillRef>
+          <a:effectRef idx="0">
+            <a:schemeClr val="accent3"/>
+          </a:effectRef>
+          <a:fontRef idx="minor">
+            <a:schemeClr val="dk1"/>
+          </a:fontRef>
+        </p:style>
+        <p:txBody>
+          <a:bodyPr rtlCol="0" anchor="ctr"/>
+          <a:lstStyle/>
+          <a:p>
+            <a:pPr algn="ctr"/>
+            <a:endParaRPr lang="en-US" dirty="0"/>
+          </a:p>
+        </p:txBody>
+      </p:sp>
+    </p:spTree>
+    <p:extLst>
+      <p:ext uri="{BB962C8B-B14F-4D97-AF65-F5344CB8AC3E}">
+        <p14:creationId xmlns:p14="http://schemas.microsoft.com/office/powerpoint/2010/main" val="2323535501"/>
+      </p:ext>
+    </p:extLst>
+  </p:cSld>
+  <p:clrMapOvr>
+    <a:masterClrMapping/>
+  </p:clrMapOvr>
+  <mc:AlternateContent xmlns:mc="http://schemas.openxmlformats.org/markup-compatibility/2006" xmlns:p14="http://schemas.microsoft.com/office/powerpoint/2010/main">
+    <mc:Choice Requires="p14">
+      <p:transition spd="med" p14:dur="700">
+        <p:fade/>
+      </p:transition>
+    </mc:Choice>
+    <mc:Fallback xmlns="">
+      <p:transition spd="med">
+        <p:fade/>
+      </p:transition>
+    </mc:Fallback>
+  </mc:AlternateContent>
+</p:sld>
+</file>
+
+<file path=ppt/slides/slide54.xml><?xml version="1.0" encoding="utf-8"?>
+<p:sld xmlns:a="http://schemas.openxmlformats.org/drawingml/2006/main" xmlns:r="http://schemas.openxmlformats.org/officeDocument/2006/relationships" xmlns:p="http://schemas.openxmlformats.org/presentationml/2006/main">
+  <p:cSld>
+    <p:spTree>
+      <p:nvGrpSpPr>
+        <p:cNvPr id="1" name=""/>
+        <p:cNvGrpSpPr/>
+        <p:nvPr/>
+      </p:nvGrpSpPr>
+      <p:grpSpPr>
+        <a:xfrm>
+          <a:off x="0" y="0"/>
+          <a:ext cx="0" cy="0"/>
+          <a:chOff x="0" y="0"/>
+          <a:chExt cx="0" cy="0"/>
+        </a:xfrm>
+      </p:grpSpPr>
+      <p:sp>
+        <p:nvSpPr>
+          <p:cNvPr id="4" name="Title 3"/>
+          <p:cNvSpPr>
+            <a:spLocks noGrp="1"/>
+          </p:cNvSpPr>
+          <p:nvPr>
+            <p:ph type="ctrTitle"/>
+          </p:nvPr>
+        </p:nvSpPr>
+        <p:spPr/>
+        <p:txBody>
+          <a:bodyPr>
+            <a:normAutofit/>
+          </a:bodyPr>
+          <a:lstStyle/>
+          <a:p>
+            <a:pPr algn="ctr"/>
+            <a:r>
+              <a:rPr lang="zh-CN" altLang="en-US" sz="4800" dirty="0">
+                <a:latin typeface="华文隶书" panose="02010800040101010101" pitchFamily="2" charset="-122"/>
+                <a:ea typeface="华文隶书" panose="02010800040101010101" pitchFamily="2" charset="-122"/>
+              </a:rPr>
+              <a:t>让</a:t>
+            </a:r>
+            <a:r>
+              <a:rPr lang="en-US" altLang="zh-CN" sz="4800" dirty="0">
+                <a:latin typeface="华文隶书" panose="02010800040101010101" pitchFamily="2" charset="-122"/>
+                <a:ea typeface="华文隶书" panose="02010800040101010101" pitchFamily="2" charset="-122"/>
+              </a:rPr>
+              <a:t>Python</a:t>
+            </a:r>
+            <a:r>
+              <a:rPr lang="zh-CN" altLang="en-US" sz="4800" dirty="0">
+                <a:latin typeface="华文隶书" panose="02010800040101010101" pitchFamily="2" charset="-122"/>
+                <a:ea typeface="华文隶书" panose="02010800040101010101" pitchFamily="2" charset="-122"/>
+              </a:rPr>
+              <a:t>遇上</a:t>
+            </a:r>
+            <a:r>
+              <a:rPr lang="en-US" altLang="zh-CN" sz="4800" dirty="0">
+                <a:latin typeface="华文隶书" panose="02010800040101010101" pitchFamily="2" charset="-122"/>
+                <a:ea typeface="华文隶书" panose="02010800040101010101" pitchFamily="2" charset="-122"/>
+              </a:rPr>
+              <a:t>Office</a:t>
+            </a:r>
+            <a:br>
+              <a:rPr lang="en-US" altLang="zh-CN" sz="4800" dirty="0">
+                <a:latin typeface="华文隶书" panose="02010800040101010101" pitchFamily="2" charset="-122"/>
+                <a:ea typeface="华文隶书" panose="02010800040101010101" pitchFamily="2" charset="-122"/>
+              </a:rPr>
+            </a:br>
+            <a:br>
+              <a:rPr lang="en-US" altLang="zh-CN" sz="4800" dirty="0">
+                <a:latin typeface="华文隶书" panose="02010800040101010101" pitchFamily="2" charset="-122"/>
+                <a:ea typeface="华文隶书" panose="02010800040101010101" pitchFamily="2" charset="-122"/>
+              </a:rPr>
+            </a:br>
+            <a:r>
+              <a:rPr lang="en-US" altLang="zh-CN" sz="4800" dirty="0">
+                <a:latin typeface="华文隶书" panose="02010800040101010101" pitchFamily="2" charset="-122"/>
+                <a:ea typeface="华文隶书" panose="02010800040101010101" pitchFamily="2" charset="-122"/>
+              </a:rPr>
+              <a:t>(Python with Office)</a:t>
+            </a:r>
+            <a:endParaRPr lang="en-US" sz="4800" dirty="0">
+              <a:latin typeface="华文隶书" panose="02010800040101010101" pitchFamily="2" charset="-122"/>
+              <a:ea typeface="华文隶书" panose="02010800040101010101" pitchFamily="2" charset="-122"/>
+            </a:endParaRPr>
+          </a:p>
+        </p:txBody>
+      </p:sp>
+      <p:sp>
+        <p:nvSpPr>
+          <p:cNvPr id="3" name="Content Placeholder 2"/>
+          <p:cNvSpPr>
+            <a:spLocks noGrp="1"/>
+          </p:cNvSpPr>
+          <p:nvPr>
+            <p:ph type="subTitle" idx="1"/>
+          </p:nvPr>
+        </p:nvSpPr>
+        <p:spPr>
+          <a:xfrm>
+            <a:off x="549796" y="3403600"/>
+            <a:ext cx="5544617" cy="2185640"/>
+          </a:xfrm>
+        </p:spPr>
+        <p:txBody>
+          <a:bodyPr>
+            <a:normAutofit/>
+          </a:bodyPr>
+          <a:lstStyle/>
+          <a:p>
+            <a:r>
+              <a:rPr lang="en-US" sz="2800" dirty="0">
+                <a:latin typeface="ADLaM Display" panose="020F0502020204030204" pitchFamily="2" charset="0"/>
+                <a:ea typeface="ADLaM Display" panose="020F0502020204030204" pitchFamily="2" charset="0"/>
+                <a:cs typeface="ADLaM Display" panose="020F0502020204030204" pitchFamily="2" charset="0"/>
+              </a:rPr>
+              <a:t>Chapter 7 Work with Word</a:t>
+            </a:r>
+          </a:p>
+          <a:p>
+            <a:r>
+              <a:rPr lang="en-US" sz="2800" dirty="0">
+                <a:latin typeface="ADLaM Display" panose="020F0502020204030204" pitchFamily="2" charset="0"/>
+                <a:ea typeface="ADLaM Display" panose="020F0502020204030204" pitchFamily="2" charset="0"/>
+                <a:cs typeface="ADLaM Display" panose="020F0502020204030204" pitchFamily="2" charset="0"/>
+              </a:rPr>
+              <a:t>7.9 Work with </a:t>
+            </a:r>
+            <a:r>
+              <a:rPr lang="en-US" altLang="zh-CN" sz="2800" dirty="0">
+                <a:latin typeface="ADLaM Display" panose="020F0502020204030204" pitchFamily="2" charset="0"/>
+                <a:ea typeface="ADLaM Display" panose="020F0502020204030204" pitchFamily="2" charset="0"/>
+                <a:cs typeface="ADLaM Display" panose="020F0502020204030204" pitchFamily="2" charset="0"/>
+              </a:rPr>
+              <a:t>Pictures</a:t>
+            </a:r>
+            <a:r>
+              <a:rPr lang="en-US" sz="2800" dirty="0">
+                <a:latin typeface="ADLaM Display" panose="020F0502020204030204" pitchFamily="2" charset="0"/>
+                <a:ea typeface="ADLaM Display" panose="020F0502020204030204" pitchFamily="2" charset="0"/>
+                <a:cs typeface="ADLaM Display" panose="020F0502020204030204" pitchFamily="2" charset="0"/>
+              </a:rPr>
+              <a:t> (3)</a:t>
+            </a:r>
+          </a:p>
+          <a:p>
+            <a:r>
+              <a:rPr lang="zh-CN" altLang="en-US" sz="2800" dirty="0">
+                <a:latin typeface="ADLaM Display" panose="020F0502020204030204" pitchFamily="2" charset="0"/>
+                <a:ea typeface="ADLaM Display" panose="020F0502020204030204" pitchFamily="2" charset="0"/>
+                <a:cs typeface="ADLaM Display" panose="020F0502020204030204" pitchFamily="2" charset="0"/>
+              </a:rPr>
+              <a:t>第七章 操作</a:t>
+            </a:r>
+            <a:r>
+              <a:rPr lang="en-US" altLang="zh-CN" sz="2800" dirty="0">
+                <a:latin typeface="ADLaM Display" panose="020F0502020204030204" pitchFamily="2" charset="0"/>
+                <a:ea typeface="ADLaM Display" panose="020F0502020204030204" pitchFamily="2" charset="0"/>
+                <a:cs typeface="ADLaM Display" panose="020F0502020204030204" pitchFamily="2" charset="0"/>
+              </a:rPr>
+              <a:t>Word</a:t>
+            </a:r>
+          </a:p>
+          <a:p>
+            <a:r>
+              <a:rPr lang="en-US" altLang="zh-CN" sz="2800" dirty="0">
+                <a:latin typeface="ADLaM Display" panose="020F0502020204030204" pitchFamily="2" charset="0"/>
+                <a:ea typeface="ADLaM Display" panose="020F0502020204030204" pitchFamily="2" charset="0"/>
+                <a:cs typeface="ADLaM Display" panose="020F0502020204030204" pitchFamily="2" charset="0"/>
+              </a:rPr>
+              <a:t>7.9 </a:t>
+            </a:r>
+            <a:r>
+              <a:rPr lang="zh-CN" altLang="en-US" sz="2800" dirty="0">
+                <a:latin typeface="ADLaM Display" panose="020F0502020204030204" pitchFamily="2" charset="0"/>
+                <a:ea typeface="ADLaM Display" panose="020F0502020204030204" pitchFamily="2" charset="0"/>
+                <a:cs typeface="ADLaM Display" panose="020F0502020204030204" pitchFamily="2" charset="0"/>
+              </a:rPr>
+              <a:t>插入图像 </a:t>
+            </a:r>
+            <a:r>
+              <a:rPr lang="en-US" altLang="zh-CN" sz="2800" dirty="0">
+                <a:latin typeface="ADLaM Display" panose="020F0502020204030204" pitchFamily="2" charset="0"/>
+                <a:ea typeface="ADLaM Display" panose="020F0502020204030204" pitchFamily="2" charset="0"/>
+                <a:cs typeface="ADLaM Display" panose="020F0502020204030204" pitchFamily="2" charset="0"/>
+              </a:rPr>
+              <a:t>(3)</a:t>
+            </a:r>
+          </a:p>
+        </p:txBody>
+      </p:sp>
+      <p:pic>
+        <p:nvPicPr>
+          <p:cNvPr id="5" name="Picture 4">
+            <a:extLst>
+              <a:ext uri="{FF2B5EF4-FFF2-40B4-BE49-F238E27FC236}">
+                <a16:creationId xmlns:a16="http://schemas.microsoft.com/office/drawing/2014/main" id="{4AD8B85C-B359-195F-B78C-C879AB7840B1}"/>
+              </a:ext>
+            </a:extLst>
+          </p:cNvPr>
+          <p:cNvPicPr>
+            <a:picLocks noChangeAspect="1"/>
+          </p:cNvPicPr>
+          <p:nvPr/>
+        </p:nvPicPr>
+        <p:blipFill>
+          <a:blip r:embed="rId3"/>
+          <a:stretch>
+            <a:fillRect/>
+          </a:stretch>
+        </p:blipFill>
+        <p:spPr>
+          <a:xfrm>
+            <a:off x="57601" y="1189856"/>
+            <a:ext cx="1068259" cy="1556792"/>
+          </a:xfrm>
+          <a:prstGeom prst="rect">
+            <a:avLst/>
+          </a:prstGeom>
+          <a:ln>
+            <a:noFill/>
+          </a:ln>
+          <a:effectLst>
+            <a:outerShdw blurRad="292100" dist="139700" dir="2700000" algn="tl" rotWithShape="0">
+              <a:srgbClr val="333333">
+                <a:alpha val="65000"/>
+              </a:srgbClr>
+            </a:outerShdw>
+          </a:effectLst>
+        </p:spPr>
+      </p:pic>
+      <p:sp>
+        <p:nvSpPr>
+          <p:cNvPr id="2" name="TextBox 1">
+            <a:extLst>
+              <a:ext uri="{FF2B5EF4-FFF2-40B4-BE49-F238E27FC236}">
+                <a16:creationId xmlns:a16="http://schemas.microsoft.com/office/drawing/2014/main" id="{CAB2C784-DE74-68FC-7A84-3E6C5D164315}"/>
+              </a:ext>
+            </a:extLst>
+          </p:cNvPr>
+          <p:cNvSpPr txBox="1"/>
+          <p:nvPr/>
+        </p:nvSpPr>
+        <p:spPr>
+          <a:xfrm>
+            <a:off x="405780" y="5722972"/>
+            <a:ext cx="7951216" cy="523220"/>
+          </a:xfrm>
+          <a:prstGeom prst="rect">
+            <a:avLst/>
+          </a:prstGeom>
+          <a:solidFill>
+            <a:schemeClr val="bg1">
+              <a:lumMod val="95000"/>
+            </a:schemeClr>
+          </a:solidFill>
+          <a:ln>
+            <a:solidFill>
+              <a:schemeClr val="bg2"/>
+            </a:solidFill>
+          </a:ln>
+        </p:spPr>
+        <p:txBody>
+          <a:bodyPr wrap="none" rtlCol="0" anchor="ctr" anchorCtr="1">
+            <a:spAutoFit/>
+          </a:bodyPr>
+          <a:lstStyle/>
+          <a:p>
+            <a:r>
+              <a:rPr lang="en-US" sz="2800" dirty="0">
+                <a:hlinkClick r:id="rId4"/>
+              </a:rPr>
+              <a:t>https://github.com/yasenstar/python_with_office</a:t>
+            </a:r>
+            <a:endParaRPr lang="en-US" sz="2800" dirty="0"/>
+          </a:p>
+        </p:txBody>
+      </p:sp>
+      <p:sp>
+        <p:nvSpPr>
+          <p:cNvPr id="9" name="TextBox 8">
+            <a:extLst>
+              <a:ext uri="{FF2B5EF4-FFF2-40B4-BE49-F238E27FC236}">
+                <a16:creationId xmlns:a16="http://schemas.microsoft.com/office/drawing/2014/main" id="{C25C84F5-3AA3-A068-7E2F-9123CA5A7D16}"/>
+              </a:ext>
+            </a:extLst>
+          </p:cNvPr>
+          <p:cNvSpPr txBox="1"/>
+          <p:nvPr/>
+        </p:nvSpPr>
+        <p:spPr>
+          <a:xfrm>
+            <a:off x="405780" y="6246192"/>
+            <a:ext cx="7951216" cy="523220"/>
+          </a:xfrm>
+          <a:prstGeom prst="rect">
+            <a:avLst/>
+          </a:prstGeom>
+          <a:solidFill>
+            <a:schemeClr val="bg1">
+              <a:lumMod val="95000"/>
+            </a:schemeClr>
+          </a:solidFill>
+          <a:ln>
+            <a:solidFill>
+              <a:schemeClr val="bg2"/>
+            </a:solidFill>
+          </a:ln>
+        </p:spPr>
+        <p:txBody>
+          <a:bodyPr wrap="square" rtlCol="0" anchor="ctr" anchorCtr="1">
+            <a:spAutoFit/>
+          </a:bodyPr>
+          <a:lstStyle/>
+          <a:p>
+            <a:r>
+              <a:rPr lang="en-US" sz="2800" dirty="0">
+                <a:hlinkClick r:id="rId5"/>
+              </a:rPr>
+              <a:t>https://gitee.com/yasenstar/python_with_office</a:t>
+            </a:r>
+            <a:endParaRPr lang="en-US" sz="2800" dirty="0"/>
+          </a:p>
+        </p:txBody>
+      </p:sp>
+      <p:pic>
+        <p:nvPicPr>
+          <p:cNvPr id="6" name="Picture 5">
+            <a:extLst>
+              <a:ext uri="{FF2B5EF4-FFF2-40B4-BE49-F238E27FC236}">
+                <a16:creationId xmlns:a16="http://schemas.microsoft.com/office/drawing/2014/main" id="{AC70259A-A958-5D0A-DE40-69F3B50DCF17}"/>
+              </a:ext>
+            </a:extLst>
+          </p:cNvPr>
+          <p:cNvPicPr>
+            <a:picLocks noChangeAspect="1"/>
+          </p:cNvPicPr>
+          <p:nvPr/>
+        </p:nvPicPr>
+        <p:blipFill>
+          <a:blip r:embed="rId6"/>
+          <a:stretch>
+            <a:fillRect/>
+          </a:stretch>
+        </p:blipFill>
+        <p:spPr>
+          <a:xfrm>
+            <a:off x="6166773" y="418356"/>
+            <a:ext cx="4608159" cy="5273782"/>
+          </a:xfrm>
+          <a:prstGeom prst="rect">
+            <a:avLst/>
+          </a:prstGeom>
+          <a:ln>
+            <a:noFill/>
+          </a:ln>
+          <a:effectLst>
+            <a:outerShdw blurRad="292100" dist="139700" dir="2700000" algn="tl" rotWithShape="0">
+              <a:srgbClr val="333333">
+                <a:alpha val="65000"/>
+              </a:srgbClr>
+            </a:outerShdw>
+          </a:effectLst>
+        </p:spPr>
+      </p:pic>
+      <p:sp>
+        <p:nvSpPr>
+          <p:cNvPr id="8" name="Rectangle 7">
+            <a:extLst>
+              <a:ext uri="{FF2B5EF4-FFF2-40B4-BE49-F238E27FC236}">
+                <a16:creationId xmlns:a16="http://schemas.microsoft.com/office/drawing/2014/main" id="{BF240C6B-5810-C38F-A5D9-138DB3FF9663}"/>
+              </a:ext>
+            </a:extLst>
+          </p:cNvPr>
+          <p:cNvSpPr/>
+          <p:nvPr/>
+        </p:nvSpPr>
+        <p:spPr>
+          <a:xfrm>
+            <a:off x="7822605" y="4077072"/>
+            <a:ext cx="2808312" cy="864096"/>
+          </a:xfrm>
+          <a:prstGeom prst="rect">
+            <a:avLst/>
+          </a:prstGeom>
+          <a:noFill/>
+          <a:ln w="38100">
+            <a:solidFill>
+              <a:srgbClr val="FF0000"/>
+            </a:solidFill>
+          </a:ln>
+        </p:spPr>
+        <p:style>
+          <a:lnRef idx="2">
+            <a:schemeClr val="accent3"/>
+          </a:lnRef>
+          <a:fillRef idx="1">
+            <a:schemeClr val="lt1"/>
+          </a:fillRef>
+          <a:effectRef idx="0">
+            <a:schemeClr val="accent3"/>
+          </a:effectRef>
+          <a:fontRef idx="minor">
+            <a:schemeClr val="dk1"/>
+          </a:fontRef>
+        </p:style>
+        <p:txBody>
+          <a:bodyPr rtlCol="0" anchor="ctr"/>
+          <a:lstStyle/>
+          <a:p>
+            <a:pPr algn="ctr"/>
+            <a:endParaRPr lang="en-US" dirty="0"/>
+          </a:p>
+        </p:txBody>
+      </p:sp>
+    </p:spTree>
+    <p:extLst>
+      <p:ext uri="{BB962C8B-B14F-4D97-AF65-F5344CB8AC3E}">
+        <p14:creationId xmlns:p14="http://schemas.microsoft.com/office/powerpoint/2010/main" val="1328237252"/>
+      </p:ext>
+    </p:extLst>
+  </p:cSld>
+  <p:clrMapOvr>
+    <a:masterClrMapping/>
+  </p:clrMapOvr>
+  <mc:AlternateContent xmlns:mc="http://schemas.openxmlformats.org/markup-compatibility/2006" xmlns:p14="http://schemas.microsoft.com/office/powerpoint/2010/main">
+    <mc:Choice Requires="p14">
+      <p:transition spd="med" p14:dur="700">
+        <p:fade/>
+      </p:transition>
+    </mc:Choice>
+    <mc:Fallback xmlns="">
       <p:transition spd="med">
         <p:fade/>
       </p:transition>

</xml_diff>

<commit_message>
add 7-10 part 1 and 2
</commit_message>
<xml_diff>
--- a/Python-with-Office-Video_Covers.pptx
+++ b/Python-with-Office-Video_Covers.pptx
@@ -5,10 +5,10 @@
     <p:sldMasterId id="2147483660" r:id="rId1"/>
   </p:sldMasterIdLst>
   <p:notesMasterIdLst>
-    <p:notesMasterId r:id="rId57"/>
+    <p:notesMasterId r:id="rId59"/>
   </p:notesMasterIdLst>
   <p:handoutMasterIdLst>
-    <p:handoutMasterId r:id="rId58"/>
+    <p:handoutMasterId r:id="rId60"/>
   </p:handoutMasterIdLst>
   <p:sldIdLst>
     <p:sldId id="257" r:id="rId2"/>
@@ -66,6 +66,8 @@
     <p:sldId id="310" r:id="rId54"/>
     <p:sldId id="311" r:id="rId55"/>
     <p:sldId id="312" r:id="rId56"/>
+    <p:sldId id="313" r:id="rId57"/>
+    <p:sldId id="314" r:id="rId58"/>
   </p:sldIdLst>
   <p:sldSz cx="12188825" cy="6858000"/>
   <p:notesSz cx="6858000" cy="9144000"/>
@@ -5030,6 +5032,174 @@
     <p:extLst>
       <p:ext uri="{BB962C8B-B14F-4D97-AF65-F5344CB8AC3E}">
         <p14:creationId xmlns:p14="http://schemas.microsoft.com/office/powerpoint/2010/main" val="3686532888"/>
+      </p:ext>
+    </p:extLst>
+  </p:cSld>
+  <p:clrMapOvr>
+    <a:masterClrMapping/>
+  </p:clrMapOvr>
+</p:notes>
+</file>
+
+<file path=ppt/notesSlides/notesSlide56.xml><?xml version="1.0" encoding="utf-8"?>
+<p:notes xmlns:a="http://schemas.openxmlformats.org/drawingml/2006/main" xmlns:r="http://schemas.openxmlformats.org/officeDocument/2006/relationships" xmlns:p="http://schemas.openxmlformats.org/presentationml/2006/main">
+  <p:cSld>
+    <p:spTree>
+      <p:nvGrpSpPr>
+        <p:cNvPr id="1" name=""/>
+        <p:cNvGrpSpPr/>
+        <p:nvPr/>
+      </p:nvGrpSpPr>
+      <p:grpSpPr>
+        <a:xfrm>
+          <a:off x="0" y="0"/>
+          <a:ext cx="0" cy="0"/>
+          <a:chOff x="0" y="0"/>
+          <a:chExt cx="0" cy="0"/>
+        </a:xfrm>
+      </p:grpSpPr>
+      <p:sp>
+        <p:nvSpPr>
+          <p:cNvPr id="2" name="Slide Image Placeholder 1"/>
+          <p:cNvSpPr>
+            <a:spLocks noGrp="1" noRot="1" noChangeAspect="1"/>
+          </p:cNvSpPr>
+          <p:nvPr>
+            <p:ph type="sldImg"/>
+          </p:nvPr>
+        </p:nvSpPr>
+        <p:spPr/>
+      </p:sp>
+      <p:sp>
+        <p:nvSpPr>
+          <p:cNvPr id="3" name="Notes Placeholder 2"/>
+          <p:cNvSpPr>
+            <a:spLocks noGrp="1"/>
+          </p:cNvSpPr>
+          <p:nvPr>
+            <p:ph type="body" idx="1"/>
+          </p:nvPr>
+        </p:nvSpPr>
+        <p:spPr/>
+        <p:txBody>
+          <a:bodyPr/>
+          <a:lstStyle/>
+          <a:p>
+            <a:endParaRPr lang="en-US" dirty="0"/>
+          </a:p>
+        </p:txBody>
+      </p:sp>
+      <p:sp>
+        <p:nvSpPr>
+          <p:cNvPr id="4" name="Slide Number Placeholder 3"/>
+          <p:cNvSpPr>
+            <a:spLocks noGrp="1"/>
+          </p:cNvSpPr>
+          <p:nvPr>
+            <p:ph type="sldNum" sz="quarter" idx="10"/>
+          </p:nvPr>
+        </p:nvSpPr>
+        <p:spPr/>
+        <p:txBody>
+          <a:bodyPr/>
+          <a:lstStyle/>
+          <a:p>
+            <a:fld id="{6BB98AFB-CB0D-4DFE-87B9-B4B0D0DE73CD}" type="slidenum">
+              <a:rPr lang="en-US" smtClean="0"/>
+              <a:t>56</a:t>
+            </a:fld>
+            <a:endParaRPr lang="en-US" dirty="0"/>
+          </a:p>
+        </p:txBody>
+      </p:sp>
+    </p:spTree>
+    <p:extLst>
+      <p:ext uri="{BB962C8B-B14F-4D97-AF65-F5344CB8AC3E}">
+        <p14:creationId xmlns:p14="http://schemas.microsoft.com/office/powerpoint/2010/main" val="1236394192"/>
+      </p:ext>
+    </p:extLst>
+  </p:cSld>
+  <p:clrMapOvr>
+    <a:masterClrMapping/>
+  </p:clrMapOvr>
+</p:notes>
+</file>
+
+<file path=ppt/notesSlides/notesSlide57.xml><?xml version="1.0" encoding="utf-8"?>
+<p:notes xmlns:a="http://schemas.openxmlformats.org/drawingml/2006/main" xmlns:r="http://schemas.openxmlformats.org/officeDocument/2006/relationships" xmlns:p="http://schemas.openxmlformats.org/presentationml/2006/main">
+  <p:cSld>
+    <p:spTree>
+      <p:nvGrpSpPr>
+        <p:cNvPr id="1" name=""/>
+        <p:cNvGrpSpPr/>
+        <p:nvPr/>
+      </p:nvGrpSpPr>
+      <p:grpSpPr>
+        <a:xfrm>
+          <a:off x="0" y="0"/>
+          <a:ext cx="0" cy="0"/>
+          <a:chOff x="0" y="0"/>
+          <a:chExt cx="0" cy="0"/>
+        </a:xfrm>
+      </p:grpSpPr>
+      <p:sp>
+        <p:nvSpPr>
+          <p:cNvPr id="2" name="Slide Image Placeholder 1"/>
+          <p:cNvSpPr>
+            <a:spLocks noGrp="1" noRot="1" noChangeAspect="1"/>
+          </p:cNvSpPr>
+          <p:nvPr>
+            <p:ph type="sldImg"/>
+          </p:nvPr>
+        </p:nvSpPr>
+        <p:spPr/>
+      </p:sp>
+      <p:sp>
+        <p:nvSpPr>
+          <p:cNvPr id="3" name="Notes Placeholder 2"/>
+          <p:cNvSpPr>
+            <a:spLocks noGrp="1"/>
+          </p:cNvSpPr>
+          <p:nvPr>
+            <p:ph type="body" idx="1"/>
+          </p:nvPr>
+        </p:nvSpPr>
+        <p:spPr/>
+        <p:txBody>
+          <a:bodyPr/>
+          <a:lstStyle/>
+          <a:p>
+            <a:endParaRPr lang="en-US" dirty="0"/>
+          </a:p>
+        </p:txBody>
+      </p:sp>
+      <p:sp>
+        <p:nvSpPr>
+          <p:cNvPr id="4" name="Slide Number Placeholder 3"/>
+          <p:cNvSpPr>
+            <a:spLocks noGrp="1"/>
+          </p:cNvSpPr>
+          <p:nvPr>
+            <p:ph type="sldNum" sz="quarter" idx="10"/>
+          </p:nvPr>
+        </p:nvSpPr>
+        <p:spPr/>
+        <p:txBody>
+          <a:bodyPr/>
+          <a:lstStyle/>
+          <a:p>
+            <a:fld id="{6BB98AFB-CB0D-4DFE-87B9-B4B0D0DE73CD}" type="slidenum">
+              <a:rPr lang="en-US" smtClean="0"/>
+              <a:t>57</a:t>
+            </a:fld>
+            <a:endParaRPr lang="en-US" dirty="0"/>
+          </a:p>
+        </p:txBody>
+      </p:sp>
+    </p:spTree>
+    <p:extLst>
+      <p:ext uri="{BB962C8B-B14F-4D97-AF65-F5344CB8AC3E}">
+        <p14:creationId xmlns:p14="http://schemas.microsoft.com/office/powerpoint/2010/main" val="1747450660"/>
       </p:ext>
     </p:extLst>
   </p:cSld>
@@ -29035,8 +29205,8 @@
         </p:nvSpPr>
         <p:spPr>
           <a:xfrm>
-            <a:off x="8315298" y="2615952"/>
-            <a:ext cx="3815925" cy="1389111"/>
+            <a:off x="7390556" y="2615952"/>
+            <a:ext cx="4740667" cy="1389111"/>
           </a:xfrm>
           <a:prstGeom prst="rect">
             <a:avLst/>
@@ -29075,6 +29245,888 @@
     <p:extLst>
       <p:ext uri="{BB962C8B-B14F-4D97-AF65-F5344CB8AC3E}">
         <p14:creationId xmlns:p14="http://schemas.microsoft.com/office/powerpoint/2010/main" val="354549586"/>
+      </p:ext>
+    </p:extLst>
+  </p:cSld>
+  <p:clrMapOvr>
+    <a:masterClrMapping/>
+  </p:clrMapOvr>
+  <mc:AlternateContent xmlns:mc="http://schemas.openxmlformats.org/markup-compatibility/2006" xmlns:p14="http://schemas.microsoft.com/office/powerpoint/2010/main">
+    <mc:Choice Requires="p14">
+      <p:transition spd="med" p14:dur="700">
+        <p:fade/>
+      </p:transition>
+    </mc:Choice>
+    <mc:Fallback xmlns="">
+      <p:transition spd="med">
+        <p:fade/>
+      </p:transition>
+    </mc:Fallback>
+  </mc:AlternateContent>
+</p:sld>
+</file>
+
+<file path=ppt/slides/slide56.xml><?xml version="1.0" encoding="utf-8"?>
+<p:sld xmlns:a="http://schemas.openxmlformats.org/drawingml/2006/main" xmlns:r="http://schemas.openxmlformats.org/officeDocument/2006/relationships" xmlns:p="http://schemas.openxmlformats.org/presentationml/2006/main">
+  <p:cSld>
+    <p:spTree>
+      <p:nvGrpSpPr>
+        <p:cNvPr id="1" name=""/>
+        <p:cNvGrpSpPr/>
+        <p:nvPr/>
+      </p:nvGrpSpPr>
+      <p:grpSpPr>
+        <a:xfrm>
+          <a:off x="0" y="0"/>
+          <a:ext cx="0" cy="0"/>
+          <a:chOff x="0" y="0"/>
+          <a:chExt cx="0" cy="0"/>
+        </a:xfrm>
+      </p:grpSpPr>
+      <p:pic>
+        <p:nvPicPr>
+          <p:cNvPr id="10" name="Picture 9">
+            <a:extLst>
+              <a:ext uri="{FF2B5EF4-FFF2-40B4-BE49-F238E27FC236}">
+                <a16:creationId xmlns:a16="http://schemas.microsoft.com/office/drawing/2014/main" id="{B1D0771F-F43E-5EC2-C802-E443F65CFEBB}"/>
+              </a:ext>
+            </a:extLst>
+          </p:cNvPr>
+          <p:cNvPicPr>
+            <a:picLocks noChangeAspect="1"/>
+          </p:cNvPicPr>
+          <p:nvPr/>
+        </p:nvPicPr>
+        <p:blipFill>
+          <a:blip r:embed="rId3"/>
+          <a:stretch>
+            <a:fillRect/>
+          </a:stretch>
+        </p:blipFill>
+        <p:spPr>
+          <a:xfrm>
+            <a:off x="6094413" y="180770"/>
+            <a:ext cx="5904656" cy="5475336"/>
+          </a:xfrm>
+          <a:prstGeom prst="rect">
+            <a:avLst/>
+          </a:prstGeom>
+          <a:ln>
+            <a:noFill/>
+          </a:ln>
+          <a:effectLst>
+            <a:outerShdw blurRad="292100" dist="139700" dir="2700000" algn="tl" rotWithShape="0">
+              <a:srgbClr val="333333">
+                <a:alpha val="65000"/>
+              </a:srgbClr>
+            </a:outerShdw>
+          </a:effectLst>
+        </p:spPr>
+      </p:pic>
+      <p:sp>
+        <p:nvSpPr>
+          <p:cNvPr id="4" name="Title 3"/>
+          <p:cNvSpPr>
+            <a:spLocks noGrp="1"/>
+          </p:cNvSpPr>
+          <p:nvPr>
+            <p:ph type="ctrTitle"/>
+          </p:nvPr>
+        </p:nvSpPr>
+        <p:spPr/>
+        <p:txBody>
+          <a:bodyPr>
+            <a:normAutofit/>
+          </a:bodyPr>
+          <a:lstStyle/>
+          <a:p>
+            <a:pPr algn="ctr"/>
+            <a:r>
+              <a:rPr lang="zh-CN" altLang="en-US" sz="4800" dirty="0">
+                <a:latin typeface="华文隶书" panose="02010800040101010101" pitchFamily="2" charset="-122"/>
+                <a:ea typeface="华文隶书" panose="02010800040101010101" pitchFamily="2" charset="-122"/>
+              </a:rPr>
+              <a:t>让</a:t>
+            </a:r>
+            <a:r>
+              <a:rPr lang="en-US" altLang="zh-CN" sz="4800" dirty="0">
+                <a:latin typeface="华文隶书" panose="02010800040101010101" pitchFamily="2" charset="-122"/>
+                <a:ea typeface="华文隶书" panose="02010800040101010101" pitchFamily="2" charset="-122"/>
+              </a:rPr>
+              <a:t>Python</a:t>
+            </a:r>
+            <a:r>
+              <a:rPr lang="zh-CN" altLang="en-US" sz="4800" dirty="0">
+                <a:latin typeface="华文隶书" panose="02010800040101010101" pitchFamily="2" charset="-122"/>
+                <a:ea typeface="华文隶书" panose="02010800040101010101" pitchFamily="2" charset="-122"/>
+              </a:rPr>
+              <a:t>遇上</a:t>
+            </a:r>
+            <a:r>
+              <a:rPr lang="en-US" altLang="zh-CN" sz="4800" dirty="0">
+                <a:latin typeface="华文隶书" panose="02010800040101010101" pitchFamily="2" charset="-122"/>
+                <a:ea typeface="华文隶书" panose="02010800040101010101" pitchFamily="2" charset="-122"/>
+              </a:rPr>
+              <a:t>Office</a:t>
+            </a:r>
+            <a:br>
+              <a:rPr lang="en-US" altLang="zh-CN" sz="4800" dirty="0">
+                <a:latin typeface="华文隶书" panose="02010800040101010101" pitchFamily="2" charset="-122"/>
+                <a:ea typeface="华文隶书" panose="02010800040101010101" pitchFamily="2" charset="-122"/>
+              </a:rPr>
+            </a:br>
+            <a:br>
+              <a:rPr lang="en-US" altLang="zh-CN" sz="4800" dirty="0">
+                <a:latin typeface="华文隶书" panose="02010800040101010101" pitchFamily="2" charset="-122"/>
+                <a:ea typeface="华文隶书" panose="02010800040101010101" pitchFamily="2" charset="-122"/>
+              </a:rPr>
+            </a:br>
+            <a:r>
+              <a:rPr lang="en-US" altLang="zh-CN" sz="4800" dirty="0">
+                <a:latin typeface="华文隶书" panose="02010800040101010101" pitchFamily="2" charset="-122"/>
+                <a:ea typeface="华文隶书" panose="02010800040101010101" pitchFamily="2" charset="-122"/>
+              </a:rPr>
+              <a:t>(Python with Office)</a:t>
+            </a:r>
+            <a:endParaRPr lang="en-US" sz="4800" dirty="0">
+              <a:latin typeface="华文隶书" panose="02010800040101010101" pitchFamily="2" charset="-122"/>
+              <a:ea typeface="华文隶书" panose="02010800040101010101" pitchFamily="2" charset="-122"/>
+            </a:endParaRPr>
+          </a:p>
+        </p:txBody>
+      </p:sp>
+      <p:sp>
+        <p:nvSpPr>
+          <p:cNvPr id="3" name="Content Placeholder 2"/>
+          <p:cNvSpPr>
+            <a:spLocks noGrp="1"/>
+          </p:cNvSpPr>
+          <p:nvPr>
+            <p:ph type="subTitle" idx="1"/>
+          </p:nvPr>
+        </p:nvSpPr>
+        <p:spPr>
+          <a:xfrm>
+            <a:off x="549796" y="3403600"/>
+            <a:ext cx="5544617" cy="2185640"/>
+          </a:xfrm>
+        </p:spPr>
+        <p:txBody>
+          <a:bodyPr>
+            <a:normAutofit/>
+          </a:bodyPr>
+          <a:lstStyle/>
+          <a:p>
+            <a:r>
+              <a:rPr lang="en-US" sz="2800" dirty="0">
+                <a:latin typeface="ADLaM Display" panose="020F0502020204030204" pitchFamily="2" charset="0"/>
+                <a:ea typeface="ADLaM Display" panose="020F0502020204030204" pitchFamily="2" charset="0"/>
+                <a:cs typeface="ADLaM Display" panose="020F0502020204030204" pitchFamily="2" charset="0"/>
+              </a:rPr>
+              <a:t>Chapter 7 Work with Word</a:t>
+            </a:r>
+          </a:p>
+          <a:p>
+            <a:r>
+              <a:rPr lang="en-US" sz="2800" dirty="0">
+                <a:latin typeface="ADLaM Display" panose="020F0502020204030204" pitchFamily="2" charset="0"/>
+                <a:ea typeface="ADLaM Display" panose="020F0502020204030204" pitchFamily="2" charset="0"/>
+                <a:cs typeface="ADLaM Display" panose="020F0502020204030204" pitchFamily="2" charset="0"/>
+              </a:rPr>
+              <a:t>7.10 Work with </a:t>
+            </a:r>
+            <a:r>
+              <a:rPr lang="en-US" altLang="zh-CN" sz="2800" dirty="0">
+                <a:latin typeface="ADLaM Display" panose="020F0502020204030204" pitchFamily="2" charset="0"/>
+                <a:ea typeface="ADLaM Display" panose="020F0502020204030204" pitchFamily="2" charset="0"/>
+                <a:cs typeface="ADLaM Display" panose="020F0502020204030204" pitchFamily="2" charset="0"/>
+              </a:rPr>
+              <a:t>Tables</a:t>
+            </a:r>
+            <a:r>
+              <a:rPr lang="en-US" sz="2800" dirty="0">
+                <a:latin typeface="ADLaM Display" panose="020F0502020204030204" pitchFamily="2" charset="0"/>
+                <a:ea typeface="ADLaM Display" panose="020F0502020204030204" pitchFamily="2" charset="0"/>
+                <a:cs typeface="ADLaM Display" panose="020F0502020204030204" pitchFamily="2" charset="0"/>
+              </a:rPr>
+              <a:t> (2)</a:t>
+            </a:r>
+          </a:p>
+          <a:p>
+            <a:r>
+              <a:rPr lang="zh-CN" altLang="en-US" sz="2800" dirty="0">
+                <a:latin typeface="ADLaM Display" panose="020F0502020204030204" pitchFamily="2" charset="0"/>
+                <a:ea typeface="ADLaM Display" panose="020F0502020204030204" pitchFamily="2" charset="0"/>
+                <a:cs typeface="ADLaM Display" panose="020F0502020204030204" pitchFamily="2" charset="0"/>
+              </a:rPr>
+              <a:t>第七章 操作</a:t>
+            </a:r>
+            <a:r>
+              <a:rPr lang="en-US" altLang="zh-CN" sz="2800" dirty="0">
+                <a:latin typeface="ADLaM Display" panose="020F0502020204030204" pitchFamily="2" charset="0"/>
+                <a:ea typeface="ADLaM Display" panose="020F0502020204030204" pitchFamily="2" charset="0"/>
+                <a:cs typeface="ADLaM Display" panose="020F0502020204030204" pitchFamily="2" charset="0"/>
+              </a:rPr>
+              <a:t>Word</a:t>
+            </a:r>
+          </a:p>
+          <a:p>
+            <a:r>
+              <a:rPr lang="en-US" altLang="zh-CN" sz="2800" dirty="0">
+                <a:latin typeface="ADLaM Display" panose="020F0502020204030204" pitchFamily="2" charset="0"/>
+                <a:ea typeface="ADLaM Display" panose="020F0502020204030204" pitchFamily="2" charset="0"/>
+                <a:cs typeface="ADLaM Display" panose="020F0502020204030204" pitchFamily="2" charset="0"/>
+              </a:rPr>
+              <a:t>7.10 </a:t>
+            </a:r>
+            <a:r>
+              <a:rPr lang="zh-CN" altLang="en-US" sz="2800" dirty="0">
+                <a:latin typeface="ADLaM Display" panose="020F0502020204030204" pitchFamily="2" charset="0"/>
+                <a:ea typeface="ADLaM Display" panose="020F0502020204030204" pitchFamily="2" charset="0"/>
+                <a:cs typeface="ADLaM Display" panose="020F0502020204030204" pitchFamily="2" charset="0"/>
+              </a:rPr>
+              <a:t>操作表格 </a:t>
+            </a:r>
+            <a:r>
+              <a:rPr lang="en-US" altLang="zh-CN" sz="2800" dirty="0">
+                <a:latin typeface="ADLaM Display" panose="020F0502020204030204" pitchFamily="2" charset="0"/>
+                <a:ea typeface="ADLaM Display" panose="020F0502020204030204" pitchFamily="2" charset="0"/>
+                <a:cs typeface="ADLaM Display" panose="020F0502020204030204" pitchFamily="2" charset="0"/>
+              </a:rPr>
+              <a:t>(2)</a:t>
+            </a:r>
+          </a:p>
+        </p:txBody>
+      </p:sp>
+      <p:pic>
+        <p:nvPicPr>
+          <p:cNvPr id="5" name="Picture 4">
+            <a:extLst>
+              <a:ext uri="{FF2B5EF4-FFF2-40B4-BE49-F238E27FC236}">
+                <a16:creationId xmlns:a16="http://schemas.microsoft.com/office/drawing/2014/main" id="{4AD8B85C-B359-195F-B78C-C879AB7840B1}"/>
+              </a:ext>
+            </a:extLst>
+          </p:cNvPr>
+          <p:cNvPicPr>
+            <a:picLocks noChangeAspect="1"/>
+          </p:cNvPicPr>
+          <p:nvPr/>
+        </p:nvPicPr>
+        <p:blipFill>
+          <a:blip r:embed="rId4"/>
+          <a:stretch>
+            <a:fillRect/>
+          </a:stretch>
+        </p:blipFill>
+        <p:spPr>
+          <a:xfrm>
+            <a:off x="57601" y="1189856"/>
+            <a:ext cx="1068259" cy="1556792"/>
+          </a:xfrm>
+          <a:prstGeom prst="rect">
+            <a:avLst/>
+          </a:prstGeom>
+          <a:ln>
+            <a:noFill/>
+          </a:ln>
+          <a:effectLst>
+            <a:outerShdw blurRad="292100" dist="139700" dir="2700000" algn="tl" rotWithShape="0">
+              <a:srgbClr val="333333">
+                <a:alpha val="65000"/>
+              </a:srgbClr>
+            </a:outerShdw>
+          </a:effectLst>
+        </p:spPr>
+      </p:pic>
+      <p:sp>
+        <p:nvSpPr>
+          <p:cNvPr id="2" name="TextBox 1">
+            <a:extLst>
+              <a:ext uri="{FF2B5EF4-FFF2-40B4-BE49-F238E27FC236}">
+                <a16:creationId xmlns:a16="http://schemas.microsoft.com/office/drawing/2014/main" id="{CAB2C784-DE74-68FC-7A84-3E6C5D164315}"/>
+              </a:ext>
+            </a:extLst>
+          </p:cNvPr>
+          <p:cNvSpPr txBox="1"/>
+          <p:nvPr/>
+        </p:nvSpPr>
+        <p:spPr>
+          <a:xfrm>
+            <a:off x="405780" y="5722972"/>
+            <a:ext cx="7951216" cy="523220"/>
+          </a:xfrm>
+          <a:prstGeom prst="rect">
+            <a:avLst/>
+          </a:prstGeom>
+          <a:solidFill>
+            <a:schemeClr val="bg1">
+              <a:lumMod val="95000"/>
+            </a:schemeClr>
+          </a:solidFill>
+          <a:ln>
+            <a:solidFill>
+              <a:schemeClr val="bg2"/>
+            </a:solidFill>
+          </a:ln>
+        </p:spPr>
+        <p:txBody>
+          <a:bodyPr wrap="none" rtlCol="0" anchor="ctr" anchorCtr="1">
+            <a:spAutoFit/>
+          </a:bodyPr>
+          <a:lstStyle/>
+          <a:p>
+            <a:r>
+              <a:rPr lang="en-US" sz="2800" dirty="0">
+                <a:hlinkClick r:id="rId5"/>
+              </a:rPr>
+              <a:t>https://github.com/yasenstar/python_with_office</a:t>
+            </a:r>
+            <a:endParaRPr lang="en-US" sz="2800" dirty="0"/>
+          </a:p>
+        </p:txBody>
+      </p:sp>
+      <p:sp>
+        <p:nvSpPr>
+          <p:cNvPr id="9" name="TextBox 8">
+            <a:extLst>
+              <a:ext uri="{FF2B5EF4-FFF2-40B4-BE49-F238E27FC236}">
+                <a16:creationId xmlns:a16="http://schemas.microsoft.com/office/drawing/2014/main" id="{C25C84F5-3AA3-A068-7E2F-9123CA5A7D16}"/>
+              </a:ext>
+            </a:extLst>
+          </p:cNvPr>
+          <p:cNvSpPr txBox="1"/>
+          <p:nvPr/>
+        </p:nvSpPr>
+        <p:spPr>
+          <a:xfrm>
+            <a:off x="405780" y="6246192"/>
+            <a:ext cx="7951216" cy="523220"/>
+          </a:xfrm>
+          <a:prstGeom prst="rect">
+            <a:avLst/>
+          </a:prstGeom>
+          <a:solidFill>
+            <a:schemeClr val="bg1">
+              <a:lumMod val="95000"/>
+            </a:schemeClr>
+          </a:solidFill>
+          <a:ln>
+            <a:solidFill>
+              <a:schemeClr val="bg2"/>
+            </a:solidFill>
+          </a:ln>
+        </p:spPr>
+        <p:txBody>
+          <a:bodyPr wrap="square" rtlCol="0" anchor="ctr" anchorCtr="1">
+            <a:spAutoFit/>
+          </a:bodyPr>
+          <a:lstStyle/>
+          <a:p>
+            <a:r>
+              <a:rPr lang="en-US" sz="2800" dirty="0">
+                <a:hlinkClick r:id="rId6"/>
+              </a:rPr>
+              <a:t>https://gitee.com/yasenstar/python_with_office</a:t>
+            </a:r>
+            <a:endParaRPr lang="en-US" sz="2800" dirty="0"/>
+          </a:p>
+        </p:txBody>
+      </p:sp>
+      <p:sp>
+        <p:nvSpPr>
+          <p:cNvPr id="8" name="Rectangle 7">
+            <a:extLst>
+              <a:ext uri="{FF2B5EF4-FFF2-40B4-BE49-F238E27FC236}">
+                <a16:creationId xmlns:a16="http://schemas.microsoft.com/office/drawing/2014/main" id="{BF240C6B-5810-C38F-A5D9-138DB3FF9663}"/>
+              </a:ext>
+            </a:extLst>
+          </p:cNvPr>
+          <p:cNvSpPr/>
+          <p:nvPr/>
+        </p:nvSpPr>
+        <p:spPr>
+          <a:xfrm>
+            <a:off x="7318548" y="4005064"/>
+            <a:ext cx="4740667" cy="802340"/>
+          </a:xfrm>
+          <a:prstGeom prst="rect">
+            <a:avLst/>
+          </a:prstGeom>
+          <a:noFill/>
+          <a:ln w="38100">
+            <a:solidFill>
+              <a:srgbClr val="FF0000"/>
+            </a:solidFill>
+          </a:ln>
+        </p:spPr>
+        <p:style>
+          <a:lnRef idx="2">
+            <a:schemeClr val="accent3"/>
+          </a:lnRef>
+          <a:fillRef idx="1">
+            <a:schemeClr val="lt1"/>
+          </a:fillRef>
+          <a:effectRef idx="0">
+            <a:schemeClr val="accent3"/>
+          </a:effectRef>
+          <a:fontRef idx="minor">
+            <a:schemeClr val="dk1"/>
+          </a:fontRef>
+        </p:style>
+        <p:txBody>
+          <a:bodyPr rtlCol="0" anchor="ctr"/>
+          <a:lstStyle/>
+          <a:p>
+            <a:pPr algn="ctr"/>
+            <a:endParaRPr lang="en-US" dirty="0"/>
+          </a:p>
+        </p:txBody>
+      </p:sp>
+    </p:spTree>
+    <p:extLst>
+      <p:ext uri="{BB962C8B-B14F-4D97-AF65-F5344CB8AC3E}">
+        <p14:creationId xmlns:p14="http://schemas.microsoft.com/office/powerpoint/2010/main" val="2169694169"/>
+      </p:ext>
+    </p:extLst>
+  </p:cSld>
+  <p:clrMapOvr>
+    <a:masterClrMapping/>
+  </p:clrMapOvr>
+  <mc:AlternateContent xmlns:mc="http://schemas.openxmlformats.org/markup-compatibility/2006" xmlns:p14="http://schemas.microsoft.com/office/powerpoint/2010/main">
+    <mc:Choice Requires="p14">
+      <p:transition spd="med" p14:dur="700">
+        <p:fade/>
+      </p:transition>
+    </mc:Choice>
+    <mc:Fallback xmlns="">
+      <p:transition spd="med">
+        <p:fade/>
+      </p:transition>
+    </mc:Fallback>
+  </mc:AlternateContent>
+</p:sld>
+</file>
+
+<file path=ppt/slides/slide57.xml><?xml version="1.0" encoding="utf-8"?>
+<p:sld xmlns:a="http://schemas.openxmlformats.org/drawingml/2006/main" xmlns:r="http://schemas.openxmlformats.org/officeDocument/2006/relationships" xmlns:p="http://schemas.openxmlformats.org/presentationml/2006/main">
+  <p:cSld>
+    <p:spTree>
+      <p:nvGrpSpPr>
+        <p:cNvPr id="1" name=""/>
+        <p:cNvGrpSpPr/>
+        <p:nvPr/>
+      </p:nvGrpSpPr>
+      <p:grpSpPr>
+        <a:xfrm>
+          <a:off x="0" y="0"/>
+          <a:ext cx="0" cy="0"/>
+          <a:chOff x="0" y="0"/>
+          <a:chExt cx="0" cy="0"/>
+        </a:xfrm>
+      </p:grpSpPr>
+      <p:pic>
+        <p:nvPicPr>
+          <p:cNvPr id="10" name="Picture 9">
+            <a:extLst>
+              <a:ext uri="{FF2B5EF4-FFF2-40B4-BE49-F238E27FC236}">
+                <a16:creationId xmlns:a16="http://schemas.microsoft.com/office/drawing/2014/main" id="{B1D0771F-F43E-5EC2-C802-E443F65CFEBB}"/>
+              </a:ext>
+            </a:extLst>
+          </p:cNvPr>
+          <p:cNvPicPr>
+            <a:picLocks noChangeAspect="1"/>
+          </p:cNvPicPr>
+          <p:nvPr/>
+        </p:nvPicPr>
+        <p:blipFill>
+          <a:blip r:embed="rId3"/>
+          <a:stretch>
+            <a:fillRect/>
+          </a:stretch>
+        </p:blipFill>
+        <p:spPr>
+          <a:xfrm>
+            <a:off x="6094413" y="180770"/>
+            <a:ext cx="5904656" cy="5475336"/>
+          </a:xfrm>
+          <a:prstGeom prst="rect">
+            <a:avLst/>
+          </a:prstGeom>
+          <a:ln>
+            <a:noFill/>
+          </a:ln>
+          <a:effectLst>
+            <a:outerShdw blurRad="292100" dist="139700" dir="2700000" algn="tl" rotWithShape="0">
+              <a:srgbClr val="333333">
+                <a:alpha val="65000"/>
+              </a:srgbClr>
+            </a:outerShdw>
+          </a:effectLst>
+        </p:spPr>
+      </p:pic>
+      <p:sp>
+        <p:nvSpPr>
+          <p:cNvPr id="4" name="Title 3"/>
+          <p:cNvSpPr>
+            <a:spLocks noGrp="1"/>
+          </p:cNvSpPr>
+          <p:nvPr>
+            <p:ph type="ctrTitle"/>
+          </p:nvPr>
+        </p:nvSpPr>
+        <p:spPr/>
+        <p:txBody>
+          <a:bodyPr>
+            <a:normAutofit/>
+          </a:bodyPr>
+          <a:lstStyle/>
+          <a:p>
+            <a:pPr algn="ctr"/>
+            <a:r>
+              <a:rPr lang="zh-CN" altLang="en-US" sz="4800" dirty="0">
+                <a:latin typeface="华文隶书" panose="02010800040101010101" pitchFamily="2" charset="-122"/>
+                <a:ea typeface="华文隶书" panose="02010800040101010101" pitchFamily="2" charset="-122"/>
+              </a:rPr>
+              <a:t>让</a:t>
+            </a:r>
+            <a:r>
+              <a:rPr lang="en-US" altLang="zh-CN" sz="4800" dirty="0">
+                <a:latin typeface="华文隶书" panose="02010800040101010101" pitchFamily="2" charset="-122"/>
+                <a:ea typeface="华文隶书" panose="02010800040101010101" pitchFamily="2" charset="-122"/>
+              </a:rPr>
+              <a:t>Python</a:t>
+            </a:r>
+            <a:r>
+              <a:rPr lang="zh-CN" altLang="en-US" sz="4800" dirty="0">
+                <a:latin typeface="华文隶书" panose="02010800040101010101" pitchFamily="2" charset="-122"/>
+                <a:ea typeface="华文隶书" panose="02010800040101010101" pitchFamily="2" charset="-122"/>
+              </a:rPr>
+              <a:t>遇上</a:t>
+            </a:r>
+            <a:r>
+              <a:rPr lang="en-US" altLang="zh-CN" sz="4800" dirty="0">
+                <a:latin typeface="华文隶书" panose="02010800040101010101" pitchFamily="2" charset="-122"/>
+                <a:ea typeface="华文隶书" panose="02010800040101010101" pitchFamily="2" charset="-122"/>
+              </a:rPr>
+              <a:t>Office</a:t>
+            </a:r>
+            <a:br>
+              <a:rPr lang="en-US" altLang="zh-CN" sz="4800" dirty="0">
+                <a:latin typeface="华文隶书" panose="02010800040101010101" pitchFamily="2" charset="-122"/>
+                <a:ea typeface="华文隶书" panose="02010800040101010101" pitchFamily="2" charset="-122"/>
+              </a:rPr>
+            </a:br>
+            <a:br>
+              <a:rPr lang="en-US" altLang="zh-CN" sz="4800" dirty="0">
+                <a:latin typeface="华文隶书" panose="02010800040101010101" pitchFamily="2" charset="-122"/>
+                <a:ea typeface="华文隶书" panose="02010800040101010101" pitchFamily="2" charset="-122"/>
+              </a:rPr>
+            </a:br>
+            <a:r>
+              <a:rPr lang="en-US" altLang="zh-CN" sz="4800" dirty="0">
+                <a:latin typeface="华文隶书" panose="02010800040101010101" pitchFamily="2" charset="-122"/>
+                <a:ea typeface="华文隶书" panose="02010800040101010101" pitchFamily="2" charset="-122"/>
+              </a:rPr>
+              <a:t>(Python with Office)</a:t>
+            </a:r>
+            <a:endParaRPr lang="en-US" sz="4800" dirty="0">
+              <a:latin typeface="华文隶书" panose="02010800040101010101" pitchFamily="2" charset="-122"/>
+              <a:ea typeface="华文隶书" panose="02010800040101010101" pitchFamily="2" charset="-122"/>
+            </a:endParaRPr>
+          </a:p>
+        </p:txBody>
+      </p:sp>
+      <p:sp>
+        <p:nvSpPr>
+          <p:cNvPr id="3" name="Content Placeholder 2"/>
+          <p:cNvSpPr>
+            <a:spLocks noGrp="1"/>
+          </p:cNvSpPr>
+          <p:nvPr>
+            <p:ph type="subTitle" idx="1"/>
+          </p:nvPr>
+        </p:nvSpPr>
+        <p:spPr>
+          <a:xfrm>
+            <a:off x="549796" y="3403600"/>
+            <a:ext cx="5544617" cy="2185640"/>
+          </a:xfrm>
+        </p:spPr>
+        <p:txBody>
+          <a:bodyPr>
+            <a:normAutofit/>
+          </a:bodyPr>
+          <a:lstStyle/>
+          <a:p>
+            <a:r>
+              <a:rPr lang="en-US" sz="2800" dirty="0">
+                <a:latin typeface="ADLaM Display" panose="020F0502020204030204" pitchFamily="2" charset="0"/>
+                <a:ea typeface="ADLaM Display" panose="020F0502020204030204" pitchFamily="2" charset="0"/>
+                <a:cs typeface="ADLaM Display" panose="020F0502020204030204" pitchFamily="2" charset="0"/>
+              </a:rPr>
+              <a:t>Chapter 7 Work with Word</a:t>
+            </a:r>
+          </a:p>
+          <a:p>
+            <a:r>
+              <a:rPr lang="en-US" sz="2800" dirty="0">
+                <a:latin typeface="ADLaM Display" panose="020F0502020204030204" pitchFamily="2" charset="0"/>
+                <a:ea typeface="ADLaM Display" panose="020F0502020204030204" pitchFamily="2" charset="0"/>
+                <a:cs typeface="ADLaM Display" panose="020F0502020204030204" pitchFamily="2" charset="0"/>
+              </a:rPr>
+              <a:t>7.10 Work with </a:t>
+            </a:r>
+            <a:r>
+              <a:rPr lang="en-US" altLang="zh-CN" sz="2800" dirty="0">
+                <a:latin typeface="ADLaM Display" panose="020F0502020204030204" pitchFamily="2" charset="0"/>
+                <a:ea typeface="ADLaM Display" panose="020F0502020204030204" pitchFamily="2" charset="0"/>
+                <a:cs typeface="ADLaM Display" panose="020F0502020204030204" pitchFamily="2" charset="0"/>
+              </a:rPr>
+              <a:t>Tables</a:t>
+            </a:r>
+            <a:r>
+              <a:rPr lang="en-US" sz="2800" dirty="0">
+                <a:latin typeface="ADLaM Display" panose="020F0502020204030204" pitchFamily="2" charset="0"/>
+                <a:ea typeface="ADLaM Display" panose="020F0502020204030204" pitchFamily="2" charset="0"/>
+                <a:cs typeface="ADLaM Display" panose="020F0502020204030204" pitchFamily="2" charset="0"/>
+              </a:rPr>
+              <a:t> (3)</a:t>
+            </a:r>
+          </a:p>
+          <a:p>
+            <a:r>
+              <a:rPr lang="zh-CN" altLang="en-US" sz="2800" dirty="0">
+                <a:latin typeface="ADLaM Display" panose="020F0502020204030204" pitchFamily="2" charset="0"/>
+                <a:ea typeface="ADLaM Display" panose="020F0502020204030204" pitchFamily="2" charset="0"/>
+                <a:cs typeface="ADLaM Display" panose="020F0502020204030204" pitchFamily="2" charset="0"/>
+              </a:rPr>
+              <a:t>第七章 操作</a:t>
+            </a:r>
+            <a:r>
+              <a:rPr lang="en-US" altLang="zh-CN" sz="2800" dirty="0">
+                <a:latin typeface="ADLaM Display" panose="020F0502020204030204" pitchFamily="2" charset="0"/>
+                <a:ea typeface="ADLaM Display" panose="020F0502020204030204" pitchFamily="2" charset="0"/>
+                <a:cs typeface="ADLaM Display" panose="020F0502020204030204" pitchFamily="2" charset="0"/>
+              </a:rPr>
+              <a:t>Word</a:t>
+            </a:r>
+          </a:p>
+          <a:p>
+            <a:r>
+              <a:rPr lang="en-US" altLang="zh-CN" sz="2800" dirty="0">
+                <a:latin typeface="ADLaM Display" panose="020F0502020204030204" pitchFamily="2" charset="0"/>
+                <a:ea typeface="ADLaM Display" panose="020F0502020204030204" pitchFamily="2" charset="0"/>
+                <a:cs typeface="ADLaM Display" panose="020F0502020204030204" pitchFamily="2" charset="0"/>
+              </a:rPr>
+              <a:t>7.10 </a:t>
+            </a:r>
+            <a:r>
+              <a:rPr lang="zh-CN" altLang="en-US" sz="2800" dirty="0">
+                <a:latin typeface="ADLaM Display" panose="020F0502020204030204" pitchFamily="2" charset="0"/>
+                <a:ea typeface="ADLaM Display" panose="020F0502020204030204" pitchFamily="2" charset="0"/>
+                <a:cs typeface="ADLaM Display" panose="020F0502020204030204" pitchFamily="2" charset="0"/>
+              </a:rPr>
+              <a:t>操作表格 </a:t>
+            </a:r>
+            <a:r>
+              <a:rPr lang="en-US" altLang="zh-CN" sz="2800" dirty="0">
+                <a:latin typeface="ADLaM Display" panose="020F0502020204030204" pitchFamily="2" charset="0"/>
+                <a:ea typeface="ADLaM Display" panose="020F0502020204030204" pitchFamily="2" charset="0"/>
+                <a:cs typeface="ADLaM Display" panose="020F0502020204030204" pitchFamily="2" charset="0"/>
+              </a:rPr>
+              <a:t>(3)</a:t>
+            </a:r>
+          </a:p>
+        </p:txBody>
+      </p:sp>
+      <p:pic>
+        <p:nvPicPr>
+          <p:cNvPr id="5" name="Picture 4">
+            <a:extLst>
+              <a:ext uri="{FF2B5EF4-FFF2-40B4-BE49-F238E27FC236}">
+                <a16:creationId xmlns:a16="http://schemas.microsoft.com/office/drawing/2014/main" id="{4AD8B85C-B359-195F-B78C-C879AB7840B1}"/>
+              </a:ext>
+            </a:extLst>
+          </p:cNvPr>
+          <p:cNvPicPr>
+            <a:picLocks noChangeAspect="1"/>
+          </p:cNvPicPr>
+          <p:nvPr/>
+        </p:nvPicPr>
+        <p:blipFill>
+          <a:blip r:embed="rId4"/>
+          <a:stretch>
+            <a:fillRect/>
+          </a:stretch>
+        </p:blipFill>
+        <p:spPr>
+          <a:xfrm>
+            <a:off x="57601" y="1189856"/>
+            <a:ext cx="1068259" cy="1556792"/>
+          </a:xfrm>
+          <a:prstGeom prst="rect">
+            <a:avLst/>
+          </a:prstGeom>
+          <a:ln>
+            <a:noFill/>
+          </a:ln>
+          <a:effectLst>
+            <a:outerShdw blurRad="292100" dist="139700" dir="2700000" algn="tl" rotWithShape="0">
+              <a:srgbClr val="333333">
+                <a:alpha val="65000"/>
+              </a:srgbClr>
+            </a:outerShdw>
+          </a:effectLst>
+        </p:spPr>
+      </p:pic>
+      <p:sp>
+        <p:nvSpPr>
+          <p:cNvPr id="2" name="TextBox 1">
+            <a:extLst>
+              <a:ext uri="{FF2B5EF4-FFF2-40B4-BE49-F238E27FC236}">
+                <a16:creationId xmlns:a16="http://schemas.microsoft.com/office/drawing/2014/main" id="{CAB2C784-DE74-68FC-7A84-3E6C5D164315}"/>
+              </a:ext>
+            </a:extLst>
+          </p:cNvPr>
+          <p:cNvSpPr txBox="1"/>
+          <p:nvPr/>
+        </p:nvSpPr>
+        <p:spPr>
+          <a:xfrm>
+            <a:off x="405780" y="5722972"/>
+            <a:ext cx="7951216" cy="523220"/>
+          </a:xfrm>
+          <a:prstGeom prst="rect">
+            <a:avLst/>
+          </a:prstGeom>
+          <a:solidFill>
+            <a:schemeClr val="bg1">
+              <a:lumMod val="95000"/>
+            </a:schemeClr>
+          </a:solidFill>
+          <a:ln>
+            <a:solidFill>
+              <a:schemeClr val="bg2"/>
+            </a:solidFill>
+          </a:ln>
+        </p:spPr>
+        <p:txBody>
+          <a:bodyPr wrap="none" rtlCol="0" anchor="ctr" anchorCtr="1">
+            <a:spAutoFit/>
+          </a:bodyPr>
+          <a:lstStyle/>
+          <a:p>
+            <a:r>
+              <a:rPr lang="en-US" sz="2800" dirty="0">
+                <a:hlinkClick r:id="rId5"/>
+              </a:rPr>
+              <a:t>https://github.com/yasenstar/python_with_office</a:t>
+            </a:r>
+            <a:endParaRPr lang="en-US" sz="2800" dirty="0"/>
+          </a:p>
+        </p:txBody>
+      </p:sp>
+      <p:sp>
+        <p:nvSpPr>
+          <p:cNvPr id="9" name="TextBox 8">
+            <a:extLst>
+              <a:ext uri="{FF2B5EF4-FFF2-40B4-BE49-F238E27FC236}">
+                <a16:creationId xmlns:a16="http://schemas.microsoft.com/office/drawing/2014/main" id="{C25C84F5-3AA3-A068-7E2F-9123CA5A7D16}"/>
+              </a:ext>
+            </a:extLst>
+          </p:cNvPr>
+          <p:cNvSpPr txBox="1"/>
+          <p:nvPr/>
+        </p:nvSpPr>
+        <p:spPr>
+          <a:xfrm>
+            <a:off x="405780" y="6246192"/>
+            <a:ext cx="7951216" cy="523220"/>
+          </a:xfrm>
+          <a:prstGeom prst="rect">
+            <a:avLst/>
+          </a:prstGeom>
+          <a:solidFill>
+            <a:schemeClr val="bg1">
+              <a:lumMod val="95000"/>
+            </a:schemeClr>
+          </a:solidFill>
+          <a:ln>
+            <a:solidFill>
+              <a:schemeClr val="bg2"/>
+            </a:solidFill>
+          </a:ln>
+        </p:spPr>
+        <p:txBody>
+          <a:bodyPr wrap="square" rtlCol="0" anchor="ctr" anchorCtr="1">
+            <a:spAutoFit/>
+          </a:bodyPr>
+          <a:lstStyle/>
+          <a:p>
+            <a:r>
+              <a:rPr lang="en-US" sz="2800" dirty="0">
+                <a:hlinkClick r:id="rId6"/>
+              </a:rPr>
+              <a:t>https://gitee.com/yasenstar/python_with_office</a:t>
+            </a:r>
+            <a:endParaRPr lang="en-US" sz="2800" dirty="0"/>
+          </a:p>
+        </p:txBody>
+      </p:sp>
+      <p:sp>
+        <p:nvSpPr>
+          <p:cNvPr id="8" name="Rectangle 7">
+            <a:extLst>
+              <a:ext uri="{FF2B5EF4-FFF2-40B4-BE49-F238E27FC236}">
+                <a16:creationId xmlns:a16="http://schemas.microsoft.com/office/drawing/2014/main" id="{BF240C6B-5810-C38F-A5D9-138DB3FF9663}"/>
+              </a:ext>
+            </a:extLst>
+          </p:cNvPr>
+          <p:cNvSpPr/>
+          <p:nvPr/>
+        </p:nvSpPr>
+        <p:spPr>
+          <a:xfrm>
+            <a:off x="7318548" y="4725144"/>
+            <a:ext cx="4740667" cy="648072"/>
+          </a:xfrm>
+          <a:prstGeom prst="rect">
+            <a:avLst/>
+          </a:prstGeom>
+          <a:noFill/>
+          <a:ln w="38100">
+            <a:solidFill>
+              <a:srgbClr val="FF0000"/>
+            </a:solidFill>
+          </a:ln>
+        </p:spPr>
+        <p:style>
+          <a:lnRef idx="2">
+            <a:schemeClr val="accent3"/>
+          </a:lnRef>
+          <a:fillRef idx="1">
+            <a:schemeClr val="lt1"/>
+          </a:fillRef>
+          <a:effectRef idx="0">
+            <a:schemeClr val="accent3"/>
+          </a:effectRef>
+          <a:fontRef idx="minor">
+            <a:schemeClr val="dk1"/>
+          </a:fontRef>
+        </p:style>
+        <p:txBody>
+          <a:bodyPr rtlCol="0" anchor="ctr"/>
+          <a:lstStyle/>
+          <a:p>
+            <a:pPr algn="ctr"/>
+            <a:endParaRPr lang="en-US" dirty="0"/>
+          </a:p>
+        </p:txBody>
+      </p:sp>
+    </p:spTree>
+    <p:extLst>
+      <p:ext uri="{BB962C8B-B14F-4D97-AF65-F5344CB8AC3E}">
+        <p14:creationId xmlns:p14="http://schemas.microsoft.com/office/powerpoint/2010/main" val="4087475734"/>
       </p:ext>
     </p:extLst>
   </p:cSld>

</xml_diff>

<commit_message>
7-11 part 1 and 2
</commit_message>
<xml_diff>
--- a/Python-with-Office-Video_Covers.pptx
+++ b/Python-with-Office-Video_Covers.pptx
@@ -5,10 +5,10 @@
     <p:sldMasterId id="2147483660" r:id="rId1"/>
   </p:sldMasterIdLst>
   <p:notesMasterIdLst>
-    <p:notesMasterId r:id="rId59"/>
+    <p:notesMasterId r:id="rId62"/>
   </p:notesMasterIdLst>
   <p:handoutMasterIdLst>
-    <p:handoutMasterId r:id="rId60"/>
+    <p:handoutMasterId r:id="rId63"/>
   </p:handoutMasterIdLst>
   <p:sldIdLst>
     <p:sldId id="257" r:id="rId2"/>
@@ -68,6 +68,9 @@
     <p:sldId id="312" r:id="rId56"/>
     <p:sldId id="313" r:id="rId57"/>
     <p:sldId id="314" r:id="rId58"/>
+    <p:sldId id="315" r:id="rId59"/>
+    <p:sldId id="316" r:id="rId60"/>
+    <p:sldId id="317" r:id="rId61"/>
   </p:sldIdLst>
   <p:sldSz cx="12188825" cy="6858000"/>
   <p:notesSz cx="6858000" cy="9144000"/>
@@ -5209,6 +5212,174 @@
 </p:notes>
 </file>
 
+<file path=ppt/notesSlides/notesSlide58.xml><?xml version="1.0" encoding="utf-8"?>
+<p:notes xmlns:a="http://schemas.openxmlformats.org/drawingml/2006/main" xmlns:r="http://schemas.openxmlformats.org/officeDocument/2006/relationships" xmlns:p="http://schemas.openxmlformats.org/presentationml/2006/main">
+  <p:cSld>
+    <p:spTree>
+      <p:nvGrpSpPr>
+        <p:cNvPr id="1" name=""/>
+        <p:cNvGrpSpPr/>
+        <p:nvPr/>
+      </p:nvGrpSpPr>
+      <p:grpSpPr>
+        <a:xfrm>
+          <a:off x="0" y="0"/>
+          <a:ext cx="0" cy="0"/>
+          <a:chOff x="0" y="0"/>
+          <a:chExt cx="0" cy="0"/>
+        </a:xfrm>
+      </p:grpSpPr>
+      <p:sp>
+        <p:nvSpPr>
+          <p:cNvPr id="2" name="Slide Image Placeholder 1"/>
+          <p:cNvSpPr>
+            <a:spLocks noGrp="1" noRot="1" noChangeAspect="1"/>
+          </p:cNvSpPr>
+          <p:nvPr>
+            <p:ph type="sldImg"/>
+          </p:nvPr>
+        </p:nvSpPr>
+        <p:spPr/>
+      </p:sp>
+      <p:sp>
+        <p:nvSpPr>
+          <p:cNvPr id="3" name="Notes Placeholder 2"/>
+          <p:cNvSpPr>
+            <a:spLocks noGrp="1"/>
+          </p:cNvSpPr>
+          <p:nvPr>
+            <p:ph type="body" idx="1"/>
+          </p:nvPr>
+        </p:nvSpPr>
+        <p:spPr/>
+        <p:txBody>
+          <a:bodyPr/>
+          <a:lstStyle/>
+          <a:p>
+            <a:endParaRPr lang="en-US" dirty="0"/>
+          </a:p>
+        </p:txBody>
+      </p:sp>
+      <p:sp>
+        <p:nvSpPr>
+          <p:cNvPr id="4" name="Slide Number Placeholder 3"/>
+          <p:cNvSpPr>
+            <a:spLocks noGrp="1"/>
+          </p:cNvSpPr>
+          <p:nvPr>
+            <p:ph type="sldNum" sz="quarter" idx="10"/>
+          </p:nvPr>
+        </p:nvSpPr>
+        <p:spPr/>
+        <p:txBody>
+          <a:bodyPr/>
+          <a:lstStyle/>
+          <a:p>
+            <a:fld id="{6BB98AFB-CB0D-4DFE-87B9-B4B0D0DE73CD}" type="slidenum">
+              <a:rPr lang="en-US" smtClean="0"/>
+              <a:t>58</a:t>
+            </a:fld>
+            <a:endParaRPr lang="en-US" dirty="0"/>
+          </a:p>
+        </p:txBody>
+      </p:sp>
+    </p:spTree>
+    <p:extLst>
+      <p:ext uri="{BB962C8B-B14F-4D97-AF65-F5344CB8AC3E}">
+        <p14:creationId xmlns:p14="http://schemas.microsoft.com/office/powerpoint/2010/main" val="3040961221"/>
+      </p:ext>
+    </p:extLst>
+  </p:cSld>
+  <p:clrMapOvr>
+    <a:masterClrMapping/>
+  </p:clrMapOvr>
+</p:notes>
+</file>
+
+<file path=ppt/notesSlides/notesSlide59.xml><?xml version="1.0" encoding="utf-8"?>
+<p:notes xmlns:a="http://schemas.openxmlformats.org/drawingml/2006/main" xmlns:r="http://schemas.openxmlformats.org/officeDocument/2006/relationships" xmlns:p="http://schemas.openxmlformats.org/presentationml/2006/main">
+  <p:cSld>
+    <p:spTree>
+      <p:nvGrpSpPr>
+        <p:cNvPr id="1" name=""/>
+        <p:cNvGrpSpPr/>
+        <p:nvPr/>
+      </p:nvGrpSpPr>
+      <p:grpSpPr>
+        <a:xfrm>
+          <a:off x="0" y="0"/>
+          <a:ext cx="0" cy="0"/>
+          <a:chOff x="0" y="0"/>
+          <a:chExt cx="0" cy="0"/>
+        </a:xfrm>
+      </p:grpSpPr>
+      <p:sp>
+        <p:nvSpPr>
+          <p:cNvPr id="2" name="Slide Image Placeholder 1"/>
+          <p:cNvSpPr>
+            <a:spLocks noGrp="1" noRot="1" noChangeAspect="1"/>
+          </p:cNvSpPr>
+          <p:nvPr>
+            <p:ph type="sldImg"/>
+          </p:nvPr>
+        </p:nvSpPr>
+        <p:spPr/>
+      </p:sp>
+      <p:sp>
+        <p:nvSpPr>
+          <p:cNvPr id="3" name="Notes Placeholder 2"/>
+          <p:cNvSpPr>
+            <a:spLocks noGrp="1"/>
+          </p:cNvSpPr>
+          <p:nvPr>
+            <p:ph type="body" idx="1"/>
+          </p:nvPr>
+        </p:nvSpPr>
+        <p:spPr/>
+        <p:txBody>
+          <a:bodyPr/>
+          <a:lstStyle/>
+          <a:p>
+            <a:endParaRPr lang="en-US" dirty="0"/>
+          </a:p>
+        </p:txBody>
+      </p:sp>
+      <p:sp>
+        <p:nvSpPr>
+          <p:cNvPr id="4" name="Slide Number Placeholder 3"/>
+          <p:cNvSpPr>
+            <a:spLocks noGrp="1"/>
+          </p:cNvSpPr>
+          <p:nvPr>
+            <p:ph type="sldNum" sz="quarter" idx="10"/>
+          </p:nvPr>
+        </p:nvSpPr>
+        <p:spPr/>
+        <p:txBody>
+          <a:bodyPr/>
+          <a:lstStyle/>
+          <a:p>
+            <a:fld id="{6BB98AFB-CB0D-4DFE-87B9-B4B0D0DE73CD}" type="slidenum">
+              <a:rPr lang="en-US" smtClean="0"/>
+              <a:t>59</a:t>
+            </a:fld>
+            <a:endParaRPr lang="en-US" dirty="0"/>
+          </a:p>
+        </p:txBody>
+      </p:sp>
+    </p:spTree>
+    <p:extLst>
+      <p:ext uri="{BB962C8B-B14F-4D97-AF65-F5344CB8AC3E}">
+        <p14:creationId xmlns:p14="http://schemas.microsoft.com/office/powerpoint/2010/main" val="2896392913"/>
+      </p:ext>
+    </p:extLst>
+  </p:cSld>
+  <p:clrMapOvr>
+    <a:masterClrMapping/>
+  </p:clrMapOvr>
+</p:notes>
+</file>
+
 <file path=ppt/notesSlides/notesSlide6.xml><?xml version="1.0" encoding="utf-8"?>
 <p:notes xmlns:a="http://schemas.openxmlformats.org/drawingml/2006/main" xmlns:r="http://schemas.openxmlformats.org/officeDocument/2006/relationships" xmlns:p="http://schemas.openxmlformats.org/presentationml/2006/main">
   <p:cSld>
@@ -5284,6 +5455,90 @@
     <p:extLst>
       <p:ext uri="{BB962C8B-B14F-4D97-AF65-F5344CB8AC3E}">
         <p14:creationId xmlns:p14="http://schemas.microsoft.com/office/powerpoint/2010/main" val="3079784339"/>
+      </p:ext>
+    </p:extLst>
+  </p:cSld>
+  <p:clrMapOvr>
+    <a:masterClrMapping/>
+  </p:clrMapOvr>
+</p:notes>
+</file>
+
+<file path=ppt/notesSlides/notesSlide60.xml><?xml version="1.0" encoding="utf-8"?>
+<p:notes xmlns:a="http://schemas.openxmlformats.org/drawingml/2006/main" xmlns:r="http://schemas.openxmlformats.org/officeDocument/2006/relationships" xmlns:p="http://schemas.openxmlformats.org/presentationml/2006/main">
+  <p:cSld>
+    <p:spTree>
+      <p:nvGrpSpPr>
+        <p:cNvPr id="1" name=""/>
+        <p:cNvGrpSpPr/>
+        <p:nvPr/>
+      </p:nvGrpSpPr>
+      <p:grpSpPr>
+        <a:xfrm>
+          <a:off x="0" y="0"/>
+          <a:ext cx="0" cy="0"/>
+          <a:chOff x="0" y="0"/>
+          <a:chExt cx="0" cy="0"/>
+        </a:xfrm>
+      </p:grpSpPr>
+      <p:sp>
+        <p:nvSpPr>
+          <p:cNvPr id="2" name="Slide Image Placeholder 1"/>
+          <p:cNvSpPr>
+            <a:spLocks noGrp="1" noRot="1" noChangeAspect="1"/>
+          </p:cNvSpPr>
+          <p:nvPr>
+            <p:ph type="sldImg"/>
+          </p:nvPr>
+        </p:nvSpPr>
+        <p:spPr/>
+      </p:sp>
+      <p:sp>
+        <p:nvSpPr>
+          <p:cNvPr id="3" name="Notes Placeholder 2"/>
+          <p:cNvSpPr>
+            <a:spLocks noGrp="1"/>
+          </p:cNvSpPr>
+          <p:nvPr>
+            <p:ph type="body" idx="1"/>
+          </p:nvPr>
+        </p:nvSpPr>
+        <p:spPr/>
+        <p:txBody>
+          <a:bodyPr/>
+          <a:lstStyle/>
+          <a:p>
+            <a:endParaRPr lang="en-US" dirty="0"/>
+          </a:p>
+        </p:txBody>
+      </p:sp>
+      <p:sp>
+        <p:nvSpPr>
+          <p:cNvPr id="4" name="Slide Number Placeholder 3"/>
+          <p:cNvSpPr>
+            <a:spLocks noGrp="1"/>
+          </p:cNvSpPr>
+          <p:nvPr>
+            <p:ph type="sldNum" sz="quarter" idx="10"/>
+          </p:nvPr>
+        </p:nvSpPr>
+        <p:spPr/>
+        <p:txBody>
+          <a:bodyPr/>
+          <a:lstStyle/>
+          <a:p>
+            <a:fld id="{6BB98AFB-CB0D-4DFE-87B9-B4B0D0DE73CD}" type="slidenum">
+              <a:rPr lang="en-US" smtClean="0"/>
+              <a:t>60</a:t>
+            </a:fld>
+            <a:endParaRPr lang="en-US" dirty="0"/>
+          </a:p>
+        </p:txBody>
+      </p:sp>
+    </p:spTree>
+    <p:extLst>
+      <p:ext uri="{BB962C8B-B14F-4D97-AF65-F5344CB8AC3E}">
+        <p14:creationId xmlns:p14="http://schemas.microsoft.com/office/powerpoint/2010/main" val="2349590784"/>
       </p:ext>
     </p:extLst>
   </p:cSld>
@@ -30148,7 +30403,7 @@
 </p:sld>
 </file>
 
-<file path=ppt/slides/slide6.xml><?xml version="1.0" encoding="utf-8"?>
+<file path=ppt/slides/slide58.xml><?xml version="1.0" encoding="utf-8"?>
 <p:sld xmlns:a="http://schemas.openxmlformats.org/drawingml/2006/main" xmlns:r="http://schemas.openxmlformats.org/officeDocument/2006/relationships" xmlns:p="http://schemas.openxmlformats.org/presentationml/2006/main">
   <p:cSld>
     <p:spTree>
@@ -30249,13 +30504,13 @@
         </p:nvSpPr>
         <p:spPr>
           <a:xfrm>
-            <a:off x="1065212" y="3403600"/>
-            <a:ext cx="5029201" cy="2185640"/>
+            <a:off x="549796" y="3403600"/>
+            <a:ext cx="5544617" cy="2185640"/>
           </a:xfrm>
         </p:spPr>
         <p:txBody>
           <a:bodyPr>
-            <a:normAutofit lnSpcReduction="10000"/>
+            <a:normAutofit/>
           </a:bodyPr>
           <a:lstStyle/>
           <a:p>
@@ -30265,7 +30520,7 @@
                 <a:ea typeface="ADLaM Display" panose="020F0502020204030204" pitchFamily="2" charset="0"/>
                 <a:cs typeface="ADLaM Display" panose="020F0502020204030204" pitchFamily="2" charset="0"/>
               </a:rPr>
-              <a:t>Chapter 2 Data Structure </a:t>
+              <a:t>Chapter 7 Work with Word</a:t>
             </a:r>
           </a:p>
           <a:p>
@@ -30275,7 +30530,17 @@
                 <a:ea typeface="ADLaM Display" panose="020F0502020204030204" pitchFamily="2" charset="0"/>
                 <a:cs typeface="ADLaM Display" panose="020F0502020204030204" pitchFamily="2" charset="0"/>
               </a:rPr>
-              <a:t>2.5 </a:t>
+              <a:t>7.11 Page Settings (1)</a:t>
+            </a:r>
+          </a:p>
+          <a:p>
+            <a:r>
+              <a:rPr lang="zh-CN" altLang="en-US" sz="2800" dirty="0">
+                <a:latin typeface="ADLaM Display" panose="020F0502020204030204" pitchFamily="2" charset="0"/>
+                <a:ea typeface="ADLaM Display" panose="020F0502020204030204" pitchFamily="2" charset="0"/>
+                <a:cs typeface="ADLaM Display" panose="020F0502020204030204" pitchFamily="2" charset="0"/>
+              </a:rPr>
+              <a:t>第七章 操作</a:t>
             </a:r>
             <a:r>
               <a:rPr lang="en-US" altLang="zh-CN" sz="2800" dirty="0">
@@ -30283,60 +30548,34 @@
                 <a:ea typeface="ADLaM Display" panose="020F0502020204030204" pitchFamily="2" charset="0"/>
                 <a:cs typeface="ADLaM Display" panose="020F0502020204030204" pitchFamily="2" charset="0"/>
               </a:rPr>
-              <a:t>Dictionary</a:t>
-            </a:r>
-          </a:p>
-          <a:p>
-            <a:endParaRPr lang="en-US" sz="2800" dirty="0">
-              <a:latin typeface="ADLaM Display" panose="020F0502020204030204" pitchFamily="2" charset="0"/>
-              <a:ea typeface="ADLaM Display" panose="020F0502020204030204" pitchFamily="2" charset="0"/>
-              <a:cs typeface="ADLaM Display" panose="020F0502020204030204" pitchFamily="2" charset="0"/>
-            </a:endParaRPr>
-          </a:p>
-          <a:p>
+              <a:t>Word</a:t>
+            </a:r>
+          </a:p>
+          <a:p>
+            <a:r>
+              <a:rPr lang="en-US" altLang="zh-CN" sz="2800" dirty="0">
+                <a:latin typeface="ADLaM Display" panose="020F0502020204030204" pitchFamily="2" charset="0"/>
+                <a:ea typeface="ADLaM Display" panose="020F0502020204030204" pitchFamily="2" charset="0"/>
+                <a:cs typeface="ADLaM Display" panose="020F0502020204030204" pitchFamily="2" charset="0"/>
+              </a:rPr>
+              <a:t>7.11 </a:t>
+            </a:r>
             <a:r>
               <a:rPr lang="zh-CN" altLang="en-US" sz="2800" dirty="0">
                 <a:latin typeface="ADLaM Display" panose="020F0502020204030204" pitchFamily="2" charset="0"/>
                 <a:ea typeface="ADLaM Display" panose="020F0502020204030204" pitchFamily="2" charset="0"/>
                 <a:cs typeface="ADLaM Display" panose="020F0502020204030204" pitchFamily="2" charset="0"/>
               </a:rPr>
-              <a:t>第二章 数据结构</a:t>
-            </a:r>
-            <a:endParaRPr lang="en-US" altLang="zh-CN" sz="2800" dirty="0">
-              <a:latin typeface="ADLaM Display" panose="020F0502020204030204" pitchFamily="2" charset="0"/>
-              <a:ea typeface="ADLaM Display" panose="020F0502020204030204" pitchFamily="2" charset="0"/>
-              <a:cs typeface="ADLaM Display" panose="020F0502020204030204" pitchFamily="2" charset="0"/>
-            </a:endParaRPr>
-          </a:p>
-          <a:p>
-            <a:r>
-              <a:rPr lang="en-US" sz="2800" dirty="0">
-                <a:latin typeface="ADLaM Display" panose="020F0502020204030204" pitchFamily="2" charset="0"/>
-                <a:ea typeface="ADLaM Display" panose="020F0502020204030204" pitchFamily="2" charset="0"/>
-                <a:cs typeface="ADLaM Display" panose="020F0502020204030204" pitchFamily="2" charset="0"/>
-              </a:rPr>
-              <a:t>2.5 </a:t>
-            </a:r>
-            <a:r>
-              <a:rPr lang="zh-CN" altLang="en-US" sz="2800" dirty="0">
-                <a:latin typeface="ADLaM Display" panose="020F0502020204030204" pitchFamily="2" charset="0"/>
-                <a:ea typeface="ADLaM Display" panose="020F0502020204030204" pitchFamily="2" charset="0"/>
-                <a:cs typeface="ADLaM Display" panose="020F0502020204030204" pitchFamily="2" charset="0"/>
-              </a:rPr>
-              <a:t>字典</a:t>
-            </a:r>
-            <a:endParaRPr lang="en-US" sz="2800" dirty="0">
-              <a:latin typeface="ADLaM Display" panose="020F0502020204030204" pitchFamily="2" charset="0"/>
-              <a:ea typeface="ADLaM Display" panose="020F0502020204030204" pitchFamily="2" charset="0"/>
-              <a:cs typeface="ADLaM Display" panose="020F0502020204030204" pitchFamily="2" charset="0"/>
-            </a:endParaRPr>
-          </a:p>
-          <a:p>
-            <a:endParaRPr lang="en-US" sz="2800" dirty="0">
-              <a:latin typeface="ADLaM Display" panose="020F0502020204030204" pitchFamily="2" charset="0"/>
-              <a:ea typeface="ADLaM Display" panose="020F0502020204030204" pitchFamily="2" charset="0"/>
-              <a:cs typeface="ADLaM Display" panose="020F0502020204030204" pitchFamily="2" charset="0"/>
-            </a:endParaRPr>
+              <a:t>页面设置 </a:t>
+            </a:r>
+            <a:r>
+              <a:rPr lang="en-US" altLang="zh-CN" sz="2800" dirty="0">
+                <a:latin typeface="ADLaM Display" panose="020F0502020204030204" pitchFamily="2" charset="0"/>
+                <a:ea typeface="ADLaM Display" panose="020F0502020204030204" pitchFamily="2" charset="0"/>
+                <a:cs typeface="ADLaM Display" panose="020F0502020204030204" pitchFamily="2" charset="0"/>
+              </a:rPr>
+              <a:t>(1)</a:t>
+            </a:r>
           </a:p>
         </p:txBody>
       </p:sp>
@@ -30394,6 +30633,872 @@
         </p:nvSpPr>
         <p:spPr>
           <a:xfrm>
+            <a:off x="405780" y="5722972"/>
+            <a:ext cx="7951216" cy="523220"/>
+          </a:xfrm>
+          <a:prstGeom prst="rect">
+            <a:avLst/>
+          </a:prstGeom>
+          <a:solidFill>
+            <a:schemeClr val="bg1">
+              <a:lumMod val="95000"/>
+            </a:schemeClr>
+          </a:solidFill>
+          <a:ln>
+            <a:solidFill>
+              <a:schemeClr val="bg2"/>
+            </a:solidFill>
+          </a:ln>
+        </p:spPr>
+        <p:txBody>
+          <a:bodyPr wrap="none" rtlCol="0" anchor="ctr" anchorCtr="1">
+            <a:spAutoFit/>
+          </a:bodyPr>
+          <a:lstStyle/>
+          <a:p>
+            <a:r>
+              <a:rPr lang="en-US" sz="2800" dirty="0">
+                <a:hlinkClick r:id="rId4"/>
+              </a:rPr>
+              <a:t>https://github.com/yasenstar/python_with_office</a:t>
+            </a:r>
+            <a:endParaRPr lang="en-US" sz="2800" dirty="0"/>
+          </a:p>
+        </p:txBody>
+      </p:sp>
+      <p:sp>
+        <p:nvSpPr>
+          <p:cNvPr id="9" name="TextBox 8">
+            <a:extLst>
+              <a:ext uri="{FF2B5EF4-FFF2-40B4-BE49-F238E27FC236}">
+                <a16:creationId xmlns:a16="http://schemas.microsoft.com/office/drawing/2014/main" id="{C25C84F5-3AA3-A068-7E2F-9123CA5A7D16}"/>
+              </a:ext>
+            </a:extLst>
+          </p:cNvPr>
+          <p:cNvSpPr txBox="1"/>
+          <p:nvPr/>
+        </p:nvSpPr>
+        <p:spPr>
+          <a:xfrm>
+            <a:off x="405780" y="6246192"/>
+            <a:ext cx="7951216" cy="523220"/>
+          </a:xfrm>
+          <a:prstGeom prst="rect">
+            <a:avLst/>
+          </a:prstGeom>
+          <a:solidFill>
+            <a:schemeClr val="bg1">
+              <a:lumMod val="95000"/>
+            </a:schemeClr>
+          </a:solidFill>
+          <a:ln>
+            <a:solidFill>
+              <a:schemeClr val="bg2"/>
+            </a:solidFill>
+          </a:ln>
+        </p:spPr>
+        <p:txBody>
+          <a:bodyPr wrap="square" rtlCol="0" anchor="ctr" anchorCtr="1">
+            <a:spAutoFit/>
+          </a:bodyPr>
+          <a:lstStyle/>
+          <a:p>
+            <a:r>
+              <a:rPr lang="en-US" sz="2800" dirty="0">
+                <a:hlinkClick r:id="rId5"/>
+              </a:rPr>
+              <a:t>https://gitee.com/yasenstar/python_with_office</a:t>
+            </a:r>
+            <a:endParaRPr lang="en-US" sz="2800" dirty="0"/>
+          </a:p>
+        </p:txBody>
+      </p:sp>
+      <p:pic>
+        <p:nvPicPr>
+          <p:cNvPr id="7" name="Picture 6">
+            <a:extLst>
+              <a:ext uri="{FF2B5EF4-FFF2-40B4-BE49-F238E27FC236}">
+                <a16:creationId xmlns:a16="http://schemas.microsoft.com/office/drawing/2014/main" id="{4C47AB2F-4A6D-FDCB-80C1-18B414222519}"/>
+              </a:ext>
+            </a:extLst>
+          </p:cNvPr>
+          <p:cNvPicPr>
+            <a:picLocks noChangeAspect="1"/>
+          </p:cNvPicPr>
+          <p:nvPr/>
+        </p:nvPicPr>
+        <p:blipFill>
+          <a:blip r:embed="rId6"/>
+          <a:stretch>
+            <a:fillRect/>
+          </a:stretch>
+        </p:blipFill>
+        <p:spPr>
+          <a:xfrm>
+            <a:off x="6094412" y="373791"/>
+            <a:ext cx="5760640" cy="5219249"/>
+          </a:xfrm>
+          <a:prstGeom prst="rect">
+            <a:avLst/>
+          </a:prstGeom>
+          <a:ln>
+            <a:noFill/>
+          </a:ln>
+          <a:effectLst>
+            <a:outerShdw blurRad="292100" dist="139700" dir="2700000" algn="tl" rotWithShape="0">
+              <a:srgbClr val="333333">
+                <a:alpha val="65000"/>
+              </a:srgbClr>
+            </a:outerShdw>
+          </a:effectLst>
+        </p:spPr>
+      </p:pic>
+      <p:sp>
+        <p:nvSpPr>
+          <p:cNvPr id="8" name="Rectangle 7">
+            <a:extLst>
+              <a:ext uri="{FF2B5EF4-FFF2-40B4-BE49-F238E27FC236}">
+                <a16:creationId xmlns:a16="http://schemas.microsoft.com/office/drawing/2014/main" id="{BF240C6B-5810-C38F-A5D9-138DB3FF9663}"/>
+              </a:ext>
+            </a:extLst>
+          </p:cNvPr>
+          <p:cNvSpPr/>
+          <p:nvPr/>
+        </p:nvSpPr>
+        <p:spPr>
+          <a:xfrm>
+            <a:off x="7318548" y="2858615"/>
+            <a:ext cx="4740667" cy="1002433"/>
+          </a:xfrm>
+          <a:prstGeom prst="rect">
+            <a:avLst/>
+          </a:prstGeom>
+          <a:noFill/>
+          <a:ln w="38100">
+            <a:solidFill>
+              <a:srgbClr val="FF0000"/>
+            </a:solidFill>
+          </a:ln>
+        </p:spPr>
+        <p:style>
+          <a:lnRef idx="2">
+            <a:schemeClr val="accent3"/>
+          </a:lnRef>
+          <a:fillRef idx="1">
+            <a:schemeClr val="lt1"/>
+          </a:fillRef>
+          <a:effectRef idx="0">
+            <a:schemeClr val="accent3"/>
+          </a:effectRef>
+          <a:fontRef idx="minor">
+            <a:schemeClr val="dk1"/>
+          </a:fontRef>
+        </p:style>
+        <p:txBody>
+          <a:bodyPr rtlCol="0" anchor="ctr"/>
+          <a:lstStyle/>
+          <a:p>
+            <a:pPr algn="ctr"/>
+            <a:endParaRPr lang="en-US" dirty="0"/>
+          </a:p>
+        </p:txBody>
+      </p:sp>
+    </p:spTree>
+    <p:extLst>
+      <p:ext uri="{BB962C8B-B14F-4D97-AF65-F5344CB8AC3E}">
+        <p14:creationId xmlns:p14="http://schemas.microsoft.com/office/powerpoint/2010/main" val="3748963969"/>
+      </p:ext>
+    </p:extLst>
+  </p:cSld>
+  <p:clrMapOvr>
+    <a:masterClrMapping/>
+  </p:clrMapOvr>
+  <mc:AlternateContent xmlns:mc="http://schemas.openxmlformats.org/markup-compatibility/2006">
+    <mc:Choice xmlns:p14="http://schemas.microsoft.com/office/powerpoint/2010/main" Requires="p14">
+      <p:transition spd="med" p14:dur="700">
+        <p:fade/>
+      </p:transition>
+    </mc:Choice>
+    <mc:Fallback>
+      <p:transition spd="med">
+        <p:fade/>
+      </p:transition>
+    </mc:Fallback>
+  </mc:AlternateContent>
+</p:sld>
+</file>
+
+<file path=ppt/slides/slide59.xml><?xml version="1.0" encoding="utf-8"?>
+<p:sld xmlns:a="http://schemas.openxmlformats.org/drawingml/2006/main" xmlns:r="http://schemas.openxmlformats.org/officeDocument/2006/relationships" xmlns:p="http://schemas.openxmlformats.org/presentationml/2006/main">
+  <p:cSld>
+    <p:spTree>
+      <p:nvGrpSpPr>
+        <p:cNvPr id="1" name=""/>
+        <p:cNvGrpSpPr/>
+        <p:nvPr/>
+      </p:nvGrpSpPr>
+      <p:grpSpPr>
+        <a:xfrm>
+          <a:off x="0" y="0"/>
+          <a:ext cx="0" cy="0"/>
+          <a:chOff x="0" y="0"/>
+          <a:chExt cx="0" cy="0"/>
+        </a:xfrm>
+      </p:grpSpPr>
+      <p:sp>
+        <p:nvSpPr>
+          <p:cNvPr id="4" name="Title 3"/>
+          <p:cNvSpPr>
+            <a:spLocks noGrp="1"/>
+          </p:cNvSpPr>
+          <p:nvPr>
+            <p:ph type="ctrTitle"/>
+          </p:nvPr>
+        </p:nvSpPr>
+        <p:spPr/>
+        <p:txBody>
+          <a:bodyPr>
+            <a:normAutofit/>
+          </a:bodyPr>
+          <a:lstStyle/>
+          <a:p>
+            <a:pPr algn="ctr"/>
+            <a:r>
+              <a:rPr lang="zh-CN" altLang="en-US" sz="4800" dirty="0">
+                <a:latin typeface="华文隶书" panose="02010800040101010101" pitchFamily="2" charset="-122"/>
+                <a:ea typeface="华文隶书" panose="02010800040101010101" pitchFamily="2" charset="-122"/>
+              </a:rPr>
+              <a:t>让</a:t>
+            </a:r>
+            <a:r>
+              <a:rPr lang="en-US" altLang="zh-CN" sz="4800" dirty="0">
+                <a:latin typeface="华文隶书" panose="02010800040101010101" pitchFamily="2" charset="-122"/>
+                <a:ea typeface="华文隶书" panose="02010800040101010101" pitchFamily="2" charset="-122"/>
+              </a:rPr>
+              <a:t>Python</a:t>
+            </a:r>
+            <a:r>
+              <a:rPr lang="zh-CN" altLang="en-US" sz="4800" dirty="0">
+                <a:latin typeface="华文隶书" panose="02010800040101010101" pitchFamily="2" charset="-122"/>
+                <a:ea typeface="华文隶书" panose="02010800040101010101" pitchFamily="2" charset="-122"/>
+              </a:rPr>
+              <a:t>遇上</a:t>
+            </a:r>
+            <a:r>
+              <a:rPr lang="en-US" altLang="zh-CN" sz="4800" dirty="0">
+                <a:latin typeface="华文隶书" panose="02010800040101010101" pitchFamily="2" charset="-122"/>
+                <a:ea typeface="华文隶书" panose="02010800040101010101" pitchFamily="2" charset="-122"/>
+              </a:rPr>
+              <a:t>Office</a:t>
+            </a:r>
+            <a:br>
+              <a:rPr lang="en-US" altLang="zh-CN" sz="4800" dirty="0">
+                <a:latin typeface="华文隶书" panose="02010800040101010101" pitchFamily="2" charset="-122"/>
+                <a:ea typeface="华文隶书" panose="02010800040101010101" pitchFamily="2" charset="-122"/>
+              </a:rPr>
+            </a:br>
+            <a:br>
+              <a:rPr lang="en-US" altLang="zh-CN" sz="4800" dirty="0">
+                <a:latin typeface="华文隶书" panose="02010800040101010101" pitchFamily="2" charset="-122"/>
+                <a:ea typeface="华文隶书" panose="02010800040101010101" pitchFamily="2" charset="-122"/>
+              </a:rPr>
+            </a:br>
+            <a:r>
+              <a:rPr lang="en-US" altLang="zh-CN" sz="4800" dirty="0">
+                <a:latin typeface="华文隶书" panose="02010800040101010101" pitchFamily="2" charset="-122"/>
+                <a:ea typeface="华文隶书" panose="02010800040101010101" pitchFamily="2" charset="-122"/>
+              </a:rPr>
+              <a:t>(Python with Office)</a:t>
+            </a:r>
+            <a:endParaRPr lang="en-US" sz="4800" dirty="0">
+              <a:latin typeface="华文隶书" panose="02010800040101010101" pitchFamily="2" charset="-122"/>
+              <a:ea typeface="华文隶书" panose="02010800040101010101" pitchFamily="2" charset="-122"/>
+            </a:endParaRPr>
+          </a:p>
+        </p:txBody>
+      </p:sp>
+      <p:sp>
+        <p:nvSpPr>
+          <p:cNvPr id="3" name="Content Placeholder 2"/>
+          <p:cNvSpPr>
+            <a:spLocks noGrp="1"/>
+          </p:cNvSpPr>
+          <p:nvPr>
+            <p:ph type="subTitle" idx="1"/>
+          </p:nvPr>
+        </p:nvSpPr>
+        <p:spPr>
+          <a:xfrm>
+            <a:off x="549796" y="3403600"/>
+            <a:ext cx="5544617" cy="2185640"/>
+          </a:xfrm>
+        </p:spPr>
+        <p:txBody>
+          <a:bodyPr>
+            <a:normAutofit/>
+          </a:bodyPr>
+          <a:lstStyle/>
+          <a:p>
+            <a:r>
+              <a:rPr lang="en-US" sz="2800" dirty="0">
+                <a:latin typeface="ADLaM Display" panose="020F0502020204030204" pitchFamily="2" charset="0"/>
+                <a:ea typeface="ADLaM Display" panose="020F0502020204030204" pitchFamily="2" charset="0"/>
+                <a:cs typeface="ADLaM Display" panose="020F0502020204030204" pitchFamily="2" charset="0"/>
+              </a:rPr>
+              <a:t>Chapter 7 Work with Word</a:t>
+            </a:r>
+          </a:p>
+          <a:p>
+            <a:r>
+              <a:rPr lang="en-US" sz="2800" dirty="0">
+                <a:latin typeface="ADLaM Display" panose="020F0502020204030204" pitchFamily="2" charset="0"/>
+                <a:ea typeface="ADLaM Display" panose="020F0502020204030204" pitchFamily="2" charset="0"/>
+                <a:cs typeface="ADLaM Display" panose="020F0502020204030204" pitchFamily="2" charset="0"/>
+              </a:rPr>
+              <a:t>7.11 Page Settings (2)</a:t>
+            </a:r>
+          </a:p>
+          <a:p>
+            <a:r>
+              <a:rPr lang="zh-CN" altLang="en-US" sz="2800" dirty="0">
+                <a:latin typeface="ADLaM Display" panose="020F0502020204030204" pitchFamily="2" charset="0"/>
+                <a:ea typeface="ADLaM Display" panose="020F0502020204030204" pitchFamily="2" charset="0"/>
+                <a:cs typeface="ADLaM Display" panose="020F0502020204030204" pitchFamily="2" charset="0"/>
+              </a:rPr>
+              <a:t>第七章 操作</a:t>
+            </a:r>
+            <a:r>
+              <a:rPr lang="en-US" altLang="zh-CN" sz="2800" dirty="0">
+                <a:latin typeface="ADLaM Display" panose="020F0502020204030204" pitchFamily="2" charset="0"/>
+                <a:ea typeface="ADLaM Display" panose="020F0502020204030204" pitchFamily="2" charset="0"/>
+                <a:cs typeface="ADLaM Display" panose="020F0502020204030204" pitchFamily="2" charset="0"/>
+              </a:rPr>
+              <a:t>Word</a:t>
+            </a:r>
+          </a:p>
+          <a:p>
+            <a:r>
+              <a:rPr lang="en-US" altLang="zh-CN" sz="2800" dirty="0">
+                <a:latin typeface="ADLaM Display" panose="020F0502020204030204" pitchFamily="2" charset="0"/>
+                <a:ea typeface="ADLaM Display" panose="020F0502020204030204" pitchFamily="2" charset="0"/>
+                <a:cs typeface="ADLaM Display" panose="020F0502020204030204" pitchFamily="2" charset="0"/>
+              </a:rPr>
+              <a:t>7.11 </a:t>
+            </a:r>
+            <a:r>
+              <a:rPr lang="zh-CN" altLang="en-US" sz="2800" dirty="0">
+                <a:latin typeface="ADLaM Display" panose="020F0502020204030204" pitchFamily="2" charset="0"/>
+                <a:ea typeface="ADLaM Display" panose="020F0502020204030204" pitchFamily="2" charset="0"/>
+                <a:cs typeface="ADLaM Display" panose="020F0502020204030204" pitchFamily="2" charset="0"/>
+              </a:rPr>
+              <a:t>页面设置 </a:t>
+            </a:r>
+            <a:r>
+              <a:rPr lang="en-US" altLang="zh-CN" sz="2800" dirty="0">
+                <a:latin typeface="ADLaM Display" panose="020F0502020204030204" pitchFamily="2" charset="0"/>
+                <a:ea typeface="ADLaM Display" panose="020F0502020204030204" pitchFamily="2" charset="0"/>
+                <a:cs typeface="ADLaM Display" panose="020F0502020204030204" pitchFamily="2" charset="0"/>
+              </a:rPr>
+              <a:t>(2)</a:t>
+            </a:r>
+          </a:p>
+        </p:txBody>
+      </p:sp>
+      <p:pic>
+        <p:nvPicPr>
+          <p:cNvPr id="5" name="Picture 4">
+            <a:extLst>
+              <a:ext uri="{FF2B5EF4-FFF2-40B4-BE49-F238E27FC236}">
+                <a16:creationId xmlns:a16="http://schemas.microsoft.com/office/drawing/2014/main" id="{4AD8B85C-B359-195F-B78C-C879AB7840B1}"/>
+              </a:ext>
+            </a:extLst>
+          </p:cNvPr>
+          <p:cNvPicPr>
+            <a:picLocks noChangeAspect="1"/>
+          </p:cNvPicPr>
+          <p:nvPr/>
+        </p:nvPicPr>
+        <p:blipFill>
+          <a:blip r:embed="rId3"/>
+          <a:stretch>
+            <a:fillRect/>
+          </a:stretch>
+        </p:blipFill>
+        <p:spPr>
+          <a:xfrm>
+            <a:off x="57601" y="1189856"/>
+            <a:ext cx="1068259" cy="1556792"/>
+          </a:xfrm>
+          <a:prstGeom prst="rect">
+            <a:avLst/>
+          </a:prstGeom>
+          <a:ln>
+            <a:noFill/>
+          </a:ln>
+          <a:effectLst>
+            <a:outerShdw blurRad="292100" dist="139700" dir="2700000" algn="tl" rotWithShape="0">
+              <a:srgbClr val="333333">
+                <a:alpha val="65000"/>
+              </a:srgbClr>
+            </a:outerShdw>
+          </a:effectLst>
+        </p:spPr>
+      </p:pic>
+      <p:sp>
+        <p:nvSpPr>
+          <p:cNvPr id="2" name="TextBox 1">
+            <a:extLst>
+              <a:ext uri="{FF2B5EF4-FFF2-40B4-BE49-F238E27FC236}">
+                <a16:creationId xmlns:a16="http://schemas.microsoft.com/office/drawing/2014/main" id="{CAB2C784-DE74-68FC-7A84-3E6C5D164315}"/>
+              </a:ext>
+            </a:extLst>
+          </p:cNvPr>
+          <p:cNvSpPr txBox="1"/>
+          <p:nvPr/>
+        </p:nvSpPr>
+        <p:spPr>
+          <a:xfrm>
+            <a:off x="405780" y="5722972"/>
+            <a:ext cx="7951216" cy="523220"/>
+          </a:xfrm>
+          <a:prstGeom prst="rect">
+            <a:avLst/>
+          </a:prstGeom>
+          <a:solidFill>
+            <a:schemeClr val="bg1">
+              <a:lumMod val="95000"/>
+            </a:schemeClr>
+          </a:solidFill>
+          <a:ln>
+            <a:solidFill>
+              <a:schemeClr val="bg2"/>
+            </a:solidFill>
+          </a:ln>
+        </p:spPr>
+        <p:txBody>
+          <a:bodyPr wrap="none" rtlCol="0" anchor="ctr" anchorCtr="1">
+            <a:spAutoFit/>
+          </a:bodyPr>
+          <a:lstStyle/>
+          <a:p>
+            <a:r>
+              <a:rPr lang="en-US" sz="2800" dirty="0">
+                <a:hlinkClick r:id="rId4"/>
+              </a:rPr>
+              <a:t>https://github.com/yasenstar/python_with_office</a:t>
+            </a:r>
+            <a:endParaRPr lang="en-US" sz="2800" dirty="0"/>
+          </a:p>
+        </p:txBody>
+      </p:sp>
+      <p:sp>
+        <p:nvSpPr>
+          <p:cNvPr id="9" name="TextBox 8">
+            <a:extLst>
+              <a:ext uri="{FF2B5EF4-FFF2-40B4-BE49-F238E27FC236}">
+                <a16:creationId xmlns:a16="http://schemas.microsoft.com/office/drawing/2014/main" id="{C25C84F5-3AA3-A068-7E2F-9123CA5A7D16}"/>
+              </a:ext>
+            </a:extLst>
+          </p:cNvPr>
+          <p:cNvSpPr txBox="1"/>
+          <p:nvPr/>
+        </p:nvSpPr>
+        <p:spPr>
+          <a:xfrm>
+            <a:off x="405780" y="6246192"/>
+            <a:ext cx="7951216" cy="523220"/>
+          </a:xfrm>
+          <a:prstGeom prst="rect">
+            <a:avLst/>
+          </a:prstGeom>
+          <a:solidFill>
+            <a:schemeClr val="bg1">
+              <a:lumMod val="95000"/>
+            </a:schemeClr>
+          </a:solidFill>
+          <a:ln>
+            <a:solidFill>
+              <a:schemeClr val="bg2"/>
+            </a:solidFill>
+          </a:ln>
+        </p:spPr>
+        <p:txBody>
+          <a:bodyPr wrap="square" rtlCol="0" anchor="ctr" anchorCtr="1">
+            <a:spAutoFit/>
+          </a:bodyPr>
+          <a:lstStyle/>
+          <a:p>
+            <a:r>
+              <a:rPr lang="en-US" sz="2800" dirty="0">
+                <a:hlinkClick r:id="rId5"/>
+              </a:rPr>
+              <a:t>https://gitee.com/yasenstar/python_with_office</a:t>
+            </a:r>
+            <a:endParaRPr lang="en-US" sz="2800" dirty="0"/>
+          </a:p>
+        </p:txBody>
+      </p:sp>
+      <p:pic>
+        <p:nvPicPr>
+          <p:cNvPr id="7" name="Picture 6">
+            <a:extLst>
+              <a:ext uri="{FF2B5EF4-FFF2-40B4-BE49-F238E27FC236}">
+                <a16:creationId xmlns:a16="http://schemas.microsoft.com/office/drawing/2014/main" id="{4C47AB2F-4A6D-FDCB-80C1-18B414222519}"/>
+              </a:ext>
+            </a:extLst>
+          </p:cNvPr>
+          <p:cNvPicPr>
+            <a:picLocks noChangeAspect="1"/>
+          </p:cNvPicPr>
+          <p:nvPr/>
+        </p:nvPicPr>
+        <p:blipFill>
+          <a:blip r:embed="rId6"/>
+          <a:stretch>
+            <a:fillRect/>
+          </a:stretch>
+        </p:blipFill>
+        <p:spPr>
+          <a:xfrm>
+            <a:off x="6094412" y="373791"/>
+            <a:ext cx="5760640" cy="5219249"/>
+          </a:xfrm>
+          <a:prstGeom prst="rect">
+            <a:avLst/>
+          </a:prstGeom>
+          <a:ln>
+            <a:noFill/>
+          </a:ln>
+          <a:effectLst>
+            <a:outerShdw blurRad="292100" dist="139700" dir="2700000" algn="tl" rotWithShape="0">
+              <a:srgbClr val="333333">
+                <a:alpha val="65000"/>
+              </a:srgbClr>
+            </a:outerShdw>
+          </a:effectLst>
+        </p:spPr>
+      </p:pic>
+      <p:sp>
+        <p:nvSpPr>
+          <p:cNvPr id="8" name="Rectangle 7">
+            <a:extLst>
+              <a:ext uri="{FF2B5EF4-FFF2-40B4-BE49-F238E27FC236}">
+                <a16:creationId xmlns:a16="http://schemas.microsoft.com/office/drawing/2014/main" id="{BF240C6B-5810-C38F-A5D9-138DB3FF9663}"/>
+              </a:ext>
+            </a:extLst>
+          </p:cNvPr>
+          <p:cNvSpPr/>
+          <p:nvPr/>
+        </p:nvSpPr>
+        <p:spPr>
+          <a:xfrm>
+            <a:off x="7318548" y="3861048"/>
+            <a:ext cx="4740667" cy="792088"/>
+          </a:xfrm>
+          <a:prstGeom prst="rect">
+            <a:avLst/>
+          </a:prstGeom>
+          <a:noFill/>
+          <a:ln w="38100">
+            <a:solidFill>
+              <a:srgbClr val="FF0000"/>
+            </a:solidFill>
+          </a:ln>
+        </p:spPr>
+        <p:style>
+          <a:lnRef idx="2">
+            <a:schemeClr val="accent3"/>
+          </a:lnRef>
+          <a:fillRef idx="1">
+            <a:schemeClr val="lt1"/>
+          </a:fillRef>
+          <a:effectRef idx="0">
+            <a:schemeClr val="accent3"/>
+          </a:effectRef>
+          <a:fontRef idx="minor">
+            <a:schemeClr val="dk1"/>
+          </a:fontRef>
+        </p:style>
+        <p:txBody>
+          <a:bodyPr rtlCol="0" anchor="ctr"/>
+          <a:lstStyle/>
+          <a:p>
+            <a:pPr algn="ctr"/>
+            <a:endParaRPr lang="en-US" dirty="0"/>
+          </a:p>
+        </p:txBody>
+      </p:sp>
+    </p:spTree>
+    <p:extLst>
+      <p:ext uri="{BB962C8B-B14F-4D97-AF65-F5344CB8AC3E}">
+        <p14:creationId xmlns:p14="http://schemas.microsoft.com/office/powerpoint/2010/main" val="3712601381"/>
+      </p:ext>
+    </p:extLst>
+  </p:cSld>
+  <p:clrMapOvr>
+    <a:masterClrMapping/>
+  </p:clrMapOvr>
+  <mc:AlternateContent xmlns:mc="http://schemas.openxmlformats.org/markup-compatibility/2006">
+    <mc:Choice xmlns:p14="http://schemas.microsoft.com/office/powerpoint/2010/main" Requires="p14">
+      <p:transition spd="med" p14:dur="700">
+        <p:fade/>
+      </p:transition>
+    </mc:Choice>
+    <mc:Fallback>
+      <p:transition spd="med">
+        <p:fade/>
+      </p:transition>
+    </mc:Fallback>
+  </mc:AlternateContent>
+</p:sld>
+</file>
+
+<file path=ppt/slides/slide6.xml><?xml version="1.0" encoding="utf-8"?>
+<p:sld xmlns:a="http://schemas.openxmlformats.org/drawingml/2006/main" xmlns:r="http://schemas.openxmlformats.org/officeDocument/2006/relationships" xmlns:p="http://schemas.openxmlformats.org/presentationml/2006/main">
+  <p:cSld>
+    <p:spTree>
+      <p:nvGrpSpPr>
+        <p:cNvPr id="1" name=""/>
+        <p:cNvGrpSpPr/>
+        <p:nvPr/>
+      </p:nvGrpSpPr>
+      <p:grpSpPr>
+        <a:xfrm>
+          <a:off x="0" y="0"/>
+          <a:ext cx="0" cy="0"/>
+          <a:chOff x="0" y="0"/>
+          <a:chExt cx="0" cy="0"/>
+        </a:xfrm>
+      </p:grpSpPr>
+      <p:sp>
+        <p:nvSpPr>
+          <p:cNvPr id="4" name="Title 3"/>
+          <p:cNvSpPr>
+            <a:spLocks noGrp="1"/>
+          </p:cNvSpPr>
+          <p:nvPr>
+            <p:ph type="ctrTitle"/>
+          </p:nvPr>
+        </p:nvSpPr>
+        <p:spPr/>
+        <p:txBody>
+          <a:bodyPr>
+            <a:normAutofit/>
+          </a:bodyPr>
+          <a:lstStyle/>
+          <a:p>
+            <a:pPr algn="ctr"/>
+            <a:r>
+              <a:rPr lang="zh-CN" altLang="en-US" sz="4800" dirty="0">
+                <a:latin typeface="华文隶书" panose="02010800040101010101" pitchFamily="2" charset="-122"/>
+                <a:ea typeface="华文隶书" panose="02010800040101010101" pitchFamily="2" charset="-122"/>
+              </a:rPr>
+              <a:t>让</a:t>
+            </a:r>
+            <a:r>
+              <a:rPr lang="en-US" altLang="zh-CN" sz="4800" dirty="0">
+                <a:latin typeface="华文隶书" panose="02010800040101010101" pitchFamily="2" charset="-122"/>
+                <a:ea typeface="华文隶书" panose="02010800040101010101" pitchFamily="2" charset="-122"/>
+              </a:rPr>
+              <a:t>Python</a:t>
+            </a:r>
+            <a:r>
+              <a:rPr lang="zh-CN" altLang="en-US" sz="4800" dirty="0">
+                <a:latin typeface="华文隶书" panose="02010800040101010101" pitchFamily="2" charset="-122"/>
+                <a:ea typeface="华文隶书" panose="02010800040101010101" pitchFamily="2" charset="-122"/>
+              </a:rPr>
+              <a:t>遇上</a:t>
+            </a:r>
+            <a:r>
+              <a:rPr lang="en-US" altLang="zh-CN" sz="4800" dirty="0">
+                <a:latin typeface="华文隶书" panose="02010800040101010101" pitchFamily="2" charset="-122"/>
+                <a:ea typeface="华文隶书" panose="02010800040101010101" pitchFamily="2" charset="-122"/>
+              </a:rPr>
+              <a:t>Office</a:t>
+            </a:r>
+            <a:br>
+              <a:rPr lang="en-US" altLang="zh-CN" sz="4800" dirty="0">
+                <a:latin typeface="华文隶书" panose="02010800040101010101" pitchFamily="2" charset="-122"/>
+                <a:ea typeface="华文隶书" panose="02010800040101010101" pitchFamily="2" charset="-122"/>
+              </a:rPr>
+            </a:br>
+            <a:br>
+              <a:rPr lang="en-US" altLang="zh-CN" sz="4800" dirty="0">
+                <a:latin typeface="华文隶书" panose="02010800040101010101" pitchFamily="2" charset="-122"/>
+                <a:ea typeface="华文隶书" panose="02010800040101010101" pitchFamily="2" charset="-122"/>
+              </a:rPr>
+            </a:br>
+            <a:r>
+              <a:rPr lang="en-US" altLang="zh-CN" sz="4800" dirty="0">
+                <a:latin typeface="华文隶书" panose="02010800040101010101" pitchFamily="2" charset="-122"/>
+                <a:ea typeface="华文隶书" panose="02010800040101010101" pitchFamily="2" charset="-122"/>
+              </a:rPr>
+              <a:t>(Python with Office)</a:t>
+            </a:r>
+            <a:endParaRPr lang="en-US" sz="4800" dirty="0">
+              <a:latin typeface="华文隶书" panose="02010800040101010101" pitchFamily="2" charset="-122"/>
+              <a:ea typeface="华文隶书" panose="02010800040101010101" pitchFamily="2" charset="-122"/>
+            </a:endParaRPr>
+          </a:p>
+        </p:txBody>
+      </p:sp>
+      <p:sp>
+        <p:nvSpPr>
+          <p:cNvPr id="3" name="Content Placeholder 2"/>
+          <p:cNvSpPr>
+            <a:spLocks noGrp="1"/>
+          </p:cNvSpPr>
+          <p:nvPr>
+            <p:ph type="subTitle" idx="1"/>
+          </p:nvPr>
+        </p:nvSpPr>
+        <p:spPr>
+          <a:xfrm>
+            <a:off x="1065212" y="3403600"/>
+            <a:ext cx="5029201" cy="2185640"/>
+          </a:xfrm>
+        </p:spPr>
+        <p:txBody>
+          <a:bodyPr>
+            <a:normAutofit lnSpcReduction="10000"/>
+          </a:bodyPr>
+          <a:lstStyle/>
+          <a:p>
+            <a:r>
+              <a:rPr lang="en-US" sz="2800" dirty="0">
+                <a:latin typeface="ADLaM Display" panose="020F0502020204030204" pitchFamily="2" charset="0"/>
+                <a:ea typeface="ADLaM Display" panose="020F0502020204030204" pitchFamily="2" charset="0"/>
+                <a:cs typeface="ADLaM Display" panose="020F0502020204030204" pitchFamily="2" charset="0"/>
+              </a:rPr>
+              <a:t>Chapter 2 Data Structure </a:t>
+            </a:r>
+          </a:p>
+          <a:p>
+            <a:r>
+              <a:rPr lang="en-US" sz="2800" dirty="0">
+                <a:latin typeface="ADLaM Display" panose="020F0502020204030204" pitchFamily="2" charset="0"/>
+                <a:ea typeface="ADLaM Display" panose="020F0502020204030204" pitchFamily="2" charset="0"/>
+                <a:cs typeface="ADLaM Display" panose="020F0502020204030204" pitchFamily="2" charset="0"/>
+              </a:rPr>
+              <a:t>2.5 </a:t>
+            </a:r>
+            <a:r>
+              <a:rPr lang="en-US" altLang="zh-CN" sz="2800" dirty="0">
+                <a:latin typeface="ADLaM Display" panose="020F0502020204030204" pitchFamily="2" charset="0"/>
+                <a:ea typeface="ADLaM Display" panose="020F0502020204030204" pitchFamily="2" charset="0"/>
+                <a:cs typeface="ADLaM Display" panose="020F0502020204030204" pitchFamily="2" charset="0"/>
+              </a:rPr>
+              <a:t>Dictionary</a:t>
+            </a:r>
+          </a:p>
+          <a:p>
+            <a:endParaRPr lang="en-US" sz="2800" dirty="0">
+              <a:latin typeface="ADLaM Display" panose="020F0502020204030204" pitchFamily="2" charset="0"/>
+              <a:ea typeface="ADLaM Display" panose="020F0502020204030204" pitchFamily="2" charset="0"/>
+              <a:cs typeface="ADLaM Display" panose="020F0502020204030204" pitchFamily="2" charset="0"/>
+            </a:endParaRPr>
+          </a:p>
+          <a:p>
+            <a:r>
+              <a:rPr lang="zh-CN" altLang="en-US" sz="2800" dirty="0">
+                <a:latin typeface="ADLaM Display" panose="020F0502020204030204" pitchFamily="2" charset="0"/>
+                <a:ea typeface="ADLaM Display" panose="020F0502020204030204" pitchFamily="2" charset="0"/>
+                <a:cs typeface="ADLaM Display" panose="020F0502020204030204" pitchFamily="2" charset="0"/>
+              </a:rPr>
+              <a:t>第二章 数据结构</a:t>
+            </a:r>
+            <a:endParaRPr lang="en-US" altLang="zh-CN" sz="2800" dirty="0">
+              <a:latin typeface="ADLaM Display" panose="020F0502020204030204" pitchFamily="2" charset="0"/>
+              <a:ea typeface="ADLaM Display" panose="020F0502020204030204" pitchFamily="2" charset="0"/>
+              <a:cs typeface="ADLaM Display" panose="020F0502020204030204" pitchFamily="2" charset="0"/>
+            </a:endParaRPr>
+          </a:p>
+          <a:p>
+            <a:r>
+              <a:rPr lang="en-US" sz="2800" dirty="0">
+                <a:latin typeface="ADLaM Display" panose="020F0502020204030204" pitchFamily="2" charset="0"/>
+                <a:ea typeface="ADLaM Display" panose="020F0502020204030204" pitchFamily="2" charset="0"/>
+                <a:cs typeface="ADLaM Display" panose="020F0502020204030204" pitchFamily="2" charset="0"/>
+              </a:rPr>
+              <a:t>2.5 </a:t>
+            </a:r>
+            <a:r>
+              <a:rPr lang="zh-CN" altLang="en-US" sz="2800" dirty="0">
+                <a:latin typeface="ADLaM Display" panose="020F0502020204030204" pitchFamily="2" charset="0"/>
+                <a:ea typeface="ADLaM Display" panose="020F0502020204030204" pitchFamily="2" charset="0"/>
+                <a:cs typeface="ADLaM Display" panose="020F0502020204030204" pitchFamily="2" charset="0"/>
+              </a:rPr>
+              <a:t>字典</a:t>
+            </a:r>
+            <a:endParaRPr lang="en-US" sz="2800" dirty="0">
+              <a:latin typeface="ADLaM Display" panose="020F0502020204030204" pitchFamily="2" charset="0"/>
+              <a:ea typeface="ADLaM Display" panose="020F0502020204030204" pitchFamily="2" charset="0"/>
+              <a:cs typeface="ADLaM Display" panose="020F0502020204030204" pitchFamily="2" charset="0"/>
+            </a:endParaRPr>
+          </a:p>
+          <a:p>
+            <a:endParaRPr lang="en-US" sz="2800" dirty="0">
+              <a:latin typeface="ADLaM Display" panose="020F0502020204030204" pitchFamily="2" charset="0"/>
+              <a:ea typeface="ADLaM Display" panose="020F0502020204030204" pitchFamily="2" charset="0"/>
+              <a:cs typeface="ADLaM Display" panose="020F0502020204030204" pitchFamily="2" charset="0"/>
+            </a:endParaRPr>
+          </a:p>
+        </p:txBody>
+      </p:sp>
+      <p:pic>
+        <p:nvPicPr>
+          <p:cNvPr id="5" name="Picture 4">
+            <a:extLst>
+              <a:ext uri="{FF2B5EF4-FFF2-40B4-BE49-F238E27FC236}">
+                <a16:creationId xmlns:a16="http://schemas.microsoft.com/office/drawing/2014/main" id="{4AD8B85C-B359-195F-B78C-C879AB7840B1}"/>
+              </a:ext>
+            </a:extLst>
+          </p:cNvPr>
+          <p:cNvPicPr>
+            <a:picLocks noChangeAspect="1"/>
+          </p:cNvPicPr>
+          <p:nvPr/>
+        </p:nvPicPr>
+        <p:blipFill>
+          <a:blip r:embed="rId3"/>
+          <a:stretch>
+            <a:fillRect/>
+          </a:stretch>
+        </p:blipFill>
+        <p:spPr>
+          <a:xfrm>
+            <a:off x="57601" y="1189856"/>
+            <a:ext cx="1068259" cy="1556792"/>
+          </a:xfrm>
+          <a:prstGeom prst="rect">
+            <a:avLst/>
+          </a:prstGeom>
+          <a:ln>
+            <a:noFill/>
+          </a:ln>
+          <a:effectLst>
+            <a:outerShdw blurRad="292100" dist="139700" dir="2700000" algn="tl" rotWithShape="0">
+              <a:srgbClr val="333333">
+                <a:alpha val="65000"/>
+              </a:srgbClr>
+            </a:outerShdw>
+          </a:effectLst>
+        </p:spPr>
+      </p:pic>
+      <p:sp>
+        <p:nvSpPr>
+          <p:cNvPr id="2" name="TextBox 1">
+            <a:extLst>
+              <a:ext uri="{FF2B5EF4-FFF2-40B4-BE49-F238E27FC236}">
+                <a16:creationId xmlns:a16="http://schemas.microsoft.com/office/drawing/2014/main" id="{CAB2C784-DE74-68FC-7A84-3E6C5D164315}"/>
+              </a:ext>
+            </a:extLst>
+          </p:cNvPr>
+          <p:cNvSpPr txBox="1"/>
+          <p:nvPr/>
+        </p:nvSpPr>
+        <p:spPr>
+          <a:xfrm>
             <a:off x="405780" y="6139934"/>
             <a:ext cx="7951216" cy="523220"/>
           </a:xfrm>
@@ -30484,6 +31589,431 @@
       </p:transition>
     </mc:Choice>
     <mc:Fallback xmlns="">
+      <p:transition spd="med">
+        <p:fade/>
+      </p:transition>
+    </mc:Fallback>
+  </mc:AlternateContent>
+</p:sld>
+</file>
+
+<file path=ppt/slides/slide60.xml><?xml version="1.0" encoding="utf-8"?>
+<p:sld xmlns:a="http://schemas.openxmlformats.org/drawingml/2006/main" xmlns:r="http://schemas.openxmlformats.org/officeDocument/2006/relationships" xmlns:p="http://schemas.openxmlformats.org/presentationml/2006/main">
+  <p:cSld>
+    <p:spTree>
+      <p:nvGrpSpPr>
+        <p:cNvPr id="1" name=""/>
+        <p:cNvGrpSpPr/>
+        <p:nvPr/>
+      </p:nvGrpSpPr>
+      <p:grpSpPr>
+        <a:xfrm>
+          <a:off x="0" y="0"/>
+          <a:ext cx="0" cy="0"/>
+          <a:chOff x="0" y="0"/>
+          <a:chExt cx="0" cy="0"/>
+        </a:xfrm>
+      </p:grpSpPr>
+      <p:sp>
+        <p:nvSpPr>
+          <p:cNvPr id="4" name="Title 3"/>
+          <p:cNvSpPr>
+            <a:spLocks noGrp="1"/>
+          </p:cNvSpPr>
+          <p:nvPr>
+            <p:ph type="ctrTitle"/>
+          </p:nvPr>
+        </p:nvSpPr>
+        <p:spPr/>
+        <p:txBody>
+          <a:bodyPr>
+            <a:normAutofit/>
+          </a:bodyPr>
+          <a:lstStyle/>
+          <a:p>
+            <a:pPr algn="ctr"/>
+            <a:r>
+              <a:rPr lang="zh-CN" altLang="en-US" sz="4800" dirty="0">
+                <a:latin typeface="华文隶书" panose="02010800040101010101" pitchFamily="2" charset="-122"/>
+                <a:ea typeface="华文隶书" panose="02010800040101010101" pitchFamily="2" charset="-122"/>
+              </a:rPr>
+              <a:t>让</a:t>
+            </a:r>
+            <a:r>
+              <a:rPr lang="en-US" altLang="zh-CN" sz="4800" dirty="0">
+                <a:latin typeface="华文隶书" panose="02010800040101010101" pitchFamily="2" charset="-122"/>
+                <a:ea typeface="华文隶书" panose="02010800040101010101" pitchFamily="2" charset="-122"/>
+              </a:rPr>
+              <a:t>Python</a:t>
+            </a:r>
+            <a:r>
+              <a:rPr lang="zh-CN" altLang="en-US" sz="4800" dirty="0">
+                <a:latin typeface="华文隶书" panose="02010800040101010101" pitchFamily="2" charset="-122"/>
+                <a:ea typeface="华文隶书" panose="02010800040101010101" pitchFamily="2" charset="-122"/>
+              </a:rPr>
+              <a:t>遇上</a:t>
+            </a:r>
+            <a:r>
+              <a:rPr lang="en-US" altLang="zh-CN" sz="4800" dirty="0">
+                <a:latin typeface="华文隶书" panose="02010800040101010101" pitchFamily="2" charset="-122"/>
+                <a:ea typeface="华文隶书" panose="02010800040101010101" pitchFamily="2" charset="-122"/>
+              </a:rPr>
+              <a:t>Office</a:t>
+            </a:r>
+            <a:br>
+              <a:rPr lang="en-US" altLang="zh-CN" sz="4800" dirty="0">
+                <a:latin typeface="华文隶书" panose="02010800040101010101" pitchFamily="2" charset="-122"/>
+                <a:ea typeface="华文隶书" panose="02010800040101010101" pitchFamily="2" charset="-122"/>
+              </a:rPr>
+            </a:br>
+            <a:br>
+              <a:rPr lang="en-US" altLang="zh-CN" sz="4800" dirty="0">
+                <a:latin typeface="华文隶书" panose="02010800040101010101" pitchFamily="2" charset="-122"/>
+                <a:ea typeface="华文隶书" panose="02010800040101010101" pitchFamily="2" charset="-122"/>
+              </a:rPr>
+            </a:br>
+            <a:r>
+              <a:rPr lang="en-US" altLang="zh-CN" sz="4800" dirty="0">
+                <a:latin typeface="华文隶书" panose="02010800040101010101" pitchFamily="2" charset="-122"/>
+                <a:ea typeface="华文隶书" panose="02010800040101010101" pitchFamily="2" charset="-122"/>
+              </a:rPr>
+              <a:t>(Python with Office)</a:t>
+            </a:r>
+            <a:endParaRPr lang="en-US" sz="4800" dirty="0">
+              <a:latin typeface="华文隶书" panose="02010800040101010101" pitchFamily="2" charset="-122"/>
+              <a:ea typeface="华文隶书" panose="02010800040101010101" pitchFamily="2" charset="-122"/>
+            </a:endParaRPr>
+          </a:p>
+        </p:txBody>
+      </p:sp>
+      <p:sp>
+        <p:nvSpPr>
+          <p:cNvPr id="3" name="Content Placeholder 2"/>
+          <p:cNvSpPr>
+            <a:spLocks noGrp="1"/>
+          </p:cNvSpPr>
+          <p:nvPr>
+            <p:ph type="subTitle" idx="1"/>
+          </p:nvPr>
+        </p:nvSpPr>
+        <p:spPr>
+          <a:xfrm>
+            <a:off x="549796" y="3403600"/>
+            <a:ext cx="5544617" cy="2185640"/>
+          </a:xfrm>
+        </p:spPr>
+        <p:txBody>
+          <a:bodyPr>
+            <a:normAutofit/>
+          </a:bodyPr>
+          <a:lstStyle/>
+          <a:p>
+            <a:r>
+              <a:rPr lang="en-US" sz="2800" dirty="0">
+                <a:latin typeface="ADLaM Display" panose="020F0502020204030204" pitchFamily="2" charset="0"/>
+                <a:ea typeface="ADLaM Display" panose="020F0502020204030204" pitchFamily="2" charset="0"/>
+                <a:cs typeface="ADLaM Display" panose="020F0502020204030204" pitchFamily="2" charset="0"/>
+              </a:rPr>
+              <a:t>Chapter 7 Work with Word</a:t>
+            </a:r>
+          </a:p>
+          <a:p>
+            <a:r>
+              <a:rPr lang="en-US" sz="2800" dirty="0">
+                <a:latin typeface="ADLaM Display" panose="020F0502020204030204" pitchFamily="2" charset="0"/>
+                <a:ea typeface="ADLaM Display" panose="020F0502020204030204" pitchFamily="2" charset="0"/>
+                <a:cs typeface="ADLaM Display" panose="020F0502020204030204" pitchFamily="2" charset="0"/>
+              </a:rPr>
+              <a:t>7.11 Page Settings (3)</a:t>
+            </a:r>
+          </a:p>
+          <a:p>
+            <a:r>
+              <a:rPr lang="zh-CN" altLang="en-US" sz="2800" dirty="0">
+                <a:latin typeface="ADLaM Display" panose="020F0502020204030204" pitchFamily="2" charset="0"/>
+                <a:ea typeface="ADLaM Display" panose="020F0502020204030204" pitchFamily="2" charset="0"/>
+                <a:cs typeface="ADLaM Display" panose="020F0502020204030204" pitchFamily="2" charset="0"/>
+              </a:rPr>
+              <a:t>第七章 操作</a:t>
+            </a:r>
+            <a:r>
+              <a:rPr lang="en-US" altLang="zh-CN" sz="2800" dirty="0">
+                <a:latin typeface="ADLaM Display" panose="020F0502020204030204" pitchFamily="2" charset="0"/>
+                <a:ea typeface="ADLaM Display" panose="020F0502020204030204" pitchFamily="2" charset="0"/>
+                <a:cs typeface="ADLaM Display" panose="020F0502020204030204" pitchFamily="2" charset="0"/>
+              </a:rPr>
+              <a:t>Word</a:t>
+            </a:r>
+          </a:p>
+          <a:p>
+            <a:r>
+              <a:rPr lang="en-US" altLang="zh-CN" sz="2800" dirty="0">
+                <a:latin typeface="ADLaM Display" panose="020F0502020204030204" pitchFamily="2" charset="0"/>
+                <a:ea typeface="ADLaM Display" panose="020F0502020204030204" pitchFamily="2" charset="0"/>
+                <a:cs typeface="ADLaM Display" panose="020F0502020204030204" pitchFamily="2" charset="0"/>
+              </a:rPr>
+              <a:t>7.11 </a:t>
+            </a:r>
+            <a:r>
+              <a:rPr lang="zh-CN" altLang="en-US" sz="2800" dirty="0">
+                <a:latin typeface="ADLaM Display" panose="020F0502020204030204" pitchFamily="2" charset="0"/>
+                <a:ea typeface="ADLaM Display" panose="020F0502020204030204" pitchFamily="2" charset="0"/>
+                <a:cs typeface="ADLaM Display" panose="020F0502020204030204" pitchFamily="2" charset="0"/>
+              </a:rPr>
+              <a:t>页面设置 </a:t>
+            </a:r>
+            <a:r>
+              <a:rPr lang="en-US" altLang="zh-CN" sz="2800" dirty="0">
+                <a:latin typeface="ADLaM Display" panose="020F0502020204030204" pitchFamily="2" charset="0"/>
+                <a:ea typeface="ADLaM Display" panose="020F0502020204030204" pitchFamily="2" charset="0"/>
+                <a:cs typeface="ADLaM Display" panose="020F0502020204030204" pitchFamily="2" charset="0"/>
+              </a:rPr>
+              <a:t>(3)</a:t>
+            </a:r>
+          </a:p>
+        </p:txBody>
+      </p:sp>
+      <p:pic>
+        <p:nvPicPr>
+          <p:cNvPr id="5" name="Picture 4">
+            <a:extLst>
+              <a:ext uri="{FF2B5EF4-FFF2-40B4-BE49-F238E27FC236}">
+                <a16:creationId xmlns:a16="http://schemas.microsoft.com/office/drawing/2014/main" id="{4AD8B85C-B359-195F-B78C-C879AB7840B1}"/>
+              </a:ext>
+            </a:extLst>
+          </p:cNvPr>
+          <p:cNvPicPr>
+            <a:picLocks noChangeAspect="1"/>
+          </p:cNvPicPr>
+          <p:nvPr/>
+        </p:nvPicPr>
+        <p:blipFill>
+          <a:blip r:embed="rId3"/>
+          <a:stretch>
+            <a:fillRect/>
+          </a:stretch>
+        </p:blipFill>
+        <p:spPr>
+          <a:xfrm>
+            <a:off x="57601" y="1189856"/>
+            <a:ext cx="1068259" cy="1556792"/>
+          </a:xfrm>
+          <a:prstGeom prst="rect">
+            <a:avLst/>
+          </a:prstGeom>
+          <a:ln>
+            <a:noFill/>
+          </a:ln>
+          <a:effectLst>
+            <a:outerShdw blurRad="292100" dist="139700" dir="2700000" algn="tl" rotWithShape="0">
+              <a:srgbClr val="333333">
+                <a:alpha val="65000"/>
+              </a:srgbClr>
+            </a:outerShdw>
+          </a:effectLst>
+        </p:spPr>
+      </p:pic>
+      <p:sp>
+        <p:nvSpPr>
+          <p:cNvPr id="2" name="TextBox 1">
+            <a:extLst>
+              <a:ext uri="{FF2B5EF4-FFF2-40B4-BE49-F238E27FC236}">
+                <a16:creationId xmlns:a16="http://schemas.microsoft.com/office/drawing/2014/main" id="{CAB2C784-DE74-68FC-7A84-3E6C5D164315}"/>
+              </a:ext>
+            </a:extLst>
+          </p:cNvPr>
+          <p:cNvSpPr txBox="1"/>
+          <p:nvPr/>
+        </p:nvSpPr>
+        <p:spPr>
+          <a:xfrm>
+            <a:off x="405780" y="5722972"/>
+            <a:ext cx="7951216" cy="523220"/>
+          </a:xfrm>
+          <a:prstGeom prst="rect">
+            <a:avLst/>
+          </a:prstGeom>
+          <a:solidFill>
+            <a:schemeClr val="bg1">
+              <a:lumMod val="95000"/>
+            </a:schemeClr>
+          </a:solidFill>
+          <a:ln>
+            <a:solidFill>
+              <a:schemeClr val="bg2"/>
+            </a:solidFill>
+          </a:ln>
+        </p:spPr>
+        <p:txBody>
+          <a:bodyPr wrap="none" rtlCol="0" anchor="ctr" anchorCtr="1">
+            <a:spAutoFit/>
+          </a:bodyPr>
+          <a:lstStyle/>
+          <a:p>
+            <a:r>
+              <a:rPr lang="en-US" sz="2800" dirty="0">
+                <a:hlinkClick r:id="rId4"/>
+              </a:rPr>
+              <a:t>https://github.com/yasenstar/python_with_office</a:t>
+            </a:r>
+            <a:endParaRPr lang="en-US" sz="2800" dirty="0"/>
+          </a:p>
+        </p:txBody>
+      </p:sp>
+      <p:sp>
+        <p:nvSpPr>
+          <p:cNvPr id="9" name="TextBox 8">
+            <a:extLst>
+              <a:ext uri="{FF2B5EF4-FFF2-40B4-BE49-F238E27FC236}">
+                <a16:creationId xmlns:a16="http://schemas.microsoft.com/office/drawing/2014/main" id="{C25C84F5-3AA3-A068-7E2F-9123CA5A7D16}"/>
+              </a:ext>
+            </a:extLst>
+          </p:cNvPr>
+          <p:cNvSpPr txBox="1"/>
+          <p:nvPr/>
+        </p:nvSpPr>
+        <p:spPr>
+          <a:xfrm>
+            <a:off x="405780" y="6246192"/>
+            <a:ext cx="7951216" cy="523220"/>
+          </a:xfrm>
+          <a:prstGeom prst="rect">
+            <a:avLst/>
+          </a:prstGeom>
+          <a:solidFill>
+            <a:schemeClr val="bg1">
+              <a:lumMod val="95000"/>
+            </a:schemeClr>
+          </a:solidFill>
+          <a:ln>
+            <a:solidFill>
+              <a:schemeClr val="bg2"/>
+            </a:solidFill>
+          </a:ln>
+        </p:spPr>
+        <p:txBody>
+          <a:bodyPr wrap="square" rtlCol="0" anchor="ctr" anchorCtr="1">
+            <a:spAutoFit/>
+          </a:bodyPr>
+          <a:lstStyle/>
+          <a:p>
+            <a:r>
+              <a:rPr lang="en-US" sz="2800" dirty="0">
+                <a:hlinkClick r:id="rId5"/>
+              </a:rPr>
+              <a:t>https://gitee.com/yasenstar/python_with_office</a:t>
+            </a:r>
+            <a:endParaRPr lang="en-US" sz="2800" dirty="0"/>
+          </a:p>
+        </p:txBody>
+      </p:sp>
+      <p:pic>
+        <p:nvPicPr>
+          <p:cNvPr id="7" name="Picture 6">
+            <a:extLst>
+              <a:ext uri="{FF2B5EF4-FFF2-40B4-BE49-F238E27FC236}">
+                <a16:creationId xmlns:a16="http://schemas.microsoft.com/office/drawing/2014/main" id="{4C47AB2F-4A6D-FDCB-80C1-18B414222519}"/>
+              </a:ext>
+            </a:extLst>
+          </p:cNvPr>
+          <p:cNvPicPr>
+            <a:picLocks noChangeAspect="1"/>
+          </p:cNvPicPr>
+          <p:nvPr/>
+        </p:nvPicPr>
+        <p:blipFill>
+          <a:blip r:embed="rId6"/>
+          <a:stretch>
+            <a:fillRect/>
+          </a:stretch>
+        </p:blipFill>
+        <p:spPr>
+          <a:xfrm>
+            <a:off x="6094412" y="373791"/>
+            <a:ext cx="5760640" cy="5219249"/>
+          </a:xfrm>
+          <a:prstGeom prst="rect">
+            <a:avLst/>
+          </a:prstGeom>
+          <a:ln>
+            <a:noFill/>
+          </a:ln>
+          <a:effectLst>
+            <a:outerShdw blurRad="292100" dist="139700" dir="2700000" algn="tl" rotWithShape="0">
+              <a:srgbClr val="333333">
+                <a:alpha val="65000"/>
+              </a:srgbClr>
+            </a:outerShdw>
+          </a:effectLst>
+        </p:spPr>
+      </p:pic>
+      <p:sp>
+        <p:nvSpPr>
+          <p:cNvPr id="8" name="Rectangle 7">
+            <a:extLst>
+              <a:ext uri="{FF2B5EF4-FFF2-40B4-BE49-F238E27FC236}">
+                <a16:creationId xmlns:a16="http://schemas.microsoft.com/office/drawing/2014/main" id="{BF240C6B-5810-C38F-A5D9-138DB3FF9663}"/>
+              </a:ext>
+            </a:extLst>
+          </p:cNvPr>
+          <p:cNvSpPr/>
+          <p:nvPr/>
+        </p:nvSpPr>
+        <p:spPr>
+          <a:xfrm>
+            <a:off x="7318548" y="4581128"/>
+            <a:ext cx="4740667" cy="1080120"/>
+          </a:xfrm>
+          <a:prstGeom prst="rect">
+            <a:avLst/>
+          </a:prstGeom>
+          <a:noFill/>
+          <a:ln w="38100">
+            <a:solidFill>
+              <a:srgbClr val="FF0000"/>
+            </a:solidFill>
+          </a:ln>
+        </p:spPr>
+        <p:style>
+          <a:lnRef idx="2">
+            <a:schemeClr val="accent3"/>
+          </a:lnRef>
+          <a:fillRef idx="1">
+            <a:schemeClr val="lt1"/>
+          </a:fillRef>
+          <a:effectRef idx="0">
+            <a:schemeClr val="accent3"/>
+          </a:effectRef>
+          <a:fontRef idx="minor">
+            <a:schemeClr val="dk1"/>
+          </a:fontRef>
+        </p:style>
+        <p:txBody>
+          <a:bodyPr rtlCol="0" anchor="ctr"/>
+          <a:lstStyle/>
+          <a:p>
+            <a:pPr algn="ctr"/>
+            <a:endParaRPr lang="en-US" dirty="0"/>
+          </a:p>
+        </p:txBody>
+      </p:sp>
+    </p:spTree>
+    <p:extLst>
+      <p:ext uri="{BB962C8B-B14F-4D97-AF65-F5344CB8AC3E}">
+        <p14:creationId xmlns:p14="http://schemas.microsoft.com/office/powerpoint/2010/main" val="775645733"/>
+      </p:ext>
+    </p:extLst>
+  </p:cSld>
+  <p:clrMapOvr>
+    <a:masterClrMapping/>
+  </p:clrMapOvr>
+  <mc:AlternateContent xmlns:mc="http://schemas.openxmlformats.org/markup-compatibility/2006">
+    <mc:Choice xmlns:p14="http://schemas.microsoft.com/office/powerpoint/2010/main" Requires="p14">
+      <p:transition spd="med" p14:dur="700">
+        <p:fade/>
+      </p:transition>
+    </mc:Choice>
+    <mc:Fallback>
       <p:transition spd="med">
         <p:fade/>
       </p:transition>

</xml_diff>

<commit_message>
add 8-1 and 8-2
</commit_message>
<xml_diff>
--- a/Python-with-Office-Video_Covers.pptx
+++ b/Python-with-Office-Video_Covers.pptx
@@ -5,10 +5,10 @@
     <p:sldMasterId id="2147483660" r:id="rId1"/>
   </p:sldMasterIdLst>
   <p:notesMasterIdLst>
-    <p:notesMasterId r:id="rId62"/>
+    <p:notesMasterId r:id="rId63"/>
   </p:notesMasterIdLst>
   <p:handoutMasterIdLst>
-    <p:handoutMasterId r:id="rId63"/>
+    <p:handoutMasterId r:id="rId64"/>
   </p:handoutMasterIdLst>
   <p:sldIdLst>
     <p:sldId id="257" r:id="rId2"/>
@@ -71,6 +71,7 @@
     <p:sldId id="315" r:id="rId59"/>
     <p:sldId id="316" r:id="rId60"/>
     <p:sldId id="317" r:id="rId61"/>
+    <p:sldId id="318" r:id="rId62"/>
   </p:sldIdLst>
   <p:sldSz cx="12188825" cy="6858000"/>
   <p:notesSz cx="6858000" cy="9144000"/>
@@ -333,7 +334,7 @@
           <a:p>
             <a:fld id="{24CE221E-83ED-4F6C-BA5F-3F9E6FDB6953}" type="datetimeFigureOut">
               <a:rPr lang="en-US"/>
-              <a:t>12/10/2023</a:t>
+              <a:t>12/11/2023</a:t>
             </a:fld>
             <a:endParaRPr dirty="0"/>
           </a:p>
@@ -498,7 +499,7 @@
           <a:p>
             <a:fld id="{97853E5F-CE67-483C-A264-F17AC70E9CA2}" type="datetimeFigureOut">
               <a:rPr lang="en-US"/>
-              <a:t>12/10/2023</a:t>
+              <a:t>12/11/2023</a:t>
             </a:fld>
             <a:endParaRPr dirty="0"/>
           </a:p>
@@ -5548,6 +5549,90 @@
 </p:notes>
 </file>
 
+<file path=ppt/notesSlides/notesSlide61.xml><?xml version="1.0" encoding="utf-8"?>
+<p:notes xmlns:a="http://schemas.openxmlformats.org/drawingml/2006/main" xmlns:r="http://schemas.openxmlformats.org/officeDocument/2006/relationships" xmlns:p="http://schemas.openxmlformats.org/presentationml/2006/main">
+  <p:cSld>
+    <p:spTree>
+      <p:nvGrpSpPr>
+        <p:cNvPr id="1" name=""/>
+        <p:cNvGrpSpPr/>
+        <p:nvPr/>
+      </p:nvGrpSpPr>
+      <p:grpSpPr>
+        <a:xfrm>
+          <a:off x="0" y="0"/>
+          <a:ext cx="0" cy="0"/>
+          <a:chOff x="0" y="0"/>
+          <a:chExt cx="0" cy="0"/>
+        </a:xfrm>
+      </p:grpSpPr>
+      <p:sp>
+        <p:nvSpPr>
+          <p:cNvPr id="2" name="Slide Image Placeholder 1"/>
+          <p:cNvSpPr>
+            <a:spLocks noGrp="1" noRot="1" noChangeAspect="1"/>
+          </p:cNvSpPr>
+          <p:nvPr>
+            <p:ph type="sldImg"/>
+          </p:nvPr>
+        </p:nvSpPr>
+        <p:spPr/>
+      </p:sp>
+      <p:sp>
+        <p:nvSpPr>
+          <p:cNvPr id="3" name="Notes Placeholder 2"/>
+          <p:cNvSpPr>
+            <a:spLocks noGrp="1"/>
+          </p:cNvSpPr>
+          <p:nvPr>
+            <p:ph type="body" idx="1"/>
+          </p:nvPr>
+        </p:nvSpPr>
+        <p:spPr/>
+        <p:txBody>
+          <a:bodyPr/>
+          <a:lstStyle/>
+          <a:p>
+            <a:endParaRPr lang="en-US" dirty="0"/>
+          </a:p>
+        </p:txBody>
+      </p:sp>
+      <p:sp>
+        <p:nvSpPr>
+          <p:cNvPr id="4" name="Slide Number Placeholder 3"/>
+          <p:cNvSpPr>
+            <a:spLocks noGrp="1"/>
+          </p:cNvSpPr>
+          <p:nvPr>
+            <p:ph type="sldNum" sz="quarter" idx="10"/>
+          </p:nvPr>
+        </p:nvSpPr>
+        <p:spPr/>
+        <p:txBody>
+          <a:bodyPr/>
+          <a:lstStyle/>
+          <a:p>
+            <a:fld id="{6BB98AFB-CB0D-4DFE-87B9-B4B0D0DE73CD}" type="slidenum">
+              <a:rPr lang="en-US" smtClean="0"/>
+              <a:t>61</a:t>
+            </a:fld>
+            <a:endParaRPr lang="en-US" dirty="0"/>
+          </a:p>
+        </p:txBody>
+      </p:sp>
+    </p:spTree>
+    <p:extLst>
+      <p:ext uri="{BB962C8B-B14F-4D97-AF65-F5344CB8AC3E}">
+        <p14:creationId xmlns:p14="http://schemas.microsoft.com/office/powerpoint/2010/main" val="2753635112"/>
+      </p:ext>
+    </p:extLst>
+  </p:cSld>
+  <p:clrMapOvr>
+    <a:masterClrMapping/>
+  </p:clrMapOvr>
+</p:notes>
+</file>
+
 <file path=ppt/notesSlides/notesSlide7.xml><?xml version="1.0" encoding="utf-8"?>
 <p:notes xmlns:a="http://schemas.openxmlformats.org/drawingml/2006/main" xmlns:r="http://schemas.openxmlformats.org/officeDocument/2006/relationships" xmlns:p="http://schemas.openxmlformats.org/presentationml/2006/main">
   <p:cSld>
@@ -6046,7 +6131,7 @@
           <a:p>
             <a:fld id="{3E0FA9E5-6744-4841-888F-9E7CC0C2B7EC}" type="datetimeFigureOut">
               <a:rPr lang="en-US" smtClean="0"/>
-              <a:t>12/10/2023</a:t>
+              <a:t>12/11/2023</a:t>
             </a:fld>
             <a:endParaRPr lang="en-US" dirty="0"/>
           </a:p>
@@ -6236,7 +6321,7 @@
           <a:p>
             <a:fld id="{3E0FA9E5-6744-4841-888F-9E7CC0C2B7EC}" type="datetimeFigureOut">
               <a:rPr lang="en-US" smtClean="0"/>
-              <a:t>12/10/2023</a:t>
+              <a:t>12/11/2023</a:t>
             </a:fld>
             <a:endParaRPr lang="en-US" dirty="0"/>
           </a:p>
@@ -6431,7 +6516,7 @@
           <a:p>
             <a:fld id="{3E0FA9E5-6744-4841-888F-9E7CC0C2B7EC}" type="datetimeFigureOut">
               <a:rPr lang="en-US" smtClean="0"/>
-              <a:t>12/10/2023</a:t>
+              <a:t>12/11/2023</a:t>
             </a:fld>
             <a:endParaRPr lang="en-US" dirty="0"/>
           </a:p>
@@ -6616,7 +6701,7 @@
           <a:p>
             <a:fld id="{3E0FA9E5-6744-4841-888F-9E7CC0C2B7EC}" type="datetimeFigureOut">
               <a:rPr lang="en-US" smtClean="0"/>
-              <a:t>12/10/2023</a:t>
+              <a:t>12/11/2023</a:t>
             </a:fld>
             <a:endParaRPr lang="en-US" dirty="0"/>
           </a:p>
@@ -6885,7 +6970,7 @@
           <a:p>
             <a:fld id="{3E0FA9E5-6744-4841-888F-9E7CC0C2B7EC}" type="datetimeFigureOut">
               <a:rPr lang="en-US" smtClean="0"/>
-              <a:t>12/10/2023</a:t>
+              <a:t>12/11/2023</a:t>
             </a:fld>
             <a:endParaRPr lang="en-US" dirty="0"/>
           </a:p>
@@ -7192,7 +7277,7 @@
           <a:p>
             <a:fld id="{3E0FA9E5-6744-4841-888F-9E7CC0C2B7EC}" type="datetimeFigureOut">
               <a:rPr lang="en-US" smtClean="0"/>
-              <a:t>12/10/2023</a:t>
+              <a:t>12/11/2023</a:t>
             </a:fld>
             <a:endParaRPr lang="en-US" dirty="0"/>
           </a:p>
@@ -7648,7 +7733,7 @@
           <a:p>
             <a:fld id="{3E0FA9E5-6744-4841-888F-9E7CC0C2B7EC}" type="datetimeFigureOut">
               <a:rPr lang="en-US" smtClean="0"/>
-              <a:t>12/10/2023</a:t>
+              <a:t>12/11/2023</a:t>
             </a:fld>
             <a:endParaRPr lang="en-US" dirty="0"/>
           </a:p>
@@ -7781,7 +7866,7 @@
           <a:p>
             <a:fld id="{3E0FA9E5-6744-4841-888F-9E7CC0C2B7EC}" type="datetimeFigureOut">
               <a:rPr lang="en-US" smtClean="0"/>
-              <a:t>12/10/2023</a:t>
+              <a:t>12/11/2023</a:t>
             </a:fld>
             <a:endParaRPr lang="en-US" dirty="0"/>
           </a:p>
@@ -7891,7 +7976,7 @@
           <a:p>
             <a:fld id="{3E0FA9E5-6744-4841-888F-9E7CC0C2B7EC}" type="datetimeFigureOut">
               <a:rPr lang="en-US" smtClean="0"/>
-              <a:t>12/10/2023</a:t>
+              <a:t>12/11/2023</a:t>
             </a:fld>
             <a:endParaRPr lang="en-US" dirty="0"/>
           </a:p>
@@ -8202,7 +8287,7 @@
           <a:p>
             <a:fld id="{3E0FA9E5-6744-4841-888F-9E7CC0C2B7EC}" type="datetimeFigureOut">
               <a:rPr lang="en-US" smtClean="0"/>
-              <a:t>12/10/2023</a:t>
+              <a:t>12/11/2023</a:t>
             </a:fld>
             <a:endParaRPr lang="en-US" dirty="0"/>
           </a:p>
@@ -8679,7 +8764,7 @@
             <a:fld id="{3E0FA9E5-6744-4841-888F-9E7CC0C2B7EC}" type="datetimeFigureOut">
               <a:rPr lang="en-US" smtClean="0"/>
               <a:pPr/>
-              <a:t>12/10/2023</a:t>
+              <a:t>12/11/2023</a:t>
             </a:fld>
             <a:endParaRPr lang="en-US" dirty="0"/>
           </a:p>
@@ -30813,13 +30898,13 @@
   <p:clrMapOvr>
     <a:masterClrMapping/>
   </p:clrMapOvr>
-  <mc:AlternateContent xmlns:mc="http://schemas.openxmlformats.org/markup-compatibility/2006">
-    <mc:Choice xmlns:p14="http://schemas.microsoft.com/office/powerpoint/2010/main" Requires="p14">
+  <mc:AlternateContent xmlns:mc="http://schemas.openxmlformats.org/markup-compatibility/2006" xmlns:p14="http://schemas.microsoft.com/office/powerpoint/2010/main">
+    <mc:Choice Requires="p14">
       <p:transition spd="med" p14:dur="700">
         <p:fade/>
       </p:transition>
     </mc:Choice>
-    <mc:Fallback>
+    <mc:Fallback xmlns="">
       <p:transition spd="med">
         <p:fade/>
       </p:transition>
@@ -31238,13 +31323,13 @@
   <p:clrMapOvr>
     <a:masterClrMapping/>
   </p:clrMapOvr>
-  <mc:AlternateContent xmlns:mc="http://schemas.openxmlformats.org/markup-compatibility/2006">
-    <mc:Choice xmlns:p14="http://schemas.microsoft.com/office/powerpoint/2010/main" Requires="p14">
+  <mc:AlternateContent xmlns:mc="http://schemas.openxmlformats.org/markup-compatibility/2006" xmlns:p14="http://schemas.microsoft.com/office/powerpoint/2010/main">
+    <mc:Choice Requires="p14">
       <p:transition spd="med" p14:dur="700">
         <p:fade/>
       </p:transition>
     </mc:Choice>
-    <mc:Fallback>
+    <mc:Fallback xmlns="">
       <p:transition spd="med">
         <p:fade/>
       </p:transition>
@@ -32007,13 +32092,443 @@
   <p:clrMapOvr>
     <a:masterClrMapping/>
   </p:clrMapOvr>
-  <mc:AlternateContent xmlns:mc="http://schemas.openxmlformats.org/markup-compatibility/2006">
-    <mc:Choice xmlns:p14="http://schemas.microsoft.com/office/powerpoint/2010/main" Requires="p14">
+  <mc:AlternateContent xmlns:mc="http://schemas.openxmlformats.org/markup-compatibility/2006" xmlns:p14="http://schemas.microsoft.com/office/powerpoint/2010/main">
+    <mc:Choice Requires="p14">
       <p:transition spd="med" p14:dur="700">
         <p:fade/>
       </p:transition>
     </mc:Choice>
-    <mc:Fallback>
+    <mc:Fallback xmlns="">
+      <p:transition spd="med">
+        <p:fade/>
+      </p:transition>
+    </mc:Fallback>
+  </mc:AlternateContent>
+</p:sld>
+</file>
+
+<file path=ppt/slides/slide61.xml><?xml version="1.0" encoding="utf-8"?>
+<p:sld xmlns:a="http://schemas.openxmlformats.org/drawingml/2006/main" xmlns:r="http://schemas.openxmlformats.org/officeDocument/2006/relationships" xmlns:p="http://schemas.openxmlformats.org/presentationml/2006/main">
+  <p:cSld>
+    <p:spTree>
+      <p:nvGrpSpPr>
+        <p:cNvPr id="1" name=""/>
+        <p:cNvGrpSpPr/>
+        <p:nvPr/>
+      </p:nvGrpSpPr>
+      <p:grpSpPr>
+        <a:xfrm>
+          <a:off x="0" y="0"/>
+          <a:ext cx="0" cy="0"/>
+          <a:chOff x="0" y="0"/>
+          <a:chExt cx="0" cy="0"/>
+        </a:xfrm>
+      </p:grpSpPr>
+      <p:pic>
+        <p:nvPicPr>
+          <p:cNvPr id="10" name="Picture 9">
+            <a:extLst>
+              <a:ext uri="{FF2B5EF4-FFF2-40B4-BE49-F238E27FC236}">
+                <a16:creationId xmlns:a16="http://schemas.microsoft.com/office/drawing/2014/main" id="{AB4B1231-1F53-8F9E-463F-14C0F228DC92}"/>
+              </a:ext>
+            </a:extLst>
+          </p:cNvPr>
+          <p:cNvPicPr>
+            <a:picLocks noChangeAspect="1"/>
+          </p:cNvPicPr>
+          <p:nvPr/>
+        </p:nvPicPr>
+        <p:blipFill>
+          <a:blip r:embed="rId3"/>
+          <a:stretch>
+            <a:fillRect/>
+          </a:stretch>
+        </p:blipFill>
+        <p:spPr>
+          <a:xfrm>
+            <a:off x="6094412" y="1060331"/>
+            <a:ext cx="5741226" cy="4595775"/>
+          </a:xfrm>
+          <a:prstGeom prst="rect">
+            <a:avLst/>
+          </a:prstGeom>
+          <a:ln>
+            <a:noFill/>
+          </a:ln>
+          <a:effectLst>
+            <a:outerShdw blurRad="292100" dist="139700" dir="2700000" algn="tl" rotWithShape="0">
+              <a:srgbClr val="333333">
+                <a:alpha val="65000"/>
+              </a:srgbClr>
+            </a:outerShdw>
+          </a:effectLst>
+        </p:spPr>
+      </p:pic>
+      <p:sp>
+        <p:nvSpPr>
+          <p:cNvPr id="4" name="Title 3"/>
+          <p:cNvSpPr>
+            <a:spLocks noGrp="1"/>
+          </p:cNvSpPr>
+          <p:nvPr>
+            <p:ph type="ctrTitle"/>
+          </p:nvPr>
+        </p:nvSpPr>
+        <p:spPr/>
+        <p:txBody>
+          <a:bodyPr>
+            <a:normAutofit/>
+          </a:bodyPr>
+          <a:lstStyle/>
+          <a:p>
+            <a:pPr algn="ctr"/>
+            <a:r>
+              <a:rPr lang="zh-CN" altLang="en-US" sz="4800" dirty="0">
+                <a:latin typeface="华文隶书" panose="02010800040101010101" pitchFamily="2" charset="-122"/>
+                <a:ea typeface="华文隶书" panose="02010800040101010101" pitchFamily="2" charset="-122"/>
+              </a:rPr>
+              <a:t>让</a:t>
+            </a:r>
+            <a:r>
+              <a:rPr lang="en-US" altLang="zh-CN" sz="4800" dirty="0">
+                <a:latin typeface="华文隶书" panose="02010800040101010101" pitchFamily="2" charset="-122"/>
+                <a:ea typeface="华文隶书" panose="02010800040101010101" pitchFamily="2" charset="-122"/>
+              </a:rPr>
+              <a:t>Python</a:t>
+            </a:r>
+            <a:r>
+              <a:rPr lang="zh-CN" altLang="en-US" sz="4800" dirty="0">
+                <a:latin typeface="华文隶书" panose="02010800040101010101" pitchFamily="2" charset="-122"/>
+                <a:ea typeface="华文隶书" panose="02010800040101010101" pitchFamily="2" charset="-122"/>
+              </a:rPr>
+              <a:t>遇上</a:t>
+            </a:r>
+            <a:r>
+              <a:rPr lang="en-US" altLang="zh-CN" sz="4800" dirty="0">
+                <a:latin typeface="华文隶书" panose="02010800040101010101" pitchFamily="2" charset="-122"/>
+                <a:ea typeface="华文隶书" panose="02010800040101010101" pitchFamily="2" charset="-122"/>
+              </a:rPr>
+              <a:t>Office</a:t>
+            </a:r>
+            <a:br>
+              <a:rPr lang="en-US" altLang="zh-CN" sz="4800" dirty="0">
+                <a:latin typeface="华文隶书" panose="02010800040101010101" pitchFamily="2" charset="-122"/>
+                <a:ea typeface="华文隶书" panose="02010800040101010101" pitchFamily="2" charset="-122"/>
+              </a:rPr>
+            </a:br>
+            <a:br>
+              <a:rPr lang="en-US" altLang="zh-CN" sz="4800" dirty="0">
+                <a:latin typeface="华文隶书" panose="02010800040101010101" pitchFamily="2" charset="-122"/>
+                <a:ea typeface="华文隶书" panose="02010800040101010101" pitchFamily="2" charset="-122"/>
+              </a:rPr>
+            </a:br>
+            <a:r>
+              <a:rPr lang="en-US" altLang="zh-CN" sz="4800" dirty="0">
+                <a:latin typeface="华文隶书" panose="02010800040101010101" pitchFamily="2" charset="-122"/>
+                <a:ea typeface="华文隶书" panose="02010800040101010101" pitchFamily="2" charset="-122"/>
+              </a:rPr>
+              <a:t>(Python with Office)</a:t>
+            </a:r>
+            <a:endParaRPr lang="en-US" sz="4800" dirty="0">
+              <a:latin typeface="华文隶书" panose="02010800040101010101" pitchFamily="2" charset="-122"/>
+              <a:ea typeface="华文隶书" panose="02010800040101010101" pitchFamily="2" charset="-122"/>
+            </a:endParaRPr>
+          </a:p>
+        </p:txBody>
+      </p:sp>
+      <p:sp>
+        <p:nvSpPr>
+          <p:cNvPr id="3" name="Content Placeholder 2"/>
+          <p:cNvSpPr>
+            <a:spLocks noGrp="1"/>
+          </p:cNvSpPr>
+          <p:nvPr>
+            <p:ph type="subTitle" idx="1"/>
+          </p:nvPr>
+        </p:nvSpPr>
+        <p:spPr>
+          <a:xfrm>
+            <a:off x="549796" y="3403600"/>
+            <a:ext cx="5544617" cy="2185640"/>
+          </a:xfrm>
+        </p:spPr>
+        <p:txBody>
+          <a:bodyPr>
+            <a:normAutofit fontScale="92500"/>
+          </a:bodyPr>
+          <a:lstStyle/>
+          <a:p>
+            <a:r>
+              <a:rPr lang="en-US" sz="2800" dirty="0">
+                <a:latin typeface="ADLaM Display" panose="020F0502020204030204" pitchFamily="2" charset="0"/>
+                <a:ea typeface="ADLaM Display" panose="020F0502020204030204" pitchFamily="2" charset="0"/>
+                <a:cs typeface="ADLaM Display" panose="020F0502020204030204" pitchFamily="2" charset="0"/>
+              </a:rPr>
+              <a:t>Chapter 8 Work with PPT</a:t>
+            </a:r>
+          </a:p>
+          <a:p>
+            <a:r>
+              <a:rPr lang="en-US" sz="2800" dirty="0">
+                <a:latin typeface="ADLaM Display" panose="020F0502020204030204" pitchFamily="2" charset="0"/>
+                <a:ea typeface="ADLaM Display" panose="020F0502020204030204" pitchFamily="2" charset="0"/>
+                <a:cs typeface="ADLaM Display" panose="020F0502020204030204" pitchFamily="2" charset="0"/>
+              </a:rPr>
+              <a:t>8.1 / 8.2 python-pptx, open/save</a:t>
+            </a:r>
+          </a:p>
+          <a:p>
+            <a:r>
+              <a:rPr lang="zh-CN" altLang="en-US" sz="2800" dirty="0">
+                <a:latin typeface="ADLaM Display" panose="020F0502020204030204" pitchFamily="2" charset="0"/>
+                <a:ea typeface="ADLaM Display" panose="020F0502020204030204" pitchFamily="2" charset="0"/>
+                <a:cs typeface="ADLaM Display" panose="020F0502020204030204" pitchFamily="2" charset="0"/>
+              </a:rPr>
+              <a:t>第七章 操作</a:t>
+            </a:r>
+            <a:r>
+              <a:rPr lang="en-US" altLang="zh-CN" sz="2800" dirty="0">
+                <a:latin typeface="ADLaM Display" panose="020F0502020204030204" pitchFamily="2" charset="0"/>
+                <a:ea typeface="ADLaM Display" panose="020F0502020204030204" pitchFamily="2" charset="0"/>
+                <a:cs typeface="ADLaM Display" panose="020F0502020204030204" pitchFamily="2" charset="0"/>
+              </a:rPr>
+              <a:t>PPT</a:t>
+            </a:r>
+          </a:p>
+          <a:p>
+            <a:r>
+              <a:rPr lang="en-US" sz="2800" dirty="0">
+                <a:latin typeface="ADLaM Display" panose="020F0502020204030204" pitchFamily="2" charset="0"/>
+                <a:ea typeface="ADLaM Display" panose="020F0502020204030204" pitchFamily="2" charset="0"/>
+                <a:cs typeface="ADLaM Display" panose="020F0502020204030204" pitchFamily="2" charset="0"/>
+              </a:rPr>
+              <a:t>8.1 / 8.2 python-pptx,</a:t>
+            </a:r>
+            <a:r>
+              <a:rPr lang="en-US" altLang="zh-CN" sz="2800" dirty="0">
+                <a:latin typeface="ADLaM Display" panose="020F0502020204030204" pitchFamily="2" charset="0"/>
+                <a:ea typeface="ADLaM Display" panose="020F0502020204030204" pitchFamily="2" charset="0"/>
+                <a:cs typeface="ADLaM Display" panose="020F0502020204030204" pitchFamily="2" charset="0"/>
+              </a:rPr>
+              <a:t> </a:t>
+            </a:r>
+            <a:r>
+              <a:rPr lang="zh-CN" altLang="en-US" sz="2800" dirty="0">
+                <a:latin typeface="ADLaM Display" panose="020F0502020204030204" pitchFamily="2" charset="0"/>
+                <a:ea typeface="ADLaM Display" panose="020F0502020204030204" pitchFamily="2" charset="0"/>
+                <a:cs typeface="ADLaM Display" panose="020F0502020204030204" pitchFamily="2" charset="0"/>
+              </a:rPr>
+              <a:t>打开与保存</a:t>
+            </a:r>
+            <a:endParaRPr lang="en-US" altLang="zh-CN" sz="2800" dirty="0">
+              <a:latin typeface="ADLaM Display" panose="020F0502020204030204" pitchFamily="2" charset="0"/>
+              <a:ea typeface="ADLaM Display" panose="020F0502020204030204" pitchFamily="2" charset="0"/>
+              <a:cs typeface="ADLaM Display" panose="020F0502020204030204" pitchFamily="2" charset="0"/>
+            </a:endParaRPr>
+          </a:p>
+        </p:txBody>
+      </p:sp>
+      <p:pic>
+        <p:nvPicPr>
+          <p:cNvPr id="5" name="Picture 4">
+            <a:extLst>
+              <a:ext uri="{FF2B5EF4-FFF2-40B4-BE49-F238E27FC236}">
+                <a16:creationId xmlns:a16="http://schemas.microsoft.com/office/drawing/2014/main" id="{4AD8B85C-B359-195F-B78C-C879AB7840B1}"/>
+              </a:ext>
+            </a:extLst>
+          </p:cNvPr>
+          <p:cNvPicPr>
+            <a:picLocks noChangeAspect="1"/>
+          </p:cNvPicPr>
+          <p:nvPr/>
+        </p:nvPicPr>
+        <p:blipFill>
+          <a:blip r:embed="rId4"/>
+          <a:stretch>
+            <a:fillRect/>
+          </a:stretch>
+        </p:blipFill>
+        <p:spPr>
+          <a:xfrm>
+            <a:off x="57601" y="1189856"/>
+            <a:ext cx="1068259" cy="1556792"/>
+          </a:xfrm>
+          <a:prstGeom prst="rect">
+            <a:avLst/>
+          </a:prstGeom>
+          <a:ln>
+            <a:noFill/>
+          </a:ln>
+          <a:effectLst>
+            <a:outerShdw blurRad="292100" dist="139700" dir="2700000" algn="tl" rotWithShape="0">
+              <a:srgbClr val="333333">
+                <a:alpha val="65000"/>
+              </a:srgbClr>
+            </a:outerShdw>
+          </a:effectLst>
+        </p:spPr>
+      </p:pic>
+      <p:sp>
+        <p:nvSpPr>
+          <p:cNvPr id="2" name="TextBox 1">
+            <a:extLst>
+              <a:ext uri="{FF2B5EF4-FFF2-40B4-BE49-F238E27FC236}">
+                <a16:creationId xmlns:a16="http://schemas.microsoft.com/office/drawing/2014/main" id="{CAB2C784-DE74-68FC-7A84-3E6C5D164315}"/>
+              </a:ext>
+            </a:extLst>
+          </p:cNvPr>
+          <p:cNvSpPr txBox="1"/>
+          <p:nvPr/>
+        </p:nvSpPr>
+        <p:spPr>
+          <a:xfrm>
+            <a:off x="405780" y="5722972"/>
+            <a:ext cx="7951216" cy="523220"/>
+          </a:xfrm>
+          <a:prstGeom prst="rect">
+            <a:avLst/>
+          </a:prstGeom>
+          <a:solidFill>
+            <a:schemeClr val="bg1">
+              <a:lumMod val="95000"/>
+            </a:schemeClr>
+          </a:solidFill>
+          <a:ln>
+            <a:solidFill>
+              <a:schemeClr val="bg2"/>
+            </a:solidFill>
+          </a:ln>
+        </p:spPr>
+        <p:txBody>
+          <a:bodyPr wrap="none" rtlCol="0" anchor="ctr" anchorCtr="1">
+            <a:spAutoFit/>
+          </a:bodyPr>
+          <a:lstStyle/>
+          <a:p>
+            <a:r>
+              <a:rPr lang="en-US" sz="2800" dirty="0">
+                <a:hlinkClick r:id="rId5"/>
+              </a:rPr>
+              <a:t>https://github.com/yasenstar/python_with_office</a:t>
+            </a:r>
+            <a:endParaRPr lang="en-US" sz="2800" dirty="0"/>
+          </a:p>
+        </p:txBody>
+      </p:sp>
+      <p:sp>
+        <p:nvSpPr>
+          <p:cNvPr id="9" name="TextBox 8">
+            <a:extLst>
+              <a:ext uri="{FF2B5EF4-FFF2-40B4-BE49-F238E27FC236}">
+                <a16:creationId xmlns:a16="http://schemas.microsoft.com/office/drawing/2014/main" id="{C25C84F5-3AA3-A068-7E2F-9123CA5A7D16}"/>
+              </a:ext>
+            </a:extLst>
+          </p:cNvPr>
+          <p:cNvSpPr txBox="1"/>
+          <p:nvPr/>
+        </p:nvSpPr>
+        <p:spPr>
+          <a:xfrm>
+            <a:off x="405780" y="6246192"/>
+            <a:ext cx="7951216" cy="523220"/>
+          </a:xfrm>
+          <a:prstGeom prst="rect">
+            <a:avLst/>
+          </a:prstGeom>
+          <a:solidFill>
+            <a:schemeClr val="bg1">
+              <a:lumMod val="95000"/>
+            </a:schemeClr>
+          </a:solidFill>
+          <a:ln>
+            <a:solidFill>
+              <a:schemeClr val="bg2"/>
+            </a:solidFill>
+          </a:ln>
+        </p:spPr>
+        <p:txBody>
+          <a:bodyPr wrap="square" rtlCol="0" anchor="ctr" anchorCtr="1">
+            <a:spAutoFit/>
+          </a:bodyPr>
+          <a:lstStyle/>
+          <a:p>
+            <a:r>
+              <a:rPr lang="en-US" sz="2800" dirty="0">
+                <a:hlinkClick r:id="rId6"/>
+              </a:rPr>
+              <a:t>https://gitee.com/yasenstar/python_with_office</a:t>
+            </a:r>
+            <a:endParaRPr lang="en-US" sz="2800" dirty="0"/>
+          </a:p>
+        </p:txBody>
+      </p:sp>
+      <p:sp>
+        <p:nvSpPr>
+          <p:cNvPr id="8" name="Rectangle 7">
+            <a:extLst>
+              <a:ext uri="{FF2B5EF4-FFF2-40B4-BE49-F238E27FC236}">
+                <a16:creationId xmlns:a16="http://schemas.microsoft.com/office/drawing/2014/main" id="{BF240C6B-5810-C38F-A5D9-138DB3FF9663}"/>
+              </a:ext>
+            </a:extLst>
+          </p:cNvPr>
+          <p:cNvSpPr/>
+          <p:nvPr/>
+        </p:nvSpPr>
+        <p:spPr>
+          <a:xfrm>
+            <a:off x="7534571" y="1772816"/>
+            <a:ext cx="4176465" cy="1224136"/>
+          </a:xfrm>
+          <a:prstGeom prst="rect">
+            <a:avLst/>
+          </a:prstGeom>
+          <a:noFill/>
+          <a:ln w="38100">
+            <a:solidFill>
+              <a:srgbClr val="FF0000"/>
+            </a:solidFill>
+          </a:ln>
+        </p:spPr>
+        <p:style>
+          <a:lnRef idx="2">
+            <a:schemeClr val="accent3"/>
+          </a:lnRef>
+          <a:fillRef idx="1">
+            <a:schemeClr val="lt1"/>
+          </a:fillRef>
+          <a:effectRef idx="0">
+            <a:schemeClr val="accent3"/>
+          </a:effectRef>
+          <a:fontRef idx="minor">
+            <a:schemeClr val="dk1"/>
+          </a:fontRef>
+        </p:style>
+        <p:txBody>
+          <a:bodyPr rtlCol="0" anchor="ctr"/>
+          <a:lstStyle/>
+          <a:p>
+            <a:pPr algn="ctr"/>
+            <a:endParaRPr lang="en-US" dirty="0"/>
+          </a:p>
+        </p:txBody>
+      </p:sp>
+    </p:spTree>
+    <p:extLst>
+      <p:ext uri="{BB962C8B-B14F-4D97-AF65-F5344CB8AC3E}">
+        <p14:creationId xmlns:p14="http://schemas.microsoft.com/office/powerpoint/2010/main" val="94565053"/>
+      </p:ext>
+    </p:extLst>
+  </p:cSld>
+  <p:clrMapOvr>
+    <a:masterClrMapping/>
+  </p:clrMapOvr>
+  <mc:AlternateContent xmlns:mc="http://schemas.openxmlformats.org/markup-compatibility/2006" xmlns:p14="http://schemas.microsoft.com/office/powerpoint/2010/main">
+    <mc:Choice Requires="p14">
+      <p:transition spd="med" p14:dur="700">
+        <p:fade/>
+      </p:transition>
+    </mc:Choice>
+    <mc:Fallback xmlns="">
       <p:transition spd="med">
         <p:fade/>
       </p:transition>

</xml_diff>